<commit_message>
Changes made after meeting with Mike
</commit_message>
<xml_diff>
--- a/elsarticle/Images/Thesis charts.pptx
+++ b/elsarticle/Images/Thesis charts.pptx
@@ -129,7 +129,7 @@
   </p:defaultTextStyle>
   <p:extLst>
     <p:ext uri="{EFAFB233-063F-42B5-8137-9DF3F51BA10A}">
-      <p15:sldGuideLst xmlns="" xmlns:p15="http://schemas.microsoft.com/office/powerpoint/2012/main"/>
+      <p15:sldGuideLst xmlns:p15="http://schemas.microsoft.com/office/powerpoint/2012/main" xmlns=""/>
     </p:ext>
   </p:extLst>
 </p:presentation>
@@ -414,11 +414,11 @@
           <c:showPercent val="0"/>
           <c:showBubbleSize val="0"/>
         </c:dLbls>
-        <c:axId val="-2115831688"/>
-        <c:axId val="-2115608376"/>
+        <c:axId val="2107921352"/>
+        <c:axId val="2107930664"/>
       </c:scatterChart>
       <c:valAx>
-        <c:axId val="-2115831688"/>
+        <c:axId val="2107921352"/>
         <c:scaling>
           <c:orientation val="minMax"/>
         </c:scaling>
@@ -520,12 +520,12 @@
             <a:endParaRPr lang="en-US"/>
           </a:p>
         </c:txPr>
-        <c:crossAx val="-2115608376"/>
+        <c:crossAx val="2107930664"/>
         <c:crosses val="autoZero"/>
         <c:crossBetween val="midCat"/>
       </c:valAx>
       <c:valAx>
-        <c:axId val="-2115608376"/>
+        <c:axId val="2107930664"/>
         <c:scaling>
           <c:orientation val="minMax"/>
         </c:scaling>
@@ -631,7 +631,7 @@
             <a:endParaRPr lang="en-US"/>
           </a:p>
         </c:txPr>
-        <c:crossAx val="-2115831688"/>
+        <c:crossAx val="2107921352"/>
         <c:crosses val="autoZero"/>
         <c:crossBetween val="midCat"/>
       </c:valAx>
@@ -2326,11 +2326,11 @@
         </c:dLbls>
         <c:gapWidth val="150"/>
         <c:overlap val="100"/>
-        <c:axId val="-2100756088"/>
-        <c:axId val="-2100752504"/>
+        <c:axId val="2086078216"/>
+        <c:axId val="2086081800"/>
       </c:barChart>
       <c:catAx>
-        <c:axId val="-2100756088"/>
+        <c:axId val="2086078216"/>
         <c:scaling>
           <c:orientation val="minMax"/>
         </c:scaling>
@@ -2373,7 +2373,7 @@
             <a:endParaRPr lang="en-US"/>
           </a:p>
         </c:txPr>
-        <c:crossAx val="-2100752504"/>
+        <c:crossAx val="2086081800"/>
         <c:crosses val="autoZero"/>
         <c:auto val="1"/>
         <c:lblAlgn val="ctr"/>
@@ -2381,7 +2381,7 @@
         <c:noMultiLvlLbl val="0"/>
       </c:catAx>
       <c:valAx>
-        <c:axId val="-2100752504"/>
+        <c:axId val="2086081800"/>
         <c:scaling>
           <c:orientation val="minMax"/>
         </c:scaling>
@@ -2477,7 +2477,7 @@
             <a:endParaRPr lang="en-US"/>
           </a:p>
         </c:txPr>
-        <c:crossAx val="-2100756088"/>
+        <c:crossAx val="2086078216"/>
         <c:crosses val="autoZero"/>
         <c:crossBetween val="between"/>
       </c:valAx>
@@ -2860,11 +2860,11 @@
         </c:dLbls>
         <c:gapWidth val="219"/>
         <c:overlap val="-27"/>
-        <c:axId val="-2119743736"/>
-        <c:axId val="-2119740136"/>
+        <c:axId val="2086137112"/>
+        <c:axId val="2086140760"/>
       </c:barChart>
       <c:catAx>
-        <c:axId val="-2119743736"/>
+        <c:axId val="2086137112"/>
         <c:scaling>
           <c:orientation val="minMax"/>
         </c:scaling>
@@ -2904,7 +2904,7 @@
             <a:endParaRPr lang="en-US"/>
           </a:p>
         </c:txPr>
-        <c:crossAx val="-2119740136"/>
+        <c:crossAx val="2086140760"/>
         <c:crosses val="autoZero"/>
         <c:auto val="1"/>
         <c:lblAlgn val="ctr"/>
@@ -2912,7 +2912,7 @@
         <c:noMultiLvlLbl val="0"/>
       </c:catAx>
       <c:valAx>
-        <c:axId val="-2119740136"/>
+        <c:axId val="2086140760"/>
         <c:scaling>
           <c:orientation val="minMax"/>
         </c:scaling>
@@ -3033,7 +3033,7 @@
             <a:endParaRPr lang="en-US"/>
           </a:p>
         </c:txPr>
-        <c:crossAx val="-2119743736"/>
+        <c:crossAx val="2086137112"/>
         <c:crosses val="autoZero"/>
         <c:crossBetween val="between"/>
       </c:valAx>
@@ -3330,11 +3330,11 @@
         </c:dLbls>
         <c:gapWidth val="219"/>
         <c:overlap val="-27"/>
-        <c:axId val="-2138229448"/>
-        <c:axId val="-2115081576"/>
+        <c:axId val="2086198872"/>
+        <c:axId val="2086202504"/>
       </c:barChart>
       <c:catAx>
-        <c:axId val="-2138229448"/>
+        <c:axId val="2086198872"/>
         <c:scaling>
           <c:orientation val="minMax"/>
         </c:scaling>
@@ -3374,7 +3374,7 @@
             <a:endParaRPr lang="en-US"/>
           </a:p>
         </c:txPr>
-        <c:crossAx val="-2115081576"/>
+        <c:crossAx val="2086202504"/>
         <c:crosses val="autoZero"/>
         <c:auto val="1"/>
         <c:lblAlgn val="ctr"/>
@@ -3382,7 +3382,7 @@
         <c:noMultiLvlLbl val="0"/>
       </c:catAx>
       <c:valAx>
-        <c:axId val="-2115081576"/>
+        <c:axId val="2086202504"/>
         <c:scaling>
           <c:orientation val="minMax"/>
         </c:scaling>
@@ -3503,7 +3503,7 @@
             <a:endParaRPr lang="en-US"/>
           </a:p>
         </c:txPr>
-        <c:crossAx val="-2138229448"/>
+        <c:crossAx val="2086198872"/>
         <c:crosses val="autoZero"/>
         <c:crossBetween val="between"/>
       </c:valAx>
@@ -4033,7 +4033,7 @@
                   <c:v>-6.43</c:v>
                 </c:pt>
                 <c:pt idx="10">
-                  <c:v>-9.739999999999998</c:v>
+                  <c:v>-9.74</c:v>
                 </c:pt>
                 <c:pt idx="11">
                   <c:v>-13.05</c:v>
@@ -4068,11 +4068,11 @@
         </c:dLbls>
         <c:marker val="1"/>
         <c:smooth val="0"/>
-        <c:axId val="-2100676136"/>
-        <c:axId val="-2100672456"/>
+        <c:axId val="2086304088"/>
+        <c:axId val="2086307768"/>
       </c:lineChart>
       <c:catAx>
-        <c:axId val="-2100676136"/>
+        <c:axId val="2086304088"/>
         <c:scaling>
           <c:orientation val="minMax"/>
         </c:scaling>
@@ -4115,7 +4115,7 @@
             <a:endParaRPr lang="en-US"/>
           </a:p>
         </c:txPr>
-        <c:crossAx val="-2100672456"/>
+        <c:crossAx val="2086307768"/>
         <c:crosses val="autoZero"/>
         <c:auto val="1"/>
         <c:lblAlgn val="ctr"/>
@@ -4123,7 +4123,7 @@
         <c:noMultiLvlLbl val="0"/>
       </c:catAx>
       <c:valAx>
-        <c:axId val="-2100672456"/>
+        <c:axId val="2086307768"/>
         <c:scaling>
           <c:orientation val="minMax"/>
         </c:scaling>
@@ -4211,7 +4211,7 @@
             <a:endParaRPr lang="en-US"/>
           </a:p>
         </c:txPr>
-        <c:crossAx val="-2100676136"/>
+        <c:crossAx val="2086304088"/>
         <c:crosses val="autoZero"/>
         <c:crossBetween val="between"/>
       </c:valAx>
@@ -4823,11 +4823,11 @@
         </c:dLbls>
         <c:gapWidth val="219"/>
         <c:overlap val="-27"/>
-        <c:axId val="-2102310840"/>
-        <c:axId val="-2114913464"/>
+        <c:axId val="2113584248"/>
+        <c:axId val="2113588024"/>
       </c:barChart>
       <c:catAx>
-        <c:axId val="-2102310840"/>
+        <c:axId val="2113584248"/>
         <c:scaling>
           <c:orientation val="minMax"/>
         </c:scaling>
@@ -4870,7 +4870,7 @@
             <a:endParaRPr lang="en-US"/>
           </a:p>
         </c:txPr>
-        <c:crossAx val="-2114913464"/>
+        <c:crossAx val="2113588024"/>
         <c:crosses val="autoZero"/>
         <c:auto val="1"/>
         <c:lblAlgn val="ctr"/>
@@ -4878,7 +4878,7 @@
         <c:noMultiLvlLbl val="0"/>
       </c:catAx>
       <c:valAx>
-        <c:axId val="-2114913464"/>
+        <c:axId val="2113588024"/>
         <c:scaling>
           <c:orientation val="minMax"/>
         </c:scaling>
@@ -4982,7 +4982,7 @@
             <a:endParaRPr lang="en-US"/>
           </a:p>
         </c:txPr>
-        <c:crossAx val="-2102310840"/>
+        <c:crossAx val="2113584248"/>
         <c:crosses val="autoZero"/>
         <c:crossBetween val="between"/>
       </c:valAx>
@@ -5666,11 +5666,11 @@
         </c:dLbls>
         <c:gapWidth val="219"/>
         <c:overlap val="100"/>
-        <c:axId val="-2102179080"/>
-        <c:axId val="-2102175240"/>
+        <c:axId val="2144106072"/>
+        <c:axId val="2144109752"/>
       </c:barChart>
       <c:catAx>
-        <c:axId val="-2102179080"/>
+        <c:axId val="2144106072"/>
         <c:scaling>
           <c:orientation val="minMax"/>
         </c:scaling>
@@ -5713,7 +5713,7 @@
             <a:endParaRPr lang="en-US"/>
           </a:p>
         </c:txPr>
-        <c:crossAx val="-2102175240"/>
+        <c:crossAx val="2144109752"/>
         <c:crosses val="autoZero"/>
         <c:auto val="1"/>
         <c:lblAlgn val="ctr"/>
@@ -5721,7 +5721,7 @@
         <c:noMultiLvlLbl val="0"/>
       </c:catAx>
       <c:valAx>
-        <c:axId val="-2102175240"/>
+        <c:axId val="2144109752"/>
         <c:scaling>
           <c:orientation val="minMax"/>
         </c:scaling>
@@ -5843,7 +5843,7 @@
             <a:endParaRPr lang="en-US"/>
           </a:p>
         </c:txPr>
-        <c:crossAx val="-2102179080"/>
+        <c:crossAx val="2144106072"/>
         <c:crosses val="autoZero"/>
         <c:crossBetween val="between"/>
       </c:valAx>
@@ -6309,11 +6309,11 @@
         </c:dLbls>
         <c:gapWidth val="219"/>
         <c:overlap val="-27"/>
-        <c:axId val="-2100997352"/>
-        <c:axId val="-2100995960"/>
+        <c:axId val="2086373656"/>
+        <c:axId val="2108000744"/>
       </c:barChart>
       <c:catAx>
-        <c:axId val="-2100997352"/>
+        <c:axId val="2086373656"/>
         <c:scaling>
           <c:orientation val="minMax"/>
         </c:scaling>
@@ -6353,7 +6353,7 @@
             <a:endParaRPr lang="en-US"/>
           </a:p>
         </c:txPr>
-        <c:crossAx val="-2100995960"/>
+        <c:crossAx val="2108000744"/>
         <c:crosses val="autoZero"/>
         <c:auto val="1"/>
         <c:lblAlgn val="ctr"/>
@@ -6361,7 +6361,7 @@
         <c:noMultiLvlLbl val="0"/>
       </c:catAx>
       <c:valAx>
-        <c:axId val="-2100995960"/>
+        <c:axId val="2108000744"/>
         <c:scaling>
           <c:orientation val="minMax"/>
         </c:scaling>
@@ -6463,7 +6463,7 @@
             <a:endParaRPr lang="en-US"/>
           </a:p>
         </c:txPr>
-        <c:crossAx val="-2100997352"/>
+        <c:crossAx val="2086373656"/>
         <c:crosses val="autoZero"/>
         <c:crossBetween val="between"/>
       </c:valAx>
@@ -6614,7 +6614,7 @@
                   <c:v>419.0</c:v>
                 </c:pt>
                 <c:pt idx="2">
-                  <c:v>326.0</c:v>
+                  <c:v>221.0</c:v>
                 </c:pt>
               </c:numCache>
             </c:numRef>
@@ -6677,7 +6677,7 @@
                   <c:v>367.0</c:v>
                 </c:pt>
                 <c:pt idx="2">
-                  <c:v>221.0</c:v>
+                  <c:v>326.0</c:v>
                 </c:pt>
               </c:numCache>
             </c:numRef>
@@ -6713,15 +6713,6 @@
             <c:bubble3D val="0"/>
           </c:dPt>
           <c:dLbls>
-            <c:dLbl>
-              <c:idx val="0"/>
-              <c:delete val="1"/>
-              <c:extLst>
-                <c:ext xmlns:c15="http://schemas.microsoft.com/office/drawing/2012/chart" uri="{CE6537A1-D6FC-4f65-9D91-7224C49458BB}">
-                  <c15:layout/>
-                </c:ext>
-              </c:extLst>
-            </c:dLbl>
             <c:dLbl>
               <c:idx val="5"/>
               <c:tx>
@@ -6855,11 +6846,11 @@
         </c:dLbls>
         <c:gapWidth val="219"/>
         <c:overlap val="100"/>
-        <c:axId val="-2118921192"/>
-        <c:axId val="-2114137592"/>
+        <c:axId val="2144173304"/>
+        <c:axId val="2144176936"/>
       </c:barChart>
       <c:catAx>
-        <c:axId val="-2118921192"/>
+        <c:axId val="2144173304"/>
         <c:scaling>
           <c:orientation val="minMax"/>
         </c:scaling>
@@ -6902,7 +6893,7 @@
             <a:endParaRPr lang="en-US"/>
           </a:p>
         </c:txPr>
-        <c:crossAx val="-2114137592"/>
+        <c:crossAx val="2144176936"/>
         <c:crosses val="autoZero"/>
         <c:auto val="1"/>
         <c:lblAlgn val="ctr"/>
@@ -6910,7 +6901,7 @@
         <c:noMultiLvlLbl val="0"/>
       </c:catAx>
       <c:valAx>
-        <c:axId val="-2114137592"/>
+        <c:axId val="2144176936"/>
         <c:scaling>
           <c:orientation val="minMax"/>
         </c:scaling>
@@ -7032,7 +7023,7 @@
             <a:endParaRPr lang="en-US"/>
           </a:p>
         </c:txPr>
-        <c:crossAx val="-2118921192"/>
+        <c:crossAx val="2144173304"/>
         <c:crosses val="autoZero"/>
         <c:crossBetween val="between"/>
       </c:valAx>
@@ -7300,11 +7291,11 @@
         </c:dLbls>
         <c:gapWidth val="219"/>
         <c:overlap val="100"/>
-        <c:axId val="-2102260168"/>
-        <c:axId val="-2102254104"/>
+        <c:axId val="2144471656"/>
+        <c:axId val="2144475304"/>
       </c:barChart>
       <c:catAx>
-        <c:axId val="-2102260168"/>
+        <c:axId val="2144471656"/>
         <c:scaling>
           <c:orientation val="minMax"/>
         </c:scaling>
@@ -7344,7 +7335,7 @@
             <a:endParaRPr lang="en-US"/>
           </a:p>
         </c:txPr>
-        <c:crossAx val="-2102254104"/>
+        <c:crossAx val="2144475304"/>
         <c:crosses val="autoZero"/>
         <c:auto val="1"/>
         <c:lblAlgn val="ctr"/>
@@ -7352,7 +7343,7 @@
         <c:noMultiLvlLbl val="0"/>
       </c:catAx>
       <c:valAx>
-        <c:axId val="-2102254104"/>
+        <c:axId val="2144475304"/>
         <c:scaling>
           <c:orientation val="minMax"/>
         </c:scaling>
@@ -7474,7 +7465,7 @@
             <a:endParaRPr lang="en-US"/>
           </a:p>
         </c:txPr>
-        <c:crossAx val="-2102260168"/>
+        <c:crossAx val="2144471656"/>
         <c:crosses val="autoZero"/>
         <c:crossBetween val="between"/>
         <c:majorUnit val="100.0"/>
@@ -7688,11 +7679,11 @@
         </c:dLbls>
         <c:gapWidth val="219"/>
         <c:overlap val="100"/>
-        <c:axId val="-2100558440"/>
-        <c:axId val="-2100554792"/>
+        <c:axId val="2145619304"/>
+        <c:axId val="2145622952"/>
       </c:barChart>
       <c:catAx>
-        <c:axId val="-2100558440"/>
+        <c:axId val="2145619304"/>
         <c:scaling>
           <c:orientation val="minMax"/>
         </c:scaling>
@@ -7732,7 +7723,7 @@
             <a:endParaRPr lang="en-US"/>
           </a:p>
         </c:txPr>
-        <c:crossAx val="-2100554792"/>
+        <c:crossAx val="2145622952"/>
         <c:crosses val="autoZero"/>
         <c:auto val="1"/>
         <c:lblAlgn val="ctr"/>
@@ -7740,7 +7731,7 @@
         <c:noMultiLvlLbl val="0"/>
       </c:catAx>
       <c:valAx>
-        <c:axId val="-2100554792"/>
+        <c:axId val="2145622952"/>
         <c:scaling>
           <c:orientation val="minMax"/>
         </c:scaling>
@@ -7868,7 +7859,7 @@
             <a:endParaRPr lang="en-US"/>
           </a:p>
         </c:txPr>
-        <c:crossAx val="-2100558440"/>
+        <c:crossAx val="2145619304"/>
         <c:crosses val="autoZero"/>
         <c:crossBetween val="between"/>
       </c:valAx>
@@ -8195,11 +8186,11 @@
         </c:dLbls>
         <c:gapWidth val="219"/>
         <c:overlap val="-27"/>
-        <c:axId val="-2132868936"/>
-        <c:axId val="-2118190200"/>
+        <c:axId val="2108786552"/>
+        <c:axId val="2108782952"/>
       </c:barChart>
       <c:catAx>
-        <c:axId val="-2132868936"/>
+        <c:axId val="2108786552"/>
         <c:scaling>
           <c:orientation val="minMax"/>
         </c:scaling>
@@ -8239,7 +8230,7 @@
             <a:endParaRPr lang="en-US"/>
           </a:p>
         </c:txPr>
-        <c:crossAx val="-2118190200"/>
+        <c:crossAx val="2108782952"/>
         <c:crosses val="autoZero"/>
         <c:auto val="1"/>
         <c:lblAlgn val="ctr"/>
@@ -8247,7 +8238,7 @@
         <c:noMultiLvlLbl val="0"/>
       </c:catAx>
       <c:valAx>
-        <c:axId val="-2118190200"/>
+        <c:axId val="2108782952"/>
         <c:scaling>
           <c:orientation val="minMax"/>
         </c:scaling>
@@ -8361,7 +8352,7 @@
             <a:endParaRPr lang="en-US"/>
           </a:p>
         </c:txPr>
-        <c:crossAx val="-2132868936"/>
+        <c:crossAx val="2108786552"/>
         <c:crosses val="autoZero"/>
         <c:crossBetween val="between"/>
       </c:valAx>
@@ -8970,11 +8961,11 @@
         </c:dLbls>
         <c:gapWidth val="219"/>
         <c:overlap val="-27"/>
-        <c:axId val="-2122093992"/>
-        <c:axId val="-2118413368"/>
+        <c:axId val="2141313464"/>
+        <c:axId val="2141309720"/>
       </c:barChart>
       <c:catAx>
-        <c:axId val="-2122093992"/>
+        <c:axId val="2141313464"/>
         <c:scaling>
           <c:orientation val="minMax"/>
         </c:scaling>
@@ -9014,7 +9005,7 @@
             <a:endParaRPr lang="en-US"/>
           </a:p>
         </c:txPr>
-        <c:crossAx val="-2118413368"/>
+        <c:crossAx val="2141309720"/>
         <c:crosses val="autoZero"/>
         <c:auto val="1"/>
         <c:lblAlgn val="ctr"/>
@@ -9022,7 +9013,7 @@
         <c:noMultiLvlLbl val="0"/>
       </c:catAx>
       <c:valAx>
-        <c:axId val="-2118413368"/>
+        <c:axId val="2141309720"/>
         <c:scaling>
           <c:orientation val="minMax"/>
         </c:scaling>
@@ -9151,7 +9142,7 @@
             <a:endParaRPr lang="en-US"/>
           </a:p>
         </c:txPr>
-        <c:crossAx val="-2122093992"/>
+        <c:crossAx val="2141313464"/>
         <c:crosses val="autoZero"/>
         <c:crossBetween val="between"/>
       </c:valAx>
@@ -9543,11 +9534,11 @@
         </c:dLbls>
         <c:gapWidth val="219"/>
         <c:overlap val="-27"/>
-        <c:axId val="-2132932488"/>
-        <c:axId val="2127060248"/>
+        <c:axId val="2108724312"/>
+        <c:axId val="2108720600"/>
       </c:barChart>
       <c:catAx>
-        <c:axId val="-2132932488"/>
+        <c:axId val="2108724312"/>
         <c:scaling>
           <c:orientation val="minMax"/>
         </c:scaling>
@@ -9587,7 +9578,7 @@
             <a:endParaRPr lang="en-US"/>
           </a:p>
         </c:txPr>
-        <c:crossAx val="2127060248"/>
+        <c:crossAx val="2108720600"/>
         <c:crosses val="autoZero"/>
         <c:auto val="1"/>
         <c:lblAlgn val="ctr"/>
@@ -9595,7 +9586,7 @@
         <c:noMultiLvlLbl val="0"/>
       </c:catAx>
       <c:valAx>
-        <c:axId val="2127060248"/>
+        <c:axId val="2108720600"/>
         <c:scaling>
           <c:orientation val="minMax"/>
         </c:scaling>
@@ -9716,7 +9707,7 @@
             <a:endParaRPr lang="en-US"/>
           </a:p>
         </c:txPr>
-        <c:crossAx val="-2132932488"/>
+        <c:crossAx val="2108724312"/>
         <c:crosses val="autoZero"/>
         <c:crossBetween val="between"/>
       </c:valAx>
@@ -9886,11 +9877,11 @@
         </c:dLbls>
         <c:gapWidth val="219"/>
         <c:overlap val="-27"/>
-        <c:axId val="-2100905208"/>
-        <c:axId val="-2100901528"/>
+        <c:axId val="2143497016"/>
+        <c:axId val="2143500776"/>
       </c:barChart>
       <c:catAx>
-        <c:axId val="-2100905208"/>
+        <c:axId val="2143497016"/>
         <c:scaling>
           <c:orientation val="minMax"/>
         </c:scaling>
@@ -9930,7 +9921,7 @@
             <a:endParaRPr lang="en-US"/>
           </a:p>
         </c:txPr>
-        <c:crossAx val="-2100901528"/>
+        <c:crossAx val="2143500776"/>
         <c:crosses val="autoZero"/>
         <c:auto val="1"/>
         <c:lblAlgn val="ctr"/>
@@ -9938,7 +9929,7 @@
         <c:noMultiLvlLbl val="0"/>
       </c:catAx>
       <c:valAx>
-        <c:axId val="-2100901528"/>
+        <c:axId val="2143500776"/>
         <c:scaling>
           <c:orientation val="minMax"/>
         </c:scaling>
@@ -10059,7 +10050,7 @@
             <a:endParaRPr lang="en-US"/>
           </a:p>
         </c:txPr>
-        <c:crossAx val="-2100905208"/>
+        <c:crossAx val="2143497016"/>
         <c:crosses val="autoZero"/>
         <c:crossBetween val="between"/>
       </c:valAx>
@@ -10369,11 +10360,11 @@
         </c:dLbls>
         <c:gapWidth val="219"/>
         <c:overlap val="100"/>
-        <c:axId val="-2119765336"/>
-        <c:axId val="-2119295048"/>
+        <c:axId val="2143555128"/>
+        <c:axId val="2143558840"/>
       </c:barChart>
       <c:catAx>
-        <c:axId val="-2119765336"/>
+        <c:axId val="2143555128"/>
         <c:scaling>
           <c:orientation val="minMax"/>
         </c:scaling>
@@ -10416,7 +10407,7 @@
             <a:endParaRPr lang="en-US"/>
           </a:p>
         </c:txPr>
-        <c:crossAx val="-2119295048"/>
+        <c:crossAx val="2143558840"/>
         <c:crosses val="autoZero"/>
         <c:auto val="1"/>
         <c:lblAlgn val="ctr"/>
@@ -10424,7 +10415,7 @@
         <c:noMultiLvlLbl val="0"/>
       </c:catAx>
       <c:valAx>
-        <c:axId val="-2119295048"/>
+        <c:axId val="2143558840"/>
         <c:scaling>
           <c:orientation val="minMax"/>
         </c:scaling>
@@ -10516,7 +10507,7 @@
             <a:endParaRPr lang="en-US"/>
           </a:p>
         </c:txPr>
-        <c:crossAx val="-2119765336"/>
+        <c:crossAx val="2143555128"/>
         <c:crosses val="autoZero"/>
         <c:crossBetween val="between"/>
       </c:valAx>
@@ -22279,7 +22270,7 @@
           <a:p>
             <a:fld id="{8AF2A637-750D-AC4F-B19A-F61B319C6A55}" type="datetimeFigureOut">
               <a:rPr lang="en-US" smtClean="0"/>
-              <a:t>04/11/15</a:t>
+              <a:t>09/11/15</a:t>
             </a:fld>
             <a:endParaRPr lang="en-US"/>
           </a:p>
@@ -24666,7 +24657,7 @@
           <a:p>
             <a:fld id="{F87648D4-822A-184D-A945-2BBD99FACB30}" type="datetimeFigureOut">
               <a:rPr lang="en-US" smtClean="0"/>
-              <a:t>04/11/15</a:t>
+              <a:t>09/11/15</a:t>
             </a:fld>
             <a:endParaRPr lang="en-US"/>
           </a:p>
@@ -24836,7 +24827,7 @@
           <a:p>
             <a:fld id="{F87648D4-822A-184D-A945-2BBD99FACB30}" type="datetimeFigureOut">
               <a:rPr lang="en-US" smtClean="0"/>
-              <a:t>04/11/15</a:t>
+              <a:t>09/11/15</a:t>
             </a:fld>
             <a:endParaRPr lang="en-US"/>
           </a:p>
@@ -25016,7 +25007,7 @@
           <a:p>
             <a:fld id="{F87648D4-822A-184D-A945-2BBD99FACB30}" type="datetimeFigureOut">
               <a:rPr lang="en-US" smtClean="0"/>
-              <a:t>04/11/15</a:t>
+              <a:t>09/11/15</a:t>
             </a:fld>
             <a:endParaRPr lang="en-US"/>
           </a:p>
@@ -25186,7 +25177,7 @@
           <a:p>
             <a:fld id="{F87648D4-822A-184D-A945-2BBD99FACB30}" type="datetimeFigureOut">
               <a:rPr lang="en-US" smtClean="0"/>
-              <a:t>04/11/15</a:t>
+              <a:t>09/11/15</a:t>
             </a:fld>
             <a:endParaRPr lang="en-US"/>
           </a:p>
@@ -25430,7 +25421,7 @@
           <a:p>
             <a:fld id="{F87648D4-822A-184D-A945-2BBD99FACB30}" type="datetimeFigureOut">
               <a:rPr lang="en-US" smtClean="0"/>
-              <a:t>04/11/15</a:t>
+              <a:t>09/11/15</a:t>
             </a:fld>
             <a:endParaRPr lang="en-US"/>
           </a:p>
@@ -25662,7 +25653,7 @@
           <a:p>
             <a:fld id="{F87648D4-822A-184D-A945-2BBD99FACB30}" type="datetimeFigureOut">
               <a:rPr lang="en-US" smtClean="0"/>
-              <a:t>04/11/15</a:t>
+              <a:t>09/11/15</a:t>
             </a:fld>
             <a:endParaRPr lang="en-US"/>
           </a:p>
@@ -26029,7 +26020,7 @@
           <a:p>
             <a:fld id="{F87648D4-822A-184D-A945-2BBD99FACB30}" type="datetimeFigureOut">
               <a:rPr lang="en-US" smtClean="0"/>
-              <a:t>04/11/15</a:t>
+              <a:t>09/11/15</a:t>
             </a:fld>
             <a:endParaRPr lang="en-US"/>
           </a:p>
@@ -26147,7 +26138,7 @@
           <a:p>
             <a:fld id="{F87648D4-822A-184D-A945-2BBD99FACB30}" type="datetimeFigureOut">
               <a:rPr lang="en-US" smtClean="0"/>
-              <a:t>04/11/15</a:t>
+              <a:t>09/11/15</a:t>
             </a:fld>
             <a:endParaRPr lang="en-US"/>
           </a:p>
@@ -26242,7 +26233,7 @@
           <a:p>
             <a:fld id="{F87648D4-822A-184D-A945-2BBD99FACB30}" type="datetimeFigureOut">
               <a:rPr lang="en-US" smtClean="0"/>
-              <a:t>04/11/15</a:t>
+              <a:t>09/11/15</a:t>
             </a:fld>
             <a:endParaRPr lang="en-US"/>
           </a:p>
@@ -26519,7 +26510,7 @@
           <a:p>
             <a:fld id="{F87648D4-822A-184D-A945-2BBD99FACB30}" type="datetimeFigureOut">
               <a:rPr lang="en-US" smtClean="0"/>
-              <a:t>04/11/15</a:t>
+              <a:t>09/11/15</a:t>
             </a:fld>
             <a:endParaRPr lang="en-US"/>
           </a:p>
@@ -26776,7 +26767,7 @@
           <a:p>
             <a:fld id="{F87648D4-822A-184D-A945-2BBD99FACB30}" type="datetimeFigureOut">
               <a:rPr lang="en-US" smtClean="0"/>
-              <a:t>04/11/15</a:t>
+              <a:t>09/11/15</a:t>
             </a:fld>
             <a:endParaRPr lang="en-US"/>
           </a:p>
@@ -26989,7 +26980,7 @@
           <a:p>
             <a:fld id="{F87648D4-822A-184D-A945-2BBD99FACB30}" type="datetimeFigureOut">
               <a:rPr lang="en-US" smtClean="0"/>
-              <a:t>04/11/15</a:t>
+              <a:t>09/11/15</a:t>
             </a:fld>
             <a:endParaRPr lang="en-US"/>
           </a:p>
@@ -28263,7 +28254,7 @@
           <p:nvPr>
             <p:extLst>
               <p:ext uri="{D42A27DB-BD31-4B8C-83A1-F6EECF244321}">
-                <p14:modId xmlns:p14="http://schemas.microsoft.com/office/powerpoint/2010/main" val="1789377646"/>
+                <p14:modId xmlns:p14="http://schemas.microsoft.com/office/powerpoint/2010/main" val="1254439007"/>
               </p:ext>
             </p:extLst>
           </p:nvPr>
@@ -29785,7 +29776,7 @@
   <a:extraClrSchemeLst/>
   <a:extLst>
     <a:ext uri="{05A4C25C-085E-4340-85A3-A5531E510DB2}">
-      <thm15:themeFamily xmlns="" xmlns:thm15="http://schemas.microsoft.com/office/thememl/2012/main" name="Office Theme" id="{62F939B6-93AF-4DB8-9C6B-D6C7DFDC589F}" vid="{4A3C46E8-61CC-4603-A589-7422A47A8E4A}"/>
+      <thm15:themeFamily xmlns:thm15="http://schemas.microsoft.com/office/thememl/2012/main" xmlns="" name="Office Theme" id="{62F939B6-93AF-4DB8-9C6B-D6C7DFDC589F}" vid="{4A3C46E8-61CC-4603-A589-7422A47A8E4A}"/>
     </a:ext>
   </a:extLst>
 </a:theme>
@@ -30046,7 +30037,7 @@
   <a:extraClrSchemeLst/>
   <a:extLst>
     <a:ext uri="{05A4C25C-085E-4340-85A3-A5531E510DB2}">
-      <thm15:themeFamily xmlns="" xmlns:thm15="http://schemas.microsoft.com/office/thememl/2012/main" name="Office Theme" id="{62F939B6-93AF-4DB8-9C6B-D6C7DFDC589F}" vid="{4A3C46E8-61CC-4603-A589-7422A47A8E4A}"/>
+      <thm15:themeFamily xmlns:thm15="http://schemas.microsoft.com/office/thememl/2012/main" xmlns="" name="Office Theme" id="{62F939B6-93AF-4DB8-9C6B-D6C7DFDC589F}" vid="{4A3C46E8-61CC-4603-A589-7422A47A8E4A}"/>
     </a:ext>
   </a:extLst>
 </a:theme>

</xml_diff>

<commit_message>
update waterfall and maps
</commit_message>
<xml_diff>
--- a/elsarticle/Images/Thesis charts.pptx
+++ b/elsarticle/Images/Thesis charts.pptx
@@ -27221,8 +27221,8 @@
         </p:nvSpPr>
         <p:spPr>
           <a:xfrm>
-            <a:off x="5235505" y="1513618"/>
-            <a:ext cx="2816538" cy="721582"/>
+            <a:off x="5897880" y="1147342"/>
+            <a:ext cx="2154163" cy="339552"/>
           </a:xfrm>
           <a:prstGeom prst="rect">
             <a:avLst/>
@@ -27248,18 +27248,26 @@
           <a:p>
             <a:pPr algn="ctr"/>
             <a:r>
-              <a:rPr lang="en-US" sz="2400" dirty="0" smtClean="0"/>
-              <a:t>-470.1 gCO</a:t>
+              <a:rPr lang="en-US" sz="2000" dirty="0" smtClean="0"/>
+              <a:t>-</a:t>
             </a:r>
             <a:r>
-              <a:rPr lang="en-US" sz="2400" baseline="-25000" dirty="0" smtClean="0"/>
+              <a:rPr lang="en-US" sz="2000" dirty="0" smtClean="0"/>
+              <a:t>465.2 </a:t>
+            </a:r>
+            <a:r>
+              <a:rPr lang="en-US" sz="2000" dirty="0" smtClean="0"/>
+              <a:t>gCO</a:t>
+            </a:r>
+            <a:r>
+              <a:rPr lang="en-US" sz="2000" baseline="-25000" dirty="0" smtClean="0"/>
               <a:t>2eq</a:t>
             </a:r>
             <a:r>
-              <a:rPr lang="en-US" sz="2400" dirty="0" smtClean="0"/>
+              <a:rPr lang="en-US" sz="2000" dirty="0" smtClean="0"/>
               <a:t>/kWh</a:t>
             </a:r>
-            <a:endParaRPr lang="en-US" sz="2400" dirty="0"/>
+            <a:endParaRPr lang="en-US" sz="2000" dirty="0"/>
           </a:p>
         </p:txBody>
       </p:sp>
@@ -27271,13 +27279,13 @@
         </p:nvCxnSpPr>
         <p:spPr>
           <a:xfrm>
-            <a:off x="2772475" y="1912962"/>
-            <a:ext cx="612000" cy="0"/>
+            <a:off x="2788377" y="1912962"/>
+            <a:ext cx="594000" cy="0"/>
           </a:xfrm>
           <a:prstGeom prst="line">
             <a:avLst/>
           </a:prstGeom>
-          <a:ln w="9525" cmpd="sng">
+          <a:ln w="3175" cmpd="sng">
             <a:solidFill>
               <a:srgbClr val="3B3838"/>
             </a:solidFill>
@@ -27308,7 +27316,7 @@
         </p:nvSpPr>
         <p:spPr>
           <a:xfrm rot="17339126">
-            <a:off x="1381641" y="5729107"/>
+            <a:off x="1445649" y="5729107"/>
             <a:ext cx="1563632" cy="338554"/>
           </a:xfrm>
           <a:prstGeom prst="rect">
@@ -27351,7 +27359,7 @@
         </p:nvSpPr>
         <p:spPr>
           <a:xfrm rot="17339126">
-            <a:off x="2333156" y="5482885"/>
+            <a:off x="2497748" y="5482885"/>
             <a:ext cx="1563632" cy="830997"/>
           </a:xfrm>
           <a:prstGeom prst="rect">
@@ -27394,7 +27402,7 @@
         </p:nvSpPr>
         <p:spPr>
           <a:xfrm rot="17339126">
-            <a:off x="3311297" y="5828503"/>
+            <a:off x="3402737" y="5828503"/>
             <a:ext cx="1762419" cy="338554"/>
           </a:xfrm>
           <a:prstGeom prst="rect">
@@ -27566,7 +27574,7 @@
         </p:nvCxnSpPr>
         <p:spPr>
           <a:xfrm>
-            <a:off x="2095500" y="3085633"/>
+            <a:off x="2095500" y="2693634"/>
             <a:ext cx="5956543" cy="0"/>
           </a:xfrm>
           <a:prstGeom prst="line">
@@ -27775,13 +27783,13 @@
         </p:nvCxnSpPr>
         <p:spPr>
           <a:xfrm>
-            <a:off x="3769658" y="4683936"/>
-            <a:ext cx="612000" cy="0"/>
+            <a:off x="3785560" y="4683936"/>
+            <a:ext cx="594000" cy="0"/>
           </a:xfrm>
           <a:prstGeom prst="line">
             <a:avLst/>
           </a:prstGeom>
-          <a:ln w="9525" cmpd="sng">
+          <a:ln w="3175" cmpd="sng">
             <a:solidFill>
               <a:srgbClr val="3B3838"/>
             </a:solidFill>
@@ -27812,8 +27820,8 @@
         </p:nvCxnSpPr>
         <p:spPr>
           <a:xfrm>
-            <a:off x="4768136" y="4380825"/>
-            <a:ext cx="612000" cy="0"/>
+            <a:off x="4776087" y="4372874"/>
+            <a:ext cx="594000" cy="0"/>
           </a:xfrm>
           <a:prstGeom prst="line">
             <a:avLst/>
@@ -27849,13 +27857,13 @@
         </p:nvCxnSpPr>
         <p:spPr>
           <a:xfrm>
-            <a:off x="5761878" y="4305190"/>
-            <a:ext cx="612000" cy="0"/>
+            <a:off x="5769829" y="4305190"/>
+            <a:ext cx="594000" cy="0"/>
           </a:xfrm>
           <a:prstGeom prst="line">
             <a:avLst/>
           </a:prstGeom>
-          <a:ln w="9525" cmpd="sng">
+          <a:ln w="3175" cmpd="sng">
             <a:solidFill>
               <a:srgbClr val="3B3838"/>
             </a:solidFill>
@@ -27886,13 +27894,13 @@
         </p:nvCxnSpPr>
         <p:spPr>
           <a:xfrm>
-            <a:off x="6746671" y="4283900"/>
-            <a:ext cx="612000" cy="0"/>
+            <a:off x="6754622" y="4283900"/>
+            <a:ext cx="594000" cy="0"/>
           </a:xfrm>
           <a:prstGeom prst="line">
             <a:avLst/>
           </a:prstGeom>
-          <a:ln w="9525" cmpd="sng">
+          <a:ln w="3175" cmpd="sng">
             <a:solidFill>
               <a:srgbClr val="3B3838"/>
             </a:solidFill>

</xml_diff>

<commit_message>
minor inventory changes and electricity mix
</commit_message>
<xml_diff>
--- a/elsarticle/Images/Thesis charts.pptx
+++ b/elsarticle/Images/Thesis charts.pptx
@@ -425,11 +425,11 @@
           <c:showPercent val="0"/>
           <c:showBubbleSize val="0"/>
         </c:dLbls>
-        <c:axId val="2068195376"/>
-        <c:axId val="2068140608"/>
+        <c:axId val="-2103851504"/>
+        <c:axId val="-2100828768"/>
       </c:scatterChart>
       <c:valAx>
-        <c:axId val="2068195376"/>
+        <c:axId val="-2103851504"/>
         <c:scaling>
           <c:orientation val="minMax"/>
         </c:scaling>
@@ -551,12 +551,12 @@
             <a:endParaRPr lang="en-US"/>
           </a:p>
         </c:txPr>
-        <c:crossAx val="2068140608"/>
+        <c:crossAx val="-2100828768"/>
         <c:crosses val="autoZero"/>
         <c:crossBetween val="midCat"/>
       </c:valAx>
       <c:valAx>
-        <c:axId val="2068140608"/>
+        <c:axId val="-2100828768"/>
         <c:scaling>
           <c:orientation val="minMax"/>
         </c:scaling>
@@ -682,7 +682,7 @@
             <a:endParaRPr lang="en-US"/>
           </a:p>
         </c:txPr>
-        <c:crossAx val="2068195376"/>
+        <c:crossAx val="-2103851504"/>
         <c:crosses val="autoZero"/>
         <c:crossBetween val="midCat"/>
       </c:valAx>
@@ -919,9 +919,7 @@
               </c:spPr>
             </c:leaderLines>
             <c:extLst>
-              <c:ext xmlns:c15="http://schemas.microsoft.com/office/drawing/2012/chart" uri="{CE6537A1-D6FC-4f65-9D91-7224C49458BB}">
-                <c15:layout/>
-              </c:ext>
+              <c:ext xmlns:c15="http://schemas.microsoft.com/office/drawing/2012/chart" uri="{CE6537A1-D6FC-4f65-9D91-7224C49458BB}"/>
             </c:extLst>
           </c:dLbls>
           <c:cat>
@@ -1242,9 +1240,7 @@
               <c:showPercent val="0"/>
               <c:showBubbleSize val="0"/>
               <c:extLst>
-                <c:ext xmlns:c15="http://schemas.microsoft.com/office/drawing/2012/chart" uri="{CE6537A1-D6FC-4f65-9D91-7224C49458BB}">
-                  <c15:layout/>
-                </c:ext>
+                <c:ext xmlns:c15="http://schemas.microsoft.com/office/drawing/2012/chart" uri="{CE6537A1-D6FC-4f65-9D91-7224C49458BB}"/>
               </c:extLst>
             </c:dLbl>
             <c:dLbl>
@@ -1262,9 +1258,7 @@
               <c:showPercent val="0"/>
               <c:showBubbleSize val="0"/>
               <c:extLst>
-                <c:ext xmlns:c15="http://schemas.microsoft.com/office/drawing/2012/chart" uri="{CE6537A1-D6FC-4f65-9D91-7224C49458BB}">
-                  <c15:layout/>
-                </c:ext>
+                <c:ext xmlns:c15="http://schemas.microsoft.com/office/drawing/2012/chart" uri="{CE6537A1-D6FC-4f65-9D91-7224C49458BB}"/>
               </c:extLst>
             </c:dLbl>
             <c:spPr>
@@ -1318,9 +1312,7 @@
               </c:spPr>
             </c:leaderLines>
             <c:extLst>
-              <c:ext xmlns:c15="http://schemas.microsoft.com/office/drawing/2012/chart" uri="{CE6537A1-D6FC-4f65-9D91-7224C49458BB}">
-                <c15:layout/>
-              </c:ext>
+              <c:ext xmlns:c15="http://schemas.microsoft.com/office/drawing/2012/chart" uri="{CE6537A1-D6FC-4f65-9D91-7224C49458BB}"/>
             </c:extLst>
           </c:dLbls>
           <c:cat>
@@ -1639,9 +1631,7 @@
               </c:spPr>
             </c:leaderLines>
             <c:extLst>
-              <c:ext xmlns:c15="http://schemas.microsoft.com/office/drawing/2012/chart" uri="{CE6537A1-D6FC-4f65-9D91-7224C49458BB}">
-                <c15:layout/>
-              </c:ext>
+              <c:ext xmlns:c15="http://schemas.microsoft.com/office/drawing/2012/chart" uri="{CE6537A1-D6FC-4f65-9D91-7224C49458BB}"/>
             </c:extLst>
           </c:dLbls>
           <c:cat>
@@ -1884,10 +1874,10 @@
                   <c:v>-5708.6</c:v>
                 </c:pt>
                 <c:pt idx="3">
-                  <c:v>-5473</c:v>
+                  <c:v>-5473.0</c:v>
                 </c:pt>
                 <c:pt idx="4">
-                  <c:v>-5396</c:v>
+                  <c:v>-5396.0</c:v>
                 </c:pt>
                 <c:pt idx="5">
                   <c:v>0.0</c:v>
@@ -1936,9 +1926,7 @@
               <c:showPercent val="0"/>
               <c:showBubbleSize val="0"/>
               <c:extLst>
-                <c:ext xmlns:c15="http://schemas.microsoft.com/office/drawing/2012/chart" uri="{CE6537A1-D6FC-4f65-9D91-7224C49458BB}">
-                  <c15:layout/>
-                </c:ext>
+                <c:ext xmlns:c15="http://schemas.microsoft.com/office/drawing/2012/chart" uri="{CE6537A1-D6FC-4f65-9D91-7224C49458BB}"/>
               </c:extLst>
             </c:dLbl>
             <c:dLbl>
@@ -2207,9 +2195,7 @@
               <c:idx val="2"/>
               <c:delete val="1"/>
               <c:extLst>
-                <c:ext xmlns:c15="http://schemas.microsoft.com/office/drawing/2012/chart" uri="{CE6537A1-D6FC-4f65-9D91-7224C49458BB}">
-                  <c15:layout/>
-                </c:ext>
+                <c:ext xmlns:c15="http://schemas.microsoft.com/office/drawing/2012/chart" uri="{CE6537A1-D6FC-4f65-9D91-7224C49458BB}"/>
               </c:extLst>
             </c:dLbl>
             <c:dLbl>
@@ -2241,9 +2227,7 @@
               <c:showPercent val="0"/>
               <c:showBubbleSize val="0"/>
               <c:extLst>
-                <c:ext xmlns:c15="http://schemas.microsoft.com/office/drawing/2012/chart" uri="{CE6537A1-D6FC-4f65-9D91-7224C49458BB}">
-                  <c15:layout/>
-                </c:ext>
+                <c:ext xmlns:c15="http://schemas.microsoft.com/office/drawing/2012/chart" uri="{CE6537A1-D6FC-4f65-9D91-7224C49458BB}"/>
               </c:extLst>
             </c:dLbl>
             <c:spPr>
@@ -2284,7 +2268,6 @@
             <c:showLeaderLines val="0"/>
             <c:extLst>
               <c:ext xmlns:c15="http://schemas.microsoft.com/office/drawing/2012/chart" uri="{CE6537A1-D6FC-4f65-9D91-7224C49458BB}">
-                <c15:layout/>
                 <c15:showLeaderLines val="1"/>
                 <c15:leaderLines>
                   <c:spPr>
@@ -2351,7 +2334,7 @@
                   <c:v>0.0</c:v>
                 </c:pt>
                 <c:pt idx="5">
-                  <c:v>-5396</c:v>
+                  <c:v>-5396.0</c:v>
                 </c:pt>
               </c:numCache>
             </c:numRef>
@@ -2367,11 +2350,11 @@
         </c:dLbls>
         <c:gapWidth val="150"/>
         <c:overlap val="100"/>
-        <c:axId val="-2100754800"/>
-        <c:axId val="-2100751552"/>
+        <c:axId val="-2083543408"/>
+        <c:axId val="-2083540160"/>
       </c:barChart>
       <c:catAx>
-        <c:axId val="-2100754800"/>
+        <c:axId val="-2083543408"/>
         <c:scaling>
           <c:orientation val="minMax"/>
         </c:scaling>
@@ -2381,7 +2364,7 @@
         <c:majorTickMark val="none"/>
         <c:minorTickMark val="none"/>
         <c:tickLblPos val="nextTo"/>
-        <c:crossAx val="-2100751552"/>
+        <c:crossAx val="-2083540160"/>
         <c:crosses val="autoZero"/>
         <c:auto val="1"/>
         <c:lblAlgn val="ctr"/>
@@ -2389,7 +2372,7 @@
         <c:noMultiLvlLbl val="0"/>
       </c:catAx>
       <c:valAx>
-        <c:axId val="-2100751552"/>
+        <c:axId val="-2083540160"/>
         <c:scaling>
           <c:orientation val="minMax"/>
         </c:scaling>
@@ -2444,7 +2427,6 @@
               </a:p>
             </c:rich>
           </c:tx>
-          <c:layout/>
           <c:overlay val="0"/>
           <c:spPr>
             <a:noFill/>
@@ -2505,7 +2487,7 @@
             <a:endParaRPr lang="en-US"/>
           </a:p>
         </c:txPr>
-        <c:crossAx val="-2100754800"/>
+        <c:crossAx val="-2083543408"/>
         <c:crosses val="autoZero"/>
         <c:crossBetween val="between"/>
       </c:valAx>
@@ -2888,11 +2870,11 @@
         </c:dLbls>
         <c:gapWidth val="219"/>
         <c:overlap val="-27"/>
-        <c:axId val="-2101265552"/>
-        <c:axId val="-2101251104"/>
+        <c:axId val="-2086665824"/>
+        <c:axId val="2071297728"/>
       </c:barChart>
       <c:catAx>
-        <c:axId val="-2101265552"/>
+        <c:axId val="-2086665824"/>
         <c:scaling>
           <c:orientation val="minMax"/>
         </c:scaling>
@@ -2932,7 +2914,7 @@
             <a:endParaRPr lang="en-US"/>
           </a:p>
         </c:txPr>
-        <c:crossAx val="-2101251104"/>
+        <c:crossAx val="2071297728"/>
         <c:crosses val="autoZero"/>
         <c:auto val="1"/>
         <c:lblAlgn val="ctr"/>
@@ -2940,7 +2922,7 @@
         <c:noMultiLvlLbl val="0"/>
       </c:catAx>
       <c:valAx>
-        <c:axId val="-2101251104"/>
+        <c:axId val="2071297728"/>
         <c:scaling>
           <c:orientation val="minMax"/>
         </c:scaling>
@@ -3008,7 +2990,6 @@
               </a:p>
             </c:rich>
           </c:tx>
-          <c:layout/>
           <c:overlay val="0"/>
           <c:spPr>
             <a:noFill/>
@@ -3071,7 +3052,7 @@
             <a:endParaRPr lang="en-US"/>
           </a:p>
         </c:txPr>
-        <c:crossAx val="-2101265552"/>
+        <c:crossAx val="-2086665824"/>
         <c:crosses val="autoZero"/>
         <c:crossBetween val="between"/>
       </c:valAx>
@@ -3087,7 +3068,6 @@
     </c:plotArea>
     <c:legend>
       <c:legendPos val="b"/>
-      <c:layout/>
       <c:overlay val="0"/>
       <c:spPr>
         <a:noFill/>
@@ -3368,11 +3348,11 @@
         </c:dLbls>
         <c:gapWidth val="219"/>
         <c:overlap val="-27"/>
-        <c:axId val="-2100871312"/>
-        <c:axId val="-2100850784"/>
+        <c:axId val="2071957696"/>
+        <c:axId val="2071763472"/>
       </c:barChart>
       <c:catAx>
-        <c:axId val="-2100871312"/>
+        <c:axId val="2071957696"/>
         <c:scaling>
           <c:orientation val="minMax"/>
         </c:scaling>
@@ -3412,7 +3392,7 @@
             <a:endParaRPr lang="en-US"/>
           </a:p>
         </c:txPr>
-        <c:crossAx val="-2100850784"/>
+        <c:crossAx val="2071763472"/>
         <c:crosses val="autoZero"/>
         <c:auto val="1"/>
         <c:lblAlgn val="ctr"/>
@@ -3420,7 +3400,7 @@
         <c:noMultiLvlLbl val="0"/>
       </c:catAx>
       <c:valAx>
-        <c:axId val="-2100850784"/>
+        <c:axId val="2071763472"/>
         <c:scaling>
           <c:orientation val="minMax"/>
         </c:scaling>
@@ -3498,7 +3478,6 @@
               </a:p>
             </c:rich>
           </c:tx>
-          <c:layout/>
           <c:overlay val="0"/>
           <c:spPr>
             <a:noFill/>
@@ -3541,7 +3520,7 @@
             <a:endParaRPr lang="en-US"/>
           </a:p>
         </c:txPr>
-        <c:crossAx val="-2100871312"/>
+        <c:crossAx val="2071957696"/>
         <c:crosses val="autoZero"/>
         <c:crossBetween val="between"/>
       </c:valAx>
@@ -3557,7 +3536,6 @@
     </c:plotArea>
     <c:legend>
       <c:legendPos val="b"/>
-      <c:layout/>
       <c:overlay val="0"/>
       <c:spPr>
         <a:noFill/>
@@ -3789,9 +3767,7 @@
               </c:spPr>
             </c:leaderLines>
             <c:extLst>
-              <c:ext xmlns:c15="http://schemas.microsoft.com/office/drawing/2012/chart" uri="{CE6537A1-D6FC-4f65-9D91-7224C49458BB}">
-                <c15:layout/>
-              </c:ext>
+              <c:ext xmlns:c15="http://schemas.microsoft.com/office/drawing/2012/chart" uri="{CE6537A1-D6FC-4f65-9D91-7224C49458BB}"/>
             </c:extLst>
           </c:dLbls>
           <c:cat>
@@ -4071,7 +4047,7 @@
                   <c:v>-6.43</c:v>
                 </c:pt>
                 <c:pt idx="10">
-                  <c:v>-9.739999999999998</c:v>
+                  <c:v>-9.74</c:v>
                 </c:pt>
                 <c:pt idx="11">
                   <c:v>-13.05</c:v>
@@ -4105,11 +4081,11 @@
           <c:showBubbleSize val="0"/>
         </c:dLbls>
         <c:smooth val="0"/>
-        <c:axId val="2070387056"/>
-        <c:axId val="2070517008"/>
+        <c:axId val="-2095145904"/>
+        <c:axId val="-2095142544"/>
       </c:lineChart>
       <c:catAx>
-        <c:axId val="2070387056"/>
+        <c:axId val="-2095145904"/>
         <c:scaling>
           <c:orientation val="minMax"/>
         </c:scaling>
@@ -4152,7 +4128,7 @@
             <a:endParaRPr lang="en-US"/>
           </a:p>
         </c:txPr>
-        <c:crossAx val="2070517008"/>
+        <c:crossAx val="-2095142544"/>
         <c:crosses val="autoZero"/>
         <c:auto val="1"/>
         <c:lblAlgn val="ctr"/>
@@ -4160,7 +4136,7 @@
         <c:noMultiLvlLbl val="0"/>
       </c:catAx>
       <c:valAx>
-        <c:axId val="2070517008"/>
+        <c:axId val="-2095142544"/>
         <c:scaling>
           <c:orientation val="minMax"/>
         </c:scaling>
@@ -4207,7 +4183,6 @@
               </a:p>
             </c:rich>
           </c:tx>
-          <c:layout/>
           <c:overlay val="0"/>
           <c:spPr>
             <a:noFill/>
@@ -4248,7 +4223,7 @@
             <a:endParaRPr lang="en-US"/>
           </a:p>
         </c:txPr>
-        <c:crossAx val="2070387056"/>
+        <c:crossAx val="-2095145904"/>
         <c:crosses val="autoZero"/>
         <c:crossBetween val="between"/>
       </c:valAx>
@@ -4264,7 +4239,6 @@
     </c:plotArea>
     <c:legend>
       <c:legendPos val="b"/>
-      <c:layout/>
       <c:overlay val="0"/>
       <c:spPr>
         <a:noFill/>
@@ -4406,7 +4380,6 @@
             <c:showLeaderLines val="0"/>
             <c:extLst>
               <c:ext xmlns:c15="http://schemas.microsoft.com/office/drawing/2012/chart" uri="{CE6537A1-D6FC-4f65-9D91-7224C49458BB}">
-                <c15:layout/>
                 <c15:showLeaderLines val="1"/>
                 <c15:leaderLines>
                   <c:spPr>
@@ -4519,7 +4492,6 @@
             <c:showLeaderLines val="0"/>
             <c:extLst>
               <c:ext xmlns:c15="http://schemas.microsoft.com/office/drawing/2012/chart" uri="{CE6537A1-D6FC-4f65-9D91-7224C49458BB}">
-                <c15:layout/>
                 <c15:showLeaderLines val="1"/>
                 <c15:leaderLines>
                   <c:spPr>
@@ -4632,7 +4604,6 @@
             <c:showLeaderLines val="0"/>
             <c:extLst>
               <c:ext xmlns:c15="http://schemas.microsoft.com/office/drawing/2012/chart" uri="{CE6537A1-D6FC-4f65-9D91-7224C49458BB}">
-                <c15:layout/>
                 <c15:showLeaderLines val="1"/>
                 <c15:leaderLines>
                   <c:spPr>
@@ -4800,7 +4771,6 @@
             <c:showLeaderLines val="0"/>
             <c:extLst>
               <c:ext xmlns:c15="http://schemas.microsoft.com/office/drawing/2012/chart" uri="{CE6537A1-D6FC-4f65-9D91-7224C49458BB}">
-                <c15:layout/>
                 <c15:showLeaderLines val="1"/>
                 <c15:leaderLines>
                   <c:spPr>
@@ -4860,11 +4830,11 @@
         </c:dLbls>
         <c:gapWidth val="219"/>
         <c:overlap val="-27"/>
-        <c:axId val="2068891408"/>
-        <c:axId val="2111284224"/>
+        <c:axId val="2044902576"/>
+        <c:axId val="-2095722144"/>
       </c:barChart>
       <c:catAx>
-        <c:axId val="2068891408"/>
+        <c:axId val="2044902576"/>
         <c:scaling>
           <c:orientation val="minMax"/>
         </c:scaling>
@@ -4907,7 +4877,7 @@
             <a:endParaRPr lang="en-US"/>
           </a:p>
         </c:txPr>
-        <c:crossAx val="2111284224"/>
+        <c:crossAx val="-2095722144"/>
         <c:crosses val="autoZero"/>
         <c:auto val="1"/>
         <c:lblAlgn val="ctr"/>
@@ -4915,7 +4885,7 @@
         <c:noMultiLvlLbl val="0"/>
       </c:catAx>
       <c:valAx>
-        <c:axId val="2111284224"/>
+        <c:axId val="-2095722144"/>
         <c:scaling>
           <c:orientation val="minMax"/>
         </c:scaling>
@@ -4978,7 +4948,6 @@
               </a:p>
             </c:rich>
           </c:tx>
-          <c:layout/>
           <c:overlay val="0"/>
           <c:spPr>
             <a:noFill/>
@@ -5039,7 +5008,7 @@
             <a:endParaRPr lang="en-US"/>
           </a:p>
         </c:txPr>
-        <c:crossAx val="2068891408"/>
+        <c:crossAx val="2044902576"/>
         <c:crosses val="autoZero"/>
         <c:crossBetween val="between"/>
       </c:valAx>
@@ -5055,7 +5024,6 @@
     </c:plotArea>
     <c:legend>
       <c:legendPos val="b"/>
-      <c:layout/>
       <c:overlay val="0"/>
       <c:spPr>
         <a:noFill/>
@@ -5163,9 +5131,9 @@
           </c:dLbls>
           <c:cat>
             <c:strRef>
-              <c:f>Sheet1!$A$2:$A$8</c:f>
+              <c:f>Sheet1!$A$2:$A$10</c:f>
               <c:strCache>
-                <c:ptCount val="7"/>
+                <c:ptCount val="9"/>
                 <c:pt idx="0">
                   <c:v>ENTSO-E</c:v>
                 </c:pt>
@@ -5173,18 +5141,24 @@
                   <c:v>Switzerland</c:v>
                 </c:pt>
                 <c:pt idx="2">
-                  <c:v>ASF (CIGS) incl. shading benefits</c:v>
+                  <c:v>ASF (CIGS) ENTSO-E mix incl. shading benefits</c:v>
                 </c:pt>
                 <c:pt idx="3">
+                  <c:v>ASF (CIGS) ENTSO-E mix excl. shading benefits</c:v>
+                </c:pt>
+                <c:pt idx="4">
+                  <c:v>ASF (CIGS) Swiss mix incl. shading benefits</c:v>
+                </c:pt>
+                <c:pt idx="5">
                   <c:v>CIGS (thin)</c:v>
                 </c:pt>
-                <c:pt idx="4">
+                <c:pt idx="6">
                   <c:v>mono-Si</c:v>
                 </c:pt>
-                <c:pt idx="5">
+                <c:pt idx="7">
                   <c:v>poly-Si</c:v>
                 </c:pt>
-                <c:pt idx="6">
+                <c:pt idx="8">
                   <c:v>CdTe (thin)</c:v>
                 </c:pt>
               </c:strCache>
@@ -5192,23 +5166,29 @@
           </c:cat>
           <c:val>
             <c:numRef>
-              <c:f>Sheet1!$B$2:$B$8</c:f>
+              <c:f>Sheet1!$B$2:$B$10</c:f>
               <c:numCache>
                 <c:formatCode>General</c:formatCode>
-                <c:ptCount val="7"/>
+                <c:ptCount val="9"/>
                 <c:pt idx="2">
                   <c:v>107.9</c:v>
                 </c:pt>
                 <c:pt idx="3">
+                  <c:v>107.9</c:v>
+                </c:pt>
+                <c:pt idx="4">
+                  <c:v>107.9</c:v>
+                </c:pt>
+                <c:pt idx="5">
                   <c:v>59.2</c:v>
                 </c:pt>
-                <c:pt idx="4">
+                <c:pt idx="6">
                   <c:v>114.9</c:v>
                 </c:pt>
-                <c:pt idx="5">
+                <c:pt idx="7">
                   <c:v>107.7</c:v>
                 </c:pt>
-                <c:pt idx="6">
+                <c:pt idx="8">
                   <c:v>53.4</c:v>
                 </c:pt>
               </c:numCache>
@@ -5324,6 +5304,24 @@
             </c:dLbl>
             <c:dLbl>
               <c:idx val="3"/>
+              <c:delete val="1"/>
+              <c:extLst>
+                <c:ext xmlns:c15="http://schemas.microsoft.com/office/drawing/2012/chart" uri="{CE6537A1-D6FC-4f65-9D91-7224C49458BB}">
+                  <c15:layout/>
+                </c:ext>
+              </c:extLst>
+            </c:dLbl>
+            <c:dLbl>
+              <c:idx val="4"/>
+              <c:delete val="1"/>
+              <c:extLst>
+                <c:ext xmlns:c15="http://schemas.microsoft.com/office/drawing/2012/chart" uri="{CE6537A1-D6FC-4f65-9D91-7224C49458BB}">
+                  <c15:layout/>
+                </c:ext>
+              </c:extLst>
+            </c:dLbl>
+            <c:dLbl>
+              <c:idx val="5"/>
               <c:layout>
                 <c:manualLayout>
                   <c:x val="-0.00144724578301638"/>
@@ -5356,7 +5354,7 @@
               </c:extLst>
             </c:dLbl>
             <c:dLbl>
-              <c:idx val="4"/>
+              <c:idx val="6"/>
               <c:layout>
                 <c:manualLayout>
                   <c:x val="0.0"/>
@@ -5389,7 +5387,7 @@
               </c:extLst>
             </c:dLbl>
             <c:dLbl>
-              <c:idx val="5"/>
+              <c:idx val="7"/>
               <c:layout>
                 <c:manualLayout>
                   <c:x val="0.0"/>
@@ -5422,7 +5420,7 @@
               </c:extLst>
             </c:dLbl>
             <c:dLbl>
-              <c:idx val="6"/>
+              <c:idx val="8"/>
               <c:layout>
                 <c:manualLayout>
                   <c:x val="0.0"/>
@@ -5513,9 +5511,9 @@
           </c:dLbls>
           <c:cat>
             <c:strRef>
-              <c:f>Sheet1!$A$2:$A$8</c:f>
+              <c:f>Sheet1!$A$2:$A$10</c:f>
               <c:strCache>
-                <c:ptCount val="7"/>
+                <c:ptCount val="9"/>
                 <c:pt idx="0">
                   <c:v>ENTSO-E</c:v>
                 </c:pt>
@@ -5523,18 +5521,24 @@
                   <c:v>Switzerland</c:v>
                 </c:pt>
                 <c:pt idx="2">
-                  <c:v>ASF (CIGS) incl. shading benefits</c:v>
+                  <c:v>ASF (CIGS) ENTSO-E mix incl. shading benefits</c:v>
                 </c:pt>
                 <c:pt idx="3">
+                  <c:v>ASF (CIGS) ENTSO-E mix excl. shading benefits</c:v>
+                </c:pt>
+                <c:pt idx="4">
+                  <c:v>ASF (CIGS) Swiss mix incl. shading benefits</c:v>
+                </c:pt>
+                <c:pt idx="5">
                   <c:v>CIGS (thin)</c:v>
                 </c:pt>
-                <c:pt idx="4">
+                <c:pt idx="6">
                   <c:v>mono-Si</c:v>
                 </c:pt>
-                <c:pt idx="5">
+                <c:pt idx="7">
                   <c:v>poly-Si</c:v>
                 </c:pt>
-                <c:pt idx="6">
+                <c:pt idx="8">
                   <c:v>CdTe (thin)</c:v>
                 </c:pt>
               </c:strCache>
@@ -5542,23 +5546,29 @@
           </c:cat>
           <c:val>
             <c:numRef>
-              <c:f>Sheet1!$C$2:$C$8</c:f>
+              <c:f>Sheet1!$C$2:$C$10</c:f>
               <c:numCache>
                 <c:formatCode>General</c:formatCode>
-                <c:ptCount val="7"/>
+                <c:ptCount val="9"/>
                 <c:pt idx="2" formatCode="0.0">
                   <c:v>18.9</c:v>
                 </c:pt>
                 <c:pt idx="3" formatCode="0.0">
+                  <c:v>18.9</c:v>
+                </c:pt>
+                <c:pt idx="4" formatCode="0.0">
+                  <c:v>18.9</c:v>
+                </c:pt>
+                <c:pt idx="5" formatCode="0.0">
                   <c:v>6.1</c:v>
                 </c:pt>
-                <c:pt idx="4" formatCode="0.0">
+                <c:pt idx="6" formatCode="0.0">
                   <c:v>26.0</c:v>
                 </c:pt>
-                <c:pt idx="5" formatCode="0.0">
+                <c:pt idx="7" formatCode="0.0">
                   <c:v>30.6</c:v>
                 </c:pt>
-                <c:pt idx="6" formatCode="0.0">
+                <c:pt idx="8" formatCode="0.0">
                   <c:v>8.6</c:v>
                 </c:pt>
               </c:numCache>
@@ -5574,7 +5584,7 @@
               <c:strCache>
                 <c:ptCount val="1"/>
                 <c:pt idx="0">
-                  <c:v>UCTE</c:v>
+                  <c:v>Electricity mix</c:v>
                 </c:pt>
               </c:strCache>
             </c:strRef>
@@ -5620,7 +5630,7 @@
               <c:layout>
                 <c:manualLayout>
                   <c:x val="0.0"/>
-                  <c:y val="-0.112764574488286"/>
+                  <c:y val="-0.102513249534806"/>
                 </c:manualLayout>
               </c:layout>
               <c:showLegendKey val="0"/>
@@ -5636,7 +5646,7 @@
               </c:extLst>
             </c:dLbl>
             <c:dLbl>
-              <c:idx val="6"/>
+              <c:idx val="8"/>
               <c:tx>
                 <c:rich>
                   <a:bodyPr/>
@@ -5705,7 +5715,6 @@
             <c:showLeaderLines val="0"/>
             <c:extLst>
               <c:ext xmlns:c15="http://schemas.microsoft.com/office/drawing/2012/chart" uri="{CE6537A1-D6FC-4f65-9D91-7224C49458BB}">
-                <c15:layout/>
                 <c15:showLeaderLines val="1"/>
                 <c15:leaderLines>
                   <c:spPr>
@@ -5726,9 +5735,9 @@
           </c:dLbls>
           <c:cat>
             <c:strRef>
-              <c:f>Sheet1!$A$2:$A$8</c:f>
+              <c:f>Sheet1!$A$2:$A$10</c:f>
               <c:strCache>
-                <c:ptCount val="7"/>
+                <c:ptCount val="9"/>
                 <c:pt idx="0">
                   <c:v>ENTSO-E</c:v>
                 </c:pt>
@@ -5736,18 +5745,24 @@
                   <c:v>Switzerland</c:v>
                 </c:pt>
                 <c:pt idx="2">
-                  <c:v>ASF (CIGS) incl. shading benefits</c:v>
+                  <c:v>ASF (CIGS) ENTSO-E mix incl. shading benefits</c:v>
                 </c:pt>
                 <c:pt idx="3">
+                  <c:v>ASF (CIGS) ENTSO-E mix excl. shading benefits</c:v>
+                </c:pt>
+                <c:pt idx="4">
+                  <c:v>ASF (CIGS) Swiss mix incl. shading benefits</c:v>
+                </c:pt>
+                <c:pt idx="5">
                   <c:v>CIGS (thin)</c:v>
                 </c:pt>
-                <c:pt idx="4">
+                <c:pt idx="6">
                   <c:v>mono-Si</c:v>
                 </c:pt>
-                <c:pt idx="5">
+                <c:pt idx="7">
                   <c:v>poly-Si</c:v>
                 </c:pt>
-                <c:pt idx="6">
+                <c:pt idx="8">
                   <c:v>CdTe (thin)</c:v>
                 </c:pt>
               </c:strCache>
@@ -5755,10 +5770,10 @@
           </c:cat>
           <c:val>
             <c:numRef>
-              <c:f>Sheet1!$D$2:$D$8</c:f>
+              <c:f>Sheet1!$D$2:$D$10</c:f>
               <c:numCache>
                 <c:formatCode>General</c:formatCode>
-                <c:ptCount val="7"/>
+                <c:ptCount val="9"/>
                 <c:pt idx="0" formatCode="0.0">
                   <c:v>462.1</c:v>
                 </c:pt>
@@ -5779,11 +5794,11 @@
         </c:dLbls>
         <c:gapWidth val="219"/>
         <c:overlap val="100"/>
-        <c:axId val="2107061808"/>
-        <c:axId val="2107064416"/>
+        <c:axId val="-2095217248"/>
+        <c:axId val="-2123442512"/>
       </c:barChart>
       <c:catAx>
-        <c:axId val="2107061808"/>
+        <c:axId val="-2095217248"/>
         <c:scaling>
           <c:orientation val="minMax"/>
         </c:scaling>
@@ -5826,7 +5841,7 @@
             <a:endParaRPr lang="en-US"/>
           </a:p>
         </c:txPr>
-        <c:crossAx val="2107064416"/>
+        <c:crossAx val="-2123442512"/>
         <c:crosses val="autoZero"/>
         <c:auto val="1"/>
         <c:lblAlgn val="ctr"/>
@@ -5834,7 +5849,7 @@
         <c:noMultiLvlLbl val="0"/>
       </c:catAx>
       <c:valAx>
-        <c:axId val="2107064416"/>
+        <c:axId val="-2123442512"/>
         <c:scaling>
           <c:orientation val="minMax"/>
         </c:scaling>
@@ -5976,7 +5991,7 @@
             <a:endParaRPr lang="en-US"/>
           </a:p>
         </c:txPr>
-        <c:crossAx val="2107061808"/>
+        <c:crossAx val="-2095217248"/>
         <c:crosses val="autoZero"/>
         <c:crossBetween val="between"/>
       </c:valAx>
@@ -6134,7 +6149,6 @@
             <c:showLeaderLines val="0"/>
             <c:extLst>
               <c:ext xmlns:c15="http://schemas.microsoft.com/office/drawing/2012/chart" uri="{CE6537A1-D6FC-4f65-9D91-7224C49458BB}">
-                <c15:layout/>
                 <c15:showLeaderLines val="1"/>
                 <c15:leaderLines>
                   <c:spPr>
@@ -6258,7 +6272,6 @@
             <c:showLeaderLines val="0"/>
             <c:extLst>
               <c:ext xmlns:c15="http://schemas.microsoft.com/office/drawing/2012/chart" uri="{CE6537A1-D6FC-4f65-9D91-7224C49458BB}">
-                <c15:layout/>
                 <c15:showLeaderLines val="1"/>
                 <c15:leaderLines>
                   <c:spPr>
@@ -6377,7 +6390,6 @@
             <c:showLeaderLines val="0"/>
             <c:extLst>
               <c:ext xmlns:c15="http://schemas.microsoft.com/office/drawing/2012/chart" uri="{CE6537A1-D6FC-4f65-9D91-7224C49458BB}">
-                <c15:layout/>
                 <c15:showLeaderLines val="1"/>
                 <c15:leaderLines>
                   <c:spPr>
@@ -6442,11 +6454,11 @@
         </c:dLbls>
         <c:gapWidth val="219"/>
         <c:overlap val="-27"/>
-        <c:axId val="-2125096448"/>
-        <c:axId val="-2125209056"/>
+        <c:axId val="-2095662288"/>
+        <c:axId val="-2129402688"/>
       </c:barChart>
       <c:catAx>
-        <c:axId val="-2125096448"/>
+        <c:axId val="-2095662288"/>
         <c:scaling>
           <c:orientation val="minMax"/>
         </c:scaling>
@@ -6486,7 +6498,7 @@
             <a:endParaRPr lang="en-US"/>
           </a:p>
         </c:txPr>
-        <c:crossAx val="-2125209056"/>
+        <c:crossAx val="-2129402688"/>
         <c:crosses val="autoZero"/>
         <c:auto val="1"/>
         <c:lblAlgn val="ctr"/>
@@ -6494,7 +6506,7 @@
         <c:noMultiLvlLbl val="0"/>
       </c:catAx>
       <c:valAx>
-        <c:axId val="-2125209056"/>
+        <c:axId val="-2129402688"/>
         <c:scaling>
           <c:orientation val="minMax"/>
         </c:scaling>
@@ -6553,7 +6565,6 @@
               </a:p>
             </c:rich>
           </c:tx>
-          <c:layout/>
           <c:overlay val="0"/>
           <c:spPr>
             <a:noFill/>
@@ -6616,7 +6627,7 @@
             <a:endParaRPr lang="en-US"/>
           </a:p>
         </c:txPr>
-        <c:crossAx val="-2125096448"/>
+        <c:crossAx val="-2095662288"/>
         <c:crosses val="autoZero"/>
         <c:crossBetween val="between"/>
       </c:valAx>
@@ -6632,7 +6643,6 @@
     </c:plotArea>
     <c:legend>
       <c:legendPos val="b"/>
-      <c:layout/>
       <c:overlay val="0"/>
       <c:spPr>
         <a:noFill/>
@@ -6999,11 +7009,11 @@
         </c:dLbls>
         <c:gapWidth val="219"/>
         <c:overlap val="100"/>
-        <c:axId val="2070803264"/>
-        <c:axId val="2070802496"/>
+        <c:axId val="-2084209648"/>
+        <c:axId val="-2100715824"/>
       </c:barChart>
       <c:catAx>
-        <c:axId val="2070803264"/>
+        <c:axId val="-2084209648"/>
         <c:scaling>
           <c:orientation val="minMax"/>
         </c:scaling>
@@ -7046,7 +7056,7 @@
             <a:endParaRPr lang="en-US"/>
           </a:p>
         </c:txPr>
-        <c:crossAx val="2070802496"/>
+        <c:crossAx val="-2100715824"/>
         <c:crosses val="autoZero"/>
         <c:auto val="1"/>
         <c:lblAlgn val="ctr"/>
@@ -7054,7 +7064,7 @@
         <c:noMultiLvlLbl val="0"/>
       </c:catAx>
       <c:valAx>
-        <c:axId val="2070802496"/>
+        <c:axId val="-2100715824"/>
         <c:scaling>
           <c:orientation val="minMax"/>
         </c:scaling>
@@ -7105,7 +7115,6 @@
               </a:p>
             </c:rich>
           </c:tx>
-          <c:layout/>
           <c:overlay val="0"/>
           <c:spPr>
             <a:noFill/>
@@ -7146,7 +7155,7 @@
             <a:endParaRPr lang="en-US"/>
           </a:p>
         </c:txPr>
-        <c:crossAx val="2070803264"/>
+        <c:crossAx val="-2084209648"/>
         <c:crosses val="autoZero"/>
         <c:crossBetween val="between"/>
       </c:valAx>
@@ -7162,7 +7171,6 @@
     </c:plotArea>
     <c:legend>
       <c:legendPos val="b"/>
-      <c:layout/>
       <c:overlay val="0"/>
       <c:spPr>
         <a:noFill/>
@@ -7414,11 +7422,11 @@
         </c:dLbls>
         <c:gapWidth val="219"/>
         <c:overlap val="100"/>
-        <c:axId val="2107180992"/>
-        <c:axId val="2107183296"/>
+        <c:axId val="2144097616"/>
+        <c:axId val="2144079232"/>
       </c:barChart>
       <c:catAx>
-        <c:axId val="2107180992"/>
+        <c:axId val="2144097616"/>
         <c:scaling>
           <c:orientation val="minMax"/>
         </c:scaling>
@@ -7458,7 +7466,7 @@
             <a:endParaRPr lang="en-US"/>
           </a:p>
         </c:txPr>
-        <c:crossAx val="2107183296"/>
+        <c:crossAx val="2144079232"/>
         <c:crosses val="autoZero"/>
         <c:auto val="1"/>
         <c:lblAlgn val="ctr"/>
@@ -7466,7 +7474,7 @@
         <c:noMultiLvlLbl val="0"/>
       </c:catAx>
       <c:valAx>
-        <c:axId val="2107183296"/>
+        <c:axId val="2144079232"/>
         <c:scaling>
           <c:orientation val="minMax"/>
         </c:scaling>
@@ -7547,7 +7555,6 @@
               </a:p>
             </c:rich>
           </c:tx>
-          <c:layout/>
           <c:overlay val="0"/>
           <c:spPr>
             <a:noFill/>
@@ -7608,7 +7615,7 @@
             <a:endParaRPr lang="en-US"/>
           </a:p>
         </c:txPr>
-        <c:crossAx val="2107180992"/>
+        <c:crossAx val="2144097616"/>
         <c:crosses val="autoZero"/>
         <c:crossBetween val="between"/>
         <c:majorUnit val="100.0"/>
@@ -7822,11 +7829,11 @@
         </c:dLbls>
         <c:gapWidth val="219"/>
         <c:overlap val="100"/>
-        <c:axId val="2068918768"/>
-        <c:axId val="2068911008"/>
+        <c:axId val="-2095298592"/>
+        <c:axId val="-2095292208"/>
       </c:barChart>
       <c:catAx>
-        <c:axId val="2068918768"/>
+        <c:axId val="-2095298592"/>
         <c:scaling>
           <c:orientation val="minMax"/>
         </c:scaling>
@@ -7866,7 +7873,7 @@
             <a:endParaRPr lang="en-US"/>
           </a:p>
         </c:txPr>
-        <c:crossAx val="2068911008"/>
+        <c:crossAx val="-2095292208"/>
         <c:crosses val="autoZero"/>
         <c:auto val="1"/>
         <c:lblAlgn val="ctr"/>
@@ -7874,7 +7881,7 @@
         <c:noMultiLvlLbl val="0"/>
       </c:catAx>
       <c:valAx>
-        <c:axId val="2068911008"/>
+        <c:axId val="-2095292208"/>
         <c:scaling>
           <c:orientation val="minMax"/>
         </c:scaling>
@@ -7961,7 +7968,6 @@
               </a:p>
             </c:rich>
           </c:tx>
-          <c:layout/>
           <c:overlay val="0"/>
           <c:spPr>
             <a:noFill/>
@@ -8022,7 +8028,7 @@
             <a:endParaRPr lang="en-US"/>
           </a:p>
         </c:txPr>
-        <c:crossAx val="2068918768"/>
+        <c:crossAx val="-2095298592"/>
         <c:crosses val="autoZero"/>
         <c:crossBetween val="between"/>
       </c:valAx>
@@ -8148,7 +8154,6 @@
             <c:showLeaderLines val="0"/>
             <c:extLst>
               <c:ext xmlns:c15="http://schemas.microsoft.com/office/drawing/2012/chart" uri="{CE6537A1-D6FC-4f65-9D91-7224C49458BB}">
-                <c15:layout/>
                 <c15:showLeaderLines val="1"/>
                 <c15:leaderLines>
                   <c:spPr>
@@ -8278,7 +8283,6 @@
             <c:showLeaderLines val="0"/>
             <c:extLst>
               <c:ext xmlns:c15="http://schemas.microsoft.com/office/drawing/2012/chart" uri="{CE6537A1-D6FC-4f65-9D91-7224C49458BB}">
-                <c15:layout/>
                 <c15:showLeaderLines val="1"/>
                 <c15:leaderLines>
                   <c:spPr>
@@ -8349,11 +8353,11 @@
         </c:dLbls>
         <c:gapWidth val="219"/>
         <c:overlap val="-27"/>
-        <c:axId val="2071510048"/>
-        <c:axId val="2071513456"/>
+        <c:axId val="-2095643600"/>
+        <c:axId val="-2129107552"/>
       </c:barChart>
       <c:catAx>
-        <c:axId val="2071510048"/>
+        <c:axId val="-2095643600"/>
         <c:scaling>
           <c:orientation val="minMax"/>
         </c:scaling>
@@ -8393,7 +8397,7 @@
             <a:endParaRPr lang="en-US"/>
           </a:p>
         </c:txPr>
-        <c:crossAx val="2071513456"/>
+        <c:crossAx val="-2129107552"/>
         <c:crosses val="autoZero"/>
         <c:auto val="1"/>
         <c:lblAlgn val="ctr"/>
@@ -8401,7 +8405,7 @@
         <c:noMultiLvlLbl val="0"/>
       </c:catAx>
       <c:valAx>
-        <c:axId val="2071513456"/>
+        <c:axId val="-2129107552"/>
         <c:scaling>
           <c:orientation val="minMax"/>
         </c:scaling>
@@ -8472,7 +8476,6 @@
               </a:p>
             </c:rich>
           </c:tx>
-          <c:layout/>
           <c:overlay val="0"/>
           <c:spPr>
             <a:noFill/>
@@ -8535,7 +8538,7 @@
             <a:endParaRPr lang="en-US"/>
           </a:p>
         </c:txPr>
-        <c:crossAx val="2071510048"/>
+        <c:crossAx val="-2095643600"/>
         <c:crosses val="autoZero"/>
         <c:crossBetween val="between"/>
       </c:valAx>
@@ -8551,7 +8554,6 @@
     </c:plotArea>
     <c:legend>
       <c:legendPos val="b"/>
-      <c:layout/>
       <c:overlay val="0"/>
       <c:spPr>
         <a:noFill/>
@@ -8693,7 +8695,6 @@
             <c:showLeaderLines val="0"/>
             <c:extLst>
               <c:ext xmlns:c15="http://schemas.microsoft.com/office/drawing/2012/chart" uri="{CE6537A1-D6FC-4f65-9D91-7224C49458BB}">
-                <c15:layout/>
                 <c15:showLeaderLines val="1"/>
                 <c15:leaderLines>
                   <c:spPr>
@@ -8823,7 +8824,6 @@
             <c:showLeaderLines val="0"/>
             <c:extLst>
               <c:ext xmlns:c15="http://schemas.microsoft.com/office/drawing/2012/chart" uri="{CE6537A1-D6FC-4f65-9D91-7224C49458BB}">
-                <c15:layout/>
                 <c15:showLeaderLines val="1"/>
                 <c15:leaderLines>
                   <c:spPr>
@@ -8948,7 +8948,6 @@
             <c:showLeaderLines val="0"/>
             <c:extLst>
               <c:ext xmlns:c15="http://schemas.microsoft.com/office/drawing/2012/chart" uri="{CE6537A1-D6FC-4f65-9D91-7224C49458BB}">
-                <c15:layout/>
                 <c15:showLeaderLines val="1"/>
                 <c15:leaderLines>
                   <c:spPr>
@@ -9073,7 +9072,6 @@
             <c:showLeaderLines val="0"/>
             <c:extLst>
               <c:ext xmlns:c15="http://schemas.microsoft.com/office/drawing/2012/chart" uri="{CE6537A1-D6FC-4f65-9D91-7224C49458BB}">
-                <c15:layout/>
                 <c15:showLeaderLines val="1"/>
                 <c15:leaderLines>
                   <c:spPr>
@@ -9144,11 +9142,11 @@
         </c:dLbls>
         <c:gapWidth val="219"/>
         <c:overlap val="-27"/>
-        <c:axId val="2071467200"/>
-        <c:axId val="2071458320"/>
+        <c:axId val="-2103102240"/>
+        <c:axId val="-2100245904"/>
       </c:barChart>
       <c:catAx>
-        <c:axId val="2071467200"/>
+        <c:axId val="-2103102240"/>
         <c:scaling>
           <c:orientation val="minMax"/>
         </c:scaling>
@@ -9188,7 +9186,7 @@
             <a:endParaRPr lang="en-US"/>
           </a:p>
         </c:txPr>
-        <c:crossAx val="2071458320"/>
+        <c:crossAx val="-2100245904"/>
         <c:crosses val="autoZero"/>
         <c:auto val="1"/>
         <c:lblAlgn val="ctr"/>
@@ -9196,7 +9194,7 @@
         <c:noMultiLvlLbl val="0"/>
       </c:catAx>
       <c:valAx>
-        <c:axId val="2071458320"/>
+        <c:axId val="-2100245904"/>
         <c:scaling>
           <c:orientation val="minMax"/>
         </c:scaling>
@@ -9272,7 +9270,6 @@
               </a:p>
             </c:rich>
           </c:tx>
-          <c:layout/>
           <c:overlay val="0"/>
           <c:spPr>
             <a:noFill/>
@@ -9335,7 +9332,7 @@
             <a:endParaRPr lang="en-US"/>
           </a:p>
         </c:txPr>
-        <c:crossAx val="2071467200"/>
+        <c:crossAx val="-2103102240"/>
         <c:crosses val="autoZero"/>
         <c:crossBetween val="between"/>
       </c:valAx>
@@ -9351,7 +9348,6 @@
     </c:plotArea>
     <c:legend>
       <c:legendPos val="b"/>
-      <c:layout/>
       <c:overlay val="0"/>
       <c:spPr>
         <a:noFill/>
@@ -9727,11 +9723,11 @@
         </c:dLbls>
         <c:gapWidth val="219"/>
         <c:overlap val="-27"/>
-        <c:axId val="2071566352"/>
-        <c:axId val="2071563504"/>
+        <c:axId val="2108492800"/>
+        <c:axId val="-2125977040"/>
       </c:barChart>
       <c:catAx>
-        <c:axId val="2071566352"/>
+        <c:axId val="2108492800"/>
         <c:scaling>
           <c:orientation val="minMax"/>
         </c:scaling>
@@ -9771,7 +9767,7 @@
             <a:endParaRPr lang="en-US"/>
           </a:p>
         </c:txPr>
-        <c:crossAx val="2071563504"/>
+        <c:crossAx val="-2125977040"/>
         <c:crosses val="autoZero"/>
         <c:auto val="1"/>
         <c:lblAlgn val="ctr"/>
@@ -9779,7 +9775,7 @@
         <c:noMultiLvlLbl val="0"/>
       </c:catAx>
       <c:valAx>
-        <c:axId val="2071563504"/>
+        <c:axId val="-2125977040"/>
         <c:scaling>
           <c:orientation val="minMax"/>
         </c:scaling>
@@ -9847,7 +9843,6 @@
               </a:p>
             </c:rich>
           </c:tx>
-          <c:layout/>
           <c:overlay val="0"/>
           <c:spPr>
             <a:noFill/>
@@ -9910,7 +9905,7 @@
             <a:endParaRPr lang="en-US"/>
           </a:p>
         </c:txPr>
-        <c:crossAx val="2071566352"/>
+        <c:crossAx val="2108492800"/>
         <c:crosses val="autoZero"/>
         <c:crossBetween val="between"/>
       </c:valAx>
@@ -9926,7 +9921,6 @@
     </c:plotArea>
     <c:legend>
       <c:legendPos val="b"/>
-      <c:layout/>
       <c:overlay val="0"/>
       <c:spPr>
         <a:noFill/>
@@ -10080,11 +10074,11 @@
         </c:dLbls>
         <c:gapWidth val="219"/>
         <c:overlap val="-27"/>
-        <c:axId val="2069120592"/>
-        <c:axId val="2069079072"/>
+        <c:axId val="-2096837360"/>
+        <c:axId val="2070112432"/>
       </c:barChart>
       <c:catAx>
-        <c:axId val="2069120592"/>
+        <c:axId val="-2096837360"/>
         <c:scaling>
           <c:orientation val="minMax"/>
         </c:scaling>
@@ -10124,7 +10118,7 @@
             <a:endParaRPr lang="en-US"/>
           </a:p>
         </c:txPr>
-        <c:crossAx val="2069079072"/>
+        <c:crossAx val="2070112432"/>
         <c:crosses val="autoZero"/>
         <c:auto val="1"/>
         <c:lblAlgn val="ctr"/>
@@ -10132,7 +10126,7 @@
         <c:noMultiLvlLbl val="0"/>
       </c:catAx>
       <c:valAx>
-        <c:axId val="2069079072"/>
+        <c:axId val="2070112432"/>
         <c:scaling>
           <c:orientation val="minMax"/>
         </c:scaling>
@@ -10200,7 +10194,6 @@
               </a:p>
             </c:rich>
           </c:tx>
-          <c:layout/>
           <c:overlay val="0"/>
           <c:spPr>
             <a:noFill/>
@@ -10263,7 +10256,7 @@
             <a:endParaRPr lang="en-US"/>
           </a:p>
         </c:txPr>
-        <c:crossAx val="2069120592"/>
+        <c:crossAx val="-2096837360"/>
         <c:crosses val="autoZero"/>
         <c:crossBetween val="between"/>
       </c:valAx>
@@ -10573,11 +10566,11 @@
         </c:dLbls>
         <c:gapWidth val="219"/>
         <c:overlap val="100"/>
-        <c:axId val="2071601088"/>
-        <c:axId val="2071427152"/>
+        <c:axId val="-2085955216"/>
+        <c:axId val="-2085948272"/>
       </c:barChart>
       <c:catAx>
-        <c:axId val="2071601088"/>
+        <c:axId val="-2085955216"/>
         <c:scaling>
           <c:orientation val="minMax"/>
         </c:scaling>
@@ -10620,7 +10613,7 @@
             <a:endParaRPr lang="en-US"/>
           </a:p>
         </c:txPr>
-        <c:crossAx val="2071427152"/>
+        <c:crossAx val="-2085948272"/>
         <c:crosses val="autoZero"/>
         <c:auto val="1"/>
         <c:lblAlgn val="ctr"/>
@@ -10628,7 +10621,7 @@
         <c:noMultiLvlLbl val="0"/>
       </c:catAx>
       <c:valAx>
-        <c:axId val="2071427152"/>
+        <c:axId val="-2085948272"/>
         <c:scaling>
           <c:orientation val="minMax"/>
         </c:scaling>
@@ -10679,7 +10672,6 @@
               </a:p>
             </c:rich>
           </c:tx>
-          <c:layout/>
           <c:overlay val="0"/>
           <c:spPr>
             <a:noFill/>
@@ -10740,7 +10732,7 @@
             <a:endParaRPr lang="en-US"/>
           </a:p>
         </c:txPr>
-        <c:crossAx val="2071601088"/>
+        <c:crossAx val="-2085955216"/>
         <c:crosses val="autoZero"/>
         <c:crossBetween val="between"/>
       </c:valAx>
@@ -11031,9 +11023,7 @@
               </c:spPr>
             </c:leaderLines>
             <c:extLst>
-              <c:ext xmlns:c15="http://schemas.microsoft.com/office/drawing/2012/chart" uri="{CE6537A1-D6FC-4f65-9D91-7224C49458BB}">
-                <c15:layout/>
-              </c:ext>
+              <c:ext xmlns:c15="http://schemas.microsoft.com/office/drawing/2012/chart" uri="{CE6537A1-D6FC-4f65-9D91-7224C49458BB}"/>
             </c:extLst>
           </c:dLbls>
           <c:cat>
@@ -11337,9 +11327,7 @@
               </c:spPr>
             </c:leaderLines>
             <c:extLst>
-              <c:ext xmlns:c15="http://schemas.microsoft.com/office/drawing/2012/chart" uri="{CE6537A1-D6FC-4f65-9D91-7224C49458BB}">
-                <c15:layout/>
-              </c:ext>
+              <c:ext xmlns:c15="http://schemas.microsoft.com/office/drawing/2012/chart" uri="{CE6537A1-D6FC-4f65-9D91-7224C49458BB}"/>
             </c:extLst>
           </c:dLbls>
           <c:cat>
@@ -27283,15 +27271,7 @@
             <a:pPr algn="ctr"/>
             <a:r>
               <a:rPr lang="en-US" sz="2000" dirty="0" smtClean="0"/>
-              <a:t>-</a:t>
-            </a:r>
-            <a:r>
-              <a:rPr lang="en-US" sz="2000" dirty="0" smtClean="0"/>
-              <a:t>465.2 </a:t>
-            </a:r>
-            <a:r>
-              <a:rPr lang="en-US" sz="2000" dirty="0" smtClean="0"/>
-              <a:t>gCO</a:t>
+              <a:t>-465.2 gCO</a:t>
             </a:r>
             <a:r>
               <a:rPr lang="en-US" sz="2000" baseline="-25000" dirty="0" smtClean="0"/>
@@ -28403,7 +28383,7 @@
           <p:nvPr>
             <p:extLst>
               <p:ext uri="{D42A27DB-BD31-4B8C-83A1-F6EECF244321}">
-                <p14:modId xmlns:p14="http://schemas.microsoft.com/office/powerpoint/2010/main" val="1234554607"/>
+                <p14:modId xmlns:p14="http://schemas.microsoft.com/office/powerpoint/2010/main" val="337523327"/>
               </p:ext>
             </p:extLst>
           </p:nvPr>

</xml_diff>

<commit_message>
last minor changes before sending to arno
</commit_message>
<xml_diff>
--- a/elsarticle/Images/Thesis charts.pptx
+++ b/elsarticle/Images/Thesis charts.pptx
@@ -128,7 +128,7 @@
   </p:defaultTextStyle>
   <p:extLst>
     <p:ext uri="{EFAFB233-063F-42B5-8137-9DF3F51BA10A}">
-      <p15:sldGuideLst xmlns:p15="http://schemas.microsoft.com/office/powerpoint/2012/main">
+      <p15:sldGuideLst xmlns:p15="http://schemas.microsoft.com/office/powerpoint/2012/main" xmlns="">
         <p15:guide id="1" orient="horz" pos="2160">
           <p15:clr>
             <a:srgbClr val="A4A3A4"/>
@@ -424,11 +424,11 @@
           <c:showPercent val="0"/>
           <c:showBubbleSize val="0"/>
         </c:dLbls>
-        <c:axId val="-2103977168"/>
-        <c:axId val="-2104033184"/>
+        <c:axId val="-2146064504"/>
+        <c:axId val="2113054552"/>
       </c:scatterChart>
       <c:valAx>
-        <c:axId val="-2103977168"/>
+        <c:axId val="-2146064504"/>
         <c:scaling>
           <c:orientation val="minMax"/>
         </c:scaling>
@@ -492,26 +492,6 @@
             </a:ln>
             <a:effectLst/>
           </c:spPr>
-          <c:txPr>
-            <a:bodyPr rot="0" spcFirstLastPara="1" vertOverflow="ellipsis" vert="horz" wrap="square" anchor="ctr" anchorCtr="1"/>
-            <a:lstStyle/>
-            <a:p>
-              <a:pPr>
-                <a:defRPr sz="1330" b="0" i="0" u="none" strike="noStrike" kern="1200" baseline="0">
-                  <a:solidFill>
-                    <a:schemeClr val="tx1">
-                      <a:lumMod val="65000"/>
-                      <a:lumOff val="35000"/>
-                    </a:schemeClr>
-                  </a:solidFill>
-                  <a:latin typeface="+mn-lt"/>
-                  <a:ea typeface="+mn-ea"/>
-                  <a:cs typeface="+mn-cs"/>
-                </a:defRPr>
-              </a:pPr>
-              <a:endParaRPr lang="en-US"/>
-            </a:p>
-          </c:txPr>
         </c:title>
         <c:numFmt formatCode="General" sourceLinked="1"/>
         <c:majorTickMark val="out"/>
@@ -550,12 +530,12 @@
             <a:endParaRPr lang="en-US"/>
           </a:p>
         </c:txPr>
-        <c:crossAx val="-2104033184"/>
+        <c:crossAx val="2113054552"/>
         <c:crosses val="autoZero"/>
         <c:crossBetween val="midCat"/>
       </c:valAx>
       <c:valAx>
-        <c:axId val="-2104033184"/>
+        <c:axId val="2113054552"/>
         <c:scaling>
           <c:orientation val="minMax"/>
         </c:scaling>
@@ -623,26 +603,6 @@
             </a:ln>
             <a:effectLst/>
           </c:spPr>
-          <c:txPr>
-            <a:bodyPr rot="-5400000" spcFirstLastPara="1" vertOverflow="ellipsis" vert="horz" wrap="square" anchor="ctr" anchorCtr="1"/>
-            <a:lstStyle/>
-            <a:p>
-              <a:pPr>
-                <a:defRPr sz="1330" b="0" i="0" u="none" strike="noStrike" kern="1200" baseline="0">
-                  <a:solidFill>
-                    <a:schemeClr val="tx1">
-                      <a:lumMod val="65000"/>
-                      <a:lumOff val="35000"/>
-                    </a:schemeClr>
-                  </a:solidFill>
-                  <a:latin typeface="+mn-lt"/>
-                  <a:ea typeface="+mn-ea"/>
-                  <a:cs typeface="+mn-cs"/>
-                </a:defRPr>
-              </a:pPr>
-              <a:endParaRPr lang="en-US"/>
-            </a:p>
-          </c:txPr>
         </c:title>
         <c:numFmt formatCode="General" sourceLinked="1"/>
         <c:majorTickMark val="out"/>
@@ -681,7 +641,7 @@
             <a:endParaRPr lang="en-US"/>
           </a:p>
         </c:txPr>
-        <c:crossAx val="-2103977168"/>
+        <c:crossAx val="-2146064504"/>
         <c:crosses val="autoZero"/>
         <c:crossBetween val="midCat"/>
       </c:valAx>
@@ -748,7 +708,7 @@
       <a:endParaRPr lang="en-US"/>
     </a:p>
   </c:txPr>
-  <c:externalData r:id="rId3">
+  <c:externalData r:id="rId1">
     <c:autoUpdate val="0"/>
   </c:externalData>
 </c:chartSpace>
@@ -811,26 +771,6 @@
         </a:ln>
         <a:effectLst/>
       </c:spPr>
-      <c:txPr>
-        <a:bodyPr rot="0" spcFirstLastPara="1" vertOverflow="ellipsis" vert="horz" wrap="square" anchor="ctr" anchorCtr="1"/>
-        <a:lstStyle/>
-        <a:p>
-          <a:pPr>
-            <a:defRPr sz="1862" b="0" i="0" u="none" strike="noStrike" kern="1200" spc="0" baseline="0">
-              <a:solidFill>
-                <a:schemeClr val="tx1">
-                  <a:lumMod val="65000"/>
-                  <a:lumOff val="35000"/>
-                </a:schemeClr>
-              </a:solidFill>
-              <a:latin typeface="+mn-lt"/>
-              <a:ea typeface="+mn-ea"/>
-              <a:cs typeface="+mn-cs"/>
-            </a:defRPr>
-          </a:pPr>
-          <a:endParaRPr lang="en-US"/>
-        </a:p>
-      </c:txPr>
     </c:title>
     <c:autoTitleDeleted val="0"/>
     <c:plotArea>
@@ -1026,7 +966,7 @@
       <a:endParaRPr lang="en-US"/>
     </a:p>
   </c:txPr>
-  <c:externalData r:id="rId3">
+  <c:externalData r:id="rId1">
     <c:autoUpdate val="0"/>
   </c:externalData>
 </c:chartSpace>
@@ -1093,26 +1033,6 @@
         </a:ln>
         <a:effectLst/>
       </c:spPr>
-      <c:txPr>
-        <a:bodyPr rot="0" spcFirstLastPara="1" vertOverflow="ellipsis" vert="horz" wrap="square" anchor="ctr" anchorCtr="1"/>
-        <a:lstStyle/>
-        <a:p>
-          <a:pPr>
-            <a:defRPr sz="1862" b="0" i="0" u="none" strike="noStrike" kern="1200" spc="0" baseline="0">
-              <a:solidFill>
-                <a:schemeClr val="tx1">
-                  <a:lumMod val="65000"/>
-                  <a:lumOff val="35000"/>
-                </a:schemeClr>
-              </a:solidFill>
-              <a:latin typeface="+mn-lt"/>
-              <a:ea typeface="+mn-ea"/>
-              <a:cs typeface="+mn-cs"/>
-            </a:defRPr>
-          </a:pPr>
-          <a:endParaRPr lang="en-US"/>
-        </a:p>
-      </c:txPr>
     </c:title>
     <c:autoTitleDeleted val="0"/>
     <c:plotArea>
@@ -1449,7 +1369,7 @@
       <a:endParaRPr lang="en-US"/>
     </a:p>
   </c:txPr>
-  <c:externalData r:id="rId3">
+  <c:externalData r:id="rId1">
     <c:autoUpdate val="0"/>
   </c:externalData>
 </c:chartSpace>
@@ -1768,7 +1688,7 @@
       <a:endParaRPr lang="en-US"/>
     </a:p>
   </c:txPr>
-  <c:externalData r:id="rId3">
+  <c:externalData r:id="rId1">
     <c:autoUpdate val="0"/>
   </c:externalData>
 </c:chartSpace>
@@ -2353,11 +2273,11 @@
         </c:dLbls>
         <c:gapWidth val="150"/>
         <c:overlap val="100"/>
-        <c:axId val="-2104300784"/>
-        <c:axId val="-2077606576"/>
+        <c:axId val="-2142072536"/>
+        <c:axId val="-2142075736"/>
       </c:barChart>
       <c:catAx>
-        <c:axId val="-2104300784"/>
+        <c:axId val="-2142072536"/>
         <c:scaling>
           <c:orientation val="minMax"/>
         </c:scaling>
@@ -2367,7 +2287,7 @@
         <c:majorTickMark val="none"/>
         <c:minorTickMark val="none"/>
         <c:tickLblPos val="nextTo"/>
-        <c:crossAx val="-2077606576"/>
+        <c:crossAx val="-2142075736"/>
         <c:crosses val="autoZero"/>
         <c:auto val="1"/>
         <c:lblAlgn val="ctr"/>
@@ -2375,7 +2295,7 @@
         <c:noMultiLvlLbl val="0"/>
       </c:catAx>
       <c:valAx>
-        <c:axId val="-2077606576"/>
+        <c:axId val="-2142075736"/>
         <c:scaling>
           <c:orientation val="minMax"/>
         </c:scaling>
@@ -2439,26 +2359,6 @@
             </a:ln>
             <a:effectLst/>
           </c:spPr>
-          <c:txPr>
-            <a:bodyPr rot="-5400000" spcFirstLastPara="1" vertOverflow="ellipsis" vert="horz" wrap="square" anchor="ctr" anchorCtr="1"/>
-            <a:lstStyle/>
-            <a:p>
-              <a:pPr>
-                <a:defRPr sz="1330" b="0" i="0" u="none" strike="noStrike" kern="1200" baseline="0">
-                  <a:solidFill>
-                    <a:schemeClr val="tx1">
-                      <a:lumMod val="65000"/>
-                      <a:lumOff val="35000"/>
-                    </a:schemeClr>
-                  </a:solidFill>
-                  <a:latin typeface="+mn-lt"/>
-                  <a:ea typeface="+mn-ea"/>
-                  <a:cs typeface="+mn-cs"/>
-                </a:defRPr>
-              </a:pPr>
-              <a:endParaRPr lang="en-US"/>
-            </a:p>
-          </c:txPr>
         </c:title>
         <c:numFmt formatCode="0.0" sourceLinked="1"/>
         <c:majorTickMark val="none"/>
@@ -2491,7 +2391,7 @@
             <a:endParaRPr lang="en-US"/>
           </a:p>
         </c:txPr>
-        <c:crossAx val="-2104300784"/>
+        <c:crossAx val="-2142072536"/>
         <c:crosses val="autoZero"/>
         <c:crossBetween val="between"/>
       </c:valAx>
@@ -2526,7 +2426,7 @@
       <a:endParaRPr lang="en-US"/>
     </a:p>
   </c:txPr>
-  <c:externalData r:id="rId3">
+  <c:externalData r:id="rId1">
     <c:autoUpdate val="0"/>
   </c:externalData>
 </c:chartSpace>
@@ -2874,11 +2774,11 @@
         </c:dLbls>
         <c:gapWidth val="219"/>
         <c:overlap val="-27"/>
-        <c:axId val="2122911344"/>
-        <c:axId val="-2078216416"/>
+        <c:axId val="-2142156856"/>
+        <c:axId val="-2142160600"/>
       </c:barChart>
       <c:catAx>
-        <c:axId val="2122911344"/>
+        <c:axId val="-2142156856"/>
         <c:scaling>
           <c:orientation val="minMax"/>
         </c:scaling>
@@ -2918,7 +2818,7 @@
             <a:endParaRPr lang="en-US"/>
           </a:p>
         </c:txPr>
-        <c:crossAx val="-2078216416"/>
+        <c:crossAx val="-2142160600"/>
         <c:crosses val="autoZero"/>
         <c:auto val="1"/>
         <c:lblAlgn val="ctr"/>
@@ -2926,487 +2826,7 @@
         <c:noMultiLvlLbl val="0"/>
       </c:catAx>
       <c:valAx>
-        <c:axId val="-2078216416"/>
-        <c:scaling>
-          <c:orientation val="minMax"/>
-        </c:scaling>
-        <c:delete val="0"/>
-        <c:axPos val="l"/>
-        <c:majorGridlines>
-          <c:spPr>
-            <a:ln w="9525" cap="flat" cmpd="sng" algn="ctr">
-              <a:solidFill>
-                <a:schemeClr val="tx1">
-                  <a:lumMod val="15000"/>
-                  <a:lumOff val="85000"/>
-                </a:schemeClr>
-              </a:solidFill>
-              <a:round/>
-            </a:ln>
-            <a:effectLst/>
-          </c:spPr>
-        </c:majorGridlines>
-        <c:title>
-          <c:tx>
-            <c:rich>
-              <a:bodyPr rot="-5400000" spcFirstLastPara="1" vertOverflow="ellipsis" vert="horz" wrap="square" anchor="ctr" anchorCtr="1"/>
-              <a:lstStyle/>
-              <a:p>
-                <a:pPr>
-                  <a:defRPr sz="1400" b="0" i="0" u="none" strike="noStrike" kern="1200" baseline="0">
-                    <a:solidFill>
-                      <a:schemeClr val="tx1">
-                        <a:lumMod val="65000"/>
-                        <a:lumOff val="35000"/>
-                      </a:schemeClr>
-                    </a:solidFill>
-                    <a:latin typeface="+mn-lt"/>
-                    <a:ea typeface="+mn-ea"/>
-                    <a:cs typeface="+mn-cs"/>
-                  </a:defRPr>
-                </a:pPr>
-                <a:r>
-                  <a:rPr lang="en-US" sz="1600" dirty="0" smtClean="0"/>
-                  <a:t>Electricity production at grid</a:t>
-                </a:r>
-              </a:p>
-              <a:p>
-                <a:pPr>
-                  <a:defRPr sz="1400"/>
-                </a:pPr>
-                <a:r>
-                  <a:rPr lang="en-US" sz="1600" noProof="1" smtClean="0"/>
-                  <a:t>(g</a:t>
-                </a:r>
-                <a:r>
-                  <a:rPr lang="en-US" sz="1600" baseline="-25000" noProof="1" smtClean="0"/>
-                  <a:t>CO2eq</a:t>
-                </a:r>
-                <a:r>
-                  <a:rPr lang="en-US" sz="1600" noProof="1" smtClean="0"/>
-                  <a:t>/kWh</a:t>
-                </a:r>
-                <a:r>
-                  <a:rPr lang="de-DE" sz="1600" dirty="0" smtClean="0"/>
-                  <a:t>)</a:t>
-                </a:r>
-                <a:endParaRPr lang="en-US" sz="1600" dirty="0"/>
-              </a:p>
-            </c:rich>
-          </c:tx>
-          <c:layout/>
-          <c:overlay val="0"/>
-          <c:spPr>
-            <a:noFill/>
-            <a:ln>
-              <a:noFill/>
-            </a:ln>
-            <a:effectLst/>
-          </c:spPr>
-          <c:txPr>
-            <a:bodyPr rot="-5400000" spcFirstLastPara="1" vertOverflow="ellipsis" vert="horz" wrap="square" anchor="ctr" anchorCtr="1"/>
-            <a:lstStyle/>
-            <a:p>
-              <a:pPr>
-                <a:defRPr sz="1400" b="0" i="0" u="none" strike="noStrike" kern="1200" baseline="0">
-                  <a:solidFill>
-                    <a:schemeClr val="tx1">
-                      <a:lumMod val="65000"/>
-                      <a:lumOff val="35000"/>
-                    </a:schemeClr>
-                  </a:solidFill>
-                  <a:latin typeface="+mn-lt"/>
-                  <a:ea typeface="+mn-ea"/>
-                  <a:cs typeface="+mn-cs"/>
-                </a:defRPr>
-              </a:pPr>
-              <a:endParaRPr lang="en-US"/>
-            </a:p>
-          </c:txPr>
-        </c:title>
-        <c:numFmt formatCode="General" sourceLinked="1"/>
-        <c:majorTickMark val="none"/>
-        <c:minorTickMark val="none"/>
-        <c:tickLblPos val="nextTo"/>
-        <c:spPr>
-          <a:noFill/>
-          <a:ln>
-            <a:solidFill>
-              <a:schemeClr val="accent3"/>
-            </a:solidFill>
-          </a:ln>
-          <a:effectLst/>
-        </c:spPr>
-        <c:txPr>
-          <a:bodyPr rot="-60000000" spcFirstLastPara="1" vertOverflow="ellipsis" vert="horz" wrap="square" anchor="ctr" anchorCtr="1"/>
-          <a:lstStyle/>
-          <a:p>
-            <a:pPr>
-              <a:defRPr sz="1400" b="0" i="0" u="none" strike="noStrike" kern="1200" baseline="0">
-                <a:solidFill>
-                  <a:schemeClr val="tx1">
-                    <a:lumMod val="65000"/>
-                    <a:lumOff val="35000"/>
-                  </a:schemeClr>
-                </a:solidFill>
-                <a:latin typeface="+mn-lt"/>
-                <a:ea typeface="+mn-ea"/>
-                <a:cs typeface="+mn-cs"/>
-              </a:defRPr>
-            </a:pPr>
-            <a:endParaRPr lang="en-US"/>
-          </a:p>
-        </c:txPr>
-        <c:crossAx val="2122911344"/>
-        <c:crosses val="autoZero"/>
-        <c:crossBetween val="between"/>
-      </c:valAx>
-      <c:spPr>
-        <a:noFill/>
-        <a:ln>
-          <a:solidFill>
-            <a:schemeClr val="accent3"/>
-          </a:solidFill>
-        </a:ln>
-        <a:effectLst/>
-      </c:spPr>
-    </c:plotArea>
-    <c:legend>
-      <c:legendPos val="b"/>
-      <c:layout/>
-      <c:overlay val="0"/>
-      <c:spPr>
-        <a:noFill/>
-        <a:ln>
-          <a:noFill/>
-        </a:ln>
-        <a:effectLst/>
-      </c:spPr>
-      <c:txPr>
-        <a:bodyPr rot="0" spcFirstLastPara="1" vertOverflow="ellipsis" vert="horz" wrap="square" anchor="ctr" anchorCtr="1"/>
-        <a:lstStyle/>
-        <a:p>
-          <a:pPr>
-            <a:defRPr sz="1197" b="0" i="0" u="none" strike="noStrike" kern="1200" baseline="0">
-              <a:solidFill>
-                <a:schemeClr val="tx1">
-                  <a:lumMod val="65000"/>
-                  <a:lumOff val="35000"/>
-                </a:schemeClr>
-              </a:solidFill>
-              <a:latin typeface="+mn-lt"/>
-              <a:ea typeface="+mn-ea"/>
-              <a:cs typeface="+mn-cs"/>
-            </a:defRPr>
-          </a:pPr>
-          <a:endParaRPr lang="en-US"/>
-        </a:p>
-      </c:txPr>
-    </c:legend>
-    <c:plotVisOnly val="1"/>
-    <c:dispBlanksAs val="gap"/>
-    <c:showDLblsOverMax val="0"/>
-  </c:chart>
-  <c:spPr>
-    <a:noFill/>
-    <a:ln>
-      <a:noFill/>
-    </a:ln>
-    <a:effectLst/>
-  </c:spPr>
-  <c:txPr>
-    <a:bodyPr/>
-    <a:lstStyle/>
-    <a:p>
-      <a:pPr>
-        <a:defRPr/>
-      </a:pPr>
-      <a:endParaRPr lang="en-US"/>
-    </a:p>
-  </c:txPr>
-  <c:externalData r:id="rId3">
-    <c:autoUpdate val="0"/>
-  </c:externalData>
-</c:chartSpace>
-</file>
-
-<file path=ppt/charts/chart15.xml><?xml version="1.0" encoding="utf-8"?>
-<c:chartSpace xmlns:c="http://schemas.openxmlformats.org/drawingml/2006/chart" xmlns:a="http://schemas.openxmlformats.org/drawingml/2006/main" xmlns:r="http://schemas.openxmlformats.org/officeDocument/2006/relationships">
-  <c:date1904 val="0"/>
-  <c:lang val="en-US"/>
-  <c:roundedCorners val="0"/>
-  <mc:AlternateContent xmlns:mc="http://schemas.openxmlformats.org/markup-compatibility/2006">
-    <mc:Choice xmlns:c14="http://schemas.microsoft.com/office/drawing/2007/8/2/chart" Requires="c14">
-      <c14:style val="102"/>
-    </mc:Choice>
-    <mc:Fallback>
-      <c:style val="2"/>
-    </mc:Fallback>
-  </mc:AlternateContent>
-  <c:chart>
-    <c:autoTitleDeleted val="1"/>
-    <c:plotArea>
-      <c:layout/>
-      <c:barChart>
-        <c:barDir val="col"/>
-        <c:grouping val="clustered"/>
-        <c:varyColors val="0"/>
-        <c:ser>
-          <c:idx val="0"/>
-          <c:order val="0"/>
-          <c:tx>
-            <c:strRef>
-              <c:f>Sheet1!$B$1</c:f>
-              <c:strCache>
-                <c:ptCount val="1"/>
-                <c:pt idx="0">
-                  <c:v>High voltage at grid</c:v>
-                </c:pt>
-              </c:strCache>
-            </c:strRef>
-          </c:tx>
-          <c:spPr>
-            <a:solidFill>
-              <a:schemeClr val="accent1"/>
-            </a:solidFill>
-            <a:ln>
-              <a:noFill/>
-            </a:ln>
-            <a:effectLst/>
-          </c:spPr>
-          <c:invertIfNegative val="0"/>
-          <c:cat>
-            <c:strRef>
-              <c:f>Sheet1!$A$2:$A$8</c:f>
-              <c:strCache>
-                <c:ptCount val="7"/>
-                <c:pt idx="0">
-                  <c:v>China</c:v>
-                </c:pt>
-                <c:pt idx="1">
-                  <c:v>United States of America</c:v>
-                </c:pt>
-                <c:pt idx="2">
-                  <c:v>Germany</c:v>
-                </c:pt>
-                <c:pt idx="3">
-                  <c:v>UCTE region</c:v>
-                </c:pt>
-                <c:pt idx="4">
-                  <c:v>Switzerland</c:v>
-                </c:pt>
-                <c:pt idx="5">
-                  <c:v>ASF</c:v>
-                </c:pt>
-                <c:pt idx="6">
-                  <c:v>France</c:v>
-                </c:pt>
-              </c:strCache>
-            </c:strRef>
-          </c:cat>
-          <c:val>
-            <c:numRef>
-              <c:f>Sheet1!$B$2:$B$8</c:f>
-              <c:numCache>
-                <c:formatCode>General</c:formatCode>
-                <c:ptCount val="7"/>
-                <c:pt idx="0">
-                  <c:v>1145.8</c:v>
-                </c:pt>
-                <c:pt idx="1">
-                  <c:v>754.8</c:v>
-                </c:pt>
-                <c:pt idx="2">
-                  <c:v>629.5</c:v>
-                </c:pt>
-                <c:pt idx="3">
-                  <c:v>509.3</c:v>
-                </c:pt>
-                <c:pt idx="4">
-                  <c:v>119.6</c:v>
-                </c:pt>
-                <c:pt idx="6">
-                  <c:v>95.7</c:v>
-                </c:pt>
-              </c:numCache>
-            </c:numRef>
-          </c:val>
-        </c:ser>
-        <c:ser>
-          <c:idx val="1"/>
-          <c:order val="1"/>
-          <c:tx>
-            <c:strRef>
-              <c:f>Sheet1!$C$1</c:f>
-              <c:strCache>
-                <c:ptCount val="1"/>
-                <c:pt idx="0">
-                  <c:v>Low voltage at grid</c:v>
-                </c:pt>
-              </c:strCache>
-            </c:strRef>
-          </c:tx>
-          <c:spPr>
-            <a:solidFill>
-              <a:schemeClr val="accent2"/>
-            </a:solidFill>
-            <a:ln>
-              <a:noFill/>
-            </a:ln>
-            <a:effectLst/>
-          </c:spPr>
-          <c:invertIfNegative val="0"/>
-          <c:dPt>
-            <c:idx val="5"/>
-            <c:invertIfNegative val="0"/>
-            <c:bubble3D val="0"/>
-            <c:spPr>
-              <a:solidFill>
-                <a:srgbClr val="C52A15"/>
-              </a:solidFill>
-              <a:ln>
-                <a:noFill/>
-              </a:ln>
-              <a:effectLst/>
-            </c:spPr>
-          </c:dPt>
-          <c:dPt>
-            <c:idx val="14"/>
-            <c:invertIfNegative val="0"/>
-            <c:bubble3D val="0"/>
-            <c:spPr>
-              <a:solidFill>
-                <a:srgbClr val="C00000"/>
-              </a:solidFill>
-              <a:ln>
-                <a:noFill/>
-              </a:ln>
-              <a:effectLst/>
-            </c:spPr>
-          </c:dPt>
-          <c:cat>
-            <c:strRef>
-              <c:f>Sheet1!$A$2:$A$8</c:f>
-              <c:strCache>
-                <c:ptCount val="7"/>
-                <c:pt idx="0">
-                  <c:v>China</c:v>
-                </c:pt>
-                <c:pt idx="1">
-                  <c:v>United States of America</c:v>
-                </c:pt>
-                <c:pt idx="2">
-                  <c:v>Germany</c:v>
-                </c:pt>
-                <c:pt idx="3">
-                  <c:v>UCTE region</c:v>
-                </c:pt>
-                <c:pt idx="4">
-                  <c:v>Switzerland</c:v>
-                </c:pt>
-                <c:pt idx="5">
-                  <c:v>ASF</c:v>
-                </c:pt>
-                <c:pt idx="6">
-                  <c:v>France</c:v>
-                </c:pt>
-              </c:strCache>
-            </c:strRef>
-          </c:cat>
-          <c:val>
-            <c:numRef>
-              <c:f>Sheet1!$C$2:$C$8</c:f>
-              <c:numCache>
-                <c:formatCode>General</c:formatCode>
-                <c:ptCount val="7"/>
-                <c:pt idx="0">
-                  <c:v>1229.6</c:v>
-                </c:pt>
-                <c:pt idx="1">
-                  <c:v>808.4</c:v>
-                </c:pt>
-                <c:pt idx="2">
-                  <c:v>671.5</c:v>
-                </c:pt>
-                <c:pt idx="3">
-                  <c:v>551.7</c:v>
-                </c:pt>
-                <c:pt idx="4">
-                  <c:v>135.0</c:v>
-                </c:pt>
-                <c:pt idx="5">
-                  <c:v>126.8</c:v>
-                </c:pt>
-                <c:pt idx="6">
-                  <c:v>109.0</c:v>
-                </c:pt>
-              </c:numCache>
-            </c:numRef>
-          </c:val>
-        </c:ser>
-        <c:dLbls>
-          <c:showLegendKey val="0"/>
-          <c:showVal val="0"/>
-          <c:showCatName val="0"/>
-          <c:showSerName val="0"/>
-          <c:showPercent val="0"/>
-          <c:showBubbleSize val="0"/>
-        </c:dLbls>
-        <c:gapWidth val="219"/>
-        <c:overlap val="-27"/>
-        <c:axId val="2123694416"/>
-        <c:axId val="2124262512"/>
-      </c:barChart>
-      <c:catAx>
-        <c:axId val="2123694416"/>
-        <c:scaling>
-          <c:orientation val="minMax"/>
-        </c:scaling>
-        <c:delete val="0"/>
-        <c:axPos val="b"/>
-        <c:numFmt formatCode="General" sourceLinked="1"/>
-        <c:majorTickMark val="none"/>
-        <c:minorTickMark val="none"/>
-        <c:tickLblPos val="nextTo"/>
-        <c:spPr>
-          <a:noFill/>
-          <a:ln w="9525" cap="flat" cmpd="sng" algn="ctr">
-            <a:solidFill>
-              <a:schemeClr val="accent3"/>
-            </a:solidFill>
-            <a:round/>
-          </a:ln>
-          <a:effectLst/>
-        </c:spPr>
-        <c:txPr>
-          <a:bodyPr rot="-60000000" spcFirstLastPara="1" vertOverflow="ellipsis" vert="horz" wrap="square" anchor="ctr" anchorCtr="1"/>
-          <a:lstStyle/>
-          <a:p>
-            <a:pPr>
-              <a:defRPr sz="1400" b="0" i="0" u="none" strike="noStrike" kern="1200" baseline="0">
-                <a:solidFill>
-                  <a:schemeClr val="tx1">
-                    <a:lumMod val="65000"/>
-                    <a:lumOff val="35000"/>
-                  </a:schemeClr>
-                </a:solidFill>
-                <a:latin typeface="+mn-lt"/>
-                <a:ea typeface="+mn-ea"/>
-                <a:cs typeface="+mn-cs"/>
-              </a:defRPr>
-            </a:pPr>
-            <a:endParaRPr lang="en-US"/>
-          </a:p>
-        </c:txPr>
-        <c:crossAx val="2124262512"/>
-        <c:crosses val="autoZero"/>
-        <c:auto val="1"/>
-        <c:lblAlgn val="ctr"/>
-        <c:lblOffset val="100"/>
-        <c:noMultiLvlLbl val="0"/>
-      </c:catAx>
-      <c:valAx>
-        <c:axId val="2124262512"/>
+        <c:axId val="-2142160600"/>
         <c:scaling>
           <c:orientation val="minMax"/>
         </c:scaling>
@@ -3484,6 +2904,7 @@
               </a:p>
             </c:rich>
           </c:tx>
+          <c:layout/>
           <c:overlay val="0"/>
           <c:spPr>
             <a:noFill/>
@@ -3526,7 +2947,7 @@
             <a:endParaRPr lang="en-US"/>
           </a:p>
         </c:txPr>
-        <c:crossAx val="2123694416"/>
+        <c:crossAx val="-2142156856"/>
         <c:crosses val="autoZero"/>
         <c:crossBetween val="between"/>
       </c:valAx>
@@ -3542,6 +2963,477 @@
     </c:plotArea>
     <c:legend>
       <c:legendPos val="b"/>
+      <c:layout/>
+      <c:overlay val="0"/>
+      <c:spPr>
+        <a:noFill/>
+        <a:ln>
+          <a:noFill/>
+        </a:ln>
+        <a:effectLst/>
+      </c:spPr>
+      <c:txPr>
+        <a:bodyPr rot="0" spcFirstLastPara="1" vertOverflow="ellipsis" vert="horz" wrap="square" anchor="ctr" anchorCtr="1"/>
+        <a:lstStyle/>
+        <a:p>
+          <a:pPr>
+            <a:defRPr sz="1197" b="0" i="0" u="none" strike="noStrike" kern="1200" baseline="0">
+              <a:solidFill>
+                <a:schemeClr val="tx1">
+                  <a:lumMod val="65000"/>
+                  <a:lumOff val="35000"/>
+                </a:schemeClr>
+              </a:solidFill>
+              <a:latin typeface="+mn-lt"/>
+              <a:ea typeface="+mn-ea"/>
+              <a:cs typeface="+mn-cs"/>
+            </a:defRPr>
+          </a:pPr>
+          <a:endParaRPr lang="en-US"/>
+        </a:p>
+      </c:txPr>
+    </c:legend>
+    <c:plotVisOnly val="1"/>
+    <c:dispBlanksAs val="gap"/>
+    <c:showDLblsOverMax val="0"/>
+  </c:chart>
+  <c:spPr>
+    <a:noFill/>
+    <a:ln>
+      <a:noFill/>
+    </a:ln>
+    <a:effectLst/>
+  </c:spPr>
+  <c:txPr>
+    <a:bodyPr/>
+    <a:lstStyle/>
+    <a:p>
+      <a:pPr>
+        <a:defRPr/>
+      </a:pPr>
+      <a:endParaRPr lang="en-US"/>
+    </a:p>
+  </c:txPr>
+  <c:externalData r:id="rId1">
+    <c:autoUpdate val="0"/>
+  </c:externalData>
+</c:chartSpace>
+</file>
+
+<file path=ppt/charts/chart15.xml><?xml version="1.0" encoding="utf-8"?>
+<c:chartSpace xmlns:c="http://schemas.openxmlformats.org/drawingml/2006/chart" xmlns:a="http://schemas.openxmlformats.org/drawingml/2006/main" xmlns:r="http://schemas.openxmlformats.org/officeDocument/2006/relationships">
+  <c:date1904 val="0"/>
+  <c:lang val="en-US"/>
+  <c:roundedCorners val="0"/>
+  <mc:AlternateContent xmlns:mc="http://schemas.openxmlformats.org/markup-compatibility/2006">
+    <mc:Choice xmlns:c14="http://schemas.microsoft.com/office/drawing/2007/8/2/chart" Requires="c14">
+      <c14:style val="102"/>
+    </mc:Choice>
+    <mc:Fallback>
+      <c:style val="2"/>
+    </mc:Fallback>
+  </mc:AlternateContent>
+  <c:chart>
+    <c:autoTitleDeleted val="1"/>
+    <c:plotArea>
+      <c:layout/>
+      <c:barChart>
+        <c:barDir val="col"/>
+        <c:grouping val="clustered"/>
+        <c:varyColors val="0"/>
+        <c:ser>
+          <c:idx val="0"/>
+          <c:order val="0"/>
+          <c:tx>
+            <c:strRef>
+              <c:f>Sheet1!$B$1</c:f>
+              <c:strCache>
+                <c:ptCount val="1"/>
+                <c:pt idx="0">
+                  <c:v>High voltage at grid</c:v>
+                </c:pt>
+              </c:strCache>
+            </c:strRef>
+          </c:tx>
+          <c:spPr>
+            <a:solidFill>
+              <a:schemeClr val="accent1"/>
+            </a:solidFill>
+            <a:ln>
+              <a:noFill/>
+            </a:ln>
+            <a:effectLst/>
+          </c:spPr>
+          <c:invertIfNegative val="0"/>
+          <c:cat>
+            <c:strRef>
+              <c:f>Sheet1!$A$2:$A$8</c:f>
+              <c:strCache>
+                <c:ptCount val="7"/>
+                <c:pt idx="0">
+                  <c:v>China</c:v>
+                </c:pt>
+                <c:pt idx="1">
+                  <c:v>United States of America</c:v>
+                </c:pt>
+                <c:pt idx="2">
+                  <c:v>Germany</c:v>
+                </c:pt>
+                <c:pt idx="3">
+                  <c:v>UCTE region</c:v>
+                </c:pt>
+                <c:pt idx="4">
+                  <c:v>Switzerland</c:v>
+                </c:pt>
+                <c:pt idx="5">
+                  <c:v>ASF</c:v>
+                </c:pt>
+                <c:pt idx="6">
+                  <c:v>France</c:v>
+                </c:pt>
+              </c:strCache>
+            </c:strRef>
+          </c:cat>
+          <c:val>
+            <c:numRef>
+              <c:f>Sheet1!$B$2:$B$8</c:f>
+              <c:numCache>
+                <c:formatCode>General</c:formatCode>
+                <c:ptCount val="7"/>
+                <c:pt idx="0">
+                  <c:v>1145.8</c:v>
+                </c:pt>
+                <c:pt idx="1">
+                  <c:v>754.8</c:v>
+                </c:pt>
+                <c:pt idx="2">
+                  <c:v>629.5</c:v>
+                </c:pt>
+                <c:pt idx="3">
+                  <c:v>509.3</c:v>
+                </c:pt>
+                <c:pt idx="4">
+                  <c:v>119.6</c:v>
+                </c:pt>
+                <c:pt idx="6">
+                  <c:v>95.7</c:v>
+                </c:pt>
+              </c:numCache>
+            </c:numRef>
+          </c:val>
+        </c:ser>
+        <c:ser>
+          <c:idx val="1"/>
+          <c:order val="1"/>
+          <c:tx>
+            <c:strRef>
+              <c:f>Sheet1!$C$1</c:f>
+              <c:strCache>
+                <c:ptCount val="1"/>
+                <c:pt idx="0">
+                  <c:v>Low voltage at grid</c:v>
+                </c:pt>
+              </c:strCache>
+            </c:strRef>
+          </c:tx>
+          <c:spPr>
+            <a:solidFill>
+              <a:schemeClr val="accent2"/>
+            </a:solidFill>
+            <a:ln>
+              <a:noFill/>
+            </a:ln>
+            <a:effectLst/>
+          </c:spPr>
+          <c:invertIfNegative val="0"/>
+          <c:dPt>
+            <c:idx val="5"/>
+            <c:invertIfNegative val="0"/>
+            <c:bubble3D val="0"/>
+            <c:spPr>
+              <a:solidFill>
+                <a:srgbClr val="C52A15"/>
+              </a:solidFill>
+              <a:ln>
+                <a:noFill/>
+              </a:ln>
+              <a:effectLst/>
+            </c:spPr>
+          </c:dPt>
+          <c:dPt>
+            <c:idx val="14"/>
+            <c:invertIfNegative val="0"/>
+            <c:bubble3D val="0"/>
+            <c:spPr>
+              <a:solidFill>
+                <a:srgbClr val="C00000"/>
+              </a:solidFill>
+              <a:ln>
+                <a:noFill/>
+              </a:ln>
+              <a:effectLst/>
+            </c:spPr>
+          </c:dPt>
+          <c:cat>
+            <c:strRef>
+              <c:f>Sheet1!$A$2:$A$8</c:f>
+              <c:strCache>
+                <c:ptCount val="7"/>
+                <c:pt idx="0">
+                  <c:v>China</c:v>
+                </c:pt>
+                <c:pt idx="1">
+                  <c:v>United States of America</c:v>
+                </c:pt>
+                <c:pt idx="2">
+                  <c:v>Germany</c:v>
+                </c:pt>
+                <c:pt idx="3">
+                  <c:v>UCTE region</c:v>
+                </c:pt>
+                <c:pt idx="4">
+                  <c:v>Switzerland</c:v>
+                </c:pt>
+                <c:pt idx="5">
+                  <c:v>ASF</c:v>
+                </c:pt>
+                <c:pt idx="6">
+                  <c:v>France</c:v>
+                </c:pt>
+              </c:strCache>
+            </c:strRef>
+          </c:cat>
+          <c:val>
+            <c:numRef>
+              <c:f>Sheet1!$C$2:$C$8</c:f>
+              <c:numCache>
+                <c:formatCode>General</c:formatCode>
+                <c:ptCount val="7"/>
+                <c:pt idx="0">
+                  <c:v>1229.6</c:v>
+                </c:pt>
+                <c:pt idx="1">
+                  <c:v>808.4</c:v>
+                </c:pt>
+                <c:pt idx="2">
+                  <c:v>671.5</c:v>
+                </c:pt>
+                <c:pt idx="3">
+                  <c:v>551.7</c:v>
+                </c:pt>
+                <c:pt idx="4">
+                  <c:v>135.0</c:v>
+                </c:pt>
+                <c:pt idx="5">
+                  <c:v>126.8</c:v>
+                </c:pt>
+                <c:pt idx="6">
+                  <c:v>109.0</c:v>
+                </c:pt>
+              </c:numCache>
+            </c:numRef>
+          </c:val>
+        </c:ser>
+        <c:dLbls>
+          <c:showLegendKey val="0"/>
+          <c:showVal val="0"/>
+          <c:showCatName val="0"/>
+          <c:showSerName val="0"/>
+          <c:showPercent val="0"/>
+          <c:showBubbleSize val="0"/>
+        </c:dLbls>
+        <c:gapWidth val="219"/>
+        <c:overlap val="-27"/>
+        <c:axId val="2061831448"/>
+        <c:axId val="2061835080"/>
+      </c:barChart>
+      <c:catAx>
+        <c:axId val="2061831448"/>
+        <c:scaling>
+          <c:orientation val="minMax"/>
+        </c:scaling>
+        <c:delete val="0"/>
+        <c:axPos val="b"/>
+        <c:numFmt formatCode="General" sourceLinked="1"/>
+        <c:majorTickMark val="none"/>
+        <c:minorTickMark val="none"/>
+        <c:tickLblPos val="nextTo"/>
+        <c:spPr>
+          <a:noFill/>
+          <a:ln w="9525" cap="flat" cmpd="sng" algn="ctr">
+            <a:solidFill>
+              <a:schemeClr val="accent3"/>
+            </a:solidFill>
+            <a:round/>
+          </a:ln>
+          <a:effectLst/>
+        </c:spPr>
+        <c:txPr>
+          <a:bodyPr rot="-60000000" spcFirstLastPara="1" vertOverflow="ellipsis" vert="horz" wrap="square" anchor="ctr" anchorCtr="1"/>
+          <a:lstStyle/>
+          <a:p>
+            <a:pPr>
+              <a:defRPr sz="1400" b="0" i="0" u="none" strike="noStrike" kern="1200" baseline="0">
+                <a:solidFill>
+                  <a:schemeClr val="tx1">
+                    <a:lumMod val="65000"/>
+                    <a:lumOff val="35000"/>
+                  </a:schemeClr>
+                </a:solidFill>
+                <a:latin typeface="+mn-lt"/>
+                <a:ea typeface="+mn-ea"/>
+                <a:cs typeface="+mn-cs"/>
+              </a:defRPr>
+            </a:pPr>
+            <a:endParaRPr lang="en-US"/>
+          </a:p>
+        </c:txPr>
+        <c:crossAx val="2061835080"/>
+        <c:crosses val="autoZero"/>
+        <c:auto val="1"/>
+        <c:lblAlgn val="ctr"/>
+        <c:lblOffset val="100"/>
+        <c:noMultiLvlLbl val="0"/>
+      </c:catAx>
+      <c:valAx>
+        <c:axId val="2061835080"/>
+        <c:scaling>
+          <c:orientation val="minMax"/>
+        </c:scaling>
+        <c:delete val="0"/>
+        <c:axPos val="l"/>
+        <c:majorGridlines>
+          <c:spPr>
+            <a:ln w="9525" cap="flat" cmpd="sng" algn="ctr">
+              <a:solidFill>
+                <a:schemeClr val="tx1">
+                  <a:lumMod val="15000"/>
+                  <a:lumOff val="85000"/>
+                </a:schemeClr>
+              </a:solidFill>
+              <a:round/>
+            </a:ln>
+            <a:effectLst/>
+          </c:spPr>
+        </c:majorGridlines>
+        <c:title>
+          <c:tx>
+            <c:rich>
+              <a:bodyPr rot="-5400000" spcFirstLastPara="1" vertOverflow="ellipsis" vert="horz" wrap="square" anchor="ctr" anchorCtr="1"/>
+              <a:lstStyle/>
+              <a:p>
+                <a:pPr>
+                  <a:defRPr sz="1400" b="0" i="0" u="none" strike="noStrike" kern="1200" baseline="0">
+                    <a:solidFill>
+                      <a:schemeClr val="tx1">
+                        <a:lumMod val="65000"/>
+                        <a:lumOff val="35000"/>
+                      </a:schemeClr>
+                    </a:solidFill>
+                    <a:latin typeface="+mn-lt"/>
+                    <a:ea typeface="+mn-ea"/>
+                    <a:cs typeface="+mn-cs"/>
+                  </a:defRPr>
+                </a:pPr>
+                <a:r>
+                  <a:rPr lang="en-US" sz="1600" dirty="0" smtClean="0"/>
+                  <a:t>Electricity production at grid</a:t>
+                </a:r>
+              </a:p>
+              <a:p>
+                <a:pPr>
+                  <a:defRPr sz="1400" b="0" i="0" u="none" strike="noStrike" kern="1200" baseline="0">
+                    <a:solidFill>
+                      <a:schemeClr val="tx1">
+                        <a:lumMod val="65000"/>
+                        <a:lumOff val="35000"/>
+                      </a:schemeClr>
+                    </a:solidFill>
+                    <a:latin typeface="+mn-lt"/>
+                    <a:ea typeface="+mn-ea"/>
+                    <a:cs typeface="+mn-cs"/>
+                  </a:defRPr>
+                </a:pPr>
+                <a:r>
+                  <a:rPr lang="en-US" sz="1600" noProof="1" smtClean="0"/>
+                  <a:t>(g</a:t>
+                </a:r>
+                <a:r>
+                  <a:rPr lang="en-US" sz="1600" baseline="-25000" noProof="1" smtClean="0"/>
+                  <a:t>CO2eq</a:t>
+                </a:r>
+                <a:r>
+                  <a:rPr lang="en-US" sz="1600" noProof="1" smtClean="0"/>
+                  <a:t>/kWh</a:t>
+                </a:r>
+                <a:r>
+                  <a:rPr lang="de-DE" sz="1600" dirty="0" smtClean="0"/>
+                  <a:t>)</a:t>
+                </a:r>
+                <a:endParaRPr lang="en-US" sz="1600" dirty="0"/>
+              </a:p>
+            </c:rich>
+          </c:tx>
+          <c:layout/>
+          <c:overlay val="0"/>
+          <c:spPr>
+            <a:noFill/>
+            <a:ln>
+              <a:noFill/>
+            </a:ln>
+            <a:effectLst/>
+          </c:spPr>
+        </c:title>
+        <c:numFmt formatCode="General" sourceLinked="1"/>
+        <c:majorTickMark val="none"/>
+        <c:minorTickMark val="none"/>
+        <c:tickLblPos val="nextTo"/>
+        <c:spPr>
+          <a:noFill/>
+          <a:ln>
+            <a:solidFill>
+              <a:schemeClr val="accent3"/>
+            </a:solidFill>
+          </a:ln>
+          <a:effectLst/>
+        </c:spPr>
+        <c:txPr>
+          <a:bodyPr rot="-60000000" spcFirstLastPara="1" vertOverflow="ellipsis" vert="horz" wrap="square" anchor="ctr" anchorCtr="1"/>
+          <a:lstStyle/>
+          <a:p>
+            <a:pPr>
+              <a:defRPr sz="1400" b="0" i="0" u="none" strike="noStrike" kern="1200" baseline="0">
+                <a:solidFill>
+                  <a:schemeClr val="tx1">
+                    <a:lumMod val="65000"/>
+                    <a:lumOff val="35000"/>
+                  </a:schemeClr>
+                </a:solidFill>
+                <a:latin typeface="+mn-lt"/>
+                <a:ea typeface="+mn-ea"/>
+                <a:cs typeface="+mn-cs"/>
+              </a:defRPr>
+            </a:pPr>
+            <a:endParaRPr lang="en-US"/>
+          </a:p>
+        </c:txPr>
+        <c:crossAx val="2061831448"/>
+        <c:crosses val="autoZero"/>
+        <c:crossBetween val="between"/>
+      </c:valAx>
+      <c:spPr>
+        <a:noFill/>
+        <a:ln>
+          <a:solidFill>
+            <a:schemeClr val="accent3"/>
+          </a:solidFill>
+        </a:ln>
+        <a:effectLst/>
+      </c:spPr>
+    </c:plotArea>
+    <c:legend>
+      <c:legendPos val="b"/>
+      <c:layout/>
       <c:overlay val="0"/>
       <c:spPr>
         <a:noFill/>
@@ -3911,7 +3803,7 @@
       <a:endParaRPr lang="en-US"/>
     </a:p>
   </c:txPr>
-  <c:externalData r:id="rId3">
+  <c:externalData r:id="rId1">
     <c:autoUpdate val="0"/>
   </c:externalData>
 </c:chartSpace>
@@ -4053,7 +3945,7 @@
                   <c:v>-6.43</c:v>
                 </c:pt>
                 <c:pt idx="10">
-                  <c:v>-9.739999999999998</c:v>
+                  <c:v>-9.74</c:v>
                 </c:pt>
                 <c:pt idx="11">
                   <c:v>-13.05</c:v>
@@ -4086,12 +3978,13 @@
           <c:showPercent val="0"/>
           <c:showBubbleSize val="0"/>
         </c:dLbls>
+        <c:marker val="1"/>
         <c:smooth val="0"/>
-        <c:axId val="2122772288"/>
-        <c:axId val="2122675584"/>
+        <c:axId val="2061637336"/>
+        <c:axId val="2061633544"/>
       </c:lineChart>
       <c:catAx>
-        <c:axId val="2122772288"/>
+        <c:axId val="2061637336"/>
         <c:scaling>
           <c:orientation val="minMax"/>
         </c:scaling>
@@ -4134,7 +4027,7 @@
             <a:endParaRPr lang="en-US"/>
           </a:p>
         </c:txPr>
-        <c:crossAx val="2122675584"/>
+        <c:crossAx val="2061633544"/>
         <c:crosses val="autoZero"/>
         <c:auto val="1"/>
         <c:lblAlgn val="ctr"/>
@@ -4142,7 +4035,7 @@
         <c:noMultiLvlLbl val="0"/>
       </c:catAx>
       <c:valAx>
-        <c:axId val="2122675584"/>
+        <c:axId val="2061633544"/>
         <c:scaling>
           <c:orientation val="minMax"/>
         </c:scaling>
@@ -4189,6 +4082,7 @@
               </a:p>
             </c:rich>
           </c:tx>
+          <c:layout/>
           <c:overlay val="0"/>
           <c:spPr>
             <a:noFill/>
@@ -4229,7 +4123,7 @@
             <a:endParaRPr lang="en-US"/>
           </a:p>
         </c:txPr>
-        <c:crossAx val="2122772288"/>
+        <c:crossAx val="2061637336"/>
         <c:crosses val="autoZero"/>
         <c:crossBetween val="between"/>
       </c:valAx>
@@ -4245,6 +4139,7 @@
     </c:plotArea>
     <c:legend>
       <c:legendPos val="b"/>
+      <c:layout/>
       <c:overlay val="0"/>
       <c:spPr>
         <a:noFill/>
@@ -4836,11 +4731,11 @@
         </c:dLbls>
         <c:gapWidth val="219"/>
         <c:overlap val="-27"/>
-        <c:axId val="-2141343856"/>
-        <c:axId val="-2141340752"/>
+        <c:axId val="2061541464"/>
+        <c:axId val="2061537592"/>
       </c:barChart>
       <c:catAx>
-        <c:axId val="-2141343856"/>
+        <c:axId val="2061541464"/>
         <c:scaling>
           <c:orientation val="minMax"/>
         </c:scaling>
@@ -4883,7 +4778,7 @@
             <a:endParaRPr lang="en-US"/>
           </a:p>
         </c:txPr>
-        <c:crossAx val="-2141340752"/>
+        <c:crossAx val="2061537592"/>
         <c:crosses val="autoZero"/>
         <c:auto val="1"/>
         <c:lblAlgn val="ctr"/>
@@ -4891,7 +4786,7 @@
         <c:noMultiLvlLbl val="0"/>
       </c:catAx>
       <c:valAx>
-        <c:axId val="-2141340752"/>
+        <c:axId val="2061537592"/>
         <c:scaling>
           <c:orientation val="minMax"/>
         </c:scaling>
@@ -4954,6 +4849,7 @@
               </a:p>
             </c:rich>
           </c:tx>
+          <c:layout/>
           <c:overlay val="0"/>
           <c:spPr>
             <a:noFill/>
@@ -4962,26 +4858,6 @@
             </a:ln>
             <a:effectLst/>
           </c:spPr>
-          <c:txPr>
-            <a:bodyPr rot="-5400000" spcFirstLastPara="1" vertOverflow="ellipsis" vert="horz" wrap="square" anchor="ctr" anchorCtr="1"/>
-            <a:lstStyle/>
-            <a:p>
-              <a:pPr>
-                <a:defRPr sz="1600" b="0" i="0" u="none" strike="noStrike" kern="1200" baseline="0">
-                  <a:solidFill>
-                    <a:schemeClr val="tx1">
-                      <a:lumMod val="65000"/>
-                      <a:lumOff val="35000"/>
-                    </a:schemeClr>
-                  </a:solidFill>
-                  <a:latin typeface="+mn-lt"/>
-                  <a:ea typeface="+mn-ea"/>
-                  <a:cs typeface="+mn-cs"/>
-                </a:defRPr>
-              </a:pPr>
-              <a:endParaRPr lang="en-US"/>
-            </a:p>
-          </c:txPr>
         </c:title>
         <c:numFmt formatCode="General" sourceLinked="1"/>
         <c:majorTickMark val="none"/>
@@ -5014,7 +4890,7 @@
             <a:endParaRPr lang="en-US"/>
           </a:p>
         </c:txPr>
-        <c:crossAx val="-2141343856"/>
+        <c:crossAx val="2061541464"/>
         <c:crosses val="autoZero"/>
         <c:crossBetween val="between"/>
       </c:valAx>
@@ -5030,6 +4906,7 @@
     </c:plotArea>
     <c:legend>
       <c:legendPos val="b"/>
+      <c:layout/>
       <c:overlay val="0"/>
       <c:spPr>
         <a:noFill/>
@@ -5080,10 +4957,10 @@
       <a:endParaRPr lang="en-US"/>
     </a:p>
   </c:txPr>
-  <c:externalData r:id="rId3">
+  <c:externalData r:id="rId1">
     <c:autoUpdate val="0"/>
   </c:externalData>
-  <c:userShapes r:id="rId4"/>
+  <c:userShapes r:id="rId2"/>
 </c:chartSpace>
 </file>
 
@@ -5108,10 +4985,10 @@
           <c:layoutTarget val="inner"/>
           <c:xMode val="edge"/>
           <c:yMode val="edge"/>
-          <c:x val="0.118708113202881"/>
+          <c:x val="0.138858061581748"/>
           <c:y val="0.0264823754257671"/>
-          <c:w val="0.862477691617906"/>
-          <c:h val="0.676334734250319"/>
+          <c:w val="0.842327667361251"/>
+          <c:h val="0.652621483647289"/>
         </c:manualLayout>
       </c:layout>
       <c:barChart>
@@ -5674,11 +5551,11 @@
         </c:dLbls>
         <c:gapWidth val="219"/>
         <c:overlap val="100"/>
-        <c:axId val="-2076081168"/>
-        <c:axId val="2089784320"/>
+        <c:axId val="-2117427304"/>
+        <c:axId val="-2117424184"/>
       </c:barChart>
       <c:catAx>
-        <c:axId val="-2076081168"/>
+        <c:axId val="-2117427304"/>
         <c:scaling>
           <c:orientation val="minMax"/>
         </c:scaling>
@@ -5688,7 +5565,7 @@
         <c:majorTickMark val="none"/>
         <c:minorTickMark val="none"/>
         <c:tickLblPos val="nextTo"/>
-        <c:crossAx val="2089784320"/>
+        <c:crossAx val="-2117424184"/>
         <c:crosses val="autoZero"/>
         <c:auto val="1"/>
         <c:lblAlgn val="ctr"/>
@@ -5696,7 +5573,7 @@
         <c:noMultiLvlLbl val="0"/>
       </c:catAx>
       <c:valAx>
-        <c:axId val="2089784320"/>
+        <c:axId val="-2117424184"/>
         <c:scaling>
           <c:orientation val="minMax"/>
         </c:scaling>
@@ -5723,7 +5600,7 @@
               <a:lstStyle/>
               <a:p>
                 <a:pPr>
-                  <a:defRPr sz="2000" b="0" i="0" u="none" strike="noStrike" kern="1200" baseline="0">
+                  <a:defRPr sz="2800" b="0" i="0" u="none" strike="noStrike" kern="1200" baseline="0">
                     <a:solidFill>
                       <a:schemeClr val="tx1">
                         <a:lumMod val="65000"/>
@@ -5736,42 +5613,42 @@
                   </a:defRPr>
                 </a:pPr>
                 <a:r>
-                  <a:rPr lang="en-US" sz="2000" b="0" i="0" baseline="0" dirty="0" smtClean="0">
+                  <a:rPr lang="en-US" sz="2800" b="0" i="0" baseline="0" dirty="0" smtClean="0">
                     <a:effectLst/>
                   </a:rPr>
                   <a:t>GWP (g CO</a:t>
                 </a:r>
                 <a:r>
-                  <a:rPr lang="en-US" sz="2000" b="0" i="0" baseline="-25000" dirty="0" smtClean="0">
+                  <a:rPr lang="en-US" sz="2800" b="0" i="0" baseline="-25000" dirty="0" smtClean="0">
                     <a:effectLst/>
                   </a:rPr>
                   <a:t>2eq</a:t>
                 </a:r>
                 <a:r>
-                  <a:rPr lang="en-US" sz="2000" b="0" i="0" baseline="0" dirty="0" smtClean="0">
+                  <a:rPr lang="en-US" sz="2800" b="0" i="0" baseline="0" dirty="0" smtClean="0">
                     <a:effectLst/>
                   </a:rPr>
                   <a:t>/</a:t>
                 </a:r>
                 <a:r>
-                  <a:rPr lang="en-US" sz="2000" b="0" i="0" baseline="0" dirty="0" err="1" smtClean="0">
+                  <a:rPr lang="en-US" sz="2800" b="0" i="0" baseline="0" dirty="0" err="1" smtClean="0">
                     <a:effectLst/>
                   </a:rPr>
                   <a:t>kWh</a:t>
                 </a:r>
                 <a:r>
-                  <a:rPr lang="en-US" sz="2000" b="0" i="0" baseline="-25000" dirty="0" err="1" smtClean="0">
+                  <a:rPr lang="en-US" sz="2800" b="0" i="0" baseline="-25000" dirty="0" err="1" smtClean="0">
                     <a:effectLst/>
                   </a:rPr>
                   <a:t>pv</a:t>
                 </a:r>
                 <a:r>
-                  <a:rPr lang="en-US" sz="2000" b="0" i="0" baseline="0" dirty="0" smtClean="0">
+                  <a:rPr lang="en-US" sz="2800" b="0" i="0" baseline="0" dirty="0" smtClean="0">
                     <a:effectLst/>
                   </a:rPr>
                   <a:t>)</a:t>
                 </a:r>
-                <a:endParaRPr lang="en-US" sz="2000" dirty="0">
+                <a:endParaRPr lang="en-US" sz="2800" dirty="0">
                   <a:effectLst/>
                 </a:endParaRPr>
               </a:p>
@@ -5782,7 +5659,7 @@
               <c:xMode val="edge"/>
               <c:yMode val="edge"/>
               <c:x val="0.0"/>
-              <c:y val="0.133348631193411"/>
+              <c:y val="0.137813912025085"/>
             </c:manualLayout>
           </c:layout>
           <c:overlay val="0"/>
@@ -5793,26 +5670,6 @@
             </a:ln>
             <a:effectLst/>
           </c:spPr>
-          <c:txPr>
-            <a:bodyPr rot="-5400000" spcFirstLastPara="1" vertOverflow="ellipsis" vert="horz" wrap="square" anchor="ctr" anchorCtr="1"/>
-            <a:lstStyle/>
-            <a:p>
-              <a:pPr>
-                <a:defRPr sz="2000" b="0" i="0" u="none" strike="noStrike" kern="1200" baseline="0">
-                  <a:solidFill>
-                    <a:schemeClr val="tx1">
-                      <a:lumMod val="65000"/>
-                      <a:lumOff val="35000"/>
-                    </a:schemeClr>
-                  </a:solidFill>
-                  <a:latin typeface="+mn-lt"/>
-                  <a:ea typeface="+mn-ea"/>
-                  <a:cs typeface="+mn-cs"/>
-                </a:defRPr>
-              </a:pPr>
-              <a:endParaRPr lang="en-US"/>
-            </a:p>
-          </c:txPr>
         </c:title>
         <c:numFmt formatCode="0.0" sourceLinked="1"/>
         <c:majorTickMark val="none"/>
@@ -5830,7 +5687,7 @@
           <a:lstStyle/>
           <a:p>
             <a:pPr>
-              <a:defRPr sz="1400" b="0" i="0" u="none" strike="noStrike" kern="1200" baseline="0">
+              <a:defRPr sz="1800" b="0" i="0" u="none" strike="noStrike" kern="1200" baseline="0">
                 <a:solidFill>
                   <a:schemeClr val="tx1">
                     <a:lumMod val="65000"/>
@@ -5845,7 +5702,7 @@
             <a:endParaRPr lang="en-US"/>
           </a:p>
         </c:txPr>
-        <c:crossAx val="-2076081168"/>
+        <c:crossAx val="-2117427304"/>
         <c:crosses val="autoZero"/>
         <c:crossBetween val="between"/>
       </c:valAx>
@@ -5865,9 +5722,9 @@
         <c:manualLayout>
           <c:xMode val="edge"/>
           <c:yMode val="edge"/>
-          <c:x val="0.301308109709015"/>
-          <c:y val="0.936684083261844"/>
-          <c:w val="0.408130440761151"/>
+          <c:x val="0.150854867200474"/>
+          <c:y val="0.941149356666363"/>
+          <c:w val="0.75202356649496"/>
           <c:h val="0.0586117321622506"/>
         </c:manualLayout>
       </c:layout>
@@ -5884,7 +5741,7 @@
         <a:lstStyle/>
         <a:p>
           <a:pPr>
-            <a:defRPr sz="1600" b="0" i="0" u="none" strike="noStrike" kern="1200" baseline="0">
+            <a:defRPr sz="2000" b="0" i="0" u="none" strike="noStrike" kern="1200" baseline="0">
               <a:solidFill>
                 <a:schemeClr val="tx1">
                   <a:lumMod val="65000"/>
@@ -5921,7 +5778,7 @@
       <a:endParaRPr lang="en-US"/>
     </a:p>
   </c:txPr>
-  <c:externalData r:id="rId3">
+  <c:externalData r:id="rId1">
     <c:autoUpdate val="0"/>
   </c:externalData>
 </c:chartSpace>
@@ -6317,11 +6174,11 @@
         </c:dLbls>
         <c:gapWidth val="219"/>
         <c:overlap val="-27"/>
-        <c:axId val="-2103085920"/>
-        <c:axId val="-2103062896"/>
+        <c:axId val="2065838904"/>
+        <c:axId val="2065842600"/>
       </c:barChart>
       <c:catAx>
-        <c:axId val="-2103085920"/>
+        <c:axId val="2065838904"/>
         <c:scaling>
           <c:orientation val="minMax"/>
         </c:scaling>
@@ -6361,7 +6218,7 @@
             <a:endParaRPr lang="en-US"/>
           </a:p>
         </c:txPr>
-        <c:crossAx val="-2103062896"/>
+        <c:crossAx val="2065842600"/>
         <c:crosses val="autoZero"/>
         <c:auto val="1"/>
         <c:lblAlgn val="ctr"/>
@@ -6369,7 +6226,7 @@
         <c:noMultiLvlLbl val="0"/>
       </c:catAx>
       <c:valAx>
-        <c:axId val="-2103062896"/>
+        <c:axId val="2065842600"/>
         <c:scaling>
           <c:orientation val="minMax"/>
         </c:scaling>
@@ -6428,6 +6285,7 @@
               </a:p>
             </c:rich>
           </c:tx>
+          <c:layout/>
           <c:overlay val="0"/>
           <c:spPr>
             <a:noFill/>
@@ -6436,26 +6294,6 @@
             </a:ln>
             <a:effectLst/>
           </c:spPr>
-          <c:txPr>
-            <a:bodyPr rot="-5400000" spcFirstLastPara="1" vertOverflow="ellipsis" vert="horz" wrap="square" anchor="ctr" anchorCtr="1"/>
-            <a:lstStyle/>
-            <a:p>
-              <a:pPr>
-                <a:defRPr sz="1400" b="0" i="0" u="none" strike="noStrike" kern="1200" baseline="0">
-                  <a:solidFill>
-                    <a:schemeClr val="tx1">
-                      <a:lumMod val="65000"/>
-                      <a:lumOff val="35000"/>
-                    </a:schemeClr>
-                  </a:solidFill>
-                  <a:latin typeface="+mn-lt"/>
-                  <a:ea typeface="+mn-ea"/>
-                  <a:cs typeface="+mn-cs"/>
-                </a:defRPr>
-              </a:pPr>
-              <a:endParaRPr lang="en-US"/>
-            </a:p>
-          </c:txPr>
         </c:title>
         <c:numFmt formatCode="General" sourceLinked="1"/>
         <c:majorTickMark val="none"/>
@@ -6490,7 +6328,7 @@
             <a:endParaRPr lang="en-US"/>
           </a:p>
         </c:txPr>
-        <c:crossAx val="-2103085920"/>
+        <c:crossAx val="2065838904"/>
         <c:crosses val="autoZero"/>
         <c:crossBetween val="between"/>
       </c:valAx>
@@ -6506,6 +6344,7 @@
     </c:plotArea>
     <c:legend>
       <c:legendPos val="b"/>
+      <c:layout/>
       <c:overlay val="0"/>
       <c:spPr>
         <a:noFill/>
@@ -6556,7 +6395,7 @@
       <a:endParaRPr lang="en-US"/>
     </a:p>
   </c:txPr>
-  <c:externalData r:id="rId3">
+  <c:externalData r:id="rId1">
     <c:autoUpdate val="0"/>
   </c:externalData>
 </c:chartSpace>
@@ -6872,11 +6711,11 @@
         </c:dLbls>
         <c:gapWidth val="219"/>
         <c:overlap val="100"/>
-        <c:axId val="-2145508928"/>
-        <c:axId val="-2141215824"/>
+        <c:axId val="-2114420312"/>
+        <c:axId val="-2114416664"/>
       </c:barChart>
       <c:catAx>
-        <c:axId val="-2145508928"/>
+        <c:axId val="-2114420312"/>
         <c:scaling>
           <c:orientation val="minMax"/>
         </c:scaling>
@@ -6919,7 +6758,7 @@
             <a:endParaRPr lang="en-US"/>
           </a:p>
         </c:txPr>
-        <c:crossAx val="-2141215824"/>
+        <c:crossAx val="-2114416664"/>
         <c:crosses val="autoZero"/>
         <c:auto val="1"/>
         <c:lblAlgn val="ctr"/>
@@ -6927,7 +6766,7 @@
         <c:noMultiLvlLbl val="0"/>
       </c:catAx>
       <c:valAx>
-        <c:axId val="-2141215824"/>
+        <c:axId val="-2114416664"/>
         <c:scaling>
           <c:orientation val="minMax"/>
         </c:scaling>
@@ -6978,6 +6817,7 @@
               </a:p>
             </c:rich>
           </c:tx>
+          <c:layout/>
           <c:overlay val="0"/>
           <c:spPr>
             <a:noFill/>
@@ -7018,7 +6858,7 @@
             <a:endParaRPr lang="en-US"/>
           </a:p>
         </c:txPr>
-        <c:crossAx val="-2145508928"/>
+        <c:crossAx val="-2114420312"/>
         <c:crosses val="autoZero"/>
         <c:crossBetween val="between"/>
       </c:valAx>
@@ -7034,6 +6874,7 @@
     </c:plotArea>
     <c:legend>
       <c:legendPos val="b"/>
+      <c:layout/>
       <c:overlay val="0"/>
       <c:spPr>
         <a:noFill/>
@@ -7257,11 +7098,11 @@
         </c:dLbls>
         <c:gapWidth val="219"/>
         <c:overlap val="100"/>
-        <c:axId val="-2077288768"/>
-        <c:axId val="-2077311552"/>
+        <c:axId val="-2118845672"/>
+        <c:axId val="-2118842696"/>
       </c:barChart>
       <c:catAx>
-        <c:axId val="-2077288768"/>
+        <c:axId val="-2118845672"/>
         <c:scaling>
           <c:orientation val="minMax"/>
         </c:scaling>
@@ -7271,7 +7112,7 @@
         <c:majorTickMark val="none"/>
         <c:minorTickMark val="none"/>
         <c:tickLblPos val="nextTo"/>
-        <c:crossAx val="-2077311552"/>
+        <c:crossAx val="-2118842696"/>
         <c:crosses val="autoZero"/>
         <c:auto val="1"/>
         <c:lblAlgn val="ctr"/>
@@ -7279,7 +7120,7 @@
         <c:noMultiLvlLbl val="0"/>
       </c:catAx>
       <c:valAx>
-        <c:axId val="-2077311552"/>
+        <c:axId val="-2118842696"/>
         <c:scaling>
           <c:orientation val="minMax"/>
         </c:scaling>
@@ -7306,7 +7147,7 @@
               <a:lstStyle/>
               <a:p>
                 <a:pPr>
-                  <a:defRPr sz="1330" b="0" i="0" u="none" strike="noStrike" kern="1200" baseline="0">
+                  <a:defRPr sz="2800" b="0" i="0" u="none" strike="noStrike" kern="1200" baseline="0">
                     <a:solidFill>
                       <a:schemeClr val="tx1">
                         <a:lumMod val="65000"/>
@@ -7319,47 +7160,48 @@
                   </a:defRPr>
                 </a:pPr>
                 <a:r>
-                  <a:rPr lang="en-US" sz="1800" b="0" i="0" baseline="0" dirty="0" smtClean="0">
+                  <a:rPr lang="en-US" sz="2800" b="0" i="0" baseline="0" dirty="0" smtClean="0">
                     <a:effectLst/>
                   </a:rPr>
                   <a:t>GWP (g CO</a:t>
                 </a:r>
                 <a:r>
-                  <a:rPr lang="en-US" sz="1800" b="0" i="0" baseline="-25000" dirty="0" smtClean="0">
+                  <a:rPr lang="en-US" sz="2800" b="0" i="0" baseline="-25000" dirty="0" smtClean="0">
                     <a:effectLst/>
                   </a:rPr>
                   <a:t>2eq</a:t>
                 </a:r>
                 <a:r>
-                  <a:rPr lang="en-US" sz="1800" b="0" i="0" baseline="0" dirty="0" smtClean="0">
+                  <a:rPr lang="en-US" sz="2800" b="0" i="0" baseline="0" dirty="0" smtClean="0">
                     <a:effectLst/>
                   </a:rPr>
                   <a:t>/</a:t>
                 </a:r>
                 <a:r>
-                  <a:rPr lang="en-US" sz="1800" b="0" i="0" baseline="0" dirty="0" err="1" smtClean="0">
+                  <a:rPr lang="en-US" sz="2800" b="0" i="0" baseline="0" dirty="0" err="1" smtClean="0">
                     <a:effectLst/>
                   </a:rPr>
                   <a:t>kWh</a:t>
                 </a:r>
                 <a:r>
-                  <a:rPr lang="en-US" sz="1800" b="0" i="0" baseline="-25000" dirty="0" err="1" smtClean="0">
+                  <a:rPr lang="en-US" sz="2800" b="0" i="0" baseline="-25000" dirty="0" err="1" smtClean="0">
                     <a:effectLst/>
                   </a:rPr>
                   <a:t>pv</a:t>
                 </a:r>
                 <a:r>
-                  <a:rPr lang="en-US" sz="1800" b="0" i="0" baseline="0" dirty="0" smtClean="0">
+                  <a:rPr lang="en-US" sz="2800" b="0" i="0" baseline="0" dirty="0" smtClean="0">
                     <a:effectLst/>
                   </a:rPr>
                   <a:t>)</a:t>
                 </a:r>
-                <a:endParaRPr lang="en-US" dirty="0">
+                <a:endParaRPr lang="en-US" sz="2800" dirty="0">
                   <a:effectLst/>
                 </a:endParaRPr>
               </a:p>
             </c:rich>
           </c:tx>
+          <c:layout/>
           <c:overlay val="0"/>
           <c:spPr>
             <a:noFill/>
@@ -7368,26 +7210,6 @@
             </a:ln>
             <a:effectLst/>
           </c:spPr>
-          <c:txPr>
-            <a:bodyPr rot="-5400000" spcFirstLastPara="1" vertOverflow="ellipsis" vert="horz" wrap="square" anchor="ctr" anchorCtr="1"/>
-            <a:lstStyle/>
-            <a:p>
-              <a:pPr>
-                <a:defRPr sz="1330" b="0" i="0" u="none" strike="noStrike" kern="1200" baseline="0">
-                  <a:solidFill>
-                    <a:schemeClr val="tx1">
-                      <a:lumMod val="65000"/>
-                      <a:lumOff val="35000"/>
-                    </a:schemeClr>
-                  </a:solidFill>
-                  <a:latin typeface="+mn-lt"/>
-                  <a:ea typeface="+mn-ea"/>
-                  <a:cs typeface="+mn-cs"/>
-                </a:defRPr>
-              </a:pPr>
-              <a:endParaRPr lang="en-US"/>
-            </a:p>
-          </c:txPr>
         </c:title>
         <c:numFmt formatCode="General" sourceLinked="1"/>
         <c:majorTickMark val="none"/>
@@ -7405,7 +7227,7 @@
           <a:lstStyle/>
           <a:p>
             <a:pPr>
-              <a:defRPr sz="1197" b="0" i="0" u="none" strike="noStrike" kern="1200" baseline="0">
+              <a:defRPr sz="1800" b="0" i="0" u="none" strike="noStrike" kern="1200" baseline="0">
                 <a:solidFill>
                   <a:schemeClr val="tx1">
                     <a:lumMod val="65000"/>
@@ -7420,7 +7242,7 @@
             <a:endParaRPr lang="en-US"/>
           </a:p>
         </c:txPr>
-        <c:crossAx val="-2077288768"/>
+        <c:crossAx val="-2118845672"/>
         <c:crosses val="autoZero"/>
         <c:crossBetween val="between"/>
         <c:majorUnit val="100.0"/>
@@ -7456,7 +7278,7 @@
       <a:endParaRPr lang="en-US"/>
     </a:p>
   </c:txPr>
-  <c:externalData r:id="rId3">
+  <c:externalData r:id="rId1">
     <c:autoUpdate val="0"/>
   </c:externalData>
 </c:chartSpace>
@@ -7746,11 +7568,11 @@
         </c:dLbls>
         <c:gapWidth val="219"/>
         <c:overlap val="-27"/>
-        <c:axId val="2124163376"/>
-        <c:axId val="2124166784"/>
+        <c:axId val="2065900856"/>
+        <c:axId val="2065904472"/>
       </c:barChart>
       <c:catAx>
-        <c:axId val="2124163376"/>
+        <c:axId val="2065900856"/>
         <c:scaling>
           <c:orientation val="minMax"/>
         </c:scaling>
@@ -7790,7 +7612,7 @@
             <a:endParaRPr lang="en-US"/>
           </a:p>
         </c:txPr>
-        <c:crossAx val="2124166784"/>
+        <c:crossAx val="2065904472"/>
         <c:crosses val="autoZero"/>
         <c:auto val="1"/>
         <c:lblAlgn val="ctr"/>
@@ -7798,7 +7620,7 @@
         <c:noMultiLvlLbl val="0"/>
       </c:catAx>
       <c:valAx>
-        <c:axId val="2124166784"/>
+        <c:axId val="2065904472"/>
         <c:scaling>
           <c:orientation val="minMax"/>
         </c:scaling>
@@ -7869,6 +7691,7 @@
               </a:p>
             </c:rich>
           </c:tx>
+          <c:layout/>
           <c:overlay val="0"/>
           <c:spPr>
             <a:noFill/>
@@ -7877,26 +7700,6 @@
             </a:ln>
             <a:effectLst/>
           </c:spPr>
-          <c:txPr>
-            <a:bodyPr rot="-5400000" spcFirstLastPara="1" vertOverflow="ellipsis" vert="horz" wrap="square" anchor="ctr" anchorCtr="1"/>
-            <a:lstStyle/>
-            <a:p>
-              <a:pPr>
-                <a:defRPr sz="1400" b="0" i="0" u="none" strike="noStrike" kern="1200" baseline="0">
-                  <a:solidFill>
-                    <a:schemeClr val="tx1">
-                      <a:lumMod val="65000"/>
-                      <a:lumOff val="35000"/>
-                    </a:schemeClr>
-                  </a:solidFill>
-                  <a:latin typeface="+mn-lt"/>
-                  <a:ea typeface="+mn-ea"/>
-                  <a:cs typeface="+mn-cs"/>
-                </a:defRPr>
-              </a:pPr>
-              <a:endParaRPr lang="en-US"/>
-            </a:p>
-          </c:txPr>
         </c:title>
         <c:numFmt formatCode="General" sourceLinked="1"/>
         <c:majorTickMark val="none"/>
@@ -7931,7 +7734,7 @@
             <a:endParaRPr lang="en-US"/>
           </a:p>
         </c:txPr>
-        <c:crossAx val="2124163376"/>
+        <c:crossAx val="2065900856"/>
         <c:crosses val="autoZero"/>
         <c:crossBetween val="between"/>
       </c:valAx>
@@ -7947,6 +7750,7 @@
     </c:plotArea>
     <c:legend>
       <c:legendPos val="b"/>
+      <c:layout/>
       <c:overlay val="0"/>
       <c:spPr>
         <a:noFill/>
@@ -7997,7 +7801,7 @@
       <a:endParaRPr lang="en-US"/>
     </a:p>
   </c:txPr>
-  <c:externalData r:id="rId3">
+  <c:externalData r:id="rId1">
     <c:autoUpdate val="0"/>
   </c:externalData>
 </c:chartSpace>
@@ -8535,11 +8339,11 @@
         </c:dLbls>
         <c:gapWidth val="219"/>
         <c:overlap val="-27"/>
-        <c:axId val="2123133264"/>
-        <c:axId val="2123136608"/>
+        <c:axId val="-2143311608"/>
+        <c:axId val="-2143307944"/>
       </c:barChart>
       <c:catAx>
-        <c:axId val="2123133264"/>
+        <c:axId val="-2143311608"/>
         <c:scaling>
           <c:orientation val="minMax"/>
         </c:scaling>
@@ -8579,7 +8383,7 @@
             <a:endParaRPr lang="en-US"/>
           </a:p>
         </c:txPr>
-        <c:crossAx val="2123136608"/>
+        <c:crossAx val="-2143307944"/>
         <c:crosses val="autoZero"/>
         <c:auto val="1"/>
         <c:lblAlgn val="ctr"/>
@@ -8587,7 +8391,7 @@
         <c:noMultiLvlLbl val="0"/>
       </c:catAx>
       <c:valAx>
-        <c:axId val="2123136608"/>
+        <c:axId val="-2143307944"/>
         <c:scaling>
           <c:orientation val="minMax"/>
         </c:scaling>
@@ -8633,7 +8437,17 @@
               </a:p>
               <a:p>
                 <a:pPr>
-                  <a:defRPr sz="1400"/>
+                  <a:defRPr sz="1400" b="0" i="0" u="none" strike="noStrike" kern="1200" baseline="0">
+                    <a:solidFill>
+                      <a:schemeClr val="tx1">
+                        <a:lumMod val="65000"/>
+                        <a:lumOff val="35000"/>
+                      </a:schemeClr>
+                    </a:solidFill>
+                    <a:latin typeface="+mn-lt"/>
+                    <a:ea typeface="+mn-ea"/>
+                    <a:cs typeface="+mn-cs"/>
+                  </a:defRPr>
                 </a:pPr>
                 <a:r>
                   <a:rPr lang="en-US" sz="1600" dirty="0" smtClean="0"/>
@@ -8663,6 +8477,7 @@
               </a:p>
             </c:rich>
           </c:tx>
+          <c:layout/>
           <c:overlay val="0"/>
           <c:spPr>
             <a:noFill/>
@@ -8671,26 +8486,6 @@
             </a:ln>
             <a:effectLst/>
           </c:spPr>
-          <c:txPr>
-            <a:bodyPr rot="-5400000" spcFirstLastPara="1" vertOverflow="ellipsis" vert="horz" wrap="square" anchor="ctr" anchorCtr="1"/>
-            <a:lstStyle/>
-            <a:p>
-              <a:pPr>
-                <a:defRPr sz="1400" b="0" i="0" u="none" strike="noStrike" kern="1200" baseline="0">
-                  <a:solidFill>
-                    <a:schemeClr val="tx1">
-                      <a:lumMod val="65000"/>
-                      <a:lumOff val="35000"/>
-                    </a:schemeClr>
-                  </a:solidFill>
-                  <a:latin typeface="+mn-lt"/>
-                  <a:ea typeface="+mn-ea"/>
-                  <a:cs typeface="+mn-cs"/>
-                </a:defRPr>
-              </a:pPr>
-              <a:endParaRPr lang="en-US"/>
-            </a:p>
-          </c:txPr>
         </c:title>
         <c:numFmt formatCode="General" sourceLinked="1"/>
         <c:majorTickMark val="none"/>
@@ -8725,7 +8520,7 @@
             <a:endParaRPr lang="en-US"/>
           </a:p>
         </c:txPr>
-        <c:crossAx val="2123133264"/>
+        <c:crossAx val="-2143311608"/>
         <c:crosses val="autoZero"/>
         <c:crossBetween val="between"/>
       </c:valAx>
@@ -8741,6 +8536,7 @@
     </c:plotArea>
     <c:legend>
       <c:legendPos val="b"/>
+      <c:layout/>
       <c:overlay val="0"/>
       <c:spPr>
         <a:noFill/>
@@ -8791,7 +8587,7 @@
       <a:endParaRPr lang="en-US"/>
     </a:p>
   </c:txPr>
-  <c:externalData r:id="rId3">
+  <c:externalData r:id="rId1">
     <c:autoUpdate val="0"/>
   </c:externalData>
 </c:chartSpace>
@@ -9116,11 +8912,11 @@
         </c:dLbls>
         <c:gapWidth val="219"/>
         <c:overlap val="-27"/>
-        <c:axId val="2123249376"/>
-        <c:axId val="2123248416"/>
+        <c:axId val="-2144008488"/>
+        <c:axId val="-2144012200"/>
       </c:barChart>
       <c:catAx>
-        <c:axId val="2123249376"/>
+        <c:axId val="-2144008488"/>
         <c:scaling>
           <c:orientation val="minMax"/>
         </c:scaling>
@@ -9160,7 +8956,7 @@
             <a:endParaRPr lang="en-US"/>
           </a:p>
         </c:txPr>
-        <c:crossAx val="2123248416"/>
+        <c:crossAx val="-2144012200"/>
         <c:crosses val="autoZero"/>
         <c:auto val="1"/>
         <c:lblAlgn val="ctr"/>
@@ -9168,7 +8964,7 @@
         <c:noMultiLvlLbl val="0"/>
       </c:catAx>
       <c:valAx>
-        <c:axId val="2123248416"/>
+        <c:axId val="-2144012200"/>
         <c:scaling>
           <c:orientation val="minMax"/>
         </c:scaling>
@@ -9214,7 +9010,17 @@
               </a:p>
               <a:p>
                 <a:pPr>
-                  <a:defRPr sz="1400"/>
+                  <a:defRPr sz="1400" b="0" i="0" u="none" strike="noStrike" kern="1200" baseline="0">
+                    <a:solidFill>
+                      <a:schemeClr val="tx1">
+                        <a:lumMod val="65000"/>
+                        <a:lumOff val="35000"/>
+                      </a:schemeClr>
+                    </a:solidFill>
+                    <a:latin typeface="+mn-lt"/>
+                    <a:ea typeface="+mn-ea"/>
+                    <a:cs typeface="+mn-cs"/>
+                  </a:defRPr>
                 </a:pPr>
                 <a:r>
                   <a:rPr lang="en-US" sz="1600" noProof="1" smtClean="0"/>
@@ -9236,6 +9042,7 @@
               </a:p>
             </c:rich>
           </c:tx>
+          <c:layout/>
           <c:overlay val="0"/>
           <c:spPr>
             <a:noFill/>
@@ -9244,26 +9051,6 @@
             </a:ln>
             <a:effectLst/>
           </c:spPr>
-          <c:txPr>
-            <a:bodyPr rot="-5400000" spcFirstLastPara="1" vertOverflow="ellipsis" vert="horz" wrap="square" anchor="ctr" anchorCtr="1"/>
-            <a:lstStyle/>
-            <a:p>
-              <a:pPr>
-                <a:defRPr sz="1400" b="0" i="0" u="none" strike="noStrike" kern="1200" baseline="0">
-                  <a:solidFill>
-                    <a:schemeClr val="tx1">
-                      <a:lumMod val="65000"/>
-                      <a:lumOff val="35000"/>
-                    </a:schemeClr>
-                  </a:solidFill>
-                  <a:latin typeface="+mn-lt"/>
-                  <a:ea typeface="+mn-ea"/>
-                  <a:cs typeface="+mn-cs"/>
-                </a:defRPr>
-              </a:pPr>
-              <a:endParaRPr lang="en-US"/>
-            </a:p>
-          </c:txPr>
         </c:title>
         <c:numFmt formatCode="General" sourceLinked="1"/>
         <c:majorTickMark val="none"/>
@@ -9298,7 +9085,7 @@
             <a:endParaRPr lang="en-US"/>
           </a:p>
         </c:txPr>
-        <c:crossAx val="2123249376"/>
+        <c:crossAx val="-2144008488"/>
         <c:crosses val="autoZero"/>
         <c:crossBetween val="between"/>
       </c:valAx>
@@ -9314,6 +9101,7 @@
     </c:plotArea>
     <c:legend>
       <c:legendPos val="b"/>
+      <c:layout/>
       <c:overlay val="0"/>
       <c:spPr>
         <a:noFill/>
@@ -9364,7 +9152,7 @@
       <a:endParaRPr lang="en-US"/>
     </a:p>
   </c:txPr>
-  <c:externalData r:id="rId3">
+  <c:externalData r:id="rId1">
     <c:autoUpdate val="0"/>
   </c:externalData>
 </c:chartSpace>
@@ -9467,11 +9255,11 @@
         </c:dLbls>
         <c:gapWidth val="219"/>
         <c:overlap val="-27"/>
-        <c:axId val="2123965408"/>
-        <c:axId val="2123968768"/>
+        <c:axId val="2113001448"/>
+        <c:axId val="-2141329624"/>
       </c:barChart>
       <c:catAx>
-        <c:axId val="2123965408"/>
+        <c:axId val="2113001448"/>
         <c:scaling>
           <c:orientation val="minMax"/>
         </c:scaling>
@@ -9511,7 +9299,7 @@
             <a:endParaRPr lang="en-US"/>
           </a:p>
         </c:txPr>
-        <c:crossAx val="2123968768"/>
+        <c:crossAx val="-2141329624"/>
         <c:crosses val="autoZero"/>
         <c:auto val="1"/>
         <c:lblAlgn val="ctr"/>
@@ -9519,7 +9307,7 @@
         <c:noMultiLvlLbl val="0"/>
       </c:catAx>
       <c:valAx>
-        <c:axId val="2123968768"/>
+        <c:axId val="-2141329624"/>
         <c:scaling>
           <c:orientation val="minMax"/>
         </c:scaling>
@@ -9565,7 +9353,17 @@
               </a:p>
               <a:p>
                 <a:pPr>
-                  <a:defRPr sz="1400"/>
+                  <a:defRPr sz="1400" b="0" i="0" u="none" strike="noStrike" kern="1200" baseline="0">
+                    <a:solidFill>
+                      <a:schemeClr val="tx1">
+                        <a:lumMod val="65000"/>
+                        <a:lumOff val="35000"/>
+                      </a:schemeClr>
+                    </a:solidFill>
+                    <a:latin typeface="+mn-lt"/>
+                    <a:ea typeface="+mn-ea"/>
+                    <a:cs typeface="+mn-cs"/>
+                  </a:defRPr>
                 </a:pPr>
                 <a:r>
                   <a:rPr lang="en-US" sz="1600" noProof="1" smtClean="0"/>
@@ -9587,6 +9385,7 @@
               </a:p>
             </c:rich>
           </c:tx>
+          <c:layout/>
           <c:overlay val="0"/>
           <c:spPr>
             <a:noFill/>
@@ -9595,26 +9394,6 @@
             </a:ln>
             <a:effectLst/>
           </c:spPr>
-          <c:txPr>
-            <a:bodyPr rot="-5400000" spcFirstLastPara="1" vertOverflow="ellipsis" vert="horz" wrap="square" anchor="ctr" anchorCtr="1"/>
-            <a:lstStyle/>
-            <a:p>
-              <a:pPr>
-                <a:defRPr sz="1400" b="0" i="0" u="none" strike="noStrike" kern="1200" baseline="0">
-                  <a:solidFill>
-                    <a:schemeClr val="tx1">
-                      <a:lumMod val="65000"/>
-                      <a:lumOff val="35000"/>
-                    </a:schemeClr>
-                  </a:solidFill>
-                  <a:latin typeface="+mn-lt"/>
-                  <a:ea typeface="+mn-ea"/>
-                  <a:cs typeface="+mn-cs"/>
-                </a:defRPr>
-              </a:pPr>
-              <a:endParaRPr lang="en-US"/>
-            </a:p>
-          </c:txPr>
         </c:title>
         <c:numFmt formatCode="General" sourceLinked="1"/>
         <c:majorTickMark val="none"/>
@@ -9649,7 +9428,7 @@
             <a:endParaRPr lang="en-US"/>
           </a:p>
         </c:txPr>
-        <c:crossAx val="2123965408"/>
+        <c:crossAx val="2113001448"/>
         <c:crosses val="autoZero"/>
         <c:crossBetween val="between"/>
       </c:valAx>
@@ -9684,7 +9463,7 @@
       <a:endParaRPr lang="en-US"/>
     </a:p>
   </c:txPr>
-  <c:externalData r:id="rId3">
+  <c:externalData r:id="rId1">
     <c:autoUpdate val="0"/>
   </c:externalData>
 </c:chartSpace>
@@ -9959,11 +9738,11 @@
         </c:dLbls>
         <c:gapWidth val="219"/>
         <c:overlap val="100"/>
-        <c:axId val="2124024880"/>
-        <c:axId val="2123947152"/>
+        <c:axId val="-2141878168"/>
+        <c:axId val="-2141874680"/>
       </c:barChart>
       <c:catAx>
-        <c:axId val="2124024880"/>
+        <c:axId val="-2141878168"/>
         <c:scaling>
           <c:orientation val="minMax"/>
         </c:scaling>
@@ -10006,7 +9785,7 @@
             <a:endParaRPr lang="en-US"/>
           </a:p>
         </c:txPr>
-        <c:crossAx val="2123947152"/>
+        <c:crossAx val="-2141874680"/>
         <c:crosses val="autoZero"/>
         <c:auto val="1"/>
         <c:lblAlgn val="ctr"/>
@@ -10014,7 +9793,7 @@
         <c:noMultiLvlLbl val="0"/>
       </c:catAx>
       <c:valAx>
-        <c:axId val="2123947152"/>
+        <c:axId val="-2141874680"/>
         <c:scaling>
           <c:orientation val="minMax"/>
         </c:scaling>
@@ -10065,6 +9844,7 @@
               </a:p>
             </c:rich>
           </c:tx>
+          <c:layout/>
           <c:overlay val="0"/>
           <c:spPr>
             <a:noFill/>
@@ -10073,26 +9853,6 @@
             </a:ln>
             <a:effectLst/>
           </c:spPr>
-          <c:txPr>
-            <a:bodyPr rot="-5400000" spcFirstLastPara="1" vertOverflow="ellipsis" vert="horz" wrap="square" anchor="ctr" anchorCtr="1"/>
-            <a:lstStyle/>
-            <a:p>
-              <a:pPr>
-                <a:defRPr sz="1330" b="0" i="0" u="none" strike="noStrike" kern="1200" baseline="0">
-                  <a:solidFill>
-                    <a:schemeClr val="tx1">
-                      <a:lumMod val="65000"/>
-                      <a:lumOff val="35000"/>
-                    </a:schemeClr>
-                  </a:solidFill>
-                  <a:latin typeface="+mn-lt"/>
-                  <a:ea typeface="+mn-ea"/>
-                  <a:cs typeface="+mn-cs"/>
-                </a:defRPr>
-              </a:pPr>
-              <a:endParaRPr lang="en-US"/>
-            </a:p>
-          </c:txPr>
         </c:title>
         <c:numFmt formatCode="0" sourceLinked="1"/>
         <c:majorTickMark val="none"/>
@@ -10125,7 +9885,7 @@
             <a:endParaRPr lang="en-US"/>
           </a:p>
         </c:txPr>
-        <c:crossAx val="2124024880"/>
+        <c:crossAx val="-2141878168"/>
         <c:crosses val="autoZero"/>
         <c:crossBetween val="between"/>
       </c:valAx>
@@ -10201,7 +9961,7 @@
       <a:endParaRPr lang="en-US"/>
     </a:p>
   </c:txPr>
-  <c:externalData r:id="rId3">
+  <c:externalData r:id="rId1">
     <c:autoUpdate val="0"/>
   </c:externalData>
 </c:chartSpace>
@@ -10264,26 +10024,6 @@
         </a:ln>
         <a:effectLst/>
       </c:spPr>
-      <c:txPr>
-        <a:bodyPr rot="0" spcFirstLastPara="1" vertOverflow="ellipsis" vert="horz" wrap="square" anchor="ctr" anchorCtr="1"/>
-        <a:lstStyle/>
-        <a:p>
-          <a:pPr>
-            <a:defRPr sz="1862" b="0" i="0" u="none" strike="noStrike" kern="1200" spc="0" baseline="0">
-              <a:solidFill>
-                <a:schemeClr val="tx1">
-                  <a:lumMod val="65000"/>
-                  <a:lumOff val="35000"/>
-                </a:schemeClr>
-              </a:solidFill>
-              <a:latin typeface="+mn-lt"/>
-              <a:ea typeface="+mn-ea"/>
-              <a:cs typeface="+mn-cs"/>
-            </a:defRPr>
-          </a:pPr>
-          <a:endParaRPr lang="en-US"/>
-        </a:p>
-      </c:txPr>
     </c:title>
     <c:autoTitleDeleted val="0"/>
     <c:plotArea>
@@ -10542,7 +10282,7 @@
       <a:endParaRPr lang="en-US"/>
     </a:p>
   </c:txPr>
-  <c:externalData r:id="rId3">
+  <c:externalData r:id="rId1">
     <c:autoUpdate val="0"/>
   </c:externalData>
 </c:chartSpace>
@@ -10613,26 +10353,6 @@
         </a:ln>
         <a:effectLst/>
       </c:spPr>
-      <c:txPr>
-        <a:bodyPr rot="0" spcFirstLastPara="1" vertOverflow="ellipsis" vert="horz" wrap="square" anchor="ctr" anchorCtr="1"/>
-        <a:lstStyle/>
-        <a:p>
-          <a:pPr>
-            <a:defRPr sz="1862" b="0" i="0" u="none" strike="noStrike" kern="1200" spc="0" baseline="0">
-              <a:solidFill>
-                <a:schemeClr val="tx1">
-                  <a:lumMod val="65000"/>
-                  <a:lumOff val="35000"/>
-                </a:schemeClr>
-              </a:solidFill>
-              <a:latin typeface="+mn-lt"/>
-              <a:ea typeface="+mn-ea"/>
-              <a:cs typeface="+mn-cs"/>
-            </a:defRPr>
-          </a:pPr>
-          <a:endParaRPr lang="en-US"/>
-        </a:p>
-      </c:txPr>
     </c:title>
     <c:autoTitleDeleted val="0"/>
     <c:plotArea>
@@ -10828,7 +10548,7 @@
       <a:endParaRPr lang="en-US"/>
     </a:p>
   </c:txPr>
-  <c:externalData r:id="rId3">
+  <c:externalData r:id="rId1">
     <c:autoUpdate val="0"/>
   </c:externalData>
 </c:chartSpace>
@@ -20838,7 +20558,7 @@
           <a:p>
             <a:fld id="{8AF2A637-750D-AC4F-B19A-F61B319C6A55}" type="datetimeFigureOut">
               <a:rPr lang="en-US" smtClean="0"/>
-              <a:t>11/19/15</a:t>
+              <a:t>20/11/15</a:t>
             </a:fld>
             <a:endParaRPr lang="en-US"/>
           </a:p>
@@ -23124,7 +22844,7 @@
           <a:p>
             <a:fld id="{F87648D4-822A-184D-A945-2BBD99FACB30}" type="datetimeFigureOut">
               <a:rPr lang="en-US" smtClean="0"/>
-              <a:t>11/19/15</a:t>
+              <a:t>20/11/15</a:t>
             </a:fld>
             <a:endParaRPr lang="en-US"/>
           </a:p>
@@ -23294,7 +23014,7 @@
           <a:p>
             <a:fld id="{F87648D4-822A-184D-A945-2BBD99FACB30}" type="datetimeFigureOut">
               <a:rPr lang="en-US" smtClean="0"/>
-              <a:t>11/19/15</a:t>
+              <a:t>20/11/15</a:t>
             </a:fld>
             <a:endParaRPr lang="en-US"/>
           </a:p>
@@ -23474,7 +23194,7 @@
           <a:p>
             <a:fld id="{F87648D4-822A-184D-A945-2BBD99FACB30}" type="datetimeFigureOut">
               <a:rPr lang="en-US" smtClean="0"/>
-              <a:t>11/19/15</a:t>
+              <a:t>20/11/15</a:t>
             </a:fld>
             <a:endParaRPr lang="en-US"/>
           </a:p>
@@ -23644,7 +23364,7 @@
           <a:p>
             <a:fld id="{F87648D4-822A-184D-A945-2BBD99FACB30}" type="datetimeFigureOut">
               <a:rPr lang="en-US" smtClean="0"/>
-              <a:t>11/19/15</a:t>
+              <a:t>20/11/15</a:t>
             </a:fld>
             <a:endParaRPr lang="en-US"/>
           </a:p>
@@ -23888,7 +23608,7 @@
           <a:p>
             <a:fld id="{F87648D4-822A-184D-A945-2BBD99FACB30}" type="datetimeFigureOut">
               <a:rPr lang="en-US" smtClean="0"/>
-              <a:t>11/19/15</a:t>
+              <a:t>20/11/15</a:t>
             </a:fld>
             <a:endParaRPr lang="en-US"/>
           </a:p>
@@ -24120,7 +23840,7 @@
           <a:p>
             <a:fld id="{F87648D4-822A-184D-A945-2BBD99FACB30}" type="datetimeFigureOut">
               <a:rPr lang="en-US" smtClean="0"/>
-              <a:t>11/19/15</a:t>
+              <a:t>20/11/15</a:t>
             </a:fld>
             <a:endParaRPr lang="en-US"/>
           </a:p>
@@ -24487,7 +24207,7 @@
           <a:p>
             <a:fld id="{F87648D4-822A-184D-A945-2BBD99FACB30}" type="datetimeFigureOut">
               <a:rPr lang="en-US" smtClean="0"/>
-              <a:t>11/19/15</a:t>
+              <a:t>20/11/15</a:t>
             </a:fld>
             <a:endParaRPr lang="en-US"/>
           </a:p>
@@ -24605,7 +24325,7 @@
           <a:p>
             <a:fld id="{F87648D4-822A-184D-A945-2BBD99FACB30}" type="datetimeFigureOut">
               <a:rPr lang="en-US" smtClean="0"/>
-              <a:t>11/19/15</a:t>
+              <a:t>20/11/15</a:t>
             </a:fld>
             <a:endParaRPr lang="en-US"/>
           </a:p>
@@ -24700,7 +24420,7 @@
           <a:p>
             <a:fld id="{F87648D4-822A-184D-A945-2BBD99FACB30}" type="datetimeFigureOut">
               <a:rPr lang="en-US" smtClean="0"/>
-              <a:t>11/19/15</a:t>
+              <a:t>20/11/15</a:t>
             </a:fld>
             <a:endParaRPr lang="en-US"/>
           </a:p>
@@ -24977,7 +24697,7 @@
           <a:p>
             <a:fld id="{F87648D4-822A-184D-A945-2BBD99FACB30}" type="datetimeFigureOut">
               <a:rPr lang="en-US" smtClean="0"/>
-              <a:t>11/19/15</a:t>
+              <a:t>20/11/15</a:t>
             </a:fld>
             <a:endParaRPr lang="en-US"/>
           </a:p>
@@ -25234,7 +24954,7 @@
           <a:p>
             <a:fld id="{F87648D4-822A-184D-A945-2BBD99FACB30}" type="datetimeFigureOut">
               <a:rPr lang="en-US" smtClean="0"/>
-              <a:t>11/19/15</a:t>
+              <a:t>20/11/15</a:t>
             </a:fld>
             <a:endParaRPr lang="en-US"/>
           </a:p>
@@ -25447,7 +25167,7 @@
           <a:p>
             <a:fld id="{F87648D4-822A-184D-A945-2BBD99FACB30}" type="datetimeFigureOut">
               <a:rPr lang="en-US" smtClean="0"/>
-              <a:t>11/19/15</a:t>
+              <a:t>20/11/15</a:t>
             </a:fld>
             <a:endParaRPr lang="en-US"/>
           </a:p>
@@ -25887,7 +25607,7 @@
   <p:timing>
     <p:tnLst>
       <p:par>
-        <p:cTn id="1" dur="indefinite" restart="never" nodeType="tmRoot"/>
+        <p:cTn xmlns:p14="http://schemas.microsoft.com/office/powerpoint/2010/main" id="1" dur="indefinite" restart="never" nodeType="tmRoot"/>
       </p:par>
     </p:tnLst>
   </p:timing>
@@ -25946,7 +25666,7 @@
   <p:timing>
     <p:tnLst>
       <p:par>
-        <p:cTn id="1" dur="indefinite" restart="never" nodeType="tmRoot"/>
+        <p:cTn xmlns:p14="http://schemas.microsoft.com/office/powerpoint/2010/main" id="1" dur="indefinite" restart="never" nodeType="tmRoot"/>
       </p:par>
     </p:tnLst>
   </p:timing>
@@ -26707,7 +26427,7 @@
   <p:timing>
     <p:tnLst>
       <p:par>
-        <p:cTn id="1" dur="indefinite" restart="never" nodeType="tmRoot"/>
+        <p:cTn xmlns:p14="http://schemas.microsoft.com/office/powerpoint/2010/main" id="1" dur="indefinite" restart="never" nodeType="tmRoot"/>
       </p:par>
     </p:tnLst>
   </p:timing>
@@ -26802,7 +26522,7 @@
   <p:timing>
     <p:tnLst>
       <p:par>
-        <p:cTn id="1" dur="indefinite" restart="never" nodeType="tmRoot"/>
+        <p:cTn xmlns:p14="http://schemas.microsoft.com/office/powerpoint/2010/main" id="1" dur="indefinite" restart="never" nodeType="tmRoot"/>
       </p:par>
     </p:tnLst>
   </p:timing>
@@ -26897,7 +26617,7 @@
   <p:timing>
     <p:tnLst>
       <p:par>
-        <p:cTn id="1" dur="indefinite" restart="never" nodeType="tmRoot"/>
+        <p:cTn xmlns:p14="http://schemas.microsoft.com/office/powerpoint/2010/main" id="1" dur="indefinite" restart="never" nodeType="tmRoot"/>
       </p:par>
     </p:tnLst>
   </p:timing>
@@ -26956,7 +26676,7 @@
   <p:timing>
     <p:tnLst>
       <p:par>
-        <p:cTn id="1" dur="indefinite" restart="never" nodeType="tmRoot"/>
+        <p:cTn xmlns:p14="http://schemas.microsoft.com/office/powerpoint/2010/main" id="1" dur="indefinite" restart="never" nodeType="tmRoot"/>
       </p:par>
     </p:tnLst>
   </p:timing>
@@ -27015,7 +26735,7 @@
   <p:timing>
     <p:tnLst>
       <p:par>
-        <p:cTn id="1" dur="indefinite" restart="never" nodeType="tmRoot"/>
+        <p:cTn xmlns:p14="http://schemas.microsoft.com/office/powerpoint/2010/main" id="1" dur="indefinite" restart="never" nodeType="tmRoot"/>
       </p:par>
     </p:tnLst>
   </p:timing>
@@ -27109,7 +26829,7 @@
   <p:timing>
     <p:tnLst>
       <p:par>
-        <p:cTn id="1" dur="indefinite" restart="never" nodeType="tmRoot"/>
+        <p:cTn xmlns:p14="http://schemas.microsoft.com/office/powerpoint/2010/main" id="1" dur="indefinite" restart="never" nodeType="tmRoot"/>
       </p:par>
     </p:tnLst>
   </p:timing>
@@ -27140,14 +26860,14 @@
           <p:nvPr>
             <p:extLst>
               <p:ext uri="{D42A27DB-BD31-4B8C-83A1-F6EECF244321}">
-                <p14:modId xmlns:p14="http://schemas.microsoft.com/office/powerpoint/2010/main" val="701771237"/>
+                <p14:modId xmlns:p14="http://schemas.microsoft.com/office/powerpoint/2010/main" val="1252837245"/>
               </p:ext>
             </p:extLst>
           </p:nvPr>
         </p:nvGraphicFramePr>
         <p:xfrm>
           <a:off x="222637" y="340242"/>
-          <a:ext cx="9454100" cy="5688417"/>
+          <a:ext cx="9454100" cy="5891225"/>
         </p:xfrm>
         <a:graphic>
           <a:graphicData uri="http://schemas.openxmlformats.org/drawingml/2006/chart">
@@ -27189,7 +26909,7 @@
         </p:nvSpPr>
         <p:spPr>
           <a:xfrm>
-            <a:off x="1294566" y="4341886"/>
+            <a:off x="1514695" y="4341886"/>
             <a:ext cx="1152000" cy="338554"/>
           </a:xfrm>
           <a:prstGeom prst="rect">
@@ -27225,7 +26945,7 @@
         </p:nvSpPr>
         <p:spPr>
           <a:xfrm>
-            <a:off x="2307484" y="4341886"/>
+            <a:off x="2497302" y="4341886"/>
             <a:ext cx="1152000" cy="338554"/>
           </a:xfrm>
           <a:prstGeom prst="rect">
@@ -27261,7 +26981,7 @@
         </p:nvSpPr>
         <p:spPr>
           <a:xfrm>
-            <a:off x="3320402" y="4341886"/>
+            <a:off x="3479909" y="4341886"/>
             <a:ext cx="1152000" cy="1077218"/>
           </a:xfrm>
           <a:prstGeom prst="rect">
@@ -27297,7 +27017,7 @@
         </p:nvSpPr>
         <p:spPr>
           <a:xfrm>
-            <a:off x="4333320" y="4341886"/>
+            <a:off x="4462516" y="4341886"/>
             <a:ext cx="1152000" cy="1077218"/>
           </a:xfrm>
           <a:prstGeom prst="rect">
@@ -27333,7 +27053,7 @@
         </p:nvSpPr>
         <p:spPr>
           <a:xfrm>
-            <a:off x="5346238" y="4341886"/>
+            <a:off x="5445123" y="4341886"/>
             <a:ext cx="1152000" cy="830997"/>
           </a:xfrm>
           <a:prstGeom prst="rect">
@@ -27389,7 +27109,7 @@
         </p:nvSpPr>
         <p:spPr>
           <a:xfrm>
-            <a:off x="6359156" y="4341886"/>
+            <a:off x="6427730" y="4341886"/>
             <a:ext cx="1152000" cy="338554"/>
           </a:xfrm>
           <a:prstGeom prst="rect">
@@ -27452,7 +27172,7 @@
         </p:nvSpPr>
         <p:spPr>
           <a:xfrm>
-            <a:off x="7372074" y="4341886"/>
+            <a:off x="7410337" y="4341886"/>
             <a:ext cx="1152000" cy="338554"/>
           </a:xfrm>
           <a:prstGeom prst="rect">
@@ -27531,8 +27251,8 @@
         </p:nvCxnSpPr>
         <p:spPr>
           <a:xfrm>
-            <a:off x="1334707" y="2406553"/>
-            <a:ext cx="8172000" cy="0"/>
+            <a:off x="1514695" y="2406553"/>
+            <a:ext cx="7992012" cy="0"/>
           </a:xfrm>
           <a:prstGeom prst="line">
             <a:avLst/>
@@ -27573,7 +27293,7 @@
   <p:timing>
     <p:tnLst>
       <p:par>
-        <p:cTn id="1" dur="indefinite" restart="never" nodeType="tmRoot"/>
+        <p:cTn xmlns:p14="http://schemas.microsoft.com/office/powerpoint/2010/main" id="1" dur="indefinite" restart="never" nodeType="tmRoot"/>
       </p:par>
     </p:tnLst>
   </p:timing>
@@ -27632,7 +27352,7 @@
   <p:timing>
     <p:tnLst>
       <p:par>
-        <p:cTn id="1" dur="indefinite" restart="never" nodeType="tmRoot"/>
+        <p:cTn xmlns:p14="http://schemas.microsoft.com/office/powerpoint/2010/main" id="1" dur="indefinite" restart="never" nodeType="tmRoot"/>
       </p:par>
     </p:tnLst>
   </p:timing>
@@ -27689,7 +27409,7 @@
           <p:nvPr>
             <p:extLst>
               <p:ext uri="{D42A27DB-BD31-4B8C-83A1-F6EECF244321}">
-                <p14:modId xmlns:p14="http://schemas.microsoft.com/office/powerpoint/2010/main" val="1078591759"/>
+                <p14:modId xmlns:p14="http://schemas.microsoft.com/office/powerpoint/2010/main" val="439134882"/>
               </p:ext>
             </p:extLst>
           </p:nvPr>
@@ -27712,13 +27432,13 @@
         </p:nvCxnSpPr>
         <p:spPr>
           <a:xfrm>
-            <a:off x="1657966" y="3765841"/>
-            <a:ext cx="7236000" cy="0"/>
+            <a:off x="2035527" y="3765841"/>
+            <a:ext cx="6858439" cy="0"/>
           </a:xfrm>
           <a:prstGeom prst="line">
             <a:avLst/>
           </a:prstGeom>
-          <a:ln w="22225">
+          <a:ln w="3175" cmpd="sng">
             <a:solidFill>
               <a:srgbClr val="C00000"/>
             </a:solidFill>
@@ -27748,8 +27468,8 @@
         </p:nvSpPr>
         <p:spPr>
           <a:xfrm>
-            <a:off x="1950862" y="5083718"/>
-            <a:ext cx="1800000" cy="584775"/>
+            <a:off x="2238723" y="5083718"/>
+            <a:ext cx="1800000" cy="1200328"/>
           </a:xfrm>
           <a:prstGeom prst="rect">
             <a:avLst/>
@@ -27764,15 +27484,42 @@
           <a:p>
             <a:pPr algn="ctr"/>
             <a:r>
-              <a:rPr lang="en-US" sz="1600" dirty="0" smtClean="0">
+              <a:rPr lang="en-US" sz="2400" dirty="0" smtClean="0">
                 <a:solidFill>
                   <a:schemeClr val="bg2">
                     <a:lumMod val="25000"/>
                   </a:schemeClr>
                 </a:solidFill>
               </a:rPr>
-              <a:t>Operation location: CH/GER</a:t>
+              <a:t>Operation location: CH</a:t>
             </a:r>
+            <a:r>
+              <a:rPr lang="en-US" sz="2400" dirty="0" smtClean="0">
+                <a:solidFill>
+                  <a:schemeClr val="bg2">
+                    <a:lumMod val="25000"/>
+                  </a:schemeClr>
+                </a:solidFill>
+              </a:rPr>
+              <a:t>/</a:t>
+            </a:r>
+            <a:r>
+              <a:rPr lang="en-US" sz="2400" dirty="0" smtClean="0">
+                <a:solidFill>
+                  <a:schemeClr val="bg2">
+                    <a:lumMod val="25000"/>
+                  </a:schemeClr>
+                </a:solidFill>
+              </a:rPr>
+              <a:t>DE</a:t>
+            </a:r>
+            <a:endParaRPr lang="en-US" sz="2400" dirty="0" smtClean="0">
+              <a:solidFill>
+                <a:schemeClr val="bg2">
+                  <a:lumMod val="25000"/>
+                </a:schemeClr>
+              </a:solidFill>
+            </a:endParaRPr>
           </a:p>
         </p:txBody>
       </p:sp>
@@ -27784,8 +27531,8 @@
         </p:nvSpPr>
         <p:spPr>
           <a:xfrm>
-            <a:off x="4395319" y="5083718"/>
-            <a:ext cx="1800000" cy="584775"/>
+            <a:off x="4513850" y="5083718"/>
+            <a:ext cx="1800000" cy="830997"/>
           </a:xfrm>
           <a:prstGeom prst="rect">
             <a:avLst/>
@@ -27800,7 +27547,7 @@
           <a:p>
             <a:pPr algn="ctr"/>
             <a:r>
-              <a:rPr lang="en-US" sz="1600" dirty="0" smtClean="0">
+              <a:rPr lang="en-US" sz="2400" dirty="0" smtClean="0">
                 <a:solidFill>
                   <a:schemeClr val="bg2">
                     <a:lumMod val="25000"/>
@@ -27821,7 +27568,7 @@
         <p:spPr>
           <a:xfrm>
             <a:off x="6839776" y="5083718"/>
-            <a:ext cx="1800000" cy="584775"/>
+            <a:ext cx="1800000" cy="1200328"/>
           </a:xfrm>
           <a:prstGeom prst="rect">
             <a:avLst/>
@@ -27836,7 +27583,7 @@
           <a:p>
             <a:pPr algn="ctr"/>
             <a:r>
-              <a:rPr lang="en-US" sz="1600" dirty="0" smtClean="0">
+              <a:rPr lang="en-US" sz="2400" dirty="0" smtClean="0">
                 <a:solidFill>
                   <a:schemeClr val="bg2">
                     <a:lumMod val="25000"/>
@@ -27849,7 +27596,7 @@
           <a:p>
             <a:pPr algn="ctr"/>
             <a:r>
-              <a:rPr lang="en-US" sz="1600" dirty="0" smtClean="0">
+              <a:rPr lang="en-US" sz="2400" dirty="0" smtClean="0">
                 <a:solidFill>
                   <a:schemeClr val="bg2">
                     <a:lumMod val="25000"/>
@@ -27869,8 +27616,8 @@
         </p:nvCxnSpPr>
         <p:spPr>
           <a:xfrm>
-            <a:off x="1657965" y="1811128"/>
-            <a:ext cx="7200000" cy="0"/>
+            <a:off x="2035527" y="1811128"/>
+            <a:ext cx="6822438" cy="0"/>
           </a:xfrm>
           <a:prstGeom prst="line">
             <a:avLst/>
@@ -27898,6 +27645,196 @@
           </a:fontRef>
         </p:style>
       </p:cxnSp>
+      <p:sp>
+        <p:nvSpPr>
+          <p:cNvPr id="2" name="TextBox 1"/>
+          <p:cNvSpPr txBox="1"/>
+          <p:nvPr/>
+        </p:nvSpPr>
+        <p:spPr>
+          <a:xfrm>
+            <a:off x="2904190" y="1202267"/>
+            <a:ext cx="451566" cy="369332"/>
+          </a:xfrm>
+          <a:prstGeom prst="rect">
+            <a:avLst/>
+          </a:prstGeom>
+          <a:noFill/>
+        </p:spPr>
+        <p:txBody>
+          <a:bodyPr wrap="none" rtlCol="0">
+            <a:spAutoFit/>
+          </a:bodyPr>
+          <a:lstStyle/>
+          <a:p>
+            <a:r>
+              <a:rPr lang="en-GB" dirty="0" smtClean="0"/>
+              <a:t>CH</a:t>
+            </a:r>
+            <a:endParaRPr lang="en-GB" dirty="0"/>
+          </a:p>
+        </p:txBody>
+      </p:sp>
+      <p:sp>
+        <p:nvSpPr>
+          <p:cNvPr id="10" name="TextBox 9"/>
+          <p:cNvSpPr txBox="1"/>
+          <p:nvPr/>
+        </p:nvSpPr>
+        <p:spPr>
+          <a:xfrm>
+            <a:off x="2927971" y="4646654"/>
+            <a:ext cx="439393" cy="369332"/>
+          </a:xfrm>
+          <a:prstGeom prst="rect">
+            <a:avLst/>
+          </a:prstGeom>
+          <a:noFill/>
+        </p:spPr>
+        <p:txBody>
+          <a:bodyPr wrap="none" rtlCol="0">
+            <a:spAutoFit/>
+          </a:bodyPr>
+          <a:lstStyle/>
+          <a:p>
+            <a:r>
+              <a:rPr lang="en-GB" dirty="0" smtClean="0"/>
+              <a:t>DE</a:t>
+            </a:r>
+            <a:endParaRPr lang="en-GB" dirty="0"/>
+          </a:p>
+        </p:txBody>
+      </p:sp>
+      <p:sp>
+        <p:nvSpPr>
+          <p:cNvPr id="11" name="TextBox 10"/>
+          <p:cNvSpPr txBox="1"/>
+          <p:nvPr/>
+        </p:nvSpPr>
+        <p:spPr>
+          <a:xfrm>
+            <a:off x="5053852" y="3248107"/>
+            <a:ext cx="712041" cy="369332"/>
+          </a:xfrm>
+          <a:prstGeom prst="rect">
+            <a:avLst/>
+          </a:prstGeom>
+          <a:noFill/>
+        </p:spPr>
+        <p:txBody>
+          <a:bodyPr wrap="none" rtlCol="0">
+            <a:spAutoFit/>
+          </a:bodyPr>
+          <a:lstStyle/>
+          <a:p>
+            <a:r>
+              <a:rPr lang="en-GB" dirty="0" smtClean="0"/>
+              <a:t>Servo</a:t>
+            </a:r>
+            <a:endParaRPr lang="en-GB" dirty="0"/>
+          </a:p>
+        </p:txBody>
+      </p:sp>
+      <p:sp>
+        <p:nvSpPr>
+          <p:cNvPr id="12" name="TextBox 11"/>
+          <p:cNvSpPr txBox="1"/>
+          <p:nvPr/>
+        </p:nvSpPr>
+        <p:spPr>
+          <a:xfrm>
+            <a:off x="4910015" y="3857708"/>
+            <a:ext cx="1005403" cy="646331"/>
+          </a:xfrm>
+          <a:prstGeom prst="rect">
+            <a:avLst/>
+          </a:prstGeom>
+          <a:noFill/>
+        </p:spPr>
+        <p:txBody>
+          <a:bodyPr wrap="none" rtlCol="0">
+            <a:spAutoFit/>
+          </a:bodyPr>
+          <a:lstStyle/>
+          <a:p>
+            <a:pPr algn="ctr"/>
+            <a:r>
+              <a:rPr lang="en-GB" dirty="0" smtClean="0"/>
+              <a:t>Soft</a:t>
+            </a:r>
+          </a:p>
+          <a:p>
+            <a:pPr algn="ctr"/>
+            <a:r>
+              <a:rPr lang="en-GB" dirty="0" smtClean="0"/>
+              <a:t>Actuator</a:t>
+            </a:r>
+            <a:endParaRPr lang="en-GB" dirty="0"/>
+          </a:p>
+        </p:txBody>
+      </p:sp>
+      <p:sp>
+        <p:nvSpPr>
+          <p:cNvPr id="13" name="TextBox 12"/>
+          <p:cNvSpPr txBox="1"/>
+          <p:nvPr/>
+        </p:nvSpPr>
+        <p:spPr>
+          <a:xfrm>
+            <a:off x="7204387" y="3325683"/>
+            <a:ext cx="1101684" cy="369332"/>
+          </a:xfrm>
+          <a:prstGeom prst="rect">
+            <a:avLst/>
+          </a:prstGeom>
+          <a:noFill/>
+        </p:spPr>
+        <p:txBody>
+          <a:bodyPr wrap="none" rtlCol="0">
+            <a:spAutoFit/>
+          </a:bodyPr>
+          <a:lstStyle/>
+          <a:p>
+            <a:pPr algn="ctr"/>
+            <a:r>
+              <a:rPr lang="en-GB" dirty="0" smtClean="0"/>
+              <a:t>Individual</a:t>
+            </a:r>
+            <a:endParaRPr lang="en-GB" dirty="0"/>
+          </a:p>
+        </p:txBody>
+      </p:sp>
+      <p:sp>
+        <p:nvSpPr>
+          <p:cNvPr id="14" name="TextBox 13"/>
+          <p:cNvSpPr txBox="1"/>
+          <p:nvPr/>
+        </p:nvSpPr>
+        <p:spPr>
+          <a:xfrm>
+            <a:off x="7456861" y="3871549"/>
+            <a:ext cx="596738" cy="369332"/>
+          </a:xfrm>
+          <a:prstGeom prst="rect">
+            <a:avLst/>
+          </a:prstGeom>
+          <a:noFill/>
+        </p:spPr>
+        <p:txBody>
+          <a:bodyPr wrap="none" rtlCol="0">
+            <a:spAutoFit/>
+          </a:bodyPr>
+          <a:lstStyle/>
+          <a:p>
+            <a:pPr algn="ctr"/>
+            <a:r>
+              <a:rPr lang="en-GB" dirty="0" smtClean="0"/>
+              <a:t>Row</a:t>
+            </a:r>
+            <a:endParaRPr lang="en-GB" dirty="0"/>
+          </a:p>
+        </p:txBody>
+      </p:sp>
     </p:spTree>
     <p:extLst>
       <p:ext uri="{BB962C8B-B14F-4D97-AF65-F5344CB8AC3E}">
@@ -27911,7 +27848,7 @@
   <p:timing>
     <p:tnLst>
       <p:par>
-        <p:cTn id="1" dur="indefinite" restart="never" nodeType="tmRoot"/>
+        <p:cTn xmlns:p14="http://schemas.microsoft.com/office/powerpoint/2010/main" id="1" dur="indefinite" restart="never" nodeType="tmRoot"/>
       </p:par>
     </p:tnLst>
   </p:timing>
@@ -27970,7 +27907,7 @@
   <p:timing>
     <p:tnLst>
       <p:par>
-        <p:cTn id="1" dur="indefinite" restart="never" nodeType="tmRoot"/>
+        <p:cTn xmlns:p14="http://schemas.microsoft.com/office/powerpoint/2010/main" id="1" dur="indefinite" restart="never" nodeType="tmRoot"/>
       </p:par>
     </p:tnLst>
   </p:timing>
@@ -28059,7 +27996,7 @@
   <p:timing>
     <p:tnLst>
       <p:par>
-        <p:cTn id="1" dur="indefinite" restart="never" nodeType="tmRoot"/>
+        <p:cTn xmlns:p14="http://schemas.microsoft.com/office/powerpoint/2010/main" id="1" dur="indefinite" restart="never" nodeType="tmRoot"/>
       </p:par>
     </p:tnLst>
   </p:timing>
@@ -28118,7 +28055,7 @@
   <p:timing>
     <p:tnLst>
       <p:par>
-        <p:cTn id="1" dur="indefinite" restart="never" nodeType="tmRoot"/>
+        <p:cTn xmlns:p14="http://schemas.microsoft.com/office/powerpoint/2010/main" id="1" dur="indefinite" restart="never" nodeType="tmRoot"/>
       </p:par>
     </p:tnLst>
   </p:timing>
@@ -28177,7 +28114,7 @@
   <p:timing>
     <p:tnLst>
       <p:par>
-        <p:cTn id="1" dur="indefinite" restart="never" nodeType="tmRoot"/>
+        <p:cTn xmlns:p14="http://schemas.microsoft.com/office/powerpoint/2010/main" id="1" dur="indefinite" restart="never" nodeType="tmRoot"/>
       </p:par>
     </p:tnLst>
   </p:timing>
@@ -28236,7 +28173,7 @@
   <p:timing>
     <p:tnLst>
       <p:par>
-        <p:cTn id="1" dur="indefinite" restart="never" nodeType="tmRoot"/>
+        <p:cTn xmlns:p14="http://schemas.microsoft.com/office/powerpoint/2010/main" id="1" dur="indefinite" restart="never" nodeType="tmRoot"/>
       </p:par>
     </p:tnLst>
   </p:timing>
@@ -28295,7 +28232,7 @@
   <p:timing>
     <p:tnLst>
       <p:par>
-        <p:cTn id="1" dur="indefinite" restart="never" nodeType="tmRoot"/>
+        <p:cTn xmlns:p14="http://schemas.microsoft.com/office/powerpoint/2010/main" id="1" dur="indefinite" restart="never" nodeType="tmRoot"/>
       </p:par>
     </p:tnLst>
   </p:timing>
@@ -28657,7 +28594,7 @@
   <p:timing>
     <p:tnLst>
       <p:par>
-        <p:cTn id="1" dur="indefinite" restart="never" nodeType="tmRoot"/>
+        <p:cTn xmlns:p14="http://schemas.microsoft.com/office/powerpoint/2010/main" id="1" dur="indefinite" restart="never" nodeType="tmRoot"/>
       </p:par>
     </p:tnLst>
   </p:timing>
@@ -28750,7 +28687,7 @@
   <p:timing>
     <p:tnLst>
       <p:par>
-        <p:cTn id="1" dur="indefinite" restart="never" nodeType="tmRoot"/>
+        <p:cTn xmlns:p14="http://schemas.microsoft.com/office/powerpoint/2010/main" id="1" dur="indefinite" restart="never" nodeType="tmRoot"/>
       </p:par>
     </p:tnLst>
   </p:timing>
@@ -28875,7 +28812,7 @@
   <p:timing>
     <p:tnLst>
       <p:par>
-        <p:cTn id="1" dur="indefinite" restart="never" nodeType="tmRoot"/>
+        <p:cTn xmlns:p14="http://schemas.microsoft.com/office/powerpoint/2010/main" id="1" dur="indefinite" restart="never" nodeType="tmRoot"/>
       </p:par>
     </p:tnLst>
   </p:timing>
@@ -29137,7 +29074,7 @@
   <a:extraClrSchemeLst/>
   <a:extLst>
     <a:ext uri="{05A4C25C-085E-4340-85A3-A5531E510DB2}">
-      <thm15:themeFamily xmlns:thm15="http://schemas.microsoft.com/office/thememl/2012/main" name="Office Theme" id="{62F939B6-93AF-4DB8-9C6B-D6C7DFDC589F}" vid="{4A3C46E8-61CC-4603-A589-7422A47A8E4A}"/>
+      <thm15:themeFamily xmlns:thm15="http://schemas.microsoft.com/office/thememl/2012/main" xmlns="" name="Office Theme" id="{62F939B6-93AF-4DB8-9C6B-D6C7DFDC589F}" vid="{4A3C46E8-61CC-4603-A589-7422A47A8E4A}"/>
     </a:ext>
   </a:extLst>
 </a:theme>
@@ -29398,7 +29335,7 @@
   <a:extraClrSchemeLst/>
   <a:extLst>
     <a:ext uri="{05A4C25C-085E-4340-85A3-A5531E510DB2}">
-      <thm15:themeFamily xmlns:thm15="http://schemas.microsoft.com/office/thememl/2012/main" name="Office Theme" id="{62F939B6-93AF-4DB8-9C6B-D6C7DFDC589F}" vid="{4A3C46E8-61CC-4603-A589-7422A47A8E4A}"/>
+      <thm15:themeFamily xmlns:thm15="http://schemas.microsoft.com/office/thememl/2012/main" xmlns="" name="Office Theme" id="{62F939B6-93AF-4DB8-9C6B-D6C7DFDC589F}" vid="{4A3C46E8-61CC-4603-A589-7422A47A8E4A}"/>
     </a:ext>
   </a:extLst>
 </a:theme>

</xml_diff>

<commit_message>
version 3 of compPV chart in ppt
</commit_message>
<xml_diff>
--- a/elsarticle/Images/Thesis charts.pptx
+++ b/elsarticle/Images/Thesis charts.pptx
@@ -5,7 +5,7 @@
     <p:sldMasterId id="2147483660" r:id="rId1"/>
   </p:sldMasterIdLst>
   <p:notesMasterIdLst>
-    <p:notesMasterId r:id="rId23"/>
+    <p:notesMasterId r:id="rId24"/>
   </p:notesMasterIdLst>
   <p:sldIdLst>
     <p:sldId id="262" r:id="rId2"/>
@@ -26,9 +26,10 @@
     <p:sldId id="257" r:id="rId17"/>
     <p:sldId id="258" r:id="rId18"/>
     <p:sldId id="279" r:id="rId19"/>
-    <p:sldId id="277" r:id="rId20"/>
-    <p:sldId id="268" r:id="rId21"/>
-    <p:sldId id="266" r:id="rId22"/>
+    <p:sldId id="280" r:id="rId20"/>
+    <p:sldId id="277" r:id="rId21"/>
+    <p:sldId id="268" r:id="rId22"/>
+    <p:sldId id="266" r:id="rId23"/>
   </p:sldIdLst>
   <p:sldSz cx="9906000" cy="6858000" type="A4"/>
   <p:notesSz cx="6858000" cy="9144000"/>
@@ -425,11 +426,11 @@
           <c:showPercent val="0"/>
           <c:showBubbleSize val="0"/>
         </c:dLbls>
-        <c:axId val="2088245440"/>
-        <c:axId val="2107027328"/>
+        <c:axId val="-2050862624"/>
+        <c:axId val="-2144152768"/>
       </c:scatterChart>
       <c:valAx>
-        <c:axId val="2088245440"/>
+        <c:axId val="-2050862624"/>
         <c:scaling>
           <c:orientation val="minMax"/>
         </c:scaling>
@@ -551,12 +552,12 @@
             <a:endParaRPr lang="en-US"/>
           </a:p>
         </c:txPr>
-        <c:crossAx val="2107027328"/>
+        <c:crossAx val="-2144152768"/>
         <c:crosses val="autoZero"/>
         <c:crossBetween val="midCat"/>
       </c:valAx>
       <c:valAx>
-        <c:axId val="2107027328"/>
+        <c:axId val="-2144152768"/>
         <c:scaling>
           <c:orientation val="minMax"/>
         </c:scaling>
@@ -682,7 +683,7 @@
             <a:endParaRPr lang="en-US"/>
           </a:p>
         </c:txPr>
-        <c:crossAx val="2088245440"/>
+        <c:crossAx val="-2050862624"/>
         <c:crosses val="autoZero"/>
         <c:crossBetween val="midCat"/>
       </c:valAx>
@@ -919,9 +920,7 @@
               </c:spPr>
             </c:leaderLines>
             <c:extLst>
-              <c:ext xmlns:c15="http://schemas.microsoft.com/office/drawing/2012/chart" uri="{CE6537A1-D6FC-4f65-9D91-7224C49458BB}">
-                <c15:layout/>
-              </c:ext>
+              <c:ext xmlns:c15="http://schemas.microsoft.com/office/drawing/2012/chart" uri="{CE6537A1-D6FC-4f65-9D91-7224C49458BB}"/>
             </c:extLst>
           </c:dLbls>
           <c:cat>
@@ -1242,9 +1241,7 @@
               <c:showPercent val="0"/>
               <c:showBubbleSize val="0"/>
               <c:extLst>
-                <c:ext xmlns:c15="http://schemas.microsoft.com/office/drawing/2012/chart" uri="{CE6537A1-D6FC-4f65-9D91-7224C49458BB}">
-                  <c15:layout/>
-                </c:ext>
+                <c:ext xmlns:c15="http://schemas.microsoft.com/office/drawing/2012/chart" uri="{CE6537A1-D6FC-4f65-9D91-7224C49458BB}"/>
               </c:extLst>
             </c:dLbl>
             <c:dLbl>
@@ -1262,9 +1259,7 @@
               <c:showPercent val="0"/>
               <c:showBubbleSize val="0"/>
               <c:extLst>
-                <c:ext xmlns:c15="http://schemas.microsoft.com/office/drawing/2012/chart" uri="{CE6537A1-D6FC-4f65-9D91-7224C49458BB}">
-                  <c15:layout/>
-                </c:ext>
+                <c:ext xmlns:c15="http://schemas.microsoft.com/office/drawing/2012/chart" uri="{CE6537A1-D6FC-4f65-9D91-7224C49458BB}"/>
               </c:extLst>
             </c:dLbl>
             <c:spPr>
@@ -1318,9 +1313,7 @@
               </c:spPr>
             </c:leaderLines>
             <c:extLst>
-              <c:ext xmlns:c15="http://schemas.microsoft.com/office/drawing/2012/chart" uri="{CE6537A1-D6FC-4f65-9D91-7224C49458BB}">
-                <c15:layout/>
-              </c:ext>
+              <c:ext xmlns:c15="http://schemas.microsoft.com/office/drawing/2012/chart" uri="{CE6537A1-D6FC-4f65-9D91-7224C49458BB}"/>
             </c:extLst>
           </c:dLbls>
           <c:cat>
@@ -1639,9 +1632,7 @@
               </c:spPr>
             </c:leaderLines>
             <c:extLst>
-              <c:ext xmlns:c15="http://schemas.microsoft.com/office/drawing/2012/chart" uri="{CE6537A1-D6FC-4f65-9D91-7224C49458BB}">
-                <c15:layout/>
-              </c:ext>
+              <c:ext xmlns:c15="http://schemas.microsoft.com/office/drawing/2012/chart" uri="{CE6537A1-D6FC-4f65-9D91-7224C49458BB}"/>
             </c:extLst>
           </c:dLbls>
           <c:cat>
@@ -1936,9 +1927,7 @@
               <c:showPercent val="0"/>
               <c:showBubbleSize val="0"/>
               <c:extLst>
-                <c:ext xmlns:c15="http://schemas.microsoft.com/office/drawing/2012/chart" uri="{CE6537A1-D6FC-4f65-9D91-7224C49458BB}">
-                  <c15:layout/>
-                </c:ext>
+                <c:ext xmlns:c15="http://schemas.microsoft.com/office/drawing/2012/chart" uri="{CE6537A1-D6FC-4f65-9D91-7224C49458BB}"/>
               </c:extLst>
             </c:dLbl>
             <c:dLbl>
@@ -2239,9 +2228,7 @@
               <c:showPercent val="0"/>
               <c:showBubbleSize val="0"/>
               <c:extLst>
-                <c:ext xmlns:c15="http://schemas.microsoft.com/office/drawing/2012/chart" uri="{CE6537A1-D6FC-4f65-9D91-7224C49458BB}">
-                  <c15:layout/>
-                </c:ext>
+                <c:ext xmlns:c15="http://schemas.microsoft.com/office/drawing/2012/chart" uri="{CE6537A1-D6FC-4f65-9D91-7224C49458BB}"/>
               </c:extLst>
             </c:dLbl>
             <c:spPr>
@@ -2364,11 +2351,11 @@
         </c:dLbls>
         <c:gapWidth val="150"/>
         <c:overlap val="100"/>
-        <c:axId val="-2099362064"/>
-        <c:axId val="-2099358816"/>
+        <c:axId val="2129786000"/>
+        <c:axId val="2130092896"/>
       </c:barChart>
       <c:catAx>
-        <c:axId val="-2099362064"/>
+        <c:axId val="2129786000"/>
         <c:scaling>
           <c:orientation val="minMax"/>
         </c:scaling>
@@ -2378,7 +2365,7 @@
         <c:majorTickMark val="none"/>
         <c:minorTickMark val="none"/>
         <c:tickLblPos val="nextTo"/>
-        <c:crossAx val="-2099358816"/>
+        <c:crossAx val="2130092896"/>
         <c:crosses val="autoZero"/>
         <c:auto val="1"/>
         <c:lblAlgn val="ctr"/>
@@ -2386,7 +2373,7 @@
         <c:noMultiLvlLbl val="0"/>
       </c:catAx>
       <c:valAx>
-        <c:axId val="-2099358816"/>
+        <c:axId val="2130092896"/>
         <c:scaling>
           <c:orientation val="minMax"/>
         </c:scaling>
@@ -2441,7 +2428,6 @@
               </a:p>
             </c:rich>
           </c:tx>
-          <c:layout/>
           <c:overlay val="0"/>
           <c:spPr>
             <a:noFill/>
@@ -2502,7 +2488,7 @@
             <a:endParaRPr lang="en-US"/>
           </a:p>
         </c:txPr>
-        <c:crossAx val="-2099362064"/>
+        <c:crossAx val="2129786000"/>
         <c:crosses val="autoZero"/>
         <c:crossBetween val="between"/>
       </c:valAx>
@@ -2885,11 +2871,11 @@
         </c:dLbls>
         <c:gapWidth val="219"/>
         <c:overlap val="-27"/>
-        <c:axId val="-2099278880"/>
-        <c:axId val="-2099275312"/>
+        <c:axId val="-2141297776"/>
+        <c:axId val="-2053938784"/>
       </c:barChart>
       <c:catAx>
-        <c:axId val="-2099278880"/>
+        <c:axId val="-2141297776"/>
         <c:scaling>
           <c:orientation val="minMax"/>
         </c:scaling>
@@ -2929,7 +2915,7 @@
             <a:endParaRPr lang="en-US"/>
           </a:p>
         </c:txPr>
-        <c:crossAx val="-2099275312"/>
+        <c:crossAx val="-2053938784"/>
         <c:crosses val="autoZero"/>
         <c:auto val="1"/>
         <c:lblAlgn val="ctr"/>
@@ -2937,7 +2923,7 @@
         <c:noMultiLvlLbl val="0"/>
       </c:catAx>
       <c:valAx>
-        <c:axId val="-2099275312"/>
+        <c:axId val="-2053938784"/>
         <c:scaling>
           <c:orientation val="minMax"/>
         </c:scaling>
@@ -3005,7 +2991,6 @@
               </a:p>
             </c:rich>
           </c:tx>
-          <c:layout/>
           <c:overlay val="0"/>
           <c:spPr>
             <a:noFill/>
@@ -3068,7 +3053,7 @@
             <a:endParaRPr lang="en-US"/>
           </a:p>
         </c:txPr>
-        <c:crossAx val="-2099278880"/>
+        <c:crossAx val="-2141297776"/>
         <c:crosses val="autoZero"/>
         <c:crossBetween val="between"/>
       </c:valAx>
@@ -3084,7 +3069,6 @@
     </c:plotArea>
     <c:legend>
       <c:legendPos val="b"/>
-      <c:layout/>
       <c:overlay val="0"/>
       <c:spPr>
         <a:noFill/>
@@ -3365,11 +3349,11 @@
         </c:dLbls>
         <c:gapWidth val="219"/>
         <c:overlap val="-27"/>
-        <c:axId val="-2100026336"/>
-        <c:axId val="-2100029936"/>
+        <c:axId val="-2046107728"/>
+        <c:axId val="-2046104288"/>
       </c:barChart>
       <c:catAx>
-        <c:axId val="-2100026336"/>
+        <c:axId val="-2046107728"/>
         <c:scaling>
           <c:orientation val="minMax"/>
         </c:scaling>
@@ -3409,7 +3393,7 @@
             <a:endParaRPr lang="en-US"/>
           </a:p>
         </c:txPr>
-        <c:crossAx val="-2100029936"/>
+        <c:crossAx val="-2046104288"/>
         <c:crosses val="autoZero"/>
         <c:auto val="1"/>
         <c:lblAlgn val="ctr"/>
@@ -3417,7 +3401,7 @@
         <c:noMultiLvlLbl val="0"/>
       </c:catAx>
       <c:valAx>
-        <c:axId val="-2100029936"/>
+        <c:axId val="-2046104288"/>
         <c:scaling>
           <c:orientation val="minMax"/>
         </c:scaling>
@@ -3495,7 +3479,6 @@
               </a:p>
             </c:rich>
           </c:tx>
-          <c:layout/>
           <c:overlay val="0"/>
           <c:spPr>
             <a:noFill/>
@@ -3538,7 +3521,7 @@
             <a:endParaRPr lang="en-US"/>
           </a:p>
         </c:txPr>
-        <c:crossAx val="-2100026336"/>
+        <c:crossAx val="-2046107728"/>
         <c:crosses val="autoZero"/>
         <c:crossBetween val="between"/>
       </c:valAx>
@@ -3554,7 +3537,6 @@
     </c:plotArea>
     <c:legend>
       <c:legendPos val="b"/>
-      <c:layout/>
       <c:overlay val="0"/>
       <c:spPr>
         <a:noFill/>
@@ -3786,9 +3768,7 @@
               </c:spPr>
             </c:leaderLines>
             <c:extLst>
-              <c:ext xmlns:c15="http://schemas.microsoft.com/office/drawing/2012/chart" uri="{CE6537A1-D6FC-4f65-9D91-7224C49458BB}">
-                <c15:layout/>
-              </c:ext>
+              <c:ext xmlns:c15="http://schemas.microsoft.com/office/drawing/2012/chart" uri="{CE6537A1-D6FC-4f65-9D91-7224C49458BB}"/>
             </c:extLst>
           </c:dLbls>
           <c:cat>
@@ -4068,7 +4048,7 @@
                   <c:v>-6.43</c:v>
                 </c:pt>
                 <c:pt idx="10">
-                  <c:v>-9.739999999999998</c:v>
+                  <c:v>-9.74</c:v>
                 </c:pt>
                 <c:pt idx="11">
                   <c:v>-13.05</c:v>
@@ -4102,11 +4082,11 @@
           <c:showBubbleSize val="0"/>
         </c:dLbls>
         <c:smooth val="0"/>
-        <c:axId val="-2103376624"/>
-        <c:axId val="-2103373264"/>
+        <c:axId val="-2045909312"/>
+        <c:axId val="-2045905808"/>
       </c:lineChart>
       <c:catAx>
-        <c:axId val="-2103376624"/>
+        <c:axId val="-2045909312"/>
         <c:scaling>
           <c:orientation val="minMax"/>
         </c:scaling>
@@ -4149,7 +4129,7 @@
             <a:endParaRPr lang="en-US"/>
           </a:p>
         </c:txPr>
-        <c:crossAx val="-2103373264"/>
+        <c:crossAx val="-2045905808"/>
         <c:crosses val="autoZero"/>
         <c:auto val="1"/>
         <c:lblAlgn val="ctr"/>
@@ -4157,7 +4137,7 @@
         <c:noMultiLvlLbl val="0"/>
       </c:catAx>
       <c:valAx>
-        <c:axId val="-2103373264"/>
+        <c:axId val="-2045905808"/>
         <c:scaling>
           <c:orientation val="minMax"/>
         </c:scaling>
@@ -4204,7 +4184,6 @@
               </a:p>
             </c:rich>
           </c:tx>
-          <c:layout/>
           <c:overlay val="0"/>
           <c:spPr>
             <a:noFill/>
@@ -4245,7 +4224,7 @@
             <a:endParaRPr lang="en-US"/>
           </a:p>
         </c:txPr>
-        <c:crossAx val="-2103376624"/>
+        <c:crossAx val="-2045909312"/>
         <c:crosses val="autoZero"/>
         <c:crossBetween val="between"/>
       </c:valAx>
@@ -4261,7 +4240,6 @@
     </c:plotArea>
     <c:legend>
       <c:legendPos val="b"/>
-      <c:layout/>
       <c:overlay val="0"/>
       <c:spPr>
         <a:noFill/>
@@ -4403,7 +4381,6 @@
             <c:showLeaderLines val="0"/>
             <c:extLst>
               <c:ext xmlns:c15="http://schemas.microsoft.com/office/drawing/2012/chart" uri="{CE6537A1-D6FC-4f65-9D91-7224C49458BB}">
-                <c15:layout/>
                 <c15:showLeaderLines val="1"/>
                 <c15:leaderLines>
                   <c:spPr>
@@ -4516,7 +4493,6 @@
             <c:showLeaderLines val="0"/>
             <c:extLst>
               <c:ext xmlns:c15="http://schemas.microsoft.com/office/drawing/2012/chart" uri="{CE6537A1-D6FC-4f65-9D91-7224C49458BB}">
-                <c15:layout/>
                 <c15:showLeaderLines val="1"/>
                 <c15:leaderLines>
                   <c:spPr>
@@ -4629,7 +4605,6 @@
             <c:showLeaderLines val="0"/>
             <c:extLst>
               <c:ext xmlns:c15="http://schemas.microsoft.com/office/drawing/2012/chart" uri="{CE6537A1-D6FC-4f65-9D91-7224C49458BB}">
-                <c15:layout/>
                 <c15:showLeaderLines val="1"/>
                 <c15:leaderLines>
                   <c:spPr>
@@ -4797,7 +4772,6 @@
             <c:showLeaderLines val="0"/>
             <c:extLst>
               <c:ext xmlns:c15="http://schemas.microsoft.com/office/drawing/2012/chart" uri="{CE6537A1-D6FC-4f65-9D91-7224C49458BB}">
-                <c15:layout/>
                 <c15:showLeaderLines val="1"/>
                 <c15:leaderLines>
                   <c:spPr>
@@ -4857,11 +4831,11 @@
         </c:dLbls>
         <c:gapWidth val="219"/>
         <c:overlap val="-27"/>
-        <c:axId val="-2100206736"/>
-        <c:axId val="-2101490512"/>
+        <c:axId val="-2081722144"/>
+        <c:axId val="-2052957168"/>
       </c:barChart>
       <c:catAx>
-        <c:axId val="-2100206736"/>
+        <c:axId val="-2081722144"/>
         <c:scaling>
           <c:orientation val="minMax"/>
         </c:scaling>
@@ -4904,7 +4878,7 @@
             <a:endParaRPr lang="en-US"/>
           </a:p>
         </c:txPr>
-        <c:crossAx val="-2101490512"/>
+        <c:crossAx val="-2052957168"/>
         <c:crosses val="autoZero"/>
         <c:auto val="1"/>
         <c:lblAlgn val="ctr"/>
@@ -4912,7 +4886,7 @@
         <c:noMultiLvlLbl val="0"/>
       </c:catAx>
       <c:valAx>
-        <c:axId val="-2101490512"/>
+        <c:axId val="-2052957168"/>
         <c:scaling>
           <c:orientation val="minMax"/>
         </c:scaling>
@@ -4975,7 +4949,6 @@
               </a:p>
             </c:rich>
           </c:tx>
-          <c:layout/>
           <c:overlay val="0"/>
           <c:spPr>
             <a:noFill/>
@@ -5036,7 +5009,7 @@
             <a:endParaRPr lang="en-US"/>
           </a:p>
         </c:txPr>
-        <c:crossAx val="-2100206736"/>
+        <c:crossAx val="-2081722144"/>
         <c:crosses val="autoZero"/>
         <c:crossBetween val="between"/>
       </c:valAx>
@@ -5052,7 +5025,6 @@
     </c:plotArea>
     <c:legend>
       <c:legendPos val="b"/>
-      <c:layout/>
       <c:overlay val="0"/>
       <c:spPr>
         <a:noFill/>
@@ -5728,11 +5700,11 @@
         </c:dLbls>
         <c:gapWidth val="219"/>
         <c:overlap val="100"/>
-        <c:axId val="-2098916672"/>
-        <c:axId val="-2098925344"/>
+        <c:axId val="-2053431824"/>
+        <c:axId val="-2053511856"/>
       </c:barChart>
       <c:catAx>
-        <c:axId val="-2098916672"/>
+        <c:axId val="-2053431824"/>
         <c:scaling>
           <c:orientation val="minMax"/>
         </c:scaling>
@@ -5742,7 +5714,7 @@
         <c:majorTickMark val="none"/>
         <c:minorTickMark val="none"/>
         <c:tickLblPos val="nextTo"/>
-        <c:crossAx val="-2098925344"/>
+        <c:crossAx val="-2053511856"/>
         <c:crosses val="autoZero"/>
         <c:auto val="1"/>
         <c:lblAlgn val="ctr"/>
@@ -5750,7 +5722,7 @@
         <c:noMultiLvlLbl val="0"/>
       </c:catAx>
       <c:valAx>
-        <c:axId val="-2098925344"/>
+        <c:axId val="-2053511856"/>
         <c:scaling>
           <c:orientation val="minMax"/>
         </c:scaling>
@@ -5879,7 +5851,7 @@
             <a:endParaRPr lang="en-US"/>
           </a:p>
         </c:txPr>
-        <c:crossAx val="-2098916672"/>
+        <c:crossAx val="-2053431824"/>
         <c:crosses val="autoZero"/>
         <c:crossBetween val="between"/>
       </c:valAx>
@@ -6046,7 +6018,6 @@
             <c:showLeaderLines val="0"/>
             <c:extLst>
               <c:ext xmlns:c15="http://schemas.microsoft.com/office/drawing/2012/chart" uri="{CE6537A1-D6FC-4f65-9D91-7224C49458BB}">
-                <c15:layout/>
                 <c15:showLeaderLines val="1"/>
                 <c15:leaderLines>
                   <c:spPr>
@@ -6170,7 +6141,6 @@
             <c:showLeaderLines val="0"/>
             <c:extLst>
               <c:ext xmlns:c15="http://schemas.microsoft.com/office/drawing/2012/chart" uri="{CE6537A1-D6FC-4f65-9D91-7224C49458BB}">
-                <c15:layout/>
                 <c15:showLeaderLines val="1"/>
                 <c15:leaderLines>
                   <c:spPr>
@@ -6289,7 +6259,6 @@
             <c:showLeaderLines val="0"/>
             <c:extLst>
               <c:ext xmlns:c15="http://schemas.microsoft.com/office/drawing/2012/chart" uri="{CE6537A1-D6FC-4f65-9D91-7224C49458BB}">
-                <c15:layout/>
                 <c15:showLeaderLines val="1"/>
                 <c15:leaderLines>
                   <c:spPr>
@@ -6354,11 +6323,11 @@
         </c:dLbls>
         <c:gapWidth val="219"/>
         <c:overlap val="-27"/>
-        <c:axId val="2106735408"/>
-        <c:axId val="2106738896"/>
+        <c:axId val="-2144186112"/>
+        <c:axId val="-2143469280"/>
       </c:barChart>
       <c:catAx>
-        <c:axId val="2106735408"/>
+        <c:axId val="-2144186112"/>
         <c:scaling>
           <c:orientation val="minMax"/>
         </c:scaling>
@@ -6398,7 +6367,7 @@
             <a:endParaRPr lang="en-US"/>
           </a:p>
         </c:txPr>
-        <c:crossAx val="2106738896"/>
+        <c:crossAx val="-2143469280"/>
         <c:crosses val="autoZero"/>
         <c:auto val="1"/>
         <c:lblAlgn val="ctr"/>
@@ -6406,7 +6375,7 @@
         <c:noMultiLvlLbl val="0"/>
       </c:catAx>
       <c:valAx>
-        <c:axId val="2106738896"/>
+        <c:axId val="-2143469280"/>
         <c:scaling>
           <c:orientation val="minMax"/>
         </c:scaling>
@@ -6465,7 +6434,6 @@
               </a:p>
             </c:rich>
           </c:tx>
-          <c:layout/>
           <c:overlay val="0"/>
           <c:spPr>
             <a:noFill/>
@@ -6528,7 +6496,7 @@
             <a:endParaRPr lang="en-US"/>
           </a:p>
         </c:txPr>
-        <c:crossAx val="2106735408"/>
+        <c:crossAx val="-2144186112"/>
         <c:crosses val="autoZero"/>
         <c:crossBetween val="between"/>
       </c:valAx>
@@ -6544,7 +6512,6 @@
     </c:plotArea>
     <c:legend>
       <c:legendPos val="b"/>
-      <c:layout/>
       <c:overlay val="0"/>
       <c:spPr>
         <a:noFill/>
@@ -6672,9 +6639,7 @@
               <c:showPercent val="0"/>
               <c:showBubbleSize val="0"/>
               <c:extLst>
-                <c:ext xmlns:c15="http://schemas.microsoft.com/office/drawing/2012/chart" uri="{CE6537A1-D6FC-4f65-9D91-7224C49458BB}">
-                  <c15:layout/>
-                </c:ext>
+                <c:ext xmlns:c15="http://schemas.microsoft.com/office/drawing/2012/chart" uri="{CE6537A1-D6FC-4f65-9D91-7224C49458BB}"/>
               </c:extLst>
             </c:dLbl>
             <c:dLbl>
@@ -6692,9 +6657,7 @@
               <c:showPercent val="0"/>
               <c:showBubbleSize val="0"/>
               <c:extLst>
-                <c:ext xmlns:c15="http://schemas.microsoft.com/office/drawing/2012/chart" uri="{CE6537A1-D6FC-4f65-9D91-7224C49458BB}">
-                  <c15:layout/>
-                </c:ext>
+                <c:ext xmlns:c15="http://schemas.microsoft.com/office/drawing/2012/chart" uri="{CE6537A1-D6FC-4f65-9D91-7224C49458BB}"/>
               </c:extLst>
             </c:dLbl>
             <c:spPr>
@@ -6735,7 +6698,6 @@
             <c:showLeaderLines val="0"/>
             <c:extLst>
               <c:ext xmlns:c15="http://schemas.microsoft.com/office/drawing/2012/chart" uri="{CE6537A1-D6FC-4f65-9D91-7224C49458BB}">
-                <c15:layout/>
                 <c15:showLeaderLines val="1"/>
                 <c15:leaderLines>
                   <c:spPr>
@@ -6850,9 +6812,7 @@
               <c:showPercent val="0"/>
               <c:showBubbleSize val="0"/>
               <c:extLst>
-                <c:ext xmlns:c15="http://schemas.microsoft.com/office/drawing/2012/chart" uri="{CE6537A1-D6FC-4f65-9D91-7224C49458BB}">
-                  <c15:layout/>
-                </c:ext>
+                <c:ext xmlns:c15="http://schemas.microsoft.com/office/drawing/2012/chart" uri="{CE6537A1-D6FC-4f65-9D91-7224C49458BB}"/>
               </c:extLst>
             </c:dLbl>
             <c:dLbl>
@@ -6870,9 +6830,7 @@
               <c:showPercent val="0"/>
               <c:showBubbleSize val="0"/>
               <c:extLst>
-                <c:ext xmlns:c15="http://schemas.microsoft.com/office/drawing/2012/chart" uri="{CE6537A1-D6FC-4f65-9D91-7224C49458BB}">
-                  <c15:layout/>
-                </c:ext>
+                <c:ext xmlns:c15="http://schemas.microsoft.com/office/drawing/2012/chart" uri="{CE6537A1-D6FC-4f65-9D91-7224C49458BB}"/>
               </c:extLst>
             </c:dLbl>
             <c:dLbl>
@@ -6890,9 +6848,7 @@
               <c:showPercent val="0"/>
               <c:showBubbleSize val="0"/>
               <c:extLst>
-                <c:ext xmlns:c15="http://schemas.microsoft.com/office/drawing/2012/chart" uri="{CE6537A1-D6FC-4f65-9D91-7224C49458BB}">
-                  <c15:layout/>
-                </c:ext>
+                <c:ext xmlns:c15="http://schemas.microsoft.com/office/drawing/2012/chart" uri="{CE6537A1-D6FC-4f65-9D91-7224C49458BB}"/>
               </c:extLst>
             </c:dLbl>
             <c:dLbl>
@@ -6910,9 +6866,7 @@
               <c:showPercent val="0"/>
               <c:showBubbleSize val="0"/>
               <c:extLst>
-                <c:ext xmlns:c15="http://schemas.microsoft.com/office/drawing/2012/chart" uri="{CE6537A1-D6FC-4f65-9D91-7224C49458BB}">
-                  <c15:layout/>
-                </c:ext>
+                <c:ext xmlns:c15="http://schemas.microsoft.com/office/drawing/2012/chart" uri="{CE6537A1-D6FC-4f65-9D91-7224C49458BB}"/>
               </c:extLst>
             </c:dLbl>
             <c:spPr>
@@ -6953,7 +6907,6 @@
             <c:showLeaderLines val="0"/>
             <c:extLst>
               <c:ext xmlns:c15="http://schemas.microsoft.com/office/drawing/2012/chart" uri="{CE6537A1-D6FC-4f65-9D91-7224C49458BB}">
-                <c15:layout/>
                 <c15:showLeaderLines val="1"/>
                 <c15:leaderLines>
                   <c:spPr>
@@ -7011,18 +6964,18 @@
             <c:numRef>
               <c:f>Sheet1!$C$2:$C$10</c:f>
               <c:numCache>
-                <c:formatCode>0.0</c:formatCode>
+                <c:formatCode>General</c:formatCode>
                 <c:ptCount val="9"/>
-                <c:pt idx="2">
+                <c:pt idx="2" formatCode="0.0">
                   <c:v>-537.0</c:v>
                 </c:pt>
-                <c:pt idx="3">
+                <c:pt idx="3" formatCode="0.0">
                   <c:v>63.1</c:v>
                 </c:pt>
-                <c:pt idx="4" formatCode="General">
+                <c:pt idx="4">
                   <c:v>277.1</c:v>
                 </c:pt>
-                <c:pt idx="5" formatCode="General">
+                <c:pt idx="5">
                   <c:v>0.0</c:v>
                 </c:pt>
               </c:numCache>
@@ -7105,7 +7058,6 @@
                       <a:avLst/>
                     </a:prstGeom>
                   </c15:spPr>
-                  <c15:layout/>
                 </c:ext>
               </c:extLst>
             </c:dLbl>
@@ -7125,9 +7077,7 @@
               <c:showPercent val="0"/>
               <c:showBubbleSize val="0"/>
               <c:extLst>
-                <c:ext xmlns:c15="http://schemas.microsoft.com/office/drawing/2012/chart" uri="{CE6537A1-D6FC-4f65-9D91-7224C49458BB}">
-                  <c15:layout/>
-                </c:ext>
+                <c:ext xmlns:c15="http://schemas.microsoft.com/office/drawing/2012/chart" uri="{CE6537A1-D6FC-4f65-9D91-7224C49458BB}"/>
               </c:extLst>
             </c:dLbl>
             <c:dLbl>
@@ -7146,9 +7096,7 @@
               <c:showPercent val="0"/>
               <c:showBubbleSize val="0"/>
               <c:extLst>
-                <c:ext xmlns:c15="http://schemas.microsoft.com/office/drawing/2012/chart" uri="{CE6537A1-D6FC-4f65-9D91-7224C49458BB}">
-                  <c15:layout/>
-                </c:ext>
+                <c:ext xmlns:c15="http://schemas.microsoft.com/office/drawing/2012/chart" uri="{CE6537A1-D6FC-4f65-9D91-7224C49458BB}"/>
               </c:extLst>
             </c:dLbl>
             <c:spPr>
@@ -7272,11 +7220,11 @@
         </c:dLbls>
         <c:gapWidth val="219"/>
         <c:overlap val="100"/>
-        <c:axId val="2141890224"/>
-        <c:axId val="2141892656"/>
+        <c:axId val="-2046613264"/>
+        <c:axId val="-2046612144"/>
       </c:barChart>
       <c:catAx>
-        <c:axId val="2141890224"/>
+        <c:axId val="-2046613264"/>
         <c:scaling>
           <c:orientation val="minMax"/>
         </c:scaling>
@@ -7286,7 +7234,7 @@
         <c:majorTickMark val="none"/>
         <c:minorTickMark val="none"/>
         <c:tickLblPos val="nextTo"/>
-        <c:crossAx val="2141892656"/>
+        <c:crossAx val="-2046612144"/>
         <c:crosses val="autoZero"/>
         <c:auto val="1"/>
         <c:lblAlgn val="ctr"/>
@@ -7294,7 +7242,7 @@
         <c:noMultiLvlLbl val="0"/>
       </c:catAx>
       <c:valAx>
-        <c:axId val="2141892656"/>
+        <c:axId val="-2046612144"/>
         <c:scaling>
           <c:orientation val="minMax"/>
         </c:scaling>
@@ -7423,7 +7371,7 @@
             <a:endParaRPr lang="en-US"/>
           </a:p>
         </c:txPr>
-        <c:crossAx val="2141890224"/>
+        <c:crossAx val="-2046613264"/>
         <c:crosses val="autoZero"/>
         <c:crossBetween val="between"/>
       </c:valAx>
@@ -7506,6 +7454,859 @@
 </file>
 
 <file path=ppt/charts/chart21.xml><?xml version="1.0" encoding="utf-8"?>
+<c:chartSpace xmlns:c="http://schemas.openxmlformats.org/drawingml/2006/chart" xmlns:a="http://schemas.openxmlformats.org/drawingml/2006/main" xmlns:r="http://schemas.openxmlformats.org/officeDocument/2006/relationships">
+  <c:date1904 val="0"/>
+  <c:lang val="en-US"/>
+  <c:roundedCorners val="0"/>
+  <mc:AlternateContent xmlns:mc="http://schemas.openxmlformats.org/markup-compatibility/2006">
+    <mc:Choice xmlns:c14="http://schemas.microsoft.com/office/drawing/2007/8/2/chart" Requires="c14">
+      <c14:style val="102"/>
+    </mc:Choice>
+    <mc:Fallback>
+      <c:style val="2"/>
+    </mc:Fallback>
+  </mc:AlternateContent>
+  <c:chart>
+    <c:autoTitleDeleted val="1"/>
+    <c:plotArea>
+      <c:layout>
+        <c:manualLayout>
+          <c:layoutTarget val="inner"/>
+          <c:xMode val="edge"/>
+          <c:yMode val="edge"/>
+          <c:x val="0.138858061581748"/>
+          <c:y val="0.0264823754257671"/>
+          <c:w val="0.842327667361251"/>
+          <c:h val="0.652621483647289"/>
+        </c:manualLayout>
+      </c:layout>
+      <c:barChart>
+        <c:barDir val="col"/>
+        <c:grouping val="stacked"/>
+        <c:varyColors val="0"/>
+        <c:ser>
+          <c:idx val="0"/>
+          <c:order val="0"/>
+          <c:tx>
+            <c:strRef>
+              <c:f>Sheet1!$B$1</c:f>
+              <c:strCache>
+                <c:ptCount val="1"/>
+                <c:pt idx="0">
+                  <c:v>Electricity mix</c:v>
+                </c:pt>
+              </c:strCache>
+            </c:strRef>
+          </c:tx>
+          <c:spPr>
+            <a:solidFill>
+              <a:schemeClr val="accent3"/>
+            </a:solidFill>
+            <a:ln>
+              <a:noFill/>
+            </a:ln>
+            <a:effectLst/>
+          </c:spPr>
+          <c:invertIfNegative val="0"/>
+          <c:dLbls>
+            <c:dLbl>
+              <c:idx val="0"/>
+              <c:layout>
+                <c:manualLayout>
+                  <c:x val="0.00134333252239769"/>
+                  <c:y val="-0.145829721853049"/>
+                </c:manualLayout>
+              </c:layout>
+              <c:showLegendKey val="0"/>
+              <c:showVal val="1"/>
+              <c:showCatName val="0"/>
+              <c:showSerName val="0"/>
+              <c:showPercent val="0"/>
+              <c:showBubbleSize val="0"/>
+              <c:extLst>
+                <c:ext xmlns:c15="http://schemas.microsoft.com/office/drawing/2012/chart" uri="{CE6537A1-D6FC-4f65-9D91-7224C49458BB}">
+                  <c15:layout/>
+                </c:ext>
+              </c:extLst>
+            </c:dLbl>
+            <c:spPr>
+              <a:noFill/>
+              <a:ln>
+                <a:noFill/>
+              </a:ln>
+              <a:effectLst/>
+            </c:spPr>
+            <c:txPr>
+              <a:bodyPr rot="0" spcFirstLastPara="1" vertOverflow="ellipsis" vert="horz" wrap="square" lIns="38100" tIns="19050" rIns="38100" bIns="19050" anchor="ctr" anchorCtr="1">
+                <a:spAutoFit/>
+              </a:bodyPr>
+              <a:lstStyle/>
+              <a:p>
+                <a:pPr>
+                  <a:defRPr sz="1600" b="0" i="0" u="none" strike="noStrike" kern="1200" baseline="0">
+                    <a:solidFill>
+                      <a:schemeClr val="tx1">
+                        <a:lumMod val="75000"/>
+                        <a:lumOff val="25000"/>
+                      </a:schemeClr>
+                    </a:solidFill>
+                    <a:latin typeface="+mn-lt"/>
+                    <a:ea typeface="+mn-ea"/>
+                    <a:cs typeface="+mn-cs"/>
+                  </a:defRPr>
+                </a:pPr>
+                <a:endParaRPr lang="en-US"/>
+              </a:p>
+            </c:txPr>
+            <c:showLegendKey val="0"/>
+            <c:showVal val="1"/>
+            <c:showCatName val="0"/>
+            <c:showSerName val="0"/>
+            <c:showPercent val="0"/>
+            <c:showBubbleSize val="0"/>
+            <c:showLeaderLines val="0"/>
+            <c:extLst>
+              <c:ext xmlns:c15="http://schemas.microsoft.com/office/drawing/2012/chart" uri="{CE6537A1-D6FC-4f65-9D91-7224C49458BB}">
+                <c15:showLeaderLines val="1"/>
+                <c15:leaderLines>
+                  <c:spPr>
+                    <a:ln w="9525" cap="flat" cmpd="sng" algn="ctr">
+                      <a:solidFill>
+                        <a:schemeClr val="tx1">
+                          <a:lumMod val="35000"/>
+                          <a:lumOff val="65000"/>
+                        </a:schemeClr>
+                      </a:solidFill>
+                      <a:round/>
+                    </a:ln>
+                    <a:effectLst/>
+                  </c:spPr>
+                </c15:leaderLines>
+              </c:ext>
+            </c:extLst>
+          </c:dLbls>
+          <c:cat>
+            <c:strRef>
+              <c:f>Sheet1!$A$2:$A$9</c:f>
+              <c:strCache>
+                <c:ptCount val="8"/>
+                <c:pt idx="0">
+                  <c:v>ENTSO-E</c:v>
+                </c:pt>
+                <c:pt idx="1">
+                  <c:v>ASF (CIGS) ENTSO-E mix incl. shading benefits</c:v>
+                </c:pt>
+                <c:pt idx="2">
+                  <c:v>Static ASF (CIGS) ENTSO-E mix incl. shading benefits </c:v>
+                </c:pt>
+                <c:pt idx="3">
+                  <c:v>ASF (CIGS) ENTSO-E mix excl. shading benefits</c:v>
+                </c:pt>
+                <c:pt idx="4">
+                  <c:v>Static ASF (CIGS) ENTSO-E mix excl. shading benefits </c:v>
+                </c:pt>
+                <c:pt idx="5">
+                  <c:v>Poly-Si</c:v>
+                </c:pt>
+                <c:pt idx="6">
+                  <c:v>CIS</c:v>
+                </c:pt>
+                <c:pt idx="7">
+                  <c:v>CdTe</c:v>
+                </c:pt>
+              </c:strCache>
+            </c:strRef>
+          </c:cat>
+          <c:val>
+            <c:numRef>
+              <c:f>Sheet1!$B$2:$B$9</c:f>
+              <c:numCache>
+                <c:formatCode>General</c:formatCode>
+                <c:ptCount val="8"/>
+                <c:pt idx="0" formatCode="0.0">
+                  <c:v>462.1</c:v>
+                </c:pt>
+              </c:numCache>
+            </c:numRef>
+          </c:val>
+        </c:ser>
+        <c:ser>
+          <c:idx val="1"/>
+          <c:order val="1"/>
+          <c:tx>
+            <c:strRef>
+              <c:f>Sheet1!$C$1</c:f>
+              <c:strCache>
+                <c:ptCount val="1"/>
+                <c:pt idx="0">
+                  <c:v>Incl. shading benefits</c:v>
+                </c:pt>
+              </c:strCache>
+            </c:strRef>
+          </c:tx>
+          <c:spPr>
+            <a:solidFill>
+              <a:schemeClr val="accent1"/>
+            </a:solidFill>
+            <a:ln>
+              <a:noFill/>
+            </a:ln>
+            <a:effectLst/>
+          </c:spPr>
+          <c:invertIfNegative val="0"/>
+          <c:dPt>
+            <c:idx val="0"/>
+            <c:invertIfNegative val="0"/>
+            <c:bubble3D val="0"/>
+          </c:dPt>
+          <c:dLbls>
+            <c:dLbl>
+              <c:idx val="1"/>
+              <c:layout>
+                <c:manualLayout>
+                  <c:x val="0.0"/>
+                  <c:y val="-0.166580966198505"/>
+                </c:manualLayout>
+              </c:layout>
+              <c:showLegendKey val="0"/>
+              <c:showVal val="1"/>
+              <c:showCatName val="0"/>
+              <c:showSerName val="0"/>
+              <c:showPercent val="0"/>
+              <c:showBubbleSize val="0"/>
+              <c:extLst>
+                <c:ext xmlns:c15="http://schemas.microsoft.com/office/drawing/2012/chart" uri="{CE6537A1-D6FC-4f65-9D91-7224C49458BB}">
+                  <c15:layout/>
+                </c:ext>
+              </c:extLst>
+            </c:dLbl>
+            <c:dLbl>
+              <c:idx val="3"/>
+              <c:layout>
+                <c:manualLayout>
+                  <c:x val="0.0"/>
+                  <c:y val="-0.101139968381953"/>
+                </c:manualLayout>
+              </c:layout>
+              <c:showLegendKey val="0"/>
+              <c:showVal val="1"/>
+              <c:showCatName val="0"/>
+              <c:showSerName val="0"/>
+              <c:showPercent val="0"/>
+              <c:showBubbleSize val="0"/>
+              <c:extLst>
+                <c:ext xmlns:c15="http://schemas.microsoft.com/office/drawing/2012/chart" uri="{CE6537A1-D6FC-4f65-9D91-7224C49458BB}">
+                  <c15:layout/>
+                </c:ext>
+              </c:extLst>
+            </c:dLbl>
+            <c:spPr>
+              <a:noFill/>
+              <a:ln>
+                <a:noFill/>
+              </a:ln>
+              <a:effectLst/>
+            </c:spPr>
+            <c:txPr>
+              <a:bodyPr rot="0" spcFirstLastPara="1" vertOverflow="ellipsis" vert="horz" wrap="square" lIns="38100" tIns="19050" rIns="38100" bIns="19050" anchor="ctr" anchorCtr="1">
+                <a:spAutoFit/>
+              </a:bodyPr>
+              <a:lstStyle/>
+              <a:p>
+                <a:pPr>
+                  <a:defRPr sz="1600" b="0" i="0" u="none" strike="noStrike" kern="1200" baseline="0">
+                    <a:solidFill>
+                      <a:schemeClr val="tx1">
+                        <a:lumMod val="75000"/>
+                        <a:lumOff val="25000"/>
+                      </a:schemeClr>
+                    </a:solidFill>
+                    <a:latin typeface="+mn-lt"/>
+                    <a:ea typeface="+mn-ea"/>
+                    <a:cs typeface="+mn-cs"/>
+                  </a:defRPr>
+                </a:pPr>
+                <a:endParaRPr lang="en-US"/>
+              </a:p>
+            </c:txPr>
+            <c:showLegendKey val="0"/>
+            <c:showVal val="1"/>
+            <c:showCatName val="0"/>
+            <c:showSerName val="0"/>
+            <c:showPercent val="0"/>
+            <c:showBubbleSize val="0"/>
+            <c:showLeaderLines val="0"/>
+            <c:extLst>
+              <c:ext xmlns:c15="http://schemas.microsoft.com/office/drawing/2012/chart" uri="{CE6537A1-D6FC-4f65-9D91-7224C49458BB}">
+                <c15:layout/>
+                <c15:showLeaderLines val="1"/>
+                <c15:leaderLines>
+                  <c:spPr>
+                    <a:ln w="9525" cap="flat" cmpd="sng" algn="ctr">
+                      <a:solidFill>
+                        <a:schemeClr val="tx1">
+                          <a:lumMod val="35000"/>
+                          <a:lumOff val="65000"/>
+                        </a:schemeClr>
+                      </a:solidFill>
+                      <a:round/>
+                    </a:ln>
+                    <a:effectLst/>
+                  </c:spPr>
+                </c15:leaderLines>
+              </c:ext>
+            </c:extLst>
+          </c:dLbls>
+          <c:cat>
+            <c:strRef>
+              <c:f>Sheet1!$A$2:$A$9</c:f>
+              <c:strCache>
+                <c:ptCount val="8"/>
+                <c:pt idx="0">
+                  <c:v>ENTSO-E</c:v>
+                </c:pt>
+                <c:pt idx="1">
+                  <c:v>ASF (CIGS) ENTSO-E mix incl. shading benefits</c:v>
+                </c:pt>
+                <c:pt idx="2">
+                  <c:v>Static ASF (CIGS) ENTSO-E mix incl. shading benefits </c:v>
+                </c:pt>
+                <c:pt idx="3">
+                  <c:v>ASF (CIGS) ENTSO-E mix excl. shading benefits</c:v>
+                </c:pt>
+                <c:pt idx="4">
+                  <c:v>Static ASF (CIGS) ENTSO-E mix excl. shading benefits </c:v>
+                </c:pt>
+                <c:pt idx="5">
+                  <c:v>Poly-Si</c:v>
+                </c:pt>
+                <c:pt idx="6">
+                  <c:v>CIS</c:v>
+                </c:pt>
+                <c:pt idx="7">
+                  <c:v>CdTe</c:v>
+                </c:pt>
+              </c:strCache>
+            </c:strRef>
+          </c:cat>
+          <c:val>
+            <c:numRef>
+              <c:f>Sheet1!$C$2:$C$9</c:f>
+              <c:numCache>
+                <c:formatCode>0.0</c:formatCode>
+                <c:ptCount val="8"/>
+                <c:pt idx="1">
+                  <c:v>-537.0</c:v>
+                </c:pt>
+                <c:pt idx="2" formatCode="General">
+                  <c:v>0.0</c:v>
+                </c:pt>
+              </c:numCache>
+            </c:numRef>
+          </c:val>
+        </c:ser>
+        <c:ser>
+          <c:idx val="2"/>
+          <c:order val="2"/>
+          <c:tx>
+            <c:strRef>
+              <c:f>Sheet1!$D$1</c:f>
+              <c:strCache>
+                <c:ptCount val="1"/>
+                <c:pt idx="0">
+                  <c:v>Excl. shading benefits</c:v>
+                </c:pt>
+              </c:strCache>
+            </c:strRef>
+          </c:tx>
+          <c:spPr>
+            <a:solidFill>
+              <a:schemeClr val="accent2"/>
+            </a:solidFill>
+            <a:ln>
+              <a:noFill/>
+            </a:ln>
+            <a:effectLst/>
+          </c:spPr>
+          <c:invertIfNegative val="0"/>
+          <c:dLbls>
+            <c:dLbl>
+              <c:idx val="3"/>
+              <c:layout>
+                <c:manualLayout>
+                  <c:x val="-0.00268666504479538"/>
+                  <c:y val="-0.0862299436874334"/>
+                </c:manualLayout>
+              </c:layout>
+              <c:dLblPos val="ctr"/>
+              <c:showLegendKey val="0"/>
+              <c:showVal val="1"/>
+              <c:showCatName val="0"/>
+              <c:showSerName val="0"/>
+              <c:showPercent val="0"/>
+              <c:showBubbleSize val="0"/>
+              <c:extLst>
+                <c:ext xmlns:c15="http://schemas.microsoft.com/office/drawing/2012/chart" uri="{CE6537A1-D6FC-4f65-9D91-7224C49458BB}">
+                  <c15:layout/>
+                </c:ext>
+              </c:extLst>
+            </c:dLbl>
+            <c:dLbl>
+              <c:idx val="5"/>
+              <c:layout>
+                <c:manualLayout>
+                  <c:x val="-0.00134333252239769"/>
+                  <c:y val="-0.0529241371701132"/>
+                </c:manualLayout>
+              </c:layout>
+              <c:spPr>
+                <a:noFill/>
+                <a:ln>
+                  <a:noFill/>
+                </a:ln>
+                <a:effectLst/>
+              </c:spPr>
+              <c:txPr>
+                <a:bodyPr rot="0" spcFirstLastPara="1" vertOverflow="ellipsis" vert="horz" wrap="square" lIns="38100" tIns="19050" rIns="38100" bIns="19050" anchor="ctr" anchorCtr="1">
+                  <a:noAutofit/>
+                </a:bodyPr>
+                <a:lstStyle/>
+                <a:p>
+                  <a:pPr>
+                    <a:defRPr sz="1600" b="0" i="0" u="none" strike="noStrike" kern="1200" baseline="0">
+                      <a:solidFill>
+                        <a:schemeClr val="tx1">
+                          <a:lumMod val="75000"/>
+                          <a:lumOff val="25000"/>
+                        </a:schemeClr>
+                      </a:solidFill>
+                      <a:latin typeface="+mn-lt"/>
+                      <a:ea typeface="+mn-ea"/>
+                      <a:cs typeface="+mn-cs"/>
+                    </a:defRPr>
+                  </a:pPr>
+                  <a:endParaRPr lang="en-US"/>
+                </a:p>
+              </c:txPr>
+              <c:dLblPos val="ctr"/>
+              <c:showLegendKey val="0"/>
+              <c:showVal val="1"/>
+              <c:showCatName val="0"/>
+              <c:showSerName val="0"/>
+              <c:showPercent val="0"/>
+              <c:showBubbleSize val="0"/>
+              <c:extLst>
+                <c:ext xmlns:c15="http://schemas.microsoft.com/office/drawing/2012/chart" uri="{CE6537A1-D6FC-4f65-9D91-7224C49458BB}">
+                  <c15:spPr xmlns:c15="http://schemas.microsoft.com/office/drawing/2012/chart">
+                    <a:prstGeom prst="rect">
+                      <a:avLst/>
+                    </a:prstGeom>
+                  </c15:spPr>
+                  <c15:layout/>
+                </c:ext>
+              </c:extLst>
+            </c:dLbl>
+            <c:dLbl>
+              <c:idx val="6"/>
+              <c:layout>
+                <c:manualLayout>
+                  <c:x val="-0.00134333252239779"/>
+                  <c:y val="-0.047041845759048"/>
+                </c:manualLayout>
+              </c:layout>
+              <c:dLblPos val="ctr"/>
+              <c:showLegendKey val="0"/>
+              <c:showVal val="1"/>
+              <c:showCatName val="0"/>
+              <c:showSerName val="0"/>
+              <c:showPercent val="0"/>
+              <c:showBubbleSize val="0"/>
+              <c:extLst>
+                <c:ext xmlns:c15="http://schemas.microsoft.com/office/drawing/2012/chart" uri="{CE6537A1-D6FC-4f65-9D91-7224C49458BB}">
+                  <c15:layout/>
+                </c:ext>
+              </c:extLst>
+            </c:dLbl>
+            <c:dLbl>
+              <c:idx val="7"/>
+              <c:layout>
+                <c:manualLayout>
+                  <c:x val="-0.00268666504479538"/>
+                  <c:y val="-0.0439044511116109"/>
+                </c:manualLayout>
+              </c:layout>
+              <c:dLblPos val="ctr"/>
+              <c:showLegendKey val="0"/>
+              <c:showVal val="1"/>
+              <c:showCatName val="0"/>
+              <c:showSerName val="0"/>
+              <c:showPercent val="0"/>
+              <c:showBubbleSize val="0"/>
+              <c:extLst>
+                <c:ext xmlns:c15="http://schemas.microsoft.com/office/drawing/2012/chart" uri="{CE6537A1-D6FC-4f65-9D91-7224C49458BB}">
+                  <c15:layout/>
+                </c:ext>
+              </c:extLst>
+            </c:dLbl>
+            <c:spPr>
+              <a:noFill/>
+              <a:ln>
+                <a:noFill/>
+              </a:ln>
+              <a:effectLst/>
+            </c:spPr>
+            <c:txPr>
+              <a:bodyPr rot="0" spcFirstLastPara="1" vertOverflow="ellipsis" vert="horz" wrap="square" lIns="38100" tIns="19050" rIns="38100" bIns="19050" anchor="ctr" anchorCtr="1">
+                <a:spAutoFit/>
+              </a:bodyPr>
+              <a:lstStyle/>
+              <a:p>
+                <a:pPr>
+                  <a:defRPr sz="1600" b="0" i="0" u="none" strike="noStrike" kern="1200" baseline="0">
+                    <a:solidFill>
+                      <a:schemeClr val="tx1">
+                        <a:lumMod val="75000"/>
+                        <a:lumOff val="25000"/>
+                      </a:schemeClr>
+                    </a:solidFill>
+                    <a:latin typeface="+mn-lt"/>
+                    <a:ea typeface="+mn-ea"/>
+                    <a:cs typeface="+mn-cs"/>
+                  </a:defRPr>
+                </a:pPr>
+                <a:endParaRPr lang="en-US"/>
+              </a:p>
+            </c:txPr>
+            <c:dLblPos val="ctr"/>
+            <c:showLegendKey val="0"/>
+            <c:showVal val="1"/>
+            <c:showCatName val="0"/>
+            <c:showSerName val="0"/>
+            <c:showPercent val="0"/>
+            <c:showBubbleSize val="0"/>
+            <c:showLeaderLines val="0"/>
+            <c:extLst>
+              <c:ext xmlns:c15="http://schemas.microsoft.com/office/drawing/2012/chart" uri="{CE6537A1-D6FC-4f65-9D91-7224C49458BB}">
+                <c15:layout/>
+                <c15:showLeaderLines val="1"/>
+                <c15:leaderLines>
+                  <c:spPr>
+                    <a:ln w="9525" cap="flat" cmpd="sng" algn="ctr">
+                      <a:solidFill>
+                        <a:schemeClr val="tx1">
+                          <a:lumMod val="35000"/>
+                          <a:lumOff val="65000"/>
+                        </a:schemeClr>
+                      </a:solidFill>
+                      <a:round/>
+                    </a:ln>
+                    <a:effectLst/>
+                  </c:spPr>
+                </c15:leaderLines>
+              </c:ext>
+            </c:extLst>
+          </c:dLbls>
+          <c:cat>
+            <c:strRef>
+              <c:f>Sheet1!$A$2:$A$9</c:f>
+              <c:strCache>
+                <c:ptCount val="8"/>
+                <c:pt idx="0">
+                  <c:v>ENTSO-E</c:v>
+                </c:pt>
+                <c:pt idx="1">
+                  <c:v>ASF (CIGS) ENTSO-E mix incl. shading benefits</c:v>
+                </c:pt>
+                <c:pt idx="2">
+                  <c:v>Static ASF (CIGS) ENTSO-E mix incl. shading benefits </c:v>
+                </c:pt>
+                <c:pt idx="3">
+                  <c:v>ASF (CIGS) ENTSO-E mix excl. shading benefits</c:v>
+                </c:pt>
+                <c:pt idx="4">
+                  <c:v>Static ASF (CIGS) ENTSO-E mix excl. shading benefits </c:v>
+                </c:pt>
+                <c:pt idx="5">
+                  <c:v>Poly-Si</c:v>
+                </c:pt>
+                <c:pt idx="6">
+                  <c:v>CIS</c:v>
+                </c:pt>
+                <c:pt idx="7">
+                  <c:v>CdTe</c:v>
+                </c:pt>
+              </c:strCache>
+            </c:strRef>
+          </c:cat>
+          <c:val>
+            <c:numRef>
+              <c:f>Sheet1!$D$2:$D$9</c:f>
+              <c:numCache>
+                <c:formatCode>General</c:formatCode>
+                <c:ptCount val="8"/>
+                <c:pt idx="3">
+                  <c:v>227.1</c:v>
+                </c:pt>
+                <c:pt idx="4">
+                  <c:v>0.0</c:v>
+                </c:pt>
+                <c:pt idx="5" formatCode="0.0">
+                  <c:v>101.5</c:v>
+                </c:pt>
+                <c:pt idx="6" formatCode="0.0">
+                  <c:v>81.9</c:v>
+                </c:pt>
+                <c:pt idx="7" formatCode="0.0">
+                  <c:v>76.2</c:v>
+                </c:pt>
+              </c:numCache>
+            </c:numRef>
+          </c:val>
+        </c:ser>
+        <c:dLbls>
+          <c:showLegendKey val="0"/>
+          <c:showVal val="0"/>
+          <c:showCatName val="0"/>
+          <c:showSerName val="0"/>
+          <c:showPercent val="0"/>
+          <c:showBubbleSize val="0"/>
+        </c:dLbls>
+        <c:gapWidth val="219"/>
+        <c:overlap val="100"/>
+        <c:axId val="-2050594896"/>
+        <c:axId val="-2050864688"/>
+      </c:barChart>
+      <c:catAx>
+        <c:axId val="-2050594896"/>
+        <c:scaling>
+          <c:orientation val="minMax"/>
+        </c:scaling>
+        <c:delete val="1"/>
+        <c:axPos val="b"/>
+        <c:numFmt formatCode="General" sourceLinked="1"/>
+        <c:majorTickMark val="none"/>
+        <c:minorTickMark val="none"/>
+        <c:tickLblPos val="nextTo"/>
+        <c:crossAx val="-2050864688"/>
+        <c:crosses val="autoZero"/>
+        <c:auto val="1"/>
+        <c:lblAlgn val="ctr"/>
+        <c:lblOffset val="100"/>
+        <c:noMultiLvlLbl val="0"/>
+      </c:catAx>
+      <c:valAx>
+        <c:axId val="-2050864688"/>
+        <c:scaling>
+          <c:orientation val="minMax"/>
+        </c:scaling>
+        <c:delete val="0"/>
+        <c:axPos val="l"/>
+        <c:majorGridlines>
+          <c:spPr>
+            <a:ln w="9525" cap="flat" cmpd="sng" algn="ctr">
+              <a:solidFill>
+                <a:schemeClr val="tx1">
+                  <a:lumMod val="15000"/>
+                  <a:lumOff val="85000"/>
+                </a:schemeClr>
+              </a:solidFill>
+              <a:round/>
+            </a:ln>
+            <a:effectLst/>
+          </c:spPr>
+        </c:majorGridlines>
+        <c:title>
+          <c:tx>
+            <c:rich>
+              <a:bodyPr rot="-5400000" spcFirstLastPara="1" vertOverflow="ellipsis" vert="horz" wrap="square" anchor="ctr" anchorCtr="1"/>
+              <a:lstStyle/>
+              <a:p>
+                <a:pPr>
+                  <a:defRPr sz="2800" b="0" i="0" u="none" strike="noStrike" kern="1200" baseline="0">
+                    <a:solidFill>
+                      <a:schemeClr val="tx1">
+                        <a:lumMod val="65000"/>
+                        <a:lumOff val="35000"/>
+                      </a:schemeClr>
+                    </a:solidFill>
+                    <a:latin typeface="+mn-lt"/>
+                    <a:ea typeface="+mn-ea"/>
+                    <a:cs typeface="+mn-cs"/>
+                  </a:defRPr>
+                </a:pPr>
+                <a:r>
+                  <a:rPr lang="en-US" sz="2800" b="0" i="0" baseline="0" dirty="0" smtClean="0">
+                    <a:effectLst/>
+                  </a:rPr>
+                  <a:t>GWP (g CO</a:t>
+                </a:r>
+                <a:r>
+                  <a:rPr lang="en-US" sz="2800" b="0" i="0" baseline="-25000" dirty="0" smtClean="0">
+                    <a:effectLst/>
+                  </a:rPr>
+                  <a:t>2eq</a:t>
+                </a:r>
+                <a:r>
+                  <a:rPr lang="en-US" sz="2800" b="0" i="0" baseline="0" dirty="0" smtClean="0">
+                    <a:effectLst/>
+                  </a:rPr>
+                  <a:t>/</a:t>
+                </a:r>
+                <a:r>
+                  <a:rPr lang="en-US" sz="2800" b="0" i="0" baseline="0" dirty="0" err="1" smtClean="0">
+                    <a:effectLst/>
+                  </a:rPr>
+                  <a:t>kWh</a:t>
+                </a:r>
+                <a:r>
+                  <a:rPr lang="en-US" sz="2800" b="0" i="0" baseline="-25000" dirty="0" err="1" smtClean="0">
+                    <a:effectLst/>
+                  </a:rPr>
+                  <a:t>pv</a:t>
+                </a:r>
+                <a:r>
+                  <a:rPr lang="en-US" sz="2800" b="0" i="0" baseline="0" dirty="0" smtClean="0">
+                    <a:effectLst/>
+                  </a:rPr>
+                  <a:t>)</a:t>
+                </a:r>
+                <a:endParaRPr lang="en-US" sz="2800" dirty="0">
+                  <a:effectLst/>
+                </a:endParaRPr>
+              </a:p>
+            </c:rich>
+          </c:tx>
+          <c:layout>
+            <c:manualLayout>
+              <c:xMode val="edge"/>
+              <c:yMode val="edge"/>
+              <c:x val="0.0"/>
+              <c:y val="0.137813912025085"/>
+            </c:manualLayout>
+          </c:layout>
+          <c:overlay val="0"/>
+          <c:spPr>
+            <a:noFill/>
+            <a:ln>
+              <a:noFill/>
+            </a:ln>
+            <a:effectLst/>
+          </c:spPr>
+        </c:title>
+        <c:numFmt formatCode="0.0" sourceLinked="1"/>
+        <c:majorTickMark val="none"/>
+        <c:minorTickMark val="none"/>
+        <c:tickLblPos val="nextTo"/>
+        <c:spPr>
+          <a:noFill/>
+          <a:ln>
+            <a:noFill/>
+          </a:ln>
+          <a:effectLst/>
+        </c:spPr>
+        <c:txPr>
+          <a:bodyPr rot="-60000000" spcFirstLastPara="1" vertOverflow="ellipsis" vert="horz" wrap="square" anchor="ctr" anchorCtr="1"/>
+          <a:lstStyle/>
+          <a:p>
+            <a:pPr>
+              <a:defRPr sz="1800" b="0" i="0" u="none" strike="noStrike" kern="1200" baseline="0">
+                <a:solidFill>
+                  <a:schemeClr val="tx1">
+                    <a:lumMod val="65000"/>
+                    <a:lumOff val="35000"/>
+                  </a:schemeClr>
+                </a:solidFill>
+                <a:latin typeface="+mn-lt"/>
+                <a:ea typeface="+mn-ea"/>
+                <a:cs typeface="+mn-cs"/>
+              </a:defRPr>
+            </a:pPr>
+            <a:endParaRPr lang="en-US"/>
+          </a:p>
+        </c:txPr>
+        <c:crossAx val="-2050594896"/>
+        <c:crosses val="autoZero"/>
+        <c:crossBetween val="between"/>
+      </c:valAx>
+      <c:spPr>
+        <a:noFill/>
+        <a:ln>
+          <a:solidFill>
+            <a:schemeClr val="accent3"/>
+          </a:solidFill>
+        </a:ln>
+        <a:effectLst/>
+      </c:spPr>
+    </c:plotArea>
+    <c:legend>
+      <c:legendPos val="b"/>
+      <c:layout>
+        <c:manualLayout>
+          <c:xMode val="edge"/>
+          <c:yMode val="edge"/>
+          <c:x val="0.150854867200474"/>
+          <c:y val="0.941149356666363"/>
+          <c:w val="0.75202356649496"/>
+          <c:h val="0.0586117321622506"/>
+        </c:manualLayout>
+      </c:layout>
+      <c:overlay val="0"/>
+      <c:spPr>
+        <a:noFill/>
+        <a:ln>
+          <a:noFill/>
+        </a:ln>
+        <a:effectLst/>
+      </c:spPr>
+      <c:txPr>
+        <a:bodyPr rot="0" spcFirstLastPara="1" vertOverflow="ellipsis" vert="horz" wrap="square" anchor="ctr" anchorCtr="1"/>
+        <a:lstStyle/>
+        <a:p>
+          <a:pPr>
+            <a:defRPr sz="2000" b="0" i="0" u="none" strike="noStrike" kern="1200" baseline="0">
+              <a:solidFill>
+                <a:schemeClr val="tx1">
+                  <a:lumMod val="65000"/>
+                  <a:lumOff val="35000"/>
+                </a:schemeClr>
+              </a:solidFill>
+              <a:latin typeface="+mn-lt"/>
+              <a:ea typeface="+mn-ea"/>
+              <a:cs typeface="+mn-cs"/>
+            </a:defRPr>
+          </a:pPr>
+          <a:endParaRPr lang="en-US"/>
+        </a:p>
+      </c:txPr>
+    </c:legend>
+    <c:plotVisOnly val="1"/>
+    <c:dispBlanksAs val="gap"/>
+    <c:showDLblsOverMax val="0"/>
+  </c:chart>
+  <c:spPr>
+    <a:noFill/>
+    <a:ln>
+      <a:noFill/>
+    </a:ln>
+    <a:effectLst/>
+  </c:spPr>
+  <c:txPr>
+    <a:bodyPr/>
+    <a:lstStyle/>
+    <a:p>
+      <a:pPr>
+        <a:defRPr/>
+      </a:pPr>
+      <a:endParaRPr lang="en-US"/>
+    </a:p>
+  </c:txPr>
+  <c:externalData r:id="rId1">
+    <c:autoUpdate val="0"/>
+  </c:externalData>
+</c:chartSpace>
+</file>
+
+<file path=ppt/charts/chart22.xml><?xml version="1.0" encoding="utf-8"?>
 <c:chartSpace xmlns:c="http://schemas.openxmlformats.org/drawingml/2006/chart" xmlns:a="http://schemas.openxmlformats.org/drawingml/2006/main" xmlns:r="http://schemas.openxmlformats.org/officeDocument/2006/relationships">
   <c:date1904 val="0"/>
   <c:lang val="en-US"/>
@@ -7815,11 +8616,11 @@
         </c:dLbls>
         <c:gapWidth val="219"/>
         <c:overlap val="100"/>
-        <c:axId val="-2101373648"/>
-        <c:axId val="-2101368576"/>
+        <c:axId val="-2046428320"/>
+        <c:axId val="-2046146864"/>
       </c:barChart>
       <c:catAx>
-        <c:axId val="-2101373648"/>
+        <c:axId val="-2046428320"/>
         <c:scaling>
           <c:orientation val="minMax"/>
         </c:scaling>
@@ -7862,7 +8663,7 @@
             <a:endParaRPr lang="en-US"/>
           </a:p>
         </c:txPr>
-        <c:crossAx val="-2101368576"/>
+        <c:crossAx val="-2046146864"/>
         <c:crosses val="autoZero"/>
         <c:auto val="1"/>
         <c:lblAlgn val="ctr"/>
@@ -7870,7 +8671,7 @@
         <c:noMultiLvlLbl val="0"/>
       </c:catAx>
       <c:valAx>
-        <c:axId val="-2101368576"/>
+        <c:axId val="-2046146864"/>
         <c:scaling>
           <c:orientation val="minMax"/>
         </c:scaling>
@@ -7921,7 +8722,6 @@
               </a:p>
             </c:rich>
           </c:tx>
-          <c:layout/>
           <c:overlay val="0"/>
           <c:spPr>
             <a:noFill/>
@@ -7962,7 +8762,7 @@
             <a:endParaRPr lang="en-US"/>
           </a:p>
         </c:txPr>
-        <c:crossAx val="-2101373648"/>
+        <c:crossAx val="-2046428320"/>
         <c:crosses val="autoZero"/>
         <c:crossBetween val="between"/>
       </c:valAx>
@@ -7978,7 +8778,6 @@
     </c:plotArea>
     <c:legend>
       <c:legendPos val="b"/>
-      <c:layout/>
       <c:overlay val="0"/>
       <c:spPr>
         <a:noFill/>
@@ -8035,7 +8834,7 @@
 </c:chartSpace>
 </file>
 
-<file path=ppt/charts/chart22.xml><?xml version="1.0" encoding="utf-8"?>
+<file path=ppt/charts/chart23.xml><?xml version="1.0" encoding="utf-8"?>
 <c:chartSpace xmlns:c="http://schemas.openxmlformats.org/drawingml/2006/chart" xmlns:a="http://schemas.openxmlformats.org/drawingml/2006/main" xmlns:r="http://schemas.openxmlformats.org/officeDocument/2006/relationships">
   <c:date1904 val="0"/>
   <c:lang val="en-US"/>
@@ -8202,11 +9001,11 @@
         </c:dLbls>
         <c:gapWidth val="219"/>
         <c:overlap val="100"/>
-        <c:axId val="-2125408704"/>
-        <c:axId val="-2125141920"/>
+        <c:axId val="-2049344912"/>
+        <c:axId val="-2080874144"/>
       </c:barChart>
       <c:catAx>
-        <c:axId val="-2125408704"/>
+        <c:axId val="-2049344912"/>
         <c:scaling>
           <c:orientation val="minMax"/>
         </c:scaling>
@@ -8216,7 +9015,7 @@
         <c:majorTickMark val="none"/>
         <c:minorTickMark val="none"/>
         <c:tickLblPos val="nextTo"/>
-        <c:crossAx val="-2125141920"/>
+        <c:crossAx val="-2080874144"/>
         <c:crosses val="autoZero"/>
         <c:auto val="1"/>
         <c:lblAlgn val="ctr"/>
@@ -8224,7 +9023,7 @@
         <c:noMultiLvlLbl val="0"/>
       </c:catAx>
       <c:valAx>
-        <c:axId val="-2125141920"/>
+        <c:axId val="-2080874144"/>
         <c:scaling>
           <c:orientation val="minMax"/>
         </c:scaling>
@@ -8305,7 +9104,6 @@
               </a:p>
             </c:rich>
           </c:tx>
-          <c:layout/>
           <c:overlay val="0"/>
           <c:spPr>
             <a:noFill/>
@@ -8366,7 +9164,7 @@
             <a:endParaRPr lang="en-US"/>
           </a:p>
         </c:txPr>
-        <c:crossAx val="-2125408704"/>
+        <c:crossAx val="-2049344912"/>
         <c:crosses val="autoZero"/>
         <c:crossBetween val="between"/>
         <c:majorUnit val="100.0"/>
@@ -8493,7 +9291,6 @@
             <c:showLeaderLines val="0"/>
             <c:extLst>
               <c:ext xmlns:c15="http://schemas.microsoft.com/office/drawing/2012/chart" uri="{CE6537A1-D6FC-4f65-9D91-7224C49458BB}">
-                <c15:layout/>
                 <c15:showLeaderLines val="1"/>
                 <c15:leaderLines>
                   <c:spPr>
@@ -8623,7 +9420,6 @@
             <c:showLeaderLines val="0"/>
             <c:extLst>
               <c:ext xmlns:c15="http://schemas.microsoft.com/office/drawing/2012/chart" uri="{CE6537A1-D6FC-4f65-9D91-7224C49458BB}">
-                <c15:layout/>
                 <c15:showLeaderLines val="1"/>
                 <c15:leaderLines>
                   <c:spPr>
@@ -8694,11 +9490,11 @@
         </c:dLbls>
         <c:gapWidth val="219"/>
         <c:overlap val="-27"/>
-        <c:axId val="2141083840"/>
-        <c:axId val="2141087248"/>
+        <c:axId val="-2049441008"/>
+        <c:axId val="-2049130112"/>
       </c:barChart>
       <c:catAx>
-        <c:axId val="2141083840"/>
+        <c:axId val="-2049441008"/>
         <c:scaling>
           <c:orientation val="minMax"/>
         </c:scaling>
@@ -8738,7 +9534,7 @@
             <a:endParaRPr lang="en-US"/>
           </a:p>
         </c:txPr>
-        <c:crossAx val="2141087248"/>
+        <c:crossAx val="-2049130112"/>
         <c:crosses val="autoZero"/>
         <c:auto val="1"/>
         <c:lblAlgn val="ctr"/>
@@ -8746,7 +9542,7 @@
         <c:noMultiLvlLbl val="0"/>
       </c:catAx>
       <c:valAx>
-        <c:axId val="2141087248"/>
+        <c:axId val="-2049130112"/>
         <c:scaling>
           <c:orientation val="minMax"/>
         </c:scaling>
@@ -8817,7 +9613,6 @@
               </a:p>
             </c:rich>
           </c:tx>
-          <c:layout/>
           <c:overlay val="0"/>
           <c:spPr>
             <a:noFill/>
@@ -8880,7 +9675,7 @@
             <a:endParaRPr lang="en-US"/>
           </a:p>
         </c:txPr>
-        <c:crossAx val="2141083840"/>
+        <c:crossAx val="-2049441008"/>
         <c:crosses val="autoZero"/>
         <c:crossBetween val="between"/>
       </c:valAx>
@@ -8896,7 +9691,6 @@
     </c:plotArea>
     <c:legend>
       <c:legendPos val="b"/>
-      <c:layout/>
       <c:overlay val="0"/>
       <c:spPr>
         <a:noFill/>
@@ -9038,7 +9832,6 @@
             <c:showLeaderLines val="0"/>
             <c:extLst>
               <c:ext xmlns:c15="http://schemas.microsoft.com/office/drawing/2012/chart" uri="{CE6537A1-D6FC-4f65-9D91-7224C49458BB}">
-                <c15:layout/>
                 <c15:showLeaderLines val="1"/>
                 <c15:leaderLines>
                   <c:spPr>
@@ -9168,7 +9961,6 @@
             <c:showLeaderLines val="0"/>
             <c:extLst>
               <c:ext xmlns:c15="http://schemas.microsoft.com/office/drawing/2012/chart" uri="{CE6537A1-D6FC-4f65-9D91-7224C49458BB}">
-                <c15:layout/>
                 <c15:showLeaderLines val="1"/>
                 <c15:leaderLines>
                   <c:spPr>
@@ -9293,7 +10085,6 @@
             <c:showLeaderLines val="0"/>
             <c:extLst>
               <c:ext xmlns:c15="http://schemas.microsoft.com/office/drawing/2012/chart" uri="{CE6537A1-D6FC-4f65-9D91-7224C49458BB}">
-                <c15:layout/>
                 <c15:showLeaderLines val="1"/>
                 <c15:leaderLines>
                   <c:spPr>
@@ -9418,7 +10209,6 @@
             <c:showLeaderLines val="0"/>
             <c:extLst>
               <c:ext xmlns:c15="http://schemas.microsoft.com/office/drawing/2012/chart" uri="{CE6537A1-D6FC-4f65-9D91-7224C49458BB}">
-                <c15:layout/>
                 <c15:showLeaderLines val="1"/>
                 <c15:leaderLines>
                   <c:spPr>
@@ -9489,11 +10279,11 @@
         </c:dLbls>
         <c:gapWidth val="219"/>
         <c:overlap val="-27"/>
-        <c:axId val="2141164432"/>
-        <c:axId val="2141167776"/>
+        <c:axId val="-2050384256"/>
+        <c:axId val="-2050080208"/>
       </c:barChart>
       <c:catAx>
-        <c:axId val="2141164432"/>
+        <c:axId val="-2050384256"/>
         <c:scaling>
           <c:orientation val="minMax"/>
         </c:scaling>
@@ -9533,7 +10323,7 @@
             <a:endParaRPr lang="en-US"/>
           </a:p>
         </c:txPr>
-        <c:crossAx val="2141167776"/>
+        <c:crossAx val="-2050080208"/>
         <c:crosses val="autoZero"/>
         <c:auto val="1"/>
         <c:lblAlgn val="ctr"/>
@@ -9541,7 +10331,7 @@
         <c:noMultiLvlLbl val="0"/>
       </c:catAx>
       <c:valAx>
-        <c:axId val="2141167776"/>
+        <c:axId val="-2050080208"/>
         <c:scaling>
           <c:orientation val="minMax"/>
         </c:scaling>
@@ -9617,7 +10407,6 @@
               </a:p>
             </c:rich>
           </c:tx>
-          <c:layout/>
           <c:overlay val="0"/>
           <c:spPr>
             <a:noFill/>
@@ -9680,7 +10469,7 @@
             <a:endParaRPr lang="en-US"/>
           </a:p>
         </c:txPr>
-        <c:crossAx val="2141164432"/>
+        <c:crossAx val="-2050384256"/>
         <c:crosses val="autoZero"/>
         <c:crossBetween val="between"/>
       </c:valAx>
@@ -9696,7 +10485,6 @@
     </c:plotArea>
     <c:legend>
       <c:legendPos val="b"/>
-      <c:layout/>
       <c:overlay val="0"/>
       <c:spPr>
         <a:noFill/>
@@ -10072,11 +10860,11 @@
         </c:dLbls>
         <c:gapWidth val="219"/>
         <c:overlap val="-27"/>
-        <c:axId val="2146041024"/>
-        <c:axId val="2146044448"/>
+        <c:axId val="-2144315232"/>
+        <c:axId val="-2050366448"/>
       </c:barChart>
       <c:catAx>
-        <c:axId val="2146041024"/>
+        <c:axId val="-2144315232"/>
         <c:scaling>
           <c:orientation val="minMax"/>
         </c:scaling>
@@ -10116,7 +10904,7 @@
             <a:endParaRPr lang="en-US"/>
           </a:p>
         </c:txPr>
-        <c:crossAx val="2146044448"/>
+        <c:crossAx val="-2050366448"/>
         <c:crosses val="autoZero"/>
         <c:auto val="1"/>
         <c:lblAlgn val="ctr"/>
@@ -10124,7 +10912,7 @@
         <c:noMultiLvlLbl val="0"/>
       </c:catAx>
       <c:valAx>
-        <c:axId val="2146044448"/>
+        <c:axId val="-2050366448"/>
         <c:scaling>
           <c:orientation val="minMax"/>
         </c:scaling>
@@ -10192,7 +10980,6 @@
               </a:p>
             </c:rich>
           </c:tx>
-          <c:layout/>
           <c:overlay val="0"/>
           <c:spPr>
             <a:noFill/>
@@ -10255,7 +11042,7 @@
             <a:endParaRPr lang="en-US"/>
           </a:p>
         </c:txPr>
-        <c:crossAx val="2146041024"/>
+        <c:crossAx val="-2144315232"/>
         <c:crosses val="autoZero"/>
         <c:crossBetween val="between"/>
       </c:valAx>
@@ -10271,7 +11058,6 @@
     </c:plotArea>
     <c:legend>
       <c:legendPos val="b"/>
-      <c:layout/>
       <c:overlay val="0"/>
       <c:spPr>
         <a:noFill/>
@@ -10425,11 +11211,11 @@
         </c:dLbls>
         <c:gapWidth val="219"/>
         <c:overlap val="-27"/>
-        <c:axId val="2146057952"/>
-        <c:axId val="2145948432"/>
+        <c:axId val="-2046514160"/>
+        <c:axId val="-2046510800"/>
       </c:barChart>
       <c:catAx>
-        <c:axId val="2146057952"/>
+        <c:axId val="-2046514160"/>
         <c:scaling>
           <c:orientation val="minMax"/>
         </c:scaling>
@@ -10469,7 +11255,7 @@
             <a:endParaRPr lang="en-US"/>
           </a:p>
         </c:txPr>
-        <c:crossAx val="2145948432"/>
+        <c:crossAx val="-2046510800"/>
         <c:crosses val="autoZero"/>
         <c:auto val="1"/>
         <c:lblAlgn val="ctr"/>
@@ -10477,7 +11263,7 @@
         <c:noMultiLvlLbl val="0"/>
       </c:catAx>
       <c:valAx>
-        <c:axId val="2145948432"/>
+        <c:axId val="-2046510800"/>
         <c:scaling>
           <c:orientation val="minMax"/>
         </c:scaling>
@@ -10545,7 +11331,6 @@
               </a:p>
             </c:rich>
           </c:tx>
-          <c:layout/>
           <c:overlay val="0"/>
           <c:spPr>
             <a:noFill/>
@@ -10608,7 +11393,7 @@
             <a:endParaRPr lang="en-US"/>
           </a:p>
         </c:txPr>
-        <c:crossAx val="2146057952"/>
+        <c:crossAx val="-2046514160"/>
         <c:crosses val="autoZero"/>
         <c:crossBetween val="between"/>
       </c:valAx>
@@ -10918,11 +11703,11 @@
         </c:dLbls>
         <c:gapWidth val="219"/>
         <c:overlap val="100"/>
-        <c:axId val="2146016784"/>
-        <c:axId val="2146020144"/>
+        <c:axId val="-2080799936"/>
+        <c:axId val="-2080796576"/>
       </c:barChart>
       <c:catAx>
-        <c:axId val="2146016784"/>
+        <c:axId val="-2080799936"/>
         <c:scaling>
           <c:orientation val="minMax"/>
         </c:scaling>
@@ -10965,7 +11750,7 @@
             <a:endParaRPr lang="en-US"/>
           </a:p>
         </c:txPr>
-        <c:crossAx val="2146020144"/>
+        <c:crossAx val="-2080796576"/>
         <c:crosses val="autoZero"/>
         <c:auto val="1"/>
         <c:lblAlgn val="ctr"/>
@@ -10973,7 +11758,7 @@
         <c:noMultiLvlLbl val="0"/>
       </c:catAx>
       <c:valAx>
-        <c:axId val="2146020144"/>
+        <c:axId val="-2080796576"/>
         <c:scaling>
           <c:orientation val="minMax"/>
         </c:scaling>
@@ -11024,7 +11809,6 @@
               </a:p>
             </c:rich>
           </c:tx>
-          <c:layout/>
           <c:overlay val="0"/>
           <c:spPr>
             <a:noFill/>
@@ -11085,7 +11869,7 @@
             <a:endParaRPr lang="en-US"/>
           </a:p>
         </c:txPr>
-        <c:crossAx val="2146016784"/>
+        <c:crossAx val="-2080799936"/>
         <c:crosses val="autoZero"/>
         <c:crossBetween val="between"/>
       </c:valAx>
@@ -11376,9 +12160,7 @@
               </c:spPr>
             </c:leaderLines>
             <c:extLst>
-              <c:ext xmlns:c15="http://schemas.microsoft.com/office/drawing/2012/chart" uri="{CE6537A1-D6FC-4f65-9D91-7224C49458BB}">
-                <c15:layout/>
-              </c:ext>
+              <c:ext xmlns:c15="http://schemas.microsoft.com/office/drawing/2012/chart" uri="{CE6537A1-D6FC-4f65-9D91-7224C49458BB}"/>
             </c:extLst>
           </c:dLbls>
           <c:cat>
@@ -11682,9 +12464,7 @@
               </c:spPr>
             </c:leaderLines>
             <c:extLst>
-              <c:ext xmlns:c15="http://schemas.microsoft.com/office/drawing/2012/chart" uri="{CE6537A1-D6FC-4f65-9D91-7224C49458BB}">
-                <c15:layout/>
-              </c:ext>
+              <c:ext xmlns:c15="http://schemas.microsoft.com/office/drawing/2012/chart" uri="{CE6537A1-D6FC-4f65-9D91-7224C49458BB}"/>
             </c:extLst>
           </c:dLbls>
           <c:cat>
@@ -22585,7 +23365,7 @@
     </p:spTree>
     <p:extLst>
       <p:ext uri="{BB962C8B-B14F-4D97-AF65-F5344CB8AC3E}">
-        <p14:creationId xmlns:p14="http://schemas.microsoft.com/office/powerpoint/2010/main" val="546872044"/>
+        <p14:creationId xmlns:p14="http://schemas.microsoft.com/office/powerpoint/2010/main" val="1553132159"/>
       </p:ext>
     </p:extLst>
   </p:cSld>
@@ -22735,9 +23515,12 @@
           <a:p>
             <a:r>
               <a:rPr lang="en-US" dirty="0" smtClean="0"/>
-              <a:t>Sensitivity</a:t>
+              <a:t>GWP in g-CO2eq/kWh</a:t>
             </a:r>
-            <a:endParaRPr lang="en-US" baseline="0" dirty="0" smtClean="0"/>
+            <a:r>
+              <a:rPr lang="en-US" baseline="0" dirty="0" smtClean="0"/>
+              <a:t> solar production</a:t>
+            </a:r>
           </a:p>
         </p:txBody>
       </p:sp>
@@ -22767,6 +23550,99 @@
     </p:spTree>
     <p:extLst>
       <p:ext uri="{BB962C8B-B14F-4D97-AF65-F5344CB8AC3E}">
+        <p14:creationId xmlns:p14="http://schemas.microsoft.com/office/powerpoint/2010/main" val="546872044"/>
+      </p:ext>
+    </p:extLst>
+  </p:cSld>
+  <p:clrMapOvr>
+    <a:masterClrMapping/>
+  </p:clrMapOvr>
+</p:notes>
+</file>
+
+<file path=ppt/notesSlides/notesSlide21.xml><?xml version="1.0" encoding="utf-8"?>
+<p:notes xmlns:a="http://schemas.openxmlformats.org/drawingml/2006/main" xmlns:r="http://schemas.openxmlformats.org/officeDocument/2006/relationships" xmlns:p="http://schemas.openxmlformats.org/presentationml/2006/main">
+  <p:cSld>
+    <p:spTree>
+      <p:nvGrpSpPr>
+        <p:cNvPr id="1" name=""/>
+        <p:cNvGrpSpPr/>
+        <p:nvPr/>
+      </p:nvGrpSpPr>
+      <p:grpSpPr>
+        <a:xfrm>
+          <a:off x="0" y="0"/>
+          <a:ext cx="0" cy="0"/>
+          <a:chOff x="0" y="0"/>
+          <a:chExt cx="0" cy="0"/>
+        </a:xfrm>
+      </p:grpSpPr>
+      <p:sp>
+        <p:nvSpPr>
+          <p:cNvPr id="2" name="Slide Image Placeholder 1"/>
+          <p:cNvSpPr>
+            <a:spLocks noGrp="1" noRot="1" noChangeAspect="1"/>
+          </p:cNvSpPr>
+          <p:nvPr>
+            <p:ph type="sldImg"/>
+          </p:nvPr>
+        </p:nvSpPr>
+        <p:spPr>
+          <a:xfrm>
+            <a:off x="1200150" y="1143000"/>
+            <a:ext cx="4457700" cy="3086100"/>
+          </a:xfrm>
+        </p:spPr>
+      </p:sp>
+      <p:sp>
+        <p:nvSpPr>
+          <p:cNvPr id="3" name="Notes Placeholder 2"/>
+          <p:cNvSpPr>
+            <a:spLocks noGrp="1"/>
+          </p:cNvSpPr>
+          <p:nvPr>
+            <p:ph type="body" idx="1"/>
+          </p:nvPr>
+        </p:nvSpPr>
+        <p:spPr/>
+        <p:txBody>
+          <a:bodyPr/>
+          <a:lstStyle/>
+          <a:p>
+            <a:r>
+              <a:rPr lang="en-US" dirty="0" smtClean="0"/>
+              <a:t>Sensitivity</a:t>
+            </a:r>
+            <a:endParaRPr lang="en-US" baseline="0" dirty="0" smtClean="0"/>
+          </a:p>
+        </p:txBody>
+      </p:sp>
+      <p:sp>
+        <p:nvSpPr>
+          <p:cNvPr id="4" name="Slide Number Placeholder 3"/>
+          <p:cNvSpPr>
+            <a:spLocks noGrp="1"/>
+          </p:cNvSpPr>
+          <p:nvPr>
+            <p:ph type="sldNum" sz="quarter" idx="10"/>
+          </p:nvPr>
+        </p:nvSpPr>
+        <p:spPr/>
+        <p:txBody>
+          <a:bodyPr/>
+          <a:lstStyle/>
+          <a:p>
+            <a:fld id="{CBB4D0D9-A80C-8E44-A98C-B80FACCCE6B7}" type="slidenum">
+              <a:rPr lang="en-US" smtClean="0"/>
+              <a:t>21</a:t>
+            </a:fld>
+            <a:endParaRPr lang="en-US"/>
+          </a:p>
+        </p:txBody>
+      </p:sp>
+    </p:spTree>
+    <p:extLst>
+      <p:ext uri="{BB962C8B-B14F-4D97-AF65-F5344CB8AC3E}">
         <p14:creationId xmlns:p14="http://schemas.microsoft.com/office/powerpoint/2010/main" val="1001962961"/>
       </p:ext>
     </p:extLst>
@@ -22777,7 +23653,7 @@
 </p:notes>
 </file>
 
-<file path=ppt/notesSlides/notesSlide21.xml><?xml version="1.0" encoding="utf-8"?>
+<file path=ppt/notesSlides/notesSlide22.xml><?xml version="1.0" encoding="utf-8"?>
 <p:notes xmlns:a="http://schemas.openxmlformats.org/drawingml/2006/main" xmlns:r="http://schemas.openxmlformats.org/officeDocument/2006/relationships" xmlns:p="http://schemas.openxmlformats.org/presentationml/2006/main">
   <p:cSld>
     <p:spTree>
@@ -22847,7 +23723,7 @@
           <a:p>
             <a:fld id="{CBB4D0D9-A80C-8E44-A98C-B80FACCCE6B7}" type="slidenum">
               <a:rPr lang="en-US" smtClean="0"/>
-              <a:t>21</a:t>
+              <a:t>22</a:t>
             </a:fld>
             <a:endParaRPr lang="en-US"/>
           </a:p>
@@ -28496,27 +29372,7 @@
                   </a:schemeClr>
                 </a:solidFill>
               </a:rPr>
-              <a:t>ASF (CIGS) </a:t>
-            </a:r>
-            <a:r>
-              <a:rPr lang="en-US" sz="1600" dirty="0" smtClean="0">
-                <a:solidFill>
-                  <a:schemeClr val="bg2">
-                    <a:lumMod val="25000"/>
-                  </a:schemeClr>
-                </a:solidFill>
-              </a:rPr>
-              <a:t>CH </a:t>
-            </a:r>
-            <a:r>
-              <a:rPr lang="en-US" sz="1600" dirty="0" smtClean="0">
-                <a:solidFill>
-                  <a:schemeClr val="bg2">
-                    <a:lumMod val="25000"/>
-                  </a:schemeClr>
-                </a:solidFill>
-              </a:rPr>
-              <a:t>mix incl. shading benefits</a:t>
+              <a:t>ASF (CIGS) CH mix incl. shading benefits</a:t>
             </a:r>
           </a:p>
         </p:txBody>
@@ -28554,13 +29410,6 @@
               </a:rPr>
               <a:t>CH</a:t>
             </a:r>
-            <a:endParaRPr lang="en-US" sz="1600" dirty="0" smtClean="0">
-              <a:solidFill>
-                <a:schemeClr val="bg2">
-                  <a:lumMod val="25000"/>
-                </a:schemeClr>
-              </a:solidFill>
-            </a:endParaRPr>
           </a:p>
         </p:txBody>
       </p:sp>
@@ -28608,14 +29457,14 @@
           <p:nvPr>
             <p:extLst>
               <p:ext uri="{D42A27DB-BD31-4B8C-83A1-F6EECF244321}">
-                <p14:modId xmlns:p14="http://schemas.microsoft.com/office/powerpoint/2010/main" val="3348548957"/>
+                <p14:modId xmlns:p14="http://schemas.microsoft.com/office/powerpoint/2010/main" val="1232312632"/>
               </p:ext>
             </p:extLst>
           </p:nvPr>
         </p:nvGraphicFramePr>
         <p:xfrm>
-          <a:off x="560439" y="1327355"/>
-          <a:ext cx="8775289" cy="4955457"/>
+          <a:off x="222637" y="340242"/>
+          <a:ext cx="9454100" cy="5891225"/>
         </p:xfrm>
         <a:graphic>
           <a:graphicData uri="http://schemas.openxmlformats.org/drawingml/2006/chart">
@@ -28623,10 +29472,483 @@
           </a:graphicData>
         </a:graphic>
       </p:graphicFrame>
+      <p:sp>
+        <p:nvSpPr>
+          <p:cNvPr id="3" name="TextBox 2"/>
+          <p:cNvSpPr txBox="1"/>
+          <p:nvPr/>
+        </p:nvSpPr>
+        <p:spPr>
+          <a:xfrm>
+            <a:off x="9746166" y="2709746"/>
+            <a:ext cx="184731" cy="369332"/>
+          </a:xfrm>
+          <a:prstGeom prst="rect">
+            <a:avLst/>
+          </a:prstGeom>
+          <a:noFill/>
+        </p:spPr>
+        <p:txBody>
+          <a:bodyPr wrap="none" rtlCol="0">
+            <a:spAutoFit/>
+          </a:bodyPr>
+          <a:lstStyle/>
+          <a:p>
+            <a:endParaRPr lang="en-US" dirty="0"/>
+          </a:p>
+        </p:txBody>
+      </p:sp>
+      <p:sp>
+        <p:nvSpPr>
+          <p:cNvPr id="4" name="TextBox 3"/>
+          <p:cNvSpPr txBox="1"/>
+          <p:nvPr/>
+        </p:nvSpPr>
+        <p:spPr>
+          <a:xfrm>
+            <a:off x="1429633" y="4341886"/>
+            <a:ext cx="1152000" cy="338554"/>
+          </a:xfrm>
+          <a:prstGeom prst="rect">
+            <a:avLst/>
+          </a:prstGeom>
+          <a:noFill/>
+        </p:spPr>
+        <p:txBody>
+          <a:bodyPr wrap="square" rtlCol="0">
+            <a:spAutoFit/>
+          </a:bodyPr>
+          <a:lstStyle/>
+          <a:p>
+            <a:pPr algn="ctr"/>
+            <a:r>
+              <a:rPr lang="en-US" sz="1600" dirty="0" smtClean="0">
+                <a:solidFill>
+                  <a:schemeClr val="bg2">
+                    <a:lumMod val="25000"/>
+                  </a:schemeClr>
+                </a:solidFill>
+              </a:rPr>
+              <a:t>ENTSO-E</a:t>
+            </a:r>
+          </a:p>
+        </p:txBody>
+      </p:sp>
+      <p:sp>
+        <p:nvSpPr>
+          <p:cNvPr id="6" name="TextBox 5"/>
+          <p:cNvSpPr txBox="1"/>
+          <p:nvPr/>
+        </p:nvSpPr>
+        <p:spPr>
+          <a:xfrm>
+            <a:off x="2424391" y="4341886"/>
+            <a:ext cx="1152000" cy="830997"/>
+          </a:xfrm>
+          <a:prstGeom prst="rect">
+            <a:avLst/>
+          </a:prstGeom>
+          <a:noFill/>
+        </p:spPr>
+        <p:txBody>
+          <a:bodyPr wrap="square" rtlCol="0">
+            <a:spAutoFit/>
+          </a:bodyPr>
+          <a:lstStyle/>
+          <a:p>
+            <a:pPr algn="ctr"/>
+            <a:r>
+              <a:rPr lang="en-US" sz="1600" dirty="0" smtClean="0">
+                <a:solidFill>
+                  <a:schemeClr val="bg2">
+                    <a:lumMod val="25000"/>
+                  </a:schemeClr>
+                </a:solidFill>
+              </a:rPr>
+              <a:t>ASF (CIGS) ENTSO-E </a:t>
+            </a:r>
+            <a:r>
+              <a:rPr lang="en-US" sz="1600" dirty="0" smtClean="0">
+                <a:solidFill>
+                  <a:schemeClr val="bg2">
+                    <a:lumMod val="25000"/>
+                  </a:schemeClr>
+                </a:solidFill>
+              </a:rPr>
+              <a:t>mix</a:t>
+            </a:r>
+            <a:endParaRPr lang="en-US" sz="1600" dirty="0" smtClean="0">
+              <a:solidFill>
+                <a:schemeClr val="bg2">
+                  <a:lumMod val="25000"/>
+                </a:schemeClr>
+              </a:solidFill>
+            </a:endParaRPr>
+          </a:p>
+        </p:txBody>
+      </p:sp>
+      <p:sp>
+        <p:nvSpPr>
+          <p:cNvPr id="7" name="TextBox 6"/>
+          <p:cNvSpPr txBox="1"/>
+          <p:nvPr/>
+        </p:nvSpPr>
+        <p:spPr>
+          <a:xfrm>
+            <a:off x="3419149" y="4341886"/>
+            <a:ext cx="1152000" cy="1077218"/>
+          </a:xfrm>
+          <a:prstGeom prst="rect">
+            <a:avLst/>
+          </a:prstGeom>
+          <a:noFill/>
+        </p:spPr>
+        <p:txBody>
+          <a:bodyPr wrap="square" rtlCol="0">
+            <a:spAutoFit/>
+          </a:bodyPr>
+          <a:lstStyle/>
+          <a:p>
+            <a:pPr algn="ctr"/>
+            <a:r>
+              <a:rPr lang="en-US" sz="1600" dirty="0" smtClean="0">
+                <a:solidFill>
+                  <a:schemeClr val="bg2">
+                    <a:lumMod val="25000"/>
+                  </a:schemeClr>
+                </a:solidFill>
+              </a:rPr>
+              <a:t>Static ASF </a:t>
+            </a:r>
+            <a:r>
+              <a:rPr lang="en-US" sz="1600" dirty="0" smtClean="0">
+                <a:solidFill>
+                  <a:schemeClr val="bg2">
+                    <a:lumMod val="25000"/>
+                  </a:schemeClr>
+                </a:solidFill>
+              </a:rPr>
+              <a:t>(CIGS) ENTSO-E </a:t>
+            </a:r>
+            <a:r>
+              <a:rPr lang="en-US" sz="1600" dirty="0" smtClean="0">
+                <a:solidFill>
+                  <a:schemeClr val="bg2">
+                    <a:lumMod val="25000"/>
+                  </a:schemeClr>
+                </a:solidFill>
+              </a:rPr>
+              <a:t>mix</a:t>
+            </a:r>
+            <a:endParaRPr lang="en-US" sz="1600" dirty="0" smtClean="0">
+              <a:solidFill>
+                <a:schemeClr val="bg2">
+                  <a:lumMod val="25000"/>
+                </a:schemeClr>
+              </a:solidFill>
+            </a:endParaRPr>
+          </a:p>
+        </p:txBody>
+      </p:sp>
+      <p:sp>
+        <p:nvSpPr>
+          <p:cNvPr id="9" name="TextBox 8"/>
+          <p:cNvSpPr txBox="1"/>
+          <p:nvPr/>
+        </p:nvSpPr>
+        <p:spPr>
+          <a:xfrm>
+            <a:off x="6403423" y="4341886"/>
+            <a:ext cx="1152000" cy="338554"/>
+          </a:xfrm>
+          <a:prstGeom prst="rect">
+            <a:avLst/>
+          </a:prstGeom>
+          <a:noFill/>
+        </p:spPr>
+        <p:txBody>
+          <a:bodyPr wrap="square" rtlCol="0">
+            <a:spAutoFit/>
+          </a:bodyPr>
+          <a:lstStyle/>
+          <a:p>
+            <a:pPr algn="ctr"/>
+            <a:r>
+              <a:rPr lang="en-US" sz="1600" smtClean="0">
+                <a:solidFill>
+                  <a:schemeClr val="bg2">
+                    <a:lumMod val="25000"/>
+                  </a:schemeClr>
+                </a:solidFill>
+              </a:rPr>
+              <a:t>Poly-</a:t>
+            </a:r>
+            <a:r>
+              <a:rPr lang="en-US" sz="1600">
+                <a:solidFill>
+                  <a:schemeClr val="bg2">
+                    <a:lumMod val="25000"/>
+                  </a:schemeClr>
+                </a:solidFill>
+              </a:rPr>
+              <a:t>S</a:t>
+            </a:r>
+            <a:r>
+              <a:rPr lang="en-US" sz="1600" smtClean="0">
+                <a:solidFill>
+                  <a:schemeClr val="bg2">
+                    <a:lumMod val="25000"/>
+                  </a:schemeClr>
+                </a:solidFill>
+              </a:rPr>
+              <a:t>i</a:t>
+            </a:r>
+            <a:endParaRPr lang="en-US" sz="1600" dirty="0" smtClean="0">
+              <a:solidFill>
+                <a:schemeClr val="bg2">
+                  <a:lumMod val="25000"/>
+                </a:schemeClr>
+              </a:solidFill>
+            </a:endParaRPr>
+          </a:p>
+        </p:txBody>
+      </p:sp>
+      <p:sp>
+        <p:nvSpPr>
+          <p:cNvPr id="10" name="TextBox 9"/>
+          <p:cNvSpPr txBox="1"/>
+          <p:nvPr/>
+        </p:nvSpPr>
+        <p:spPr>
+          <a:xfrm>
+            <a:off x="7398181" y="4341886"/>
+            <a:ext cx="1152000" cy="338554"/>
+          </a:xfrm>
+          <a:prstGeom prst="rect">
+            <a:avLst/>
+          </a:prstGeom>
+          <a:noFill/>
+        </p:spPr>
+        <p:txBody>
+          <a:bodyPr wrap="square" rtlCol="0">
+            <a:spAutoFit/>
+          </a:bodyPr>
+          <a:lstStyle/>
+          <a:p>
+            <a:pPr algn="ctr"/>
+            <a:r>
+              <a:rPr lang="en-US" sz="1600" dirty="0" smtClean="0">
+                <a:solidFill>
+                  <a:schemeClr val="bg2">
+                    <a:lumMod val="25000"/>
+                  </a:schemeClr>
+                </a:solidFill>
+              </a:rPr>
+              <a:t>CIS</a:t>
+            </a:r>
+          </a:p>
+        </p:txBody>
+      </p:sp>
+      <p:sp>
+        <p:nvSpPr>
+          <p:cNvPr id="11" name="TextBox 10"/>
+          <p:cNvSpPr txBox="1"/>
+          <p:nvPr/>
+        </p:nvSpPr>
+        <p:spPr>
+          <a:xfrm>
+            <a:off x="8392942" y="4341886"/>
+            <a:ext cx="1152000" cy="338554"/>
+          </a:xfrm>
+          <a:prstGeom prst="rect">
+            <a:avLst/>
+          </a:prstGeom>
+          <a:noFill/>
+        </p:spPr>
+        <p:txBody>
+          <a:bodyPr wrap="square" rtlCol="0">
+            <a:spAutoFit/>
+          </a:bodyPr>
+          <a:lstStyle/>
+          <a:p>
+            <a:pPr algn="ctr"/>
+            <a:r>
+              <a:rPr lang="en-US" sz="1600" dirty="0" err="1" smtClean="0">
+                <a:solidFill>
+                  <a:schemeClr val="bg2">
+                    <a:lumMod val="25000"/>
+                  </a:schemeClr>
+                </a:solidFill>
+              </a:rPr>
+              <a:t>CdTe</a:t>
+            </a:r>
+            <a:endParaRPr lang="en-US" sz="1600" dirty="0" smtClean="0">
+              <a:solidFill>
+                <a:schemeClr val="bg2">
+                  <a:lumMod val="25000"/>
+                </a:schemeClr>
+              </a:solidFill>
+            </a:endParaRPr>
+          </a:p>
+        </p:txBody>
+      </p:sp>
+      <p:cxnSp>
+        <p:nvCxnSpPr>
+          <p:cNvPr id="12" name="Straight Connector 11"/>
+          <p:cNvCxnSpPr/>
+          <p:nvPr/>
+        </p:nvCxnSpPr>
+        <p:spPr>
+          <a:xfrm>
+            <a:off x="1514695" y="2406553"/>
+            <a:ext cx="7992012" cy="0"/>
+          </a:xfrm>
+          <a:prstGeom prst="line">
+            <a:avLst/>
+          </a:prstGeom>
+          <a:ln>
+            <a:solidFill>
+              <a:schemeClr val="bg2">
+                <a:lumMod val="50000"/>
+              </a:schemeClr>
+            </a:solidFill>
+          </a:ln>
+        </p:spPr>
+        <p:style>
+          <a:lnRef idx="1">
+            <a:schemeClr val="accent1"/>
+          </a:lnRef>
+          <a:fillRef idx="0">
+            <a:schemeClr val="accent1"/>
+          </a:fillRef>
+          <a:effectRef idx="0">
+            <a:schemeClr val="accent1"/>
+          </a:effectRef>
+          <a:fontRef idx="minor">
+            <a:schemeClr val="tx1"/>
+          </a:fontRef>
+        </p:style>
+      </p:cxnSp>
+      <p:sp>
+        <p:nvSpPr>
+          <p:cNvPr id="14" name="TextBox 13"/>
+          <p:cNvSpPr txBox="1"/>
+          <p:nvPr/>
+        </p:nvSpPr>
+        <p:spPr>
+          <a:xfrm>
+            <a:off x="4413907" y="4341886"/>
+            <a:ext cx="1152000" cy="830997"/>
+          </a:xfrm>
+          <a:prstGeom prst="rect">
+            <a:avLst/>
+          </a:prstGeom>
+          <a:noFill/>
+        </p:spPr>
+        <p:txBody>
+          <a:bodyPr wrap="square" rtlCol="0">
+            <a:spAutoFit/>
+          </a:bodyPr>
+          <a:lstStyle/>
+          <a:p>
+            <a:pPr algn="ctr"/>
+            <a:r>
+              <a:rPr lang="en-US" sz="1600" dirty="0" smtClean="0">
+                <a:solidFill>
+                  <a:schemeClr val="bg2">
+                    <a:lumMod val="25000"/>
+                  </a:schemeClr>
+                </a:solidFill>
+              </a:rPr>
+              <a:t>ASF (CIGS) ENTSO-E </a:t>
+            </a:r>
+            <a:r>
+              <a:rPr lang="en-US" sz="1600" dirty="0" smtClean="0">
+                <a:solidFill>
+                  <a:schemeClr val="bg2">
+                    <a:lumMod val="25000"/>
+                  </a:schemeClr>
+                </a:solidFill>
+              </a:rPr>
+              <a:t>mix</a:t>
+            </a:r>
+            <a:endParaRPr lang="en-US" sz="1600" dirty="0" smtClean="0">
+              <a:solidFill>
+                <a:schemeClr val="bg2">
+                  <a:lumMod val="25000"/>
+                </a:schemeClr>
+              </a:solidFill>
+            </a:endParaRPr>
+          </a:p>
+        </p:txBody>
+      </p:sp>
+      <p:sp>
+        <p:nvSpPr>
+          <p:cNvPr id="15" name="TextBox 14"/>
+          <p:cNvSpPr txBox="1"/>
+          <p:nvPr/>
+        </p:nvSpPr>
+        <p:spPr>
+          <a:xfrm>
+            <a:off x="5408665" y="4341886"/>
+            <a:ext cx="1152000" cy="1077218"/>
+          </a:xfrm>
+          <a:prstGeom prst="rect">
+            <a:avLst/>
+          </a:prstGeom>
+          <a:noFill/>
+        </p:spPr>
+        <p:txBody>
+          <a:bodyPr wrap="square" rtlCol="0">
+            <a:spAutoFit/>
+          </a:bodyPr>
+          <a:lstStyle/>
+          <a:p>
+            <a:pPr algn="ctr"/>
+            <a:r>
+              <a:rPr lang="en-US" sz="1600" dirty="0" smtClean="0">
+                <a:solidFill>
+                  <a:schemeClr val="bg2">
+                    <a:lumMod val="25000"/>
+                  </a:schemeClr>
+                </a:solidFill>
+              </a:rPr>
+              <a:t>Static ASF </a:t>
+            </a:r>
+            <a:r>
+              <a:rPr lang="en-US" sz="1600" dirty="0" smtClean="0">
+                <a:solidFill>
+                  <a:schemeClr val="bg2">
+                    <a:lumMod val="25000"/>
+                  </a:schemeClr>
+                </a:solidFill>
+              </a:rPr>
+              <a:t>(CIGS) ENTSO-E </a:t>
+            </a:r>
+            <a:r>
+              <a:rPr lang="en-US" sz="1600" dirty="0" smtClean="0">
+                <a:solidFill>
+                  <a:schemeClr val="bg2">
+                    <a:lumMod val="25000"/>
+                  </a:schemeClr>
+                </a:solidFill>
+              </a:rPr>
+              <a:t>mix</a:t>
+            </a:r>
+            <a:endParaRPr lang="en-US" sz="1600" dirty="0" smtClean="0">
+              <a:solidFill>
+                <a:schemeClr val="bg2">
+                  <a:lumMod val="25000"/>
+                </a:schemeClr>
+              </a:solidFill>
+            </a:endParaRPr>
+          </a:p>
+        </p:txBody>
+      </p:sp>
     </p:spTree>
     <p:extLst>
       <p:ext uri="{BB962C8B-B14F-4D97-AF65-F5344CB8AC3E}">
-        <p14:creationId xmlns:p14="http://schemas.microsoft.com/office/powerpoint/2010/main" val="458372275"/>
+        <p14:creationId xmlns:p14="http://schemas.microsoft.com/office/powerpoint/2010/main" val="2013669776"/>
       </p:ext>
     </p:extLst>
   </p:cSld>
@@ -28703,6 +30025,65 @@
 </file>
 
 <file path=ppt/slides/slide20.xml><?xml version="1.0" encoding="utf-8"?>
+<p:sld xmlns:a="http://schemas.openxmlformats.org/drawingml/2006/main" xmlns:r="http://schemas.openxmlformats.org/officeDocument/2006/relationships" xmlns:p="http://schemas.openxmlformats.org/presentationml/2006/main">
+  <p:cSld>
+    <p:spTree>
+      <p:nvGrpSpPr>
+        <p:cNvPr id="1" name=""/>
+        <p:cNvGrpSpPr/>
+        <p:nvPr/>
+      </p:nvGrpSpPr>
+      <p:grpSpPr>
+        <a:xfrm>
+          <a:off x="0" y="0"/>
+          <a:ext cx="0" cy="0"/>
+          <a:chOff x="0" y="0"/>
+          <a:chExt cx="0" cy="0"/>
+        </a:xfrm>
+      </p:grpSpPr>
+      <p:graphicFrame>
+        <p:nvGraphicFramePr>
+          <p:cNvPr id="2" name="Chart 1"/>
+          <p:cNvGraphicFramePr/>
+          <p:nvPr>
+            <p:extLst>
+              <p:ext uri="{D42A27DB-BD31-4B8C-83A1-F6EECF244321}">
+                <p14:modId xmlns:p14="http://schemas.microsoft.com/office/powerpoint/2010/main" val="3348548957"/>
+              </p:ext>
+            </p:extLst>
+          </p:nvPr>
+        </p:nvGraphicFramePr>
+        <p:xfrm>
+          <a:off x="560439" y="1327355"/>
+          <a:ext cx="8775289" cy="4955457"/>
+        </p:xfrm>
+        <a:graphic>
+          <a:graphicData uri="http://schemas.openxmlformats.org/drawingml/2006/chart">
+            <c:chart xmlns:c="http://schemas.openxmlformats.org/drawingml/2006/chart" xmlns:r="http://schemas.openxmlformats.org/officeDocument/2006/relationships" r:id="rId3"/>
+          </a:graphicData>
+        </a:graphic>
+      </p:graphicFrame>
+    </p:spTree>
+    <p:extLst>
+      <p:ext uri="{BB962C8B-B14F-4D97-AF65-F5344CB8AC3E}">
+        <p14:creationId xmlns:p14="http://schemas.microsoft.com/office/powerpoint/2010/main" val="458372275"/>
+      </p:ext>
+    </p:extLst>
+  </p:cSld>
+  <p:clrMapOvr>
+    <a:masterClrMapping/>
+  </p:clrMapOvr>
+  <p:timing>
+    <p:tnLst>
+      <p:par>
+        <p:cTn id="1" dur="indefinite" restart="never" nodeType="tmRoot"/>
+      </p:par>
+    </p:tnLst>
+  </p:timing>
+</p:sld>
+</file>
+
+<file path=ppt/slides/slide21.xml><?xml version="1.0" encoding="utf-8"?>
 <p:sld xmlns:a="http://schemas.openxmlformats.org/drawingml/2006/main" xmlns:r="http://schemas.openxmlformats.org/officeDocument/2006/relationships" xmlns:p="http://schemas.openxmlformats.org/presentationml/2006/main">
   <p:cSld>
     <p:spTree>
@@ -29171,7 +30552,7 @@
 </p:sld>
 </file>
 
-<file path=ppt/slides/slide21.xml><?xml version="1.0" encoding="utf-8"?>
+<file path=ppt/slides/slide22.xml><?xml version="1.0" encoding="utf-8"?>
 <p:sld xmlns:a="http://schemas.openxmlformats.org/drawingml/2006/main" xmlns:r="http://schemas.openxmlformats.org/officeDocument/2006/relationships" xmlns:p="http://schemas.openxmlformats.org/presentationml/2006/main">
   <p:cSld>
     <p:spTree>

</xml_diff>

<commit_message>
changes minor in graph layout
</commit_message>
<xml_diff>
--- a/elsarticle/Images/Thesis charts.pptx
+++ b/elsarticle/Images/Thesis charts.pptx
@@ -7559,8 +7559,8 @@
               <c:idx val="0"/>
               <c:layout>
                 <c:manualLayout>
-                  <c:x val="0.00134333252239769"/>
-                  <c:y val="-0.145829721853049"/>
+                  <c:x val="-0.0026866650447954"/>
+                  <c:y val="-0.139362526469452"/>
                 </c:manualLayout>
               </c:layout>
               <c:showLegendKey val="0"/>
@@ -7731,7 +7731,7 @@
               <c:layout>
                 <c:manualLayout>
                   <c:x val="-0.00268666504479543"/>
-                  <c:y val="-0.16383672326214"/>
+                  <c:y val="-0.148746313372855"/>
                 </c:manualLayout>
               </c:layout>
               <c:showLegendKey val="0"/>
@@ -7859,7 +7859,7 @@
                 <c:formatCode>0.0</c:formatCode>
                 <c:ptCount val="8"/>
                 <c:pt idx="1">
-                  <c:v>-537.0</c:v>
+                  <c:v>-601.1</c:v>
                 </c:pt>
                 <c:pt idx="2" formatCode="General">
                   <c:v>-507.6</c:v>
@@ -7898,7 +7898,7 @@
               <c:layout>
                 <c:manualLayout>
                   <c:x val="-0.00268666504479538"/>
-                  <c:y val="-0.0862299436874334"/>
+                  <c:y val="-0.0797626979108759"/>
                 </c:manualLayout>
               </c:layout>
               <c:dLblPos val="ctr"/>
@@ -7919,7 +7919,7 @@
               <c:layout>
                 <c:manualLayout>
                   <c:x val="-0.00268666504479538"/>
-                  <c:y val="-0.0948529380561768"/>
+                  <c:y val="-0.0840741950952476"/>
                 </c:manualLayout>
               </c:layout>
               <c:dLblPos val="ctr"/>
@@ -7940,7 +7940,7 @@
               <c:layout>
                 <c:manualLayout>
                   <c:x val="-0.00268666504479538"/>
-                  <c:y val="-0.149932823818476"/>
+                  <c:y val="-0.130531086488803"/>
                 </c:manualLayout>
               </c:layout>
               <c:spPr>
@@ -8016,7 +8016,7 @@
               <c:layout>
                 <c:manualLayout>
                   <c:x val="-0.00268666504479538"/>
-                  <c:y val="-0.0676176856256551"/>
+                  <c:y val="-0.0589946912569118"/>
                 </c:manualLayout>
               </c:layout>
               <c:dLblPos val="ctr"/>
@@ -29549,7 +29549,7 @@
           <p:nvPr>
             <p:extLst>
               <p:ext uri="{D42A27DB-BD31-4B8C-83A1-F6EECF244321}">
-                <p14:modId xmlns:p14="http://schemas.microsoft.com/office/powerpoint/2010/main" val="578947198"/>
+                <p14:modId xmlns:p14="http://schemas.microsoft.com/office/powerpoint/2010/main" val="1005413543"/>
               </p:ext>
             </p:extLst>
           </p:nvPr>
@@ -29872,7 +29872,7 @@
         </p:nvCxnSpPr>
         <p:spPr>
           <a:xfrm>
-            <a:off x="1514695" y="2406553"/>
+            <a:off x="1514695" y="2149377"/>
             <a:ext cx="7992012" cy="0"/>
           </a:xfrm>
           <a:prstGeom prst="line">

</xml_diff>

<commit_message>
all graphs ppt updated
</commit_message>
<xml_diff>
--- a/elsarticle/Images/Thesis charts.pptx
+++ b/elsarticle/Images/Thesis charts.pptx
@@ -9022,13 +9022,13 @@
                 <c:formatCode>General</c:formatCode>
                 <c:ptCount val="3"/>
                 <c:pt idx="0">
-                  <c:v>-792.9</c:v>
+                  <c:v>-887.5</c:v>
                 </c:pt>
                 <c:pt idx="1">
-                  <c:v>-525.7</c:v>
+                  <c:v>-588.4</c:v>
                 </c:pt>
                 <c:pt idx="2">
-                  <c:v>-535.6</c:v>
+                  <c:v>-599.5</c:v>
                 </c:pt>
               </c:numCache>
             </c:numRef>
@@ -9084,13 +9084,13 @@
                 <c:formatCode>General</c:formatCode>
                 <c:ptCount val="3"/>
                 <c:pt idx="0">
-                  <c:v>63.1</c:v>
+                  <c:v>70.6</c:v>
                 </c:pt>
                 <c:pt idx="1">
-                  <c:v>-11.3</c:v>
+                  <c:v>-12.70000000000005</c:v>
                 </c:pt>
                 <c:pt idx="2">
-                  <c:v>-1.4</c:v>
+                  <c:v>-1.600000000000023</c:v>
                 </c:pt>
               </c:numCache>
             </c:numRef>
@@ -30318,14 +30318,14 @@
           <p:nvPr>
             <p:extLst>
               <p:ext uri="{D42A27DB-BD31-4B8C-83A1-F6EECF244321}">
-                <p14:modId xmlns:p14="http://schemas.microsoft.com/office/powerpoint/2010/main" val="439134882"/>
+                <p14:modId xmlns:p14="http://schemas.microsoft.com/office/powerpoint/2010/main" val="164860294"/>
               </p:ext>
             </p:extLst>
           </p:nvPr>
         </p:nvGraphicFramePr>
         <p:xfrm>
           <a:off x="722210" y="919284"/>
-          <a:ext cx="8329612" cy="4319587"/>
+          <a:ext cx="8478940" cy="4319587"/>
         </p:xfrm>
         <a:graphic>
           <a:graphicData uri="http://schemas.openxmlformats.org/drawingml/2006/chart">
@@ -30341,7 +30341,7 @@
         </p:nvCxnSpPr>
         <p:spPr>
           <a:xfrm>
-            <a:off x="2035527" y="3965873"/>
+            <a:off x="2135541" y="3737266"/>
             <a:ext cx="6858439" cy="0"/>
           </a:xfrm>
           <a:prstGeom prst="line">
@@ -30377,8 +30377,8 @@
         </p:nvSpPr>
         <p:spPr>
           <a:xfrm>
-            <a:off x="2238723" y="5083718"/>
-            <a:ext cx="1800000" cy="1200328"/>
+            <a:off x="2378423" y="5083718"/>
+            <a:ext cx="1800000" cy="1015663"/>
           </a:xfrm>
           <a:prstGeom prst="rect">
             <a:avLst/>
@@ -30393,7 +30393,7 @@
           <a:p>
             <a:pPr algn="ctr"/>
             <a:r>
-              <a:rPr lang="en-US" sz="2400" dirty="0" smtClean="0">
+              <a:rPr lang="en-US" sz="2000" dirty="0" smtClean="0">
                 <a:solidFill>
                   <a:schemeClr val="bg2">
                     <a:lumMod val="25000"/>
@@ -30413,8 +30413,8 @@
         </p:nvSpPr>
         <p:spPr>
           <a:xfrm>
-            <a:off x="4513850" y="5083718"/>
-            <a:ext cx="1800000" cy="830997"/>
+            <a:off x="4704350" y="5083718"/>
+            <a:ext cx="1800000" cy="707886"/>
           </a:xfrm>
           <a:prstGeom prst="rect">
             <a:avLst/>
@@ -30429,7 +30429,7 @@
           <a:p>
             <a:pPr algn="ctr"/>
             <a:r>
-              <a:rPr lang="en-US" sz="2400" dirty="0" smtClean="0">
+              <a:rPr lang="en-US" sz="2000" dirty="0" smtClean="0">
                 <a:solidFill>
                   <a:schemeClr val="bg2">
                     <a:lumMod val="25000"/>
@@ -30449,8 +30449,8 @@
         </p:nvSpPr>
         <p:spPr>
           <a:xfrm>
-            <a:off x="6839776" y="5083718"/>
-            <a:ext cx="1800000" cy="1200328"/>
+            <a:off x="6979476" y="5083718"/>
+            <a:ext cx="1800000" cy="707886"/>
           </a:xfrm>
           <a:prstGeom prst="rect">
             <a:avLst/>
@@ -30465,7 +30465,7 @@
           <a:p>
             <a:pPr algn="ctr"/>
             <a:r>
-              <a:rPr lang="en-US" sz="2400" dirty="0" smtClean="0">
+              <a:rPr lang="en-US" sz="2000" dirty="0" smtClean="0">
                 <a:solidFill>
                   <a:schemeClr val="bg2">
                     <a:lumMod val="25000"/>
@@ -30478,7 +30478,7 @@
           <a:p>
             <a:pPr algn="ctr"/>
             <a:r>
-              <a:rPr lang="en-US" sz="2400" dirty="0" smtClean="0">
+              <a:rPr lang="en-US" sz="2000" dirty="0" smtClean="0">
                 <a:solidFill>
                   <a:schemeClr val="bg2">
                     <a:lumMod val="25000"/>
@@ -30498,8 +30498,8 @@
         </p:nvCxnSpPr>
         <p:spPr>
           <a:xfrm>
-            <a:off x="2035527" y="1811128"/>
-            <a:ext cx="6822438" cy="0"/>
+            <a:off x="2126015" y="1768264"/>
+            <a:ext cx="6912000" cy="0"/>
           </a:xfrm>
           <a:prstGeom prst="line">
             <a:avLst/>
@@ -30535,7 +30535,7 @@
         </p:nvSpPr>
         <p:spPr>
           <a:xfrm>
-            <a:off x="2904190" y="1202267"/>
+            <a:off x="3049694" y="1202267"/>
             <a:ext cx="451566" cy="369332"/>
           </a:xfrm>
           <a:prstGeom prst="rect">
@@ -30565,7 +30565,7 @@
         </p:nvSpPr>
         <p:spPr>
           <a:xfrm>
-            <a:off x="2927971" y="4646654"/>
+            <a:off x="3055781" y="4646654"/>
             <a:ext cx="439393" cy="369332"/>
           </a:xfrm>
           <a:prstGeom prst="rect">
@@ -30595,8 +30595,8 @@
         </p:nvSpPr>
         <p:spPr>
           <a:xfrm>
-            <a:off x="5053852" y="3248107"/>
-            <a:ext cx="712041" cy="369332"/>
+            <a:off x="5219469" y="3325683"/>
+            <a:ext cx="712054" cy="369332"/>
           </a:xfrm>
           <a:prstGeom prst="rect">
             <a:avLst/>
@@ -30625,7 +30625,7 @@
         </p:nvSpPr>
         <p:spPr>
           <a:xfrm>
-            <a:off x="4910015" y="3857708"/>
+            <a:off x="5101649" y="3723061"/>
             <a:ext cx="1005403" cy="646331"/>
           </a:xfrm>
           <a:prstGeom prst="rect">
@@ -30644,6 +30644,7 @@
               <a:rPr lang="en-GB" dirty="0" smtClean="0"/>
               <a:t>Soft</a:t>
             </a:r>
+            <a:endParaRPr lang="en-GB" dirty="0" smtClean="0"/>
           </a:p>
           <a:p>
             <a:pPr algn="ctr"/>
@@ -30663,8 +30664,8 @@
         </p:nvSpPr>
         <p:spPr>
           <a:xfrm>
-            <a:off x="7204387" y="3325683"/>
-            <a:ext cx="1101684" cy="369332"/>
+            <a:off x="7327883" y="3325683"/>
+            <a:ext cx="1103186" cy="369332"/>
           </a:xfrm>
           <a:prstGeom prst="rect">
             <a:avLst/>
@@ -30679,7 +30680,7 @@
           <a:p>
             <a:pPr algn="ctr"/>
             <a:r>
-              <a:rPr lang="en-GB" dirty="0" smtClean="0"/>
+              <a:rPr lang="en-GB" smtClean="0"/>
               <a:t>Individual</a:t>
             </a:r>
             <a:endParaRPr lang="en-GB" dirty="0"/>
@@ -30694,8 +30695,8 @@
         </p:nvSpPr>
         <p:spPr>
           <a:xfrm>
-            <a:off x="7456861" y="3871549"/>
-            <a:ext cx="596738" cy="369332"/>
+            <a:off x="7583818" y="3723061"/>
+            <a:ext cx="591316" cy="369332"/>
           </a:xfrm>
           <a:prstGeom prst="rect">
             <a:avLst/>
@@ -30710,7 +30711,7 @@
           <a:p>
             <a:pPr algn="ctr"/>
             <a:r>
-              <a:rPr lang="en-GB" dirty="0" smtClean="0"/>
+              <a:rPr lang="en-GB" smtClean="0"/>
               <a:t>Row</a:t>
             </a:r>
             <a:endParaRPr lang="en-GB" dirty="0"/>

</xml_diff>

<commit_message>
changed graphs, edited text everywhere
</commit_message>
<xml_diff>
--- a/elsarticle/Images/Thesis charts.pptx
+++ b/elsarticle/Images/Thesis charts.pptx
@@ -132,7 +132,7 @@
   </p:defaultTextStyle>
   <p:extLst>
     <p:ext uri="{EFAFB233-063F-42B5-8137-9DF3F51BA10A}">
-      <p15:sldGuideLst xmlns:p15="http://schemas.microsoft.com/office/powerpoint/2012/main">
+      <p15:sldGuideLst xmlns:p15="http://schemas.microsoft.com/office/powerpoint/2012/main" xmlns="">
         <p15:guide id="1" orient="horz" pos="2160">
           <p15:clr>
             <a:srgbClr val="A4A3A4"/>
@@ -428,11 +428,11 @@
           <c:showPercent val="0"/>
           <c:showBubbleSize val="0"/>
         </c:dLbls>
-        <c:axId val="-2069692352"/>
-        <c:axId val="-2054292432"/>
+        <c:axId val="-2117822536"/>
+        <c:axId val="-2112843992"/>
       </c:scatterChart>
       <c:valAx>
-        <c:axId val="-2069692352"/>
+        <c:axId val="-2117822536"/>
         <c:scaling>
           <c:orientation val="minMax"/>
         </c:scaling>
@@ -496,26 +496,6 @@
             </a:ln>
             <a:effectLst/>
           </c:spPr>
-          <c:txPr>
-            <a:bodyPr rot="0" spcFirstLastPara="1" vertOverflow="ellipsis" vert="horz" wrap="square" anchor="ctr" anchorCtr="1"/>
-            <a:lstStyle/>
-            <a:p>
-              <a:pPr>
-                <a:defRPr sz="1330" b="0" i="0" u="none" strike="noStrike" kern="1200" baseline="0">
-                  <a:solidFill>
-                    <a:schemeClr val="tx1">
-                      <a:lumMod val="65000"/>
-                      <a:lumOff val="35000"/>
-                    </a:schemeClr>
-                  </a:solidFill>
-                  <a:latin typeface="+mn-lt"/>
-                  <a:ea typeface="+mn-ea"/>
-                  <a:cs typeface="+mn-cs"/>
-                </a:defRPr>
-              </a:pPr>
-              <a:endParaRPr lang="en-US"/>
-            </a:p>
-          </c:txPr>
         </c:title>
         <c:numFmt formatCode="General" sourceLinked="1"/>
         <c:majorTickMark val="out"/>
@@ -554,12 +534,12 @@
             <a:endParaRPr lang="en-US"/>
           </a:p>
         </c:txPr>
-        <c:crossAx val="-2054292432"/>
+        <c:crossAx val="-2112843992"/>
         <c:crosses val="autoZero"/>
         <c:crossBetween val="midCat"/>
       </c:valAx>
       <c:valAx>
-        <c:axId val="-2054292432"/>
+        <c:axId val="-2112843992"/>
         <c:scaling>
           <c:orientation val="minMax"/>
         </c:scaling>
@@ -627,26 +607,6 @@
             </a:ln>
             <a:effectLst/>
           </c:spPr>
-          <c:txPr>
-            <a:bodyPr rot="-5400000" spcFirstLastPara="1" vertOverflow="ellipsis" vert="horz" wrap="square" anchor="ctr" anchorCtr="1"/>
-            <a:lstStyle/>
-            <a:p>
-              <a:pPr>
-                <a:defRPr sz="1330" b="0" i="0" u="none" strike="noStrike" kern="1200" baseline="0">
-                  <a:solidFill>
-                    <a:schemeClr val="tx1">
-                      <a:lumMod val="65000"/>
-                      <a:lumOff val="35000"/>
-                    </a:schemeClr>
-                  </a:solidFill>
-                  <a:latin typeface="+mn-lt"/>
-                  <a:ea typeface="+mn-ea"/>
-                  <a:cs typeface="+mn-cs"/>
-                </a:defRPr>
-              </a:pPr>
-              <a:endParaRPr lang="en-US"/>
-            </a:p>
-          </c:txPr>
         </c:title>
         <c:numFmt formatCode="General" sourceLinked="1"/>
         <c:majorTickMark val="out"/>
@@ -685,7 +645,7 @@
             <a:endParaRPr lang="en-US"/>
           </a:p>
         </c:txPr>
-        <c:crossAx val="-2069692352"/>
+        <c:crossAx val="-2117822536"/>
         <c:crosses val="autoZero"/>
         <c:crossBetween val="midCat"/>
       </c:valAx>
@@ -752,7 +712,7 @@
       <a:endParaRPr lang="en-US"/>
     </a:p>
   </c:txPr>
-  <c:externalData r:id="rId3">
+  <c:externalData r:id="rId1">
     <c:autoUpdate val="0"/>
   </c:externalData>
 </c:chartSpace>
@@ -815,26 +775,6 @@
         </a:ln>
         <a:effectLst/>
       </c:spPr>
-      <c:txPr>
-        <a:bodyPr rot="0" spcFirstLastPara="1" vertOverflow="ellipsis" vert="horz" wrap="square" anchor="ctr" anchorCtr="1"/>
-        <a:lstStyle/>
-        <a:p>
-          <a:pPr>
-            <a:defRPr sz="1862" b="0" i="0" u="none" strike="noStrike" kern="1200" spc="0" baseline="0">
-              <a:solidFill>
-                <a:schemeClr val="tx1">
-                  <a:lumMod val="65000"/>
-                  <a:lumOff val="35000"/>
-                </a:schemeClr>
-              </a:solidFill>
-              <a:latin typeface="+mn-lt"/>
-              <a:ea typeface="+mn-ea"/>
-              <a:cs typeface="+mn-cs"/>
-            </a:defRPr>
-          </a:pPr>
-          <a:endParaRPr lang="en-US"/>
-        </a:p>
-      </c:txPr>
     </c:title>
     <c:autoTitleDeleted val="0"/>
     <c:plotArea>
@@ -1032,7 +972,7 @@
       <a:endParaRPr lang="en-US"/>
     </a:p>
   </c:txPr>
-  <c:externalData r:id="rId3">
+  <c:externalData r:id="rId1">
     <c:autoUpdate val="0"/>
   </c:externalData>
 </c:chartSpace>
@@ -1099,26 +1039,6 @@
         </a:ln>
         <a:effectLst/>
       </c:spPr>
-      <c:txPr>
-        <a:bodyPr rot="0" spcFirstLastPara="1" vertOverflow="ellipsis" vert="horz" wrap="square" anchor="ctr" anchorCtr="1"/>
-        <a:lstStyle/>
-        <a:p>
-          <a:pPr>
-            <a:defRPr sz="1862" b="0" i="0" u="none" strike="noStrike" kern="1200" spc="0" baseline="0">
-              <a:solidFill>
-                <a:schemeClr val="tx1">
-                  <a:lumMod val="65000"/>
-                  <a:lumOff val="35000"/>
-                </a:schemeClr>
-              </a:solidFill>
-              <a:latin typeface="+mn-lt"/>
-              <a:ea typeface="+mn-ea"/>
-              <a:cs typeface="+mn-cs"/>
-            </a:defRPr>
-          </a:pPr>
-          <a:endParaRPr lang="en-US"/>
-        </a:p>
-      </c:txPr>
     </c:title>
     <c:autoTitleDeleted val="0"/>
     <c:plotArea>
@@ -1461,7 +1381,7 @@
       <a:endParaRPr lang="en-US"/>
     </a:p>
   </c:txPr>
-  <c:externalData r:id="rId3">
+  <c:externalData r:id="rId1">
     <c:autoUpdate val="0"/>
   </c:externalData>
 </c:chartSpace>
@@ -1782,7 +1702,7 @@
       <a:endParaRPr lang="en-US"/>
     </a:p>
   </c:txPr>
-  <c:externalData r:id="rId3">
+  <c:externalData r:id="rId1">
     <c:autoUpdate val="0"/>
   </c:externalData>
 </c:chartSpace>
@@ -2367,11 +2287,11 @@
         </c:dLbls>
         <c:gapWidth val="150"/>
         <c:overlap val="100"/>
-        <c:axId val="-2054843776"/>
-        <c:axId val="-2048156000"/>
+        <c:axId val="-2119824520"/>
+        <c:axId val="-2119821336"/>
       </c:barChart>
       <c:catAx>
-        <c:axId val="-2054843776"/>
+        <c:axId val="-2119824520"/>
         <c:scaling>
           <c:orientation val="minMax"/>
         </c:scaling>
@@ -2381,7 +2301,7 @@
         <c:majorTickMark val="none"/>
         <c:minorTickMark val="none"/>
         <c:tickLblPos val="nextTo"/>
-        <c:crossAx val="-2048156000"/>
+        <c:crossAx val="-2119821336"/>
         <c:crosses val="autoZero"/>
         <c:auto val="1"/>
         <c:lblAlgn val="ctr"/>
@@ -2389,7 +2309,7 @@
         <c:noMultiLvlLbl val="0"/>
       </c:catAx>
       <c:valAx>
-        <c:axId val="-2048156000"/>
+        <c:axId val="-2119821336"/>
         <c:scaling>
           <c:orientation val="minMax"/>
         </c:scaling>
@@ -2453,26 +2373,6 @@
             </a:ln>
             <a:effectLst/>
           </c:spPr>
-          <c:txPr>
-            <a:bodyPr rot="-5400000" spcFirstLastPara="1" vertOverflow="ellipsis" vert="horz" wrap="square" anchor="ctr" anchorCtr="1"/>
-            <a:lstStyle/>
-            <a:p>
-              <a:pPr>
-                <a:defRPr sz="1330" b="0" i="0" u="none" strike="noStrike" kern="1200" baseline="0">
-                  <a:solidFill>
-                    <a:schemeClr val="tx1">
-                      <a:lumMod val="65000"/>
-                      <a:lumOff val="35000"/>
-                    </a:schemeClr>
-                  </a:solidFill>
-                  <a:latin typeface="+mn-lt"/>
-                  <a:ea typeface="+mn-ea"/>
-                  <a:cs typeface="+mn-cs"/>
-                </a:defRPr>
-              </a:pPr>
-              <a:endParaRPr lang="en-US"/>
-            </a:p>
-          </c:txPr>
         </c:title>
         <c:numFmt formatCode="0.0" sourceLinked="1"/>
         <c:majorTickMark val="none"/>
@@ -2505,7 +2405,7 @@
             <a:endParaRPr lang="en-US"/>
           </a:p>
         </c:txPr>
-        <c:crossAx val="-2054843776"/>
+        <c:crossAx val="-2119824520"/>
         <c:crosses val="autoZero"/>
         <c:crossBetween val="between"/>
       </c:valAx>
@@ -2540,7 +2440,7 @@
       <a:endParaRPr lang="en-US"/>
     </a:p>
   </c:txPr>
-  <c:externalData r:id="rId3">
+  <c:externalData r:id="rId1">
     <c:autoUpdate val="0"/>
   </c:externalData>
 </c:chartSpace>
@@ -2888,11 +2788,11 @@
         </c:dLbls>
         <c:gapWidth val="219"/>
         <c:overlap val="-27"/>
-        <c:axId val="-2050521008"/>
-        <c:axId val="-2069496896"/>
+        <c:axId val="-2120122120"/>
+        <c:axId val="-2120118472"/>
       </c:barChart>
       <c:catAx>
-        <c:axId val="-2050521008"/>
+        <c:axId val="-2120122120"/>
         <c:scaling>
           <c:orientation val="minMax"/>
         </c:scaling>
@@ -2932,7 +2832,7 @@
             <a:endParaRPr lang="en-US"/>
           </a:p>
         </c:txPr>
-        <c:crossAx val="-2069496896"/>
+        <c:crossAx val="-2120118472"/>
         <c:crosses val="autoZero"/>
         <c:auto val="1"/>
         <c:lblAlgn val="ctr"/>
@@ -2940,487 +2840,7 @@
         <c:noMultiLvlLbl val="0"/>
       </c:catAx>
       <c:valAx>
-        <c:axId val="-2069496896"/>
-        <c:scaling>
-          <c:orientation val="minMax"/>
-        </c:scaling>
-        <c:delete val="0"/>
-        <c:axPos val="l"/>
-        <c:majorGridlines>
-          <c:spPr>
-            <a:ln w="9525" cap="flat" cmpd="sng" algn="ctr">
-              <a:solidFill>
-                <a:schemeClr val="tx1">
-                  <a:lumMod val="15000"/>
-                  <a:lumOff val="85000"/>
-                </a:schemeClr>
-              </a:solidFill>
-              <a:round/>
-            </a:ln>
-            <a:effectLst/>
-          </c:spPr>
-        </c:majorGridlines>
-        <c:title>
-          <c:tx>
-            <c:rich>
-              <a:bodyPr rot="-5400000" spcFirstLastPara="1" vertOverflow="ellipsis" vert="horz" wrap="square" anchor="ctr" anchorCtr="1"/>
-              <a:lstStyle/>
-              <a:p>
-                <a:pPr>
-                  <a:defRPr sz="1400" b="0" i="0" u="none" strike="noStrike" kern="1200" baseline="0">
-                    <a:solidFill>
-                      <a:schemeClr val="tx1">
-                        <a:lumMod val="65000"/>
-                        <a:lumOff val="35000"/>
-                      </a:schemeClr>
-                    </a:solidFill>
-                    <a:latin typeface="+mn-lt"/>
-                    <a:ea typeface="+mn-ea"/>
-                    <a:cs typeface="+mn-cs"/>
-                  </a:defRPr>
-                </a:pPr>
-                <a:r>
-                  <a:rPr lang="en-US" sz="1600" dirty="0" smtClean="0"/>
-                  <a:t>Electricity production at grid</a:t>
-                </a:r>
-              </a:p>
-              <a:p>
-                <a:pPr>
-                  <a:defRPr sz="1400"/>
-                </a:pPr>
-                <a:r>
-                  <a:rPr lang="en-US" sz="1600" noProof="1" smtClean="0"/>
-                  <a:t>(g</a:t>
-                </a:r>
-                <a:r>
-                  <a:rPr lang="en-US" sz="1600" baseline="-25000" noProof="1" smtClean="0"/>
-                  <a:t>CO2eq</a:t>
-                </a:r>
-                <a:r>
-                  <a:rPr lang="en-US" sz="1600" noProof="1" smtClean="0"/>
-                  <a:t>/kWh</a:t>
-                </a:r>
-                <a:r>
-                  <a:rPr lang="de-DE" sz="1600" dirty="0" smtClean="0"/>
-                  <a:t>)</a:t>
-                </a:r>
-                <a:endParaRPr lang="en-US" sz="1600" dirty="0"/>
-              </a:p>
-            </c:rich>
-          </c:tx>
-          <c:layout/>
-          <c:overlay val="0"/>
-          <c:spPr>
-            <a:noFill/>
-            <a:ln>
-              <a:noFill/>
-            </a:ln>
-            <a:effectLst/>
-          </c:spPr>
-          <c:txPr>
-            <a:bodyPr rot="-5400000" spcFirstLastPara="1" vertOverflow="ellipsis" vert="horz" wrap="square" anchor="ctr" anchorCtr="1"/>
-            <a:lstStyle/>
-            <a:p>
-              <a:pPr>
-                <a:defRPr sz="1400" b="0" i="0" u="none" strike="noStrike" kern="1200" baseline="0">
-                  <a:solidFill>
-                    <a:schemeClr val="tx1">
-                      <a:lumMod val="65000"/>
-                      <a:lumOff val="35000"/>
-                    </a:schemeClr>
-                  </a:solidFill>
-                  <a:latin typeface="+mn-lt"/>
-                  <a:ea typeface="+mn-ea"/>
-                  <a:cs typeface="+mn-cs"/>
-                </a:defRPr>
-              </a:pPr>
-              <a:endParaRPr lang="en-US"/>
-            </a:p>
-          </c:txPr>
-        </c:title>
-        <c:numFmt formatCode="General" sourceLinked="1"/>
-        <c:majorTickMark val="none"/>
-        <c:minorTickMark val="none"/>
-        <c:tickLblPos val="nextTo"/>
-        <c:spPr>
-          <a:noFill/>
-          <a:ln>
-            <a:solidFill>
-              <a:schemeClr val="accent3"/>
-            </a:solidFill>
-          </a:ln>
-          <a:effectLst/>
-        </c:spPr>
-        <c:txPr>
-          <a:bodyPr rot="-60000000" spcFirstLastPara="1" vertOverflow="ellipsis" vert="horz" wrap="square" anchor="ctr" anchorCtr="1"/>
-          <a:lstStyle/>
-          <a:p>
-            <a:pPr>
-              <a:defRPr sz="1400" b="0" i="0" u="none" strike="noStrike" kern="1200" baseline="0">
-                <a:solidFill>
-                  <a:schemeClr val="tx1">
-                    <a:lumMod val="65000"/>
-                    <a:lumOff val="35000"/>
-                  </a:schemeClr>
-                </a:solidFill>
-                <a:latin typeface="+mn-lt"/>
-                <a:ea typeface="+mn-ea"/>
-                <a:cs typeface="+mn-cs"/>
-              </a:defRPr>
-            </a:pPr>
-            <a:endParaRPr lang="en-US"/>
-          </a:p>
-        </c:txPr>
-        <c:crossAx val="-2050521008"/>
-        <c:crosses val="autoZero"/>
-        <c:crossBetween val="between"/>
-      </c:valAx>
-      <c:spPr>
-        <a:noFill/>
-        <a:ln>
-          <a:solidFill>
-            <a:schemeClr val="accent3"/>
-          </a:solidFill>
-        </a:ln>
-        <a:effectLst/>
-      </c:spPr>
-    </c:plotArea>
-    <c:legend>
-      <c:legendPos val="b"/>
-      <c:layout/>
-      <c:overlay val="0"/>
-      <c:spPr>
-        <a:noFill/>
-        <a:ln>
-          <a:noFill/>
-        </a:ln>
-        <a:effectLst/>
-      </c:spPr>
-      <c:txPr>
-        <a:bodyPr rot="0" spcFirstLastPara="1" vertOverflow="ellipsis" vert="horz" wrap="square" anchor="ctr" anchorCtr="1"/>
-        <a:lstStyle/>
-        <a:p>
-          <a:pPr>
-            <a:defRPr sz="1197" b="0" i="0" u="none" strike="noStrike" kern="1200" baseline="0">
-              <a:solidFill>
-                <a:schemeClr val="tx1">
-                  <a:lumMod val="65000"/>
-                  <a:lumOff val="35000"/>
-                </a:schemeClr>
-              </a:solidFill>
-              <a:latin typeface="+mn-lt"/>
-              <a:ea typeface="+mn-ea"/>
-              <a:cs typeface="+mn-cs"/>
-            </a:defRPr>
-          </a:pPr>
-          <a:endParaRPr lang="en-US"/>
-        </a:p>
-      </c:txPr>
-    </c:legend>
-    <c:plotVisOnly val="1"/>
-    <c:dispBlanksAs val="gap"/>
-    <c:showDLblsOverMax val="0"/>
-  </c:chart>
-  <c:spPr>
-    <a:noFill/>
-    <a:ln>
-      <a:noFill/>
-    </a:ln>
-    <a:effectLst/>
-  </c:spPr>
-  <c:txPr>
-    <a:bodyPr/>
-    <a:lstStyle/>
-    <a:p>
-      <a:pPr>
-        <a:defRPr/>
-      </a:pPr>
-      <a:endParaRPr lang="en-US"/>
-    </a:p>
-  </c:txPr>
-  <c:externalData r:id="rId3">
-    <c:autoUpdate val="0"/>
-  </c:externalData>
-</c:chartSpace>
-</file>
-
-<file path=ppt/charts/chart15.xml><?xml version="1.0" encoding="utf-8"?>
-<c:chartSpace xmlns:c="http://schemas.openxmlformats.org/drawingml/2006/chart" xmlns:a="http://schemas.openxmlformats.org/drawingml/2006/main" xmlns:r="http://schemas.openxmlformats.org/officeDocument/2006/relationships">
-  <c:date1904 val="0"/>
-  <c:lang val="en-US"/>
-  <c:roundedCorners val="0"/>
-  <mc:AlternateContent xmlns:mc="http://schemas.openxmlformats.org/markup-compatibility/2006">
-    <mc:Choice xmlns:c14="http://schemas.microsoft.com/office/drawing/2007/8/2/chart" Requires="c14">
-      <c14:style val="102"/>
-    </mc:Choice>
-    <mc:Fallback>
-      <c:style val="2"/>
-    </mc:Fallback>
-  </mc:AlternateContent>
-  <c:chart>
-    <c:autoTitleDeleted val="1"/>
-    <c:plotArea>
-      <c:layout/>
-      <c:barChart>
-        <c:barDir val="col"/>
-        <c:grouping val="clustered"/>
-        <c:varyColors val="0"/>
-        <c:ser>
-          <c:idx val="0"/>
-          <c:order val="0"/>
-          <c:tx>
-            <c:strRef>
-              <c:f>Sheet1!$B$1</c:f>
-              <c:strCache>
-                <c:ptCount val="1"/>
-                <c:pt idx="0">
-                  <c:v>High voltage at grid</c:v>
-                </c:pt>
-              </c:strCache>
-            </c:strRef>
-          </c:tx>
-          <c:spPr>
-            <a:solidFill>
-              <a:schemeClr val="accent1"/>
-            </a:solidFill>
-            <a:ln>
-              <a:noFill/>
-            </a:ln>
-            <a:effectLst/>
-          </c:spPr>
-          <c:invertIfNegative val="0"/>
-          <c:cat>
-            <c:strRef>
-              <c:f>Sheet1!$A$2:$A$8</c:f>
-              <c:strCache>
-                <c:ptCount val="7"/>
-                <c:pt idx="0">
-                  <c:v>China</c:v>
-                </c:pt>
-                <c:pt idx="1">
-                  <c:v>United States of America</c:v>
-                </c:pt>
-                <c:pt idx="2">
-                  <c:v>Germany</c:v>
-                </c:pt>
-                <c:pt idx="3">
-                  <c:v>UCTE region</c:v>
-                </c:pt>
-                <c:pt idx="4">
-                  <c:v>Switzerland</c:v>
-                </c:pt>
-                <c:pt idx="5">
-                  <c:v>ASF</c:v>
-                </c:pt>
-                <c:pt idx="6">
-                  <c:v>France</c:v>
-                </c:pt>
-              </c:strCache>
-            </c:strRef>
-          </c:cat>
-          <c:val>
-            <c:numRef>
-              <c:f>Sheet1!$B$2:$B$8</c:f>
-              <c:numCache>
-                <c:formatCode>General</c:formatCode>
-                <c:ptCount val="7"/>
-                <c:pt idx="0">
-                  <c:v>1145.8</c:v>
-                </c:pt>
-                <c:pt idx="1">
-                  <c:v>754.8</c:v>
-                </c:pt>
-                <c:pt idx="2">
-                  <c:v>629.5</c:v>
-                </c:pt>
-                <c:pt idx="3">
-                  <c:v>509.3</c:v>
-                </c:pt>
-                <c:pt idx="4">
-                  <c:v>119.6</c:v>
-                </c:pt>
-                <c:pt idx="6">
-                  <c:v>95.7</c:v>
-                </c:pt>
-              </c:numCache>
-            </c:numRef>
-          </c:val>
-        </c:ser>
-        <c:ser>
-          <c:idx val="1"/>
-          <c:order val="1"/>
-          <c:tx>
-            <c:strRef>
-              <c:f>Sheet1!$C$1</c:f>
-              <c:strCache>
-                <c:ptCount val="1"/>
-                <c:pt idx="0">
-                  <c:v>Low voltage at grid</c:v>
-                </c:pt>
-              </c:strCache>
-            </c:strRef>
-          </c:tx>
-          <c:spPr>
-            <a:solidFill>
-              <a:schemeClr val="accent2"/>
-            </a:solidFill>
-            <a:ln>
-              <a:noFill/>
-            </a:ln>
-            <a:effectLst/>
-          </c:spPr>
-          <c:invertIfNegative val="0"/>
-          <c:dPt>
-            <c:idx val="5"/>
-            <c:invertIfNegative val="0"/>
-            <c:bubble3D val="0"/>
-            <c:spPr>
-              <a:solidFill>
-                <a:srgbClr val="C52A15"/>
-              </a:solidFill>
-              <a:ln>
-                <a:noFill/>
-              </a:ln>
-              <a:effectLst/>
-            </c:spPr>
-          </c:dPt>
-          <c:dPt>
-            <c:idx val="14"/>
-            <c:invertIfNegative val="0"/>
-            <c:bubble3D val="0"/>
-            <c:spPr>
-              <a:solidFill>
-                <a:srgbClr val="C00000"/>
-              </a:solidFill>
-              <a:ln>
-                <a:noFill/>
-              </a:ln>
-              <a:effectLst/>
-            </c:spPr>
-          </c:dPt>
-          <c:cat>
-            <c:strRef>
-              <c:f>Sheet1!$A$2:$A$8</c:f>
-              <c:strCache>
-                <c:ptCount val="7"/>
-                <c:pt idx="0">
-                  <c:v>China</c:v>
-                </c:pt>
-                <c:pt idx="1">
-                  <c:v>United States of America</c:v>
-                </c:pt>
-                <c:pt idx="2">
-                  <c:v>Germany</c:v>
-                </c:pt>
-                <c:pt idx="3">
-                  <c:v>UCTE region</c:v>
-                </c:pt>
-                <c:pt idx="4">
-                  <c:v>Switzerland</c:v>
-                </c:pt>
-                <c:pt idx="5">
-                  <c:v>ASF</c:v>
-                </c:pt>
-                <c:pt idx="6">
-                  <c:v>France</c:v>
-                </c:pt>
-              </c:strCache>
-            </c:strRef>
-          </c:cat>
-          <c:val>
-            <c:numRef>
-              <c:f>Sheet1!$C$2:$C$8</c:f>
-              <c:numCache>
-                <c:formatCode>General</c:formatCode>
-                <c:ptCount val="7"/>
-                <c:pt idx="0">
-                  <c:v>1229.6</c:v>
-                </c:pt>
-                <c:pt idx="1">
-                  <c:v>808.4</c:v>
-                </c:pt>
-                <c:pt idx="2">
-                  <c:v>671.5</c:v>
-                </c:pt>
-                <c:pt idx="3">
-                  <c:v>551.7</c:v>
-                </c:pt>
-                <c:pt idx="4">
-                  <c:v>135.0</c:v>
-                </c:pt>
-                <c:pt idx="5">
-                  <c:v>126.8</c:v>
-                </c:pt>
-                <c:pt idx="6">
-                  <c:v>109.0</c:v>
-                </c:pt>
-              </c:numCache>
-            </c:numRef>
-          </c:val>
-        </c:ser>
-        <c:dLbls>
-          <c:showLegendKey val="0"/>
-          <c:showVal val="0"/>
-          <c:showCatName val="0"/>
-          <c:showSerName val="0"/>
-          <c:showPercent val="0"/>
-          <c:showBubbleSize val="0"/>
-        </c:dLbls>
-        <c:gapWidth val="219"/>
-        <c:overlap val="-27"/>
-        <c:axId val="-2055978160"/>
-        <c:axId val="2126033264"/>
-      </c:barChart>
-      <c:catAx>
-        <c:axId val="-2055978160"/>
-        <c:scaling>
-          <c:orientation val="minMax"/>
-        </c:scaling>
-        <c:delete val="0"/>
-        <c:axPos val="b"/>
-        <c:numFmt formatCode="General" sourceLinked="1"/>
-        <c:majorTickMark val="none"/>
-        <c:minorTickMark val="none"/>
-        <c:tickLblPos val="nextTo"/>
-        <c:spPr>
-          <a:noFill/>
-          <a:ln w="9525" cap="flat" cmpd="sng" algn="ctr">
-            <a:solidFill>
-              <a:schemeClr val="accent3"/>
-            </a:solidFill>
-            <a:round/>
-          </a:ln>
-          <a:effectLst/>
-        </c:spPr>
-        <c:txPr>
-          <a:bodyPr rot="-60000000" spcFirstLastPara="1" vertOverflow="ellipsis" vert="horz" wrap="square" anchor="ctr" anchorCtr="1"/>
-          <a:lstStyle/>
-          <a:p>
-            <a:pPr>
-              <a:defRPr sz="1400" b="0" i="0" u="none" strike="noStrike" kern="1200" baseline="0">
-                <a:solidFill>
-                  <a:schemeClr val="tx1">
-                    <a:lumMod val="65000"/>
-                    <a:lumOff val="35000"/>
-                  </a:schemeClr>
-                </a:solidFill>
-                <a:latin typeface="+mn-lt"/>
-                <a:ea typeface="+mn-ea"/>
-                <a:cs typeface="+mn-cs"/>
-              </a:defRPr>
-            </a:pPr>
-            <a:endParaRPr lang="en-US"/>
-          </a:p>
-        </c:txPr>
-        <c:crossAx val="2126033264"/>
-        <c:crosses val="autoZero"/>
-        <c:auto val="1"/>
-        <c:lblAlgn val="ctr"/>
-        <c:lblOffset val="100"/>
-        <c:noMultiLvlLbl val="0"/>
-      </c:catAx>
-      <c:valAx>
-        <c:axId val="2126033264"/>
+        <c:axId val="-2120118472"/>
         <c:scaling>
           <c:orientation val="minMax"/>
         </c:scaling>
@@ -3541,7 +2961,477 @@
             <a:endParaRPr lang="en-US"/>
           </a:p>
         </c:txPr>
-        <c:crossAx val="-2055978160"/>
+        <c:crossAx val="-2120122120"/>
+        <c:crosses val="autoZero"/>
+        <c:crossBetween val="between"/>
+      </c:valAx>
+      <c:spPr>
+        <a:noFill/>
+        <a:ln>
+          <a:solidFill>
+            <a:schemeClr val="accent3"/>
+          </a:solidFill>
+        </a:ln>
+        <a:effectLst/>
+      </c:spPr>
+    </c:plotArea>
+    <c:legend>
+      <c:legendPos val="b"/>
+      <c:layout/>
+      <c:overlay val="0"/>
+      <c:spPr>
+        <a:noFill/>
+        <a:ln>
+          <a:noFill/>
+        </a:ln>
+        <a:effectLst/>
+      </c:spPr>
+      <c:txPr>
+        <a:bodyPr rot="0" spcFirstLastPara="1" vertOverflow="ellipsis" vert="horz" wrap="square" anchor="ctr" anchorCtr="1"/>
+        <a:lstStyle/>
+        <a:p>
+          <a:pPr>
+            <a:defRPr sz="1197" b="0" i="0" u="none" strike="noStrike" kern="1200" baseline="0">
+              <a:solidFill>
+                <a:schemeClr val="tx1">
+                  <a:lumMod val="65000"/>
+                  <a:lumOff val="35000"/>
+                </a:schemeClr>
+              </a:solidFill>
+              <a:latin typeface="+mn-lt"/>
+              <a:ea typeface="+mn-ea"/>
+              <a:cs typeface="+mn-cs"/>
+            </a:defRPr>
+          </a:pPr>
+          <a:endParaRPr lang="en-US"/>
+        </a:p>
+      </c:txPr>
+    </c:legend>
+    <c:plotVisOnly val="1"/>
+    <c:dispBlanksAs val="gap"/>
+    <c:showDLblsOverMax val="0"/>
+  </c:chart>
+  <c:spPr>
+    <a:noFill/>
+    <a:ln>
+      <a:noFill/>
+    </a:ln>
+    <a:effectLst/>
+  </c:spPr>
+  <c:txPr>
+    <a:bodyPr/>
+    <a:lstStyle/>
+    <a:p>
+      <a:pPr>
+        <a:defRPr/>
+      </a:pPr>
+      <a:endParaRPr lang="en-US"/>
+    </a:p>
+  </c:txPr>
+  <c:externalData r:id="rId1">
+    <c:autoUpdate val="0"/>
+  </c:externalData>
+</c:chartSpace>
+</file>
+
+<file path=ppt/charts/chart15.xml><?xml version="1.0" encoding="utf-8"?>
+<c:chartSpace xmlns:c="http://schemas.openxmlformats.org/drawingml/2006/chart" xmlns:a="http://schemas.openxmlformats.org/drawingml/2006/main" xmlns:r="http://schemas.openxmlformats.org/officeDocument/2006/relationships">
+  <c:date1904 val="0"/>
+  <c:lang val="en-US"/>
+  <c:roundedCorners val="0"/>
+  <mc:AlternateContent xmlns:mc="http://schemas.openxmlformats.org/markup-compatibility/2006">
+    <mc:Choice xmlns:c14="http://schemas.microsoft.com/office/drawing/2007/8/2/chart" Requires="c14">
+      <c14:style val="102"/>
+    </mc:Choice>
+    <mc:Fallback>
+      <c:style val="2"/>
+    </mc:Fallback>
+  </mc:AlternateContent>
+  <c:chart>
+    <c:autoTitleDeleted val="1"/>
+    <c:plotArea>
+      <c:layout/>
+      <c:barChart>
+        <c:barDir val="col"/>
+        <c:grouping val="clustered"/>
+        <c:varyColors val="0"/>
+        <c:ser>
+          <c:idx val="0"/>
+          <c:order val="0"/>
+          <c:tx>
+            <c:strRef>
+              <c:f>Sheet1!$B$1</c:f>
+              <c:strCache>
+                <c:ptCount val="1"/>
+                <c:pt idx="0">
+                  <c:v>High voltage at grid</c:v>
+                </c:pt>
+              </c:strCache>
+            </c:strRef>
+          </c:tx>
+          <c:spPr>
+            <a:solidFill>
+              <a:schemeClr val="accent1"/>
+            </a:solidFill>
+            <a:ln>
+              <a:noFill/>
+            </a:ln>
+            <a:effectLst/>
+          </c:spPr>
+          <c:invertIfNegative val="0"/>
+          <c:cat>
+            <c:strRef>
+              <c:f>Sheet1!$A$2:$A$8</c:f>
+              <c:strCache>
+                <c:ptCount val="7"/>
+                <c:pt idx="0">
+                  <c:v>China</c:v>
+                </c:pt>
+                <c:pt idx="1">
+                  <c:v>United States of America</c:v>
+                </c:pt>
+                <c:pt idx="2">
+                  <c:v>Germany</c:v>
+                </c:pt>
+                <c:pt idx="3">
+                  <c:v>UCTE region</c:v>
+                </c:pt>
+                <c:pt idx="4">
+                  <c:v>Switzerland</c:v>
+                </c:pt>
+                <c:pt idx="5">
+                  <c:v>ASF</c:v>
+                </c:pt>
+                <c:pt idx="6">
+                  <c:v>France</c:v>
+                </c:pt>
+              </c:strCache>
+            </c:strRef>
+          </c:cat>
+          <c:val>
+            <c:numRef>
+              <c:f>Sheet1!$B$2:$B$8</c:f>
+              <c:numCache>
+                <c:formatCode>General</c:formatCode>
+                <c:ptCount val="7"/>
+                <c:pt idx="0">
+                  <c:v>1145.8</c:v>
+                </c:pt>
+                <c:pt idx="1">
+                  <c:v>754.8</c:v>
+                </c:pt>
+                <c:pt idx="2">
+                  <c:v>629.5</c:v>
+                </c:pt>
+                <c:pt idx="3">
+                  <c:v>509.3</c:v>
+                </c:pt>
+                <c:pt idx="4">
+                  <c:v>119.6</c:v>
+                </c:pt>
+                <c:pt idx="6">
+                  <c:v>95.7</c:v>
+                </c:pt>
+              </c:numCache>
+            </c:numRef>
+          </c:val>
+        </c:ser>
+        <c:ser>
+          <c:idx val="1"/>
+          <c:order val="1"/>
+          <c:tx>
+            <c:strRef>
+              <c:f>Sheet1!$C$1</c:f>
+              <c:strCache>
+                <c:ptCount val="1"/>
+                <c:pt idx="0">
+                  <c:v>Low voltage at grid</c:v>
+                </c:pt>
+              </c:strCache>
+            </c:strRef>
+          </c:tx>
+          <c:spPr>
+            <a:solidFill>
+              <a:schemeClr val="accent2"/>
+            </a:solidFill>
+            <a:ln>
+              <a:noFill/>
+            </a:ln>
+            <a:effectLst/>
+          </c:spPr>
+          <c:invertIfNegative val="0"/>
+          <c:dPt>
+            <c:idx val="5"/>
+            <c:invertIfNegative val="0"/>
+            <c:bubble3D val="0"/>
+            <c:spPr>
+              <a:solidFill>
+                <a:srgbClr val="C52A15"/>
+              </a:solidFill>
+              <a:ln>
+                <a:noFill/>
+              </a:ln>
+              <a:effectLst/>
+            </c:spPr>
+          </c:dPt>
+          <c:dPt>
+            <c:idx val="14"/>
+            <c:invertIfNegative val="0"/>
+            <c:bubble3D val="0"/>
+            <c:spPr>
+              <a:solidFill>
+                <a:srgbClr val="C00000"/>
+              </a:solidFill>
+              <a:ln>
+                <a:noFill/>
+              </a:ln>
+              <a:effectLst/>
+            </c:spPr>
+          </c:dPt>
+          <c:cat>
+            <c:strRef>
+              <c:f>Sheet1!$A$2:$A$8</c:f>
+              <c:strCache>
+                <c:ptCount val="7"/>
+                <c:pt idx="0">
+                  <c:v>China</c:v>
+                </c:pt>
+                <c:pt idx="1">
+                  <c:v>United States of America</c:v>
+                </c:pt>
+                <c:pt idx="2">
+                  <c:v>Germany</c:v>
+                </c:pt>
+                <c:pt idx="3">
+                  <c:v>UCTE region</c:v>
+                </c:pt>
+                <c:pt idx="4">
+                  <c:v>Switzerland</c:v>
+                </c:pt>
+                <c:pt idx="5">
+                  <c:v>ASF</c:v>
+                </c:pt>
+                <c:pt idx="6">
+                  <c:v>France</c:v>
+                </c:pt>
+              </c:strCache>
+            </c:strRef>
+          </c:cat>
+          <c:val>
+            <c:numRef>
+              <c:f>Sheet1!$C$2:$C$8</c:f>
+              <c:numCache>
+                <c:formatCode>General</c:formatCode>
+                <c:ptCount val="7"/>
+                <c:pt idx="0">
+                  <c:v>1229.6</c:v>
+                </c:pt>
+                <c:pt idx="1">
+                  <c:v>808.4</c:v>
+                </c:pt>
+                <c:pt idx="2">
+                  <c:v>671.5</c:v>
+                </c:pt>
+                <c:pt idx="3">
+                  <c:v>551.7</c:v>
+                </c:pt>
+                <c:pt idx="4">
+                  <c:v>135.0</c:v>
+                </c:pt>
+                <c:pt idx="5">
+                  <c:v>126.8</c:v>
+                </c:pt>
+                <c:pt idx="6">
+                  <c:v>109.0</c:v>
+                </c:pt>
+              </c:numCache>
+            </c:numRef>
+          </c:val>
+        </c:ser>
+        <c:dLbls>
+          <c:showLegendKey val="0"/>
+          <c:showVal val="0"/>
+          <c:showCatName val="0"/>
+          <c:showSerName val="0"/>
+          <c:showPercent val="0"/>
+          <c:showBubbleSize val="0"/>
+        </c:dLbls>
+        <c:gapWidth val="219"/>
+        <c:overlap val="-27"/>
+        <c:axId val="-2119360168"/>
+        <c:axId val="-2119356536"/>
+      </c:barChart>
+      <c:catAx>
+        <c:axId val="-2119360168"/>
+        <c:scaling>
+          <c:orientation val="minMax"/>
+        </c:scaling>
+        <c:delete val="0"/>
+        <c:axPos val="b"/>
+        <c:numFmt formatCode="General" sourceLinked="1"/>
+        <c:majorTickMark val="none"/>
+        <c:minorTickMark val="none"/>
+        <c:tickLblPos val="nextTo"/>
+        <c:spPr>
+          <a:noFill/>
+          <a:ln w="9525" cap="flat" cmpd="sng" algn="ctr">
+            <a:solidFill>
+              <a:schemeClr val="accent3"/>
+            </a:solidFill>
+            <a:round/>
+          </a:ln>
+          <a:effectLst/>
+        </c:spPr>
+        <c:txPr>
+          <a:bodyPr rot="-60000000" spcFirstLastPara="1" vertOverflow="ellipsis" vert="horz" wrap="square" anchor="ctr" anchorCtr="1"/>
+          <a:lstStyle/>
+          <a:p>
+            <a:pPr>
+              <a:defRPr sz="1400" b="0" i="0" u="none" strike="noStrike" kern="1200" baseline="0">
+                <a:solidFill>
+                  <a:schemeClr val="tx1">
+                    <a:lumMod val="65000"/>
+                    <a:lumOff val="35000"/>
+                  </a:schemeClr>
+                </a:solidFill>
+                <a:latin typeface="+mn-lt"/>
+                <a:ea typeface="+mn-ea"/>
+                <a:cs typeface="+mn-cs"/>
+              </a:defRPr>
+            </a:pPr>
+            <a:endParaRPr lang="en-US"/>
+          </a:p>
+        </c:txPr>
+        <c:crossAx val="-2119356536"/>
+        <c:crosses val="autoZero"/>
+        <c:auto val="1"/>
+        <c:lblAlgn val="ctr"/>
+        <c:lblOffset val="100"/>
+        <c:noMultiLvlLbl val="0"/>
+      </c:catAx>
+      <c:valAx>
+        <c:axId val="-2119356536"/>
+        <c:scaling>
+          <c:orientation val="minMax"/>
+        </c:scaling>
+        <c:delete val="0"/>
+        <c:axPos val="l"/>
+        <c:majorGridlines>
+          <c:spPr>
+            <a:ln w="9525" cap="flat" cmpd="sng" algn="ctr">
+              <a:solidFill>
+                <a:schemeClr val="tx1">
+                  <a:lumMod val="15000"/>
+                  <a:lumOff val="85000"/>
+                </a:schemeClr>
+              </a:solidFill>
+              <a:round/>
+            </a:ln>
+            <a:effectLst/>
+          </c:spPr>
+        </c:majorGridlines>
+        <c:title>
+          <c:tx>
+            <c:rich>
+              <a:bodyPr rot="-5400000" spcFirstLastPara="1" vertOverflow="ellipsis" vert="horz" wrap="square" anchor="ctr" anchorCtr="1"/>
+              <a:lstStyle/>
+              <a:p>
+                <a:pPr>
+                  <a:defRPr sz="1400" b="0" i="0" u="none" strike="noStrike" kern="1200" baseline="0">
+                    <a:solidFill>
+                      <a:schemeClr val="tx1">
+                        <a:lumMod val="65000"/>
+                        <a:lumOff val="35000"/>
+                      </a:schemeClr>
+                    </a:solidFill>
+                    <a:latin typeface="+mn-lt"/>
+                    <a:ea typeface="+mn-ea"/>
+                    <a:cs typeface="+mn-cs"/>
+                  </a:defRPr>
+                </a:pPr>
+                <a:r>
+                  <a:rPr lang="en-US" sz="1600" dirty="0" smtClean="0"/>
+                  <a:t>Electricity production at grid</a:t>
+                </a:r>
+              </a:p>
+              <a:p>
+                <a:pPr>
+                  <a:defRPr sz="1400" b="0" i="0" u="none" strike="noStrike" kern="1200" baseline="0">
+                    <a:solidFill>
+                      <a:schemeClr val="tx1">
+                        <a:lumMod val="65000"/>
+                        <a:lumOff val="35000"/>
+                      </a:schemeClr>
+                    </a:solidFill>
+                    <a:latin typeface="+mn-lt"/>
+                    <a:ea typeface="+mn-ea"/>
+                    <a:cs typeface="+mn-cs"/>
+                  </a:defRPr>
+                </a:pPr>
+                <a:r>
+                  <a:rPr lang="en-US" sz="1600" noProof="1" smtClean="0"/>
+                  <a:t>(g</a:t>
+                </a:r>
+                <a:r>
+                  <a:rPr lang="en-US" sz="1600" baseline="-25000" noProof="1" smtClean="0"/>
+                  <a:t>CO2eq</a:t>
+                </a:r>
+                <a:r>
+                  <a:rPr lang="en-US" sz="1600" noProof="1" smtClean="0"/>
+                  <a:t>/kWh</a:t>
+                </a:r>
+                <a:r>
+                  <a:rPr lang="de-DE" sz="1600" dirty="0" smtClean="0"/>
+                  <a:t>)</a:t>
+                </a:r>
+                <a:endParaRPr lang="en-US" sz="1600" dirty="0"/>
+              </a:p>
+            </c:rich>
+          </c:tx>
+          <c:layout/>
+          <c:overlay val="0"/>
+          <c:spPr>
+            <a:noFill/>
+            <a:ln>
+              <a:noFill/>
+            </a:ln>
+            <a:effectLst/>
+          </c:spPr>
+        </c:title>
+        <c:numFmt formatCode="General" sourceLinked="1"/>
+        <c:majorTickMark val="none"/>
+        <c:minorTickMark val="none"/>
+        <c:tickLblPos val="nextTo"/>
+        <c:spPr>
+          <a:noFill/>
+          <a:ln>
+            <a:solidFill>
+              <a:schemeClr val="accent3"/>
+            </a:solidFill>
+          </a:ln>
+          <a:effectLst/>
+        </c:spPr>
+        <c:txPr>
+          <a:bodyPr rot="-60000000" spcFirstLastPara="1" vertOverflow="ellipsis" vert="horz" wrap="square" anchor="ctr" anchorCtr="1"/>
+          <a:lstStyle/>
+          <a:p>
+            <a:pPr>
+              <a:defRPr sz="1400" b="0" i="0" u="none" strike="noStrike" kern="1200" baseline="0">
+                <a:solidFill>
+                  <a:schemeClr val="tx1">
+                    <a:lumMod val="65000"/>
+                    <a:lumOff val="35000"/>
+                  </a:schemeClr>
+                </a:solidFill>
+                <a:latin typeface="+mn-lt"/>
+                <a:ea typeface="+mn-ea"/>
+                <a:cs typeface="+mn-cs"/>
+              </a:defRPr>
+            </a:pPr>
+            <a:endParaRPr lang="en-US"/>
+          </a:p>
+        </c:txPr>
+        <c:crossAx val="-2119360168"/>
         <c:crosses val="autoZero"/>
         <c:crossBetween val="between"/>
       </c:valAx>
@@ -3929,7 +3819,7 @@
       <a:endParaRPr lang="en-US"/>
     </a:p>
   </c:txPr>
-  <c:externalData r:id="rId3">
+  <c:externalData r:id="rId1">
     <c:autoUpdate val="0"/>
   </c:externalData>
 </c:chartSpace>
@@ -4071,7 +3961,7 @@
                   <c:v>-6.43</c:v>
                 </c:pt>
                 <c:pt idx="10">
-                  <c:v>-9.739999999999998</c:v>
+                  <c:v>-9.74</c:v>
                 </c:pt>
                 <c:pt idx="11">
                   <c:v>-13.05</c:v>
@@ -4104,12 +3994,13 @@
           <c:showPercent val="0"/>
           <c:showBubbleSize val="0"/>
         </c:dLbls>
+        <c:marker val="1"/>
         <c:smooth val="0"/>
-        <c:axId val="-2068142064"/>
-        <c:axId val="-2120840640"/>
+        <c:axId val="-2119289208"/>
+        <c:axId val="2125468488"/>
       </c:lineChart>
       <c:catAx>
-        <c:axId val="-2068142064"/>
+        <c:axId val="-2119289208"/>
         <c:scaling>
           <c:orientation val="minMax"/>
         </c:scaling>
@@ -4152,7 +4043,7 @@
             <a:endParaRPr lang="en-US"/>
           </a:p>
         </c:txPr>
-        <c:crossAx val="-2120840640"/>
+        <c:crossAx val="2125468488"/>
         <c:crosses val="autoZero"/>
         <c:auto val="1"/>
         <c:lblAlgn val="ctr"/>
@@ -4160,7 +4051,7 @@
         <c:noMultiLvlLbl val="0"/>
       </c:catAx>
       <c:valAx>
-        <c:axId val="-2120840640"/>
+        <c:axId val="2125468488"/>
         <c:scaling>
           <c:orientation val="minMax"/>
         </c:scaling>
@@ -4207,6 +4098,7 @@
               </a:p>
             </c:rich>
           </c:tx>
+          <c:layout/>
           <c:overlay val="0"/>
           <c:spPr>
             <a:noFill/>
@@ -4247,7 +4139,7 @@
             <a:endParaRPr lang="en-US"/>
           </a:p>
         </c:txPr>
-        <c:crossAx val="-2068142064"/>
+        <c:crossAx val="-2119289208"/>
         <c:crosses val="autoZero"/>
         <c:crossBetween val="between"/>
       </c:valAx>
@@ -4263,6 +4155,7 @@
     </c:plotArea>
     <c:legend>
       <c:legendPos val="b"/>
+      <c:layout/>
       <c:overlay val="0"/>
       <c:spPr>
         <a:noFill/>
@@ -4854,11 +4747,11 @@
         </c:dLbls>
         <c:gapWidth val="219"/>
         <c:overlap val="-27"/>
-        <c:axId val="-2121389136"/>
-        <c:axId val="2129999696"/>
+        <c:axId val="-2119780712"/>
+        <c:axId val="-2119981864"/>
       </c:barChart>
       <c:catAx>
-        <c:axId val="-2121389136"/>
+        <c:axId val="-2119780712"/>
         <c:scaling>
           <c:orientation val="minMax"/>
         </c:scaling>
@@ -4901,7 +4794,7 @@
             <a:endParaRPr lang="en-US"/>
           </a:p>
         </c:txPr>
-        <c:crossAx val="2129999696"/>
+        <c:crossAx val="-2119981864"/>
         <c:crosses val="autoZero"/>
         <c:auto val="1"/>
         <c:lblAlgn val="ctr"/>
@@ -4909,7 +4802,7 @@
         <c:noMultiLvlLbl val="0"/>
       </c:catAx>
       <c:valAx>
-        <c:axId val="2129999696"/>
+        <c:axId val="-2119981864"/>
         <c:scaling>
           <c:orientation val="minMax"/>
         </c:scaling>
@@ -4972,6 +4865,7 @@
               </a:p>
             </c:rich>
           </c:tx>
+          <c:layout/>
           <c:overlay val="0"/>
           <c:spPr>
             <a:noFill/>
@@ -4980,26 +4874,6 @@
             </a:ln>
             <a:effectLst/>
           </c:spPr>
-          <c:txPr>
-            <a:bodyPr rot="-5400000" spcFirstLastPara="1" vertOverflow="ellipsis" vert="horz" wrap="square" anchor="ctr" anchorCtr="1"/>
-            <a:lstStyle/>
-            <a:p>
-              <a:pPr>
-                <a:defRPr sz="1600" b="0" i="0" u="none" strike="noStrike" kern="1200" baseline="0">
-                  <a:solidFill>
-                    <a:schemeClr val="tx1">
-                      <a:lumMod val="65000"/>
-                      <a:lumOff val="35000"/>
-                    </a:schemeClr>
-                  </a:solidFill>
-                  <a:latin typeface="+mn-lt"/>
-                  <a:ea typeface="+mn-ea"/>
-                  <a:cs typeface="+mn-cs"/>
-                </a:defRPr>
-              </a:pPr>
-              <a:endParaRPr lang="en-US"/>
-            </a:p>
-          </c:txPr>
         </c:title>
         <c:numFmt formatCode="General" sourceLinked="1"/>
         <c:majorTickMark val="none"/>
@@ -5032,7 +4906,7 @@
             <a:endParaRPr lang="en-US"/>
           </a:p>
         </c:txPr>
-        <c:crossAx val="-2121389136"/>
+        <c:crossAx val="-2119780712"/>
         <c:crosses val="autoZero"/>
         <c:crossBetween val="between"/>
       </c:valAx>
@@ -5048,6 +4922,7 @@
     </c:plotArea>
     <c:legend>
       <c:legendPos val="b"/>
+      <c:layout/>
       <c:overlay val="0"/>
       <c:spPr>
         <a:noFill/>
@@ -5098,10 +4973,10 @@
       <a:endParaRPr lang="en-US"/>
     </a:p>
   </c:txPr>
-  <c:externalData r:id="rId3">
+  <c:externalData r:id="rId1">
     <c:autoUpdate val="0"/>
   </c:externalData>
-  <c:userShapes r:id="rId4"/>
+  <c:userShapes r:id="rId2"/>
 </c:chartSpace>
 </file>
 
@@ -5727,11 +5602,11 @@
         </c:dLbls>
         <c:gapWidth val="219"/>
         <c:overlap val="100"/>
-        <c:axId val="-2044249712"/>
-        <c:axId val="-2044254432"/>
+        <c:axId val="2125157272"/>
+        <c:axId val="2125127064"/>
       </c:barChart>
       <c:catAx>
-        <c:axId val="-2044249712"/>
+        <c:axId val="2125157272"/>
         <c:scaling>
           <c:orientation val="minMax"/>
         </c:scaling>
@@ -5741,7 +5616,7 @@
         <c:majorTickMark val="none"/>
         <c:minorTickMark val="none"/>
         <c:tickLblPos val="nextTo"/>
-        <c:crossAx val="-2044254432"/>
+        <c:crossAx val="2125127064"/>
         <c:crosses val="autoZero"/>
         <c:auto val="1"/>
         <c:lblAlgn val="ctr"/>
@@ -5749,7 +5624,7 @@
         <c:noMultiLvlLbl val="0"/>
       </c:catAx>
       <c:valAx>
-        <c:axId val="-2044254432"/>
+        <c:axId val="2125127064"/>
         <c:scaling>
           <c:orientation val="minMax"/>
         </c:scaling>
@@ -5878,7 +5753,7 @@
             <a:endParaRPr lang="en-US"/>
           </a:p>
         </c:txPr>
-        <c:crossAx val="-2044249712"/>
+        <c:crossAx val="2125157272"/>
         <c:crosses val="autoZero"/>
         <c:crossBetween val="between"/>
       </c:valAx>
@@ -6350,11 +6225,11 @@
         </c:dLbls>
         <c:gapWidth val="219"/>
         <c:overlap val="-27"/>
-        <c:axId val="-2067847072"/>
-        <c:axId val="2124877344"/>
+        <c:axId val="2096135784"/>
+        <c:axId val="2096139496"/>
       </c:barChart>
       <c:catAx>
-        <c:axId val="-2067847072"/>
+        <c:axId val="2096135784"/>
         <c:scaling>
           <c:orientation val="minMax"/>
         </c:scaling>
@@ -6394,7 +6269,7 @@
             <a:endParaRPr lang="en-US"/>
           </a:p>
         </c:txPr>
-        <c:crossAx val="2124877344"/>
+        <c:crossAx val="2096139496"/>
         <c:crosses val="autoZero"/>
         <c:auto val="1"/>
         <c:lblAlgn val="ctr"/>
@@ -6402,7 +6277,7 @@
         <c:noMultiLvlLbl val="0"/>
       </c:catAx>
       <c:valAx>
-        <c:axId val="2124877344"/>
+        <c:axId val="2096139496"/>
         <c:scaling>
           <c:orientation val="minMax"/>
         </c:scaling>
@@ -6461,6 +6336,7 @@
               </a:p>
             </c:rich>
           </c:tx>
+          <c:layout/>
           <c:overlay val="0"/>
           <c:spPr>
             <a:noFill/>
@@ -6469,26 +6345,6 @@
             </a:ln>
             <a:effectLst/>
           </c:spPr>
-          <c:txPr>
-            <a:bodyPr rot="-5400000" spcFirstLastPara="1" vertOverflow="ellipsis" vert="horz" wrap="square" anchor="ctr" anchorCtr="1"/>
-            <a:lstStyle/>
-            <a:p>
-              <a:pPr>
-                <a:defRPr sz="1400" b="0" i="0" u="none" strike="noStrike" kern="1200" baseline="0">
-                  <a:solidFill>
-                    <a:schemeClr val="tx1">
-                      <a:lumMod val="65000"/>
-                      <a:lumOff val="35000"/>
-                    </a:schemeClr>
-                  </a:solidFill>
-                  <a:latin typeface="+mn-lt"/>
-                  <a:ea typeface="+mn-ea"/>
-                  <a:cs typeface="+mn-cs"/>
-                </a:defRPr>
-              </a:pPr>
-              <a:endParaRPr lang="en-US"/>
-            </a:p>
-          </c:txPr>
         </c:title>
         <c:numFmt formatCode="General" sourceLinked="1"/>
         <c:majorTickMark val="none"/>
@@ -6523,7 +6379,7 @@
             <a:endParaRPr lang="en-US"/>
           </a:p>
         </c:txPr>
-        <c:crossAx val="-2067847072"/>
+        <c:crossAx val="2096135784"/>
         <c:crosses val="autoZero"/>
         <c:crossBetween val="between"/>
       </c:valAx>
@@ -6539,6 +6395,7 @@
     </c:plotArea>
     <c:legend>
       <c:legendPos val="b"/>
+      <c:layout/>
       <c:overlay val="0"/>
       <c:spPr>
         <a:noFill/>
@@ -6589,7 +6446,7 @@
       <a:endParaRPr lang="en-US"/>
     </a:p>
   </c:txPr>
-  <c:externalData r:id="rId3">
+  <c:externalData r:id="rId1">
     <c:autoUpdate val="0"/>
   </c:externalData>
 </c:chartSpace>
@@ -7247,11 +7104,11 @@
         </c:dLbls>
         <c:gapWidth val="219"/>
         <c:overlap val="100"/>
-        <c:axId val="-2048196352"/>
-        <c:axId val="-2050609632"/>
+        <c:axId val="2125011832"/>
+        <c:axId val="2125014952"/>
       </c:barChart>
       <c:catAx>
-        <c:axId val="-2048196352"/>
+        <c:axId val="2125011832"/>
         <c:scaling>
           <c:orientation val="minMax"/>
         </c:scaling>
@@ -7261,7 +7118,7 @@
         <c:majorTickMark val="none"/>
         <c:minorTickMark val="none"/>
         <c:tickLblPos val="nextTo"/>
-        <c:crossAx val="-2050609632"/>
+        <c:crossAx val="2125014952"/>
         <c:crosses val="autoZero"/>
         <c:auto val="1"/>
         <c:lblAlgn val="ctr"/>
@@ -7269,7 +7126,7 @@
         <c:noMultiLvlLbl val="0"/>
       </c:catAx>
       <c:valAx>
-        <c:axId val="-2050609632"/>
+        <c:axId val="2125014952"/>
         <c:scaling>
           <c:orientation val="minMax"/>
         </c:scaling>
@@ -7398,7 +7255,7 @@
             <a:endParaRPr lang="en-US"/>
           </a:p>
         </c:txPr>
-        <c:crossAx val="-2048196352"/>
+        <c:crossAx val="2125011832"/>
         <c:crosses val="autoZero"/>
         <c:crossBetween val="between"/>
       </c:valAx>
@@ -8232,11 +8089,11 @@
         </c:dLbls>
         <c:gapWidth val="219"/>
         <c:overlap val="100"/>
-        <c:axId val="-2048043808"/>
-        <c:axId val="-2054465280"/>
+        <c:axId val="2124745208"/>
+        <c:axId val="2124738760"/>
       </c:barChart>
       <c:catAx>
-        <c:axId val="-2048043808"/>
+        <c:axId val="2124745208"/>
         <c:scaling>
           <c:orientation val="minMax"/>
         </c:scaling>
@@ -8246,7 +8103,7 @@
         <c:majorTickMark val="none"/>
         <c:minorTickMark val="none"/>
         <c:tickLblPos val="nextTo"/>
-        <c:crossAx val="-2054465280"/>
+        <c:crossAx val="2124738760"/>
         <c:crosses val="autoZero"/>
         <c:auto val="1"/>
         <c:lblAlgn val="ctr"/>
@@ -8254,7 +8111,7 @@
         <c:noMultiLvlLbl val="0"/>
       </c:catAx>
       <c:valAx>
-        <c:axId val="-2054465280"/>
+        <c:axId val="2124738760"/>
         <c:scaling>
           <c:orientation val="minMax"/>
         </c:scaling>
@@ -8383,7 +8240,7 @@
             <a:endParaRPr lang="en-US"/>
           </a:p>
         </c:txPr>
-        <c:crossAx val="-2048043808"/>
+        <c:crossAx val="2124745208"/>
         <c:crosses val="autoZero"/>
         <c:crossBetween val="between"/>
       </c:valAx>
@@ -8522,7 +8379,7 @@
                   <c:v>No Shading</c:v>
                 </c:pt>
                 <c:pt idx="1">
-                  <c:v>Louvers at 45°</c:v>
+                  <c:v>Static Panels at 45°</c:v>
                 </c:pt>
                 <c:pt idx="2">
                   <c:v>ASF</c:v>
@@ -8585,7 +8442,7 @@
                   <c:v>No Shading</c:v>
                 </c:pt>
                 <c:pt idx="1">
-                  <c:v>Louvers at 45°</c:v>
+                  <c:v>Static Panels at 45°</c:v>
                 </c:pt>
                 <c:pt idx="2">
                   <c:v>ASF</c:v>
@@ -8738,7 +8595,7 @@
                   <c:v>No Shading</c:v>
                 </c:pt>
                 <c:pt idx="1">
-                  <c:v>Louvers at 45°</c:v>
+                  <c:v>Static Panels at 45°</c:v>
                 </c:pt>
                 <c:pt idx="2">
                   <c:v>ASF</c:v>
@@ -8775,11 +8632,11 @@
         </c:dLbls>
         <c:gapWidth val="219"/>
         <c:overlap val="100"/>
-        <c:axId val="-2054335168"/>
-        <c:axId val="-2050707872"/>
+        <c:axId val="-2135983384"/>
+        <c:axId val="-2135979752"/>
       </c:barChart>
       <c:catAx>
-        <c:axId val="-2054335168"/>
+        <c:axId val="-2135983384"/>
         <c:scaling>
           <c:orientation val="minMax"/>
         </c:scaling>
@@ -8822,7 +8679,7 @@
             <a:endParaRPr lang="en-US"/>
           </a:p>
         </c:txPr>
-        <c:crossAx val="-2050707872"/>
+        <c:crossAx val="-2135979752"/>
         <c:crosses val="autoZero"/>
         <c:auto val="1"/>
         <c:lblAlgn val="ctr"/>
@@ -8830,7 +8687,7 @@
         <c:noMultiLvlLbl val="0"/>
       </c:catAx>
       <c:valAx>
-        <c:axId val="-2050707872"/>
+        <c:axId val="-2135979752"/>
         <c:scaling>
           <c:orientation val="minMax"/>
         </c:scaling>
@@ -8881,6 +8738,7 @@
               </a:p>
             </c:rich>
           </c:tx>
+          <c:layout/>
           <c:overlay val="0"/>
           <c:spPr>
             <a:noFill/>
@@ -8921,7 +8779,7 @@
             <a:endParaRPr lang="en-US"/>
           </a:p>
         </c:txPr>
-        <c:crossAx val="-2054335168"/>
+        <c:crossAx val="-2135983384"/>
         <c:crosses val="autoZero"/>
         <c:crossBetween val="between"/>
       </c:valAx>
@@ -8937,6 +8795,7 @@
     </c:plotArea>
     <c:legend>
       <c:legendPos val="b"/>
+      <c:layout/>
       <c:overlay val="0"/>
       <c:spPr>
         <a:noFill/>
@@ -9160,11 +9019,11 @@
         </c:dLbls>
         <c:gapWidth val="219"/>
         <c:overlap val="100"/>
-        <c:axId val="-2052586368"/>
-        <c:axId val="-2051123600"/>
+        <c:axId val="-2136117944"/>
+        <c:axId val="-2136123704"/>
       </c:barChart>
       <c:catAx>
-        <c:axId val="-2052586368"/>
+        <c:axId val="-2136117944"/>
         <c:scaling>
           <c:orientation val="minMax"/>
         </c:scaling>
@@ -9174,7 +9033,7 @@
         <c:majorTickMark val="none"/>
         <c:minorTickMark val="none"/>
         <c:tickLblPos val="nextTo"/>
-        <c:crossAx val="-2051123600"/>
+        <c:crossAx val="-2136123704"/>
         <c:crosses val="autoZero"/>
         <c:auto val="1"/>
         <c:lblAlgn val="ctr"/>
@@ -9182,7 +9041,7 @@
         <c:noMultiLvlLbl val="0"/>
       </c:catAx>
       <c:valAx>
-        <c:axId val="-2051123600"/>
+        <c:axId val="-2136123704"/>
         <c:scaling>
           <c:orientation val="minMax"/>
         </c:scaling>
@@ -9263,6 +9122,7 @@
               </a:p>
             </c:rich>
           </c:tx>
+          <c:layout/>
           <c:overlay val="0"/>
           <c:spPr>
             <a:noFill/>
@@ -9271,26 +9131,6 @@
             </a:ln>
             <a:effectLst/>
           </c:spPr>
-          <c:txPr>
-            <a:bodyPr rot="-5400000" spcFirstLastPara="1" vertOverflow="ellipsis" vert="horz" wrap="square" anchor="ctr" anchorCtr="1"/>
-            <a:lstStyle/>
-            <a:p>
-              <a:pPr>
-                <a:defRPr sz="2800" b="0" i="0" u="none" strike="noStrike" kern="1200" baseline="0">
-                  <a:solidFill>
-                    <a:schemeClr val="tx1">
-                      <a:lumMod val="65000"/>
-                      <a:lumOff val="35000"/>
-                    </a:schemeClr>
-                  </a:solidFill>
-                  <a:latin typeface="+mn-lt"/>
-                  <a:ea typeface="+mn-ea"/>
-                  <a:cs typeface="+mn-cs"/>
-                </a:defRPr>
-              </a:pPr>
-              <a:endParaRPr lang="en-US"/>
-            </a:p>
-          </c:txPr>
         </c:title>
         <c:numFmt formatCode="General" sourceLinked="1"/>
         <c:majorTickMark val="none"/>
@@ -9323,7 +9163,7 @@
             <a:endParaRPr lang="en-US"/>
           </a:p>
         </c:txPr>
-        <c:crossAx val="-2052586368"/>
+        <c:crossAx val="-2136117944"/>
         <c:crosses val="autoZero"/>
         <c:crossBetween val="between"/>
         <c:majorUnit val="100.0"/>
@@ -9359,7 +9199,7 @@
       <a:endParaRPr lang="en-US"/>
     </a:p>
   </c:txPr>
-  <c:externalData r:id="rId3">
+  <c:externalData r:id="rId1">
     <c:autoUpdate val="0"/>
   </c:externalData>
 </c:chartSpace>
@@ -9514,11 +9354,11 @@
         </c:dLbls>
         <c:gapWidth val="219"/>
         <c:overlap val="100"/>
-        <c:axId val="-2045172784"/>
-        <c:axId val="-2045168144"/>
+        <c:axId val="-2136538328"/>
+        <c:axId val="-2136539592"/>
       </c:barChart>
       <c:catAx>
-        <c:axId val="-2045172784"/>
+        <c:axId val="-2136538328"/>
         <c:scaling>
           <c:orientation val="minMax"/>
         </c:scaling>
@@ -9528,7 +9368,7 @@
         <c:majorTickMark val="none"/>
         <c:minorTickMark val="none"/>
         <c:tickLblPos val="nextTo"/>
-        <c:crossAx val="-2045168144"/>
+        <c:crossAx val="-2136539592"/>
         <c:crosses val="autoZero"/>
         <c:auto val="1"/>
         <c:lblAlgn val="ctr"/>
@@ -9536,7 +9376,7 @@
         <c:noMultiLvlLbl val="0"/>
       </c:catAx>
       <c:valAx>
-        <c:axId val="-2045168144"/>
+        <c:axId val="-2136539592"/>
         <c:scaling>
           <c:orientation val="minMax"/>
           <c:max val="-540.0"/>
@@ -9589,7 +9429,7 @@
             <a:endParaRPr lang="en-US"/>
           </a:p>
         </c:txPr>
-        <c:crossAx val="-2045172784"/>
+        <c:crossAx val="-2136538328"/>
         <c:crosses val="autoZero"/>
         <c:crossBetween val="between"/>
         <c:majorUnit val="10.0"/>
@@ -9625,7 +9465,7 @@
       <a:endParaRPr lang="en-US"/>
     </a:p>
   </c:txPr>
-  <c:externalData r:id="rId3">
+  <c:externalData r:id="rId1">
     <c:autoUpdate val="0"/>
   </c:externalData>
 </c:chartSpace>
@@ -9784,11 +9624,11 @@
         </c:dLbls>
         <c:gapWidth val="219"/>
         <c:overlap val="100"/>
-        <c:axId val="-2139858320"/>
-        <c:axId val="-2073473776"/>
+        <c:axId val="-2136597656"/>
+        <c:axId val="-2136594680"/>
       </c:barChart>
       <c:catAx>
-        <c:axId val="-2139858320"/>
+        <c:axId val="-2136597656"/>
         <c:scaling>
           <c:orientation val="minMax"/>
         </c:scaling>
@@ -9798,7 +9638,7 @@
         <c:majorTickMark val="none"/>
         <c:minorTickMark val="none"/>
         <c:tickLblPos val="nextTo"/>
-        <c:crossAx val="-2073473776"/>
+        <c:crossAx val="-2136594680"/>
         <c:crosses val="autoZero"/>
         <c:auto val="1"/>
         <c:lblAlgn val="ctr"/>
@@ -9806,7 +9646,7 @@
         <c:noMultiLvlLbl val="0"/>
       </c:catAx>
       <c:valAx>
-        <c:axId val="-2073473776"/>
+        <c:axId val="-2136594680"/>
         <c:scaling>
           <c:orientation val="minMax"/>
         </c:scaling>
@@ -9887,6 +9727,7 @@
               </a:p>
             </c:rich>
           </c:tx>
+          <c:layout/>
           <c:overlay val="0"/>
           <c:spPr>
             <a:noFill/>
@@ -9895,26 +9736,6 @@
             </a:ln>
             <a:effectLst/>
           </c:spPr>
-          <c:txPr>
-            <a:bodyPr rot="-5400000" spcFirstLastPara="1" vertOverflow="ellipsis" vert="horz" wrap="square" anchor="ctr" anchorCtr="1"/>
-            <a:lstStyle/>
-            <a:p>
-              <a:pPr>
-                <a:defRPr sz="2800" b="0" i="0" u="none" strike="noStrike" kern="1200" baseline="0">
-                  <a:solidFill>
-                    <a:schemeClr val="tx1">
-                      <a:lumMod val="65000"/>
-                      <a:lumOff val="35000"/>
-                    </a:schemeClr>
-                  </a:solidFill>
-                  <a:latin typeface="+mn-lt"/>
-                  <a:ea typeface="+mn-ea"/>
-                  <a:cs typeface="+mn-cs"/>
-                </a:defRPr>
-              </a:pPr>
-              <a:endParaRPr lang="en-US"/>
-            </a:p>
-          </c:txPr>
         </c:title>
         <c:numFmt formatCode="General" sourceLinked="1"/>
         <c:majorTickMark val="none"/>
@@ -9947,7 +9768,7 @@
             <a:endParaRPr lang="en-US"/>
           </a:p>
         </c:txPr>
-        <c:crossAx val="-2139858320"/>
+        <c:crossAx val="-2136597656"/>
         <c:crosses val="autoZero"/>
         <c:crossBetween val="between"/>
         <c:majorUnit val="100.0"/>
@@ -9983,7 +9804,7 @@
       <a:endParaRPr lang="en-US"/>
     </a:p>
   </c:txPr>
-  <c:externalData r:id="rId3">
+  <c:externalData r:id="rId1">
     <c:autoUpdate val="0"/>
   </c:externalData>
 </c:chartSpace>
@@ -10150,11 +9971,11 @@
         </c:dLbls>
         <c:gapWidth val="219"/>
         <c:overlap val="100"/>
-        <c:axId val="-2055156896"/>
-        <c:axId val="-2050186672"/>
+        <c:axId val="-2136766968"/>
+        <c:axId val="-2136763992"/>
       </c:barChart>
       <c:catAx>
-        <c:axId val="-2055156896"/>
+        <c:axId val="-2136766968"/>
         <c:scaling>
           <c:orientation val="minMax"/>
         </c:scaling>
@@ -10164,7 +9985,7 @@
         <c:majorTickMark val="none"/>
         <c:minorTickMark val="none"/>
         <c:tickLblPos val="nextTo"/>
-        <c:crossAx val="-2050186672"/>
+        <c:crossAx val="-2136763992"/>
         <c:crosses val="autoZero"/>
         <c:auto val="1"/>
         <c:lblAlgn val="ctr"/>
@@ -10172,7 +9993,7 @@
         <c:noMultiLvlLbl val="0"/>
       </c:catAx>
       <c:valAx>
-        <c:axId val="-2050186672"/>
+        <c:axId val="-2136763992"/>
         <c:scaling>
           <c:orientation val="minMax"/>
           <c:max val="-500.0"/>
@@ -10225,7 +10046,7 @@
             <a:endParaRPr lang="en-US"/>
           </a:p>
         </c:txPr>
-        <c:crossAx val="-2055156896"/>
+        <c:crossAx val="-2136766968"/>
         <c:crosses val="autoZero"/>
         <c:crossBetween val="between"/>
         <c:majorUnit val="10.0"/>
@@ -10261,7 +10082,7 @@
       <a:endParaRPr lang="en-US"/>
     </a:p>
   </c:txPr>
-  <c:externalData r:id="rId3">
+  <c:externalData r:id="rId1">
     <c:autoUpdate val="0"/>
   </c:externalData>
 </c:chartSpace>
@@ -10420,11 +10241,11 @@
         </c:dLbls>
         <c:gapWidth val="219"/>
         <c:overlap val="100"/>
-        <c:axId val="2086588848"/>
-        <c:axId val="-2147344560"/>
+        <c:axId val="-2136882824"/>
+        <c:axId val="-2136879848"/>
       </c:barChart>
       <c:catAx>
-        <c:axId val="2086588848"/>
+        <c:axId val="-2136882824"/>
         <c:scaling>
           <c:orientation val="minMax"/>
         </c:scaling>
@@ -10434,7 +10255,7 @@
         <c:majorTickMark val="none"/>
         <c:minorTickMark val="none"/>
         <c:tickLblPos val="nextTo"/>
-        <c:crossAx val="-2147344560"/>
+        <c:crossAx val="-2136879848"/>
         <c:crosses val="autoZero"/>
         <c:auto val="1"/>
         <c:lblAlgn val="ctr"/>
@@ -10442,7 +10263,7 @@
         <c:noMultiLvlLbl val="0"/>
       </c:catAx>
       <c:valAx>
-        <c:axId val="-2147344560"/>
+        <c:axId val="-2136879848"/>
         <c:scaling>
           <c:orientation val="minMax"/>
         </c:scaling>
@@ -10523,6 +10344,7 @@
               </a:p>
             </c:rich>
           </c:tx>
+          <c:layout/>
           <c:overlay val="0"/>
           <c:spPr>
             <a:noFill/>
@@ -10531,26 +10353,6 @@
             </a:ln>
             <a:effectLst/>
           </c:spPr>
-          <c:txPr>
-            <a:bodyPr rot="-5400000" spcFirstLastPara="1" vertOverflow="ellipsis" vert="horz" wrap="square" anchor="ctr" anchorCtr="1"/>
-            <a:lstStyle/>
-            <a:p>
-              <a:pPr>
-                <a:defRPr sz="2800" b="0" i="0" u="none" strike="noStrike" kern="1200" baseline="0">
-                  <a:solidFill>
-                    <a:schemeClr val="tx1">
-                      <a:lumMod val="65000"/>
-                      <a:lumOff val="35000"/>
-                    </a:schemeClr>
-                  </a:solidFill>
-                  <a:latin typeface="+mn-lt"/>
-                  <a:ea typeface="+mn-ea"/>
-                  <a:cs typeface="+mn-cs"/>
-                </a:defRPr>
-              </a:pPr>
-              <a:endParaRPr lang="en-US"/>
-            </a:p>
-          </c:txPr>
         </c:title>
         <c:numFmt formatCode="General" sourceLinked="1"/>
         <c:majorTickMark val="none"/>
@@ -10583,7 +10385,7 @@
             <a:endParaRPr lang="en-US"/>
           </a:p>
         </c:txPr>
-        <c:crossAx val="2086588848"/>
+        <c:crossAx val="-2136882824"/>
         <c:crosses val="autoZero"/>
         <c:crossBetween val="between"/>
         <c:majorUnit val="100.0"/>
@@ -10619,7 +10421,7 @@
       <a:endParaRPr lang="en-US"/>
     </a:p>
   </c:txPr>
-  <c:externalData r:id="rId3">
+  <c:externalData r:id="rId1">
     <c:autoUpdate val="0"/>
   </c:externalData>
 </c:chartSpace>
@@ -10909,11 +10711,11 @@
         </c:dLbls>
         <c:gapWidth val="219"/>
         <c:overlap val="-27"/>
-        <c:axId val="-2047346720"/>
-        <c:axId val="-2121968464"/>
+        <c:axId val="2125618968"/>
+        <c:axId val="-2119694728"/>
       </c:barChart>
       <c:catAx>
-        <c:axId val="-2047346720"/>
+        <c:axId val="2125618968"/>
         <c:scaling>
           <c:orientation val="minMax"/>
         </c:scaling>
@@ -10953,7 +10755,7 @@
             <a:endParaRPr lang="en-US"/>
           </a:p>
         </c:txPr>
-        <c:crossAx val="-2121968464"/>
+        <c:crossAx val="-2119694728"/>
         <c:crosses val="autoZero"/>
         <c:auto val="1"/>
         <c:lblAlgn val="ctr"/>
@@ -10961,7 +10763,7 @@
         <c:noMultiLvlLbl val="0"/>
       </c:catAx>
       <c:valAx>
-        <c:axId val="-2121968464"/>
+        <c:axId val="-2119694728"/>
         <c:scaling>
           <c:orientation val="minMax"/>
         </c:scaling>
@@ -11032,6 +10834,7 @@
               </a:p>
             </c:rich>
           </c:tx>
+          <c:layout/>
           <c:overlay val="0"/>
           <c:spPr>
             <a:noFill/>
@@ -11040,26 +10843,6 @@
             </a:ln>
             <a:effectLst/>
           </c:spPr>
-          <c:txPr>
-            <a:bodyPr rot="-5400000" spcFirstLastPara="1" vertOverflow="ellipsis" vert="horz" wrap="square" anchor="ctr" anchorCtr="1"/>
-            <a:lstStyle/>
-            <a:p>
-              <a:pPr>
-                <a:defRPr sz="1400" b="0" i="0" u="none" strike="noStrike" kern="1200" baseline="0">
-                  <a:solidFill>
-                    <a:schemeClr val="tx1">
-                      <a:lumMod val="65000"/>
-                      <a:lumOff val="35000"/>
-                    </a:schemeClr>
-                  </a:solidFill>
-                  <a:latin typeface="+mn-lt"/>
-                  <a:ea typeface="+mn-ea"/>
-                  <a:cs typeface="+mn-cs"/>
-                </a:defRPr>
-              </a:pPr>
-              <a:endParaRPr lang="en-US"/>
-            </a:p>
-          </c:txPr>
         </c:title>
         <c:numFmt formatCode="General" sourceLinked="1"/>
         <c:majorTickMark val="none"/>
@@ -11094,7 +10877,7 @@
             <a:endParaRPr lang="en-US"/>
           </a:p>
         </c:txPr>
-        <c:crossAx val="-2047346720"/>
+        <c:crossAx val="2125618968"/>
         <c:crosses val="autoZero"/>
         <c:crossBetween val="between"/>
       </c:valAx>
@@ -11110,6 +10893,7 @@
     </c:plotArea>
     <c:legend>
       <c:legendPos val="b"/>
+      <c:layout/>
       <c:overlay val="0"/>
       <c:spPr>
         <a:noFill/>
@@ -11160,7 +10944,7 @@
       <a:endParaRPr lang="en-US"/>
     </a:p>
   </c:txPr>
-  <c:externalData r:id="rId3">
+  <c:externalData r:id="rId1">
     <c:autoUpdate val="0"/>
   </c:externalData>
 </c:chartSpace>
@@ -11702,11 +11486,11 @@
         </c:dLbls>
         <c:gapWidth val="219"/>
         <c:overlap val="-27"/>
-        <c:axId val="-2055013168"/>
-        <c:axId val="-2069193744"/>
+        <c:axId val="2126086920"/>
+        <c:axId val="2126118552"/>
       </c:barChart>
       <c:catAx>
-        <c:axId val="-2055013168"/>
+        <c:axId val="2126086920"/>
         <c:scaling>
           <c:orientation val="minMax"/>
         </c:scaling>
@@ -11746,7 +11530,7 @@
             <a:endParaRPr lang="en-US"/>
           </a:p>
         </c:txPr>
-        <c:crossAx val="-2069193744"/>
+        <c:crossAx val="2126118552"/>
         <c:crosses val="autoZero"/>
         <c:auto val="1"/>
         <c:lblAlgn val="ctr"/>
@@ -11754,7 +11538,7 @@
         <c:noMultiLvlLbl val="0"/>
       </c:catAx>
       <c:valAx>
-        <c:axId val="-2069193744"/>
+        <c:axId val="2126118552"/>
         <c:scaling>
           <c:orientation val="minMax"/>
         </c:scaling>
@@ -11800,7 +11584,17 @@
               </a:p>
               <a:p>
                 <a:pPr>
-                  <a:defRPr sz="1400"/>
+                  <a:defRPr sz="1400" b="0" i="0" u="none" strike="noStrike" kern="1200" baseline="0">
+                    <a:solidFill>
+                      <a:schemeClr val="tx1">
+                        <a:lumMod val="65000"/>
+                        <a:lumOff val="35000"/>
+                      </a:schemeClr>
+                    </a:solidFill>
+                    <a:latin typeface="+mn-lt"/>
+                    <a:ea typeface="+mn-ea"/>
+                    <a:cs typeface="+mn-cs"/>
+                  </a:defRPr>
                 </a:pPr>
                 <a:r>
                   <a:rPr lang="en-US" sz="1600" dirty="0" smtClean="0"/>
@@ -11839,26 +11633,6 @@
             </a:ln>
             <a:effectLst/>
           </c:spPr>
-          <c:txPr>
-            <a:bodyPr rot="-5400000" spcFirstLastPara="1" vertOverflow="ellipsis" vert="horz" wrap="square" anchor="ctr" anchorCtr="1"/>
-            <a:lstStyle/>
-            <a:p>
-              <a:pPr>
-                <a:defRPr sz="1400" b="0" i="0" u="none" strike="noStrike" kern="1200" baseline="0">
-                  <a:solidFill>
-                    <a:schemeClr val="tx1">
-                      <a:lumMod val="65000"/>
-                      <a:lumOff val="35000"/>
-                    </a:schemeClr>
-                  </a:solidFill>
-                  <a:latin typeface="+mn-lt"/>
-                  <a:ea typeface="+mn-ea"/>
-                  <a:cs typeface="+mn-cs"/>
-                </a:defRPr>
-              </a:pPr>
-              <a:endParaRPr lang="en-US"/>
-            </a:p>
-          </c:txPr>
         </c:title>
         <c:numFmt formatCode="General" sourceLinked="1"/>
         <c:majorTickMark val="none"/>
@@ -11893,7 +11667,7 @@
             <a:endParaRPr lang="en-US"/>
           </a:p>
         </c:txPr>
-        <c:crossAx val="-2055013168"/>
+        <c:crossAx val="2126086920"/>
         <c:crosses val="autoZero"/>
         <c:crossBetween val="between"/>
       </c:valAx>
@@ -11960,7 +11734,7 @@
       <a:endParaRPr lang="en-US"/>
     </a:p>
   </c:txPr>
-  <c:externalData r:id="rId3">
+  <c:externalData r:id="rId1">
     <c:autoUpdate val="0"/>
   </c:externalData>
 </c:chartSpace>
@@ -12285,11 +12059,11 @@
         </c:dLbls>
         <c:gapWidth val="219"/>
         <c:overlap val="-27"/>
-        <c:axId val="-2045225680"/>
-        <c:axId val="-2045222112"/>
+        <c:axId val="2126313016"/>
+        <c:axId val="2126416376"/>
       </c:barChart>
       <c:catAx>
-        <c:axId val="-2045225680"/>
+        <c:axId val="2126313016"/>
         <c:scaling>
           <c:orientation val="minMax"/>
         </c:scaling>
@@ -12329,7 +12103,7 @@
             <a:endParaRPr lang="en-US"/>
           </a:p>
         </c:txPr>
-        <c:crossAx val="-2045222112"/>
+        <c:crossAx val="2126416376"/>
         <c:crosses val="autoZero"/>
         <c:auto val="1"/>
         <c:lblAlgn val="ctr"/>
@@ -12337,7 +12111,7 @@
         <c:noMultiLvlLbl val="0"/>
       </c:catAx>
       <c:valAx>
-        <c:axId val="-2045222112"/>
+        <c:axId val="2126416376"/>
         <c:scaling>
           <c:orientation val="minMax"/>
         </c:scaling>
@@ -12383,7 +12157,17 @@
               </a:p>
               <a:p>
                 <a:pPr>
-                  <a:defRPr sz="1400"/>
+                  <a:defRPr sz="1400" b="0" i="0" u="none" strike="noStrike" kern="1200" baseline="0">
+                    <a:solidFill>
+                      <a:schemeClr val="tx1">
+                        <a:lumMod val="65000"/>
+                        <a:lumOff val="35000"/>
+                      </a:schemeClr>
+                    </a:solidFill>
+                    <a:latin typeface="+mn-lt"/>
+                    <a:ea typeface="+mn-ea"/>
+                    <a:cs typeface="+mn-cs"/>
+                  </a:defRPr>
                 </a:pPr>
                 <a:r>
                   <a:rPr lang="en-US" sz="1600" noProof="1" smtClean="0"/>
@@ -12414,26 +12198,6 @@
             </a:ln>
             <a:effectLst/>
           </c:spPr>
-          <c:txPr>
-            <a:bodyPr rot="-5400000" spcFirstLastPara="1" vertOverflow="ellipsis" vert="horz" wrap="square" anchor="ctr" anchorCtr="1"/>
-            <a:lstStyle/>
-            <a:p>
-              <a:pPr>
-                <a:defRPr sz="1400" b="0" i="0" u="none" strike="noStrike" kern="1200" baseline="0">
-                  <a:solidFill>
-                    <a:schemeClr val="tx1">
-                      <a:lumMod val="65000"/>
-                      <a:lumOff val="35000"/>
-                    </a:schemeClr>
-                  </a:solidFill>
-                  <a:latin typeface="+mn-lt"/>
-                  <a:ea typeface="+mn-ea"/>
-                  <a:cs typeface="+mn-cs"/>
-                </a:defRPr>
-              </a:pPr>
-              <a:endParaRPr lang="en-US"/>
-            </a:p>
-          </c:txPr>
         </c:title>
         <c:numFmt formatCode="General" sourceLinked="1"/>
         <c:majorTickMark val="none"/>
@@ -12468,7 +12232,7 @@
             <a:endParaRPr lang="en-US"/>
           </a:p>
         </c:txPr>
-        <c:crossAx val="-2045225680"/>
+        <c:crossAx val="2126313016"/>
         <c:crosses val="autoZero"/>
         <c:crossBetween val="between"/>
       </c:valAx>
@@ -12535,7 +12299,7 @@
       <a:endParaRPr lang="en-US"/>
     </a:p>
   </c:txPr>
-  <c:externalData r:id="rId3">
+  <c:externalData r:id="rId1">
     <c:autoUpdate val="0"/>
   </c:externalData>
 </c:chartSpace>
@@ -12638,11 +12402,11 @@
         </c:dLbls>
         <c:gapWidth val="219"/>
         <c:overlap val="-27"/>
-        <c:axId val="-2047018752"/>
-        <c:axId val="-2079819728"/>
+        <c:axId val="-2119266248"/>
+        <c:axId val="-2119262568"/>
       </c:barChart>
       <c:catAx>
-        <c:axId val="-2047018752"/>
+        <c:axId val="-2119266248"/>
         <c:scaling>
           <c:orientation val="minMax"/>
         </c:scaling>
@@ -12682,7 +12446,7 @@
             <a:endParaRPr lang="en-US"/>
           </a:p>
         </c:txPr>
-        <c:crossAx val="-2079819728"/>
+        <c:crossAx val="-2119262568"/>
         <c:crosses val="autoZero"/>
         <c:auto val="1"/>
         <c:lblAlgn val="ctr"/>
@@ -12690,7 +12454,7 @@
         <c:noMultiLvlLbl val="0"/>
       </c:catAx>
       <c:valAx>
-        <c:axId val="-2079819728"/>
+        <c:axId val="-2119262568"/>
         <c:scaling>
           <c:orientation val="minMax"/>
         </c:scaling>
@@ -12736,7 +12500,17 @@
               </a:p>
               <a:p>
                 <a:pPr>
-                  <a:defRPr sz="1400"/>
+                  <a:defRPr sz="1400" b="0" i="0" u="none" strike="noStrike" kern="1200" baseline="0">
+                    <a:solidFill>
+                      <a:schemeClr val="tx1">
+                        <a:lumMod val="65000"/>
+                        <a:lumOff val="35000"/>
+                      </a:schemeClr>
+                    </a:solidFill>
+                    <a:latin typeface="+mn-lt"/>
+                    <a:ea typeface="+mn-ea"/>
+                    <a:cs typeface="+mn-cs"/>
+                  </a:defRPr>
                 </a:pPr>
                 <a:r>
                   <a:rPr lang="en-US" sz="1600" noProof="1" smtClean="0"/>
@@ -12767,26 +12541,6 @@
             </a:ln>
             <a:effectLst/>
           </c:spPr>
-          <c:txPr>
-            <a:bodyPr rot="-5400000" spcFirstLastPara="1" vertOverflow="ellipsis" vert="horz" wrap="square" anchor="ctr" anchorCtr="1"/>
-            <a:lstStyle/>
-            <a:p>
-              <a:pPr>
-                <a:defRPr sz="1400" b="0" i="0" u="none" strike="noStrike" kern="1200" baseline="0">
-                  <a:solidFill>
-                    <a:schemeClr val="tx1">
-                      <a:lumMod val="65000"/>
-                      <a:lumOff val="35000"/>
-                    </a:schemeClr>
-                  </a:solidFill>
-                  <a:latin typeface="+mn-lt"/>
-                  <a:ea typeface="+mn-ea"/>
-                  <a:cs typeface="+mn-cs"/>
-                </a:defRPr>
-              </a:pPr>
-              <a:endParaRPr lang="en-US"/>
-            </a:p>
-          </c:txPr>
         </c:title>
         <c:numFmt formatCode="General" sourceLinked="1"/>
         <c:majorTickMark val="none"/>
@@ -12821,7 +12575,7 @@
             <a:endParaRPr lang="en-US"/>
           </a:p>
         </c:txPr>
-        <c:crossAx val="-2047018752"/>
+        <c:crossAx val="-2119266248"/>
         <c:crosses val="autoZero"/>
         <c:crossBetween val="between"/>
       </c:valAx>
@@ -12856,7 +12610,7 @@
       <a:endParaRPr lang="en-US"/>
     </a:p>
   </c:txPr>
-  <c:externalData r:id="rId3">
+  <c:externalData r:id="rId1">
     <c:autoUpdate val="0"/>
   </c:externalData>
 </c:chartSpace>
@@ -13131,11 +12885,11 @@
         </c:dLbls>
         <c:gapWidth val="219"/>
         <c:overlap val="100"/>
-        <c:axId val="-2051446864"/>
-        <c:axId val="-2073236128"/>
+        <c:axId val="-2119236376"/>
+        <c:axId val="-2119232888"/>
       </c:barChart>
       <c:catAx>
-        <c:axId val="-2051446864"/>
+        <c:axId val="-2119236376"/>
         <c:scaling>
           <c:orientation val="minMax"/>
         </c:scaling>
@@ -13178,7 +12932,7 @@
             <a:endParaRPr lang="en-US"/>
           </a:p>
         </c:txPr>
-        <c:crossAx val="-2073236128"/>
+        <c:crossAx val="-2119232888"/>
         <c:crosses val="autoZero"/>
         <c:auto val="1"/>
         <c:lblAlgn val="ctr"/>
@@ -13186,7 +12940,7 @@
         <c:noMultiLvlLbl val="0"/>
       </c:catAx>
       <c:valAx>
-        <c:axId val="-2073236128"/>
+        <c:axId val="-2119232888"/>
         <c:scaling>
           <c:orientation val="minMax"/>
         </c:scaling>
@@ -13246,26 +13000,6 @@
             </a:ln>
             <a:effectLst/>
           </c:spPr>
-          <c:txPr>
-            <a:bodyPr rot="-5400000" spcFirstLastPara="1" vertOverflow="ellipsis" vert="horz" wrap="square" anchor="ctr" anchorCtr="1"/>
-            <a:lstStyle/>
-            <a:p>
-              <a:pPr>
-                <a:defRPr sz="1330" b="0" i="0" u="none" strike="noStrike" kern="1200" baseline="0">
-                  <a:solidFill>
-                    <a:schemeClr val="tx1">
-                      <a:lumMod val="65000"/>
-                      <a:lumOff val="35000"/>
-                    </a:schemeClr>
-                  </a:solidFill>
-                  <a:latin typeface="+mn-lt"/>
-                  <a:ea typeface="+mn-ea"/>
-                  <a:cs typeface="+mn-cs"/>
-                </a:defRPr>
-              </a:pPr>
-              <a:endParaRPr lang="en-US"/>
-            </a:p>
-          </c:txPr>
         </c:title>
         <c:numFmt formatCode="0" sourceLinked="1"/>
         <c:majorTickMark val="none"/>
@@ -13298,7 +13032,7 @@
             <a:endParaRPr lang="en-US"/>
           </a:p>
         </c:txPr>
-        <c:crossAx val="-2051446864"/>
+        <c:crossAx val="-2119236376"/>
         <c:crosses val="autoZero"/>
         <c:crossBetween val="between"/>
       </c:valAx>
@@ -13374,7 +13108,7 @@
       <a:endParaRPr lang="en-US"/>
     </a:p>
   </c:txPr>
-  <c:externalData r:id="rId3">
+  <c:externalData r:id="rId1">
     <c:autoUpdate val="0"/>
   </c:externalData>
 </c:chartSpace>
@@ -13437,26 +13171,6 @@
         </a:ln>
         <a:effectLst/>
       </c:spPr>
-      <c:txPr>
-        <a:bodyPr rot="0" spcFirstLastPara="1" vertOverflow="ellipsis" vert="horz" wrap="square" anchor="ctr" anchorCtr="1"/>
-        <a:lstStyle/>
-        <a:p>
-          <a:pPr>
-            <a:defRPr sz="1862" b="0" i="0" u="none" strike="noStrike" kern="1200" spc="0" baseline="0">
-              <a:solidFill>
-                <a:schemeClr val="tx1">
-                  <a:lumMod val="65000"/>
-                  <a:lumOff val="35000"/>
-                </a:schemeClr>
-              </a:solidFill>
-              <a:latin typeface="+mn-lt"/>
-              <a:ea typeface="+mn-ea"/>
-              <a:cs typeface="+mn-cs"/>
-            </a:defRPr>
-          </a:pPr>
-          <a:endParaRPr lang="en-US"/>
-        </a:p>
-      </c:txPr>
     </c:title>
     <c:autoTitleDeleted val="0"/>
     <c:plotArea>
@@ -13717,7 +13431,7 @@
       <a:endParaRPr lang="en-US"/>
     </a:p>
   </c:txPr>
-  <c:externalData r:id="rId3">
+  <c:externalData r:id="rId1">
     <c:autoUpdate val="0"/>
   </c:externalData>
 </c:chartSpace>
@@ -13788,26 +13502,6 @@
         </a:ln>
         <a:effectLst/>
       </c:spPr>
-      <c:txPr>
-        <a:bodyPr rot="0" spcFirstLastPara="1" vertOverflow="ellipsis" vert="horz" wrap="square" anchor="ctr" anchorCtr="1"/>
-        <a:lstStyle/>
-        <a:p>
-          <a:pPr>
-            <a:defRPr sz="1862" b="0" i="0" u="none" strike="noStrike" kern="1200" spc="0" baseline="0">
-              <a:solidFill>
-                <a:schemeClr val="tx1">
-                  <a:lumMod val="65000"/>
-                  <a:lumOff val="35000"/>
-                </a:schemeClr>
-              </a:solidFill>
-              <a:latin typeface="+mn-lt"/>
-              <a:ea typeface="+mn-ea"/>
-              <a:cs typeface="+mn-cs"/>
-            </a:defRPr>
-          </a:pPr>
-          <a:endParaRPr lang="en-US"/>
-        </a:p>
-      </c:txPr>
     </c:title>
     <c:autoTitleDeleted val="0"/>
     <c:plotArea>
@@ -14005,7 +13699,7 @@
       <a:endParaRPr lang="en-US"/>
     </a:p>
   </c:txPr>
-  <c:externalData r:id="rId3">
+  <c:externalData r:id="rId1">
     <c:autoUpdate val="0"/>
   </c:externalData>
 </c:chartSpace>
@@ -25644,7 +25338,7 @@
           <a:p>
             <a:fld id="{8AF2A637-750D-AC4F-B19A-F61B319C6A55}" type="datetimeFigureOut">
               <a:rPr lang="en-US" smtClean="0"/>
-              <a:t>11/30/15</a:t>
+              <a:t>30/11/15</a:t>
             </a:fld>
             <a:endParaRPr lang="en-US"/>
           </a:p>
@@ -28308,7 +28002,7 @@
           <a:p>
             <a:fld id="{F87648D4-822A-184D-A945-2BBD99FACB30}" type="datetimeFigureOut">
               <a:rPr lang="en-US" smtClean="0"/>
-              <a:t>11/30/15</a:t>
+              <a:t>30/11/15</a:t>
             </a:fld>
             <a:endParaRPr lang="en-US"/>
           </a:p>
@@ -28478,7 +28172,7 @@
           <a:p>
             <a:fld id="{F87648D4-822A-184D-A945-2BBD99FACB30}" type="datetimeFigureOut">
               <a:rPr lang="en-US" smtClean="0"/>
-              <a:t>11/30/15</a:t>
+              <a:t>30/11/15</a:t>
             </a:fld>
             <a:endParaRPr lang="en-US"/>
           </a:p>
@@ -28658,7 +28352,7 @@
           <a:p>
             <a:fld id="{F87648D4-822A-184D-A945-2BBD99FACB30}" type="datetimeFigureOut">
               <a:rPr lang="en-US" smtClean="0"/>
-              <a:t>11/30/15</a:t>
+              <a:t>30/11/15</a:t>
             </a:fld>
             <a:endParaRPr lang="en-US"/>
           </a:p>
@@ -28828,7 +28522,7 @@
           <a:p>
             <a:fld id="{F87648D4-822A-184D-A945-2BBD99FACB30}" type="datetimeFigureOut">
               <a:rPr lang="en-US" smtClean="0"/>
-              <a:t>11/30/15</a:t>
+              <a:t>30/11/15</a:t>
             </a:fld>
             <a:endParaRPr lang="en-US"/>
           </a:p>
@@ -29072,7 +28766,7 @@
           <a:p>
             <a:fld id="{F87648D4-822A-184D-A945-2BBD99FACB30}" type="datetimeFigureOut">
               <a:rPr lang="en-US" smtClean="0"/>
-              <a:t>11/30/15</a:t>
+              <a:t>30/11/15</a:t>
             </a:fld>
             <a:endParaRPr lang="en-US"/>
           </a:p>
@@ -29304,7 +28998,7 @@
           <a:p>
             <a:fld id="{F87648D4-822A-184D-A945-2BBD99FACB30}" type="datetimeFigureOut">
               <a:rPr lang="en-US" smtClean="0"/>
-              <a:t>11/30/15</a:t>
+              <a:t>30/11/15</a:t>
             </a:fld>
             <a:endParaRPr lang="en-US"/>
           </a:p>
@@ -29671,7 +29365,7 @@
           <a:p>
             <a:fld id="{F87648D4-822A-184D-A945-2BBD99FACB30}" type="datetimeFigureOut">
               <a:rPr lang="en-US" smtClean="0"/>
-              <a:t>11/30/15</a:t>
+              <a:t>30/11/15</a:t>
             </a:fld>
             <a:endParaRPr lang="en-US"/>
           </a:p>
@@ -29789,7 +29483,7 @@
           <a:p>
             <a:fld id="{F87648D4-822A-184D-A945-2BBD99FACB30}" type="datetimeFigureOut">
               <a:rPr lang="en-US" smtClean="0"/>
-              <a:t>11/30/15</a:t>
+              <a:t>30/11/15</a:t>
             </a:fld>
             <a:endParaRPr lang="en-US"/>
           </a:p>
@@ -29884,7 +29578,7 @@
           <a:p>
             <a:fld id="{F87648D4-822A-184D-A945-2BBD99FACB30}" type="datetimeFigureOut">
               <a:rPr lang="en-US" smtClean="0"/>
-              <a:t>11/30/15</a:t>
+              <a:t>30/11/15</a:t>
             </a:fld>
             <a:endParaRPr lang="en-US"/>
           </a:p>
@@ -30161,7 +29855,7 @@
           <a:p>
             <a:fld id="{F87648D4-822A-184D-A945-2BBD99FACB30}" type="datetimeFigureOut">
               <a:rPr lang="en-US" smtClean="0"/>
-              <a:t>11/30/15</a:t>
+              <a:t>30/11/15</a:t>
             </a:fld>
             <a:endParaRPr lang="en-US"/>
           </a:p>
@@ -30418,7 +30112,7 @@
           <a:p>
             <a:fld id="{F87648D4-822A-184D-A945-2BBD99FACB30}" type="datetimeFigureOut">
               <a:rPr lang="en-US" smtClean="0"/>
-              <a:t>11/30/15</a:t>
+              <a:t>30/11/15</a:t>
             </a:fld>
             <a:endParaRPr lang="en-US"/>
           </a:p>
@@ -30631,7 +30325,7 @@
           <a:p>
             <a:fld id="{F87648D4-822A-184D-A945-2BBD99FACB30}" type="datetimeFigureOut">
               <a:rPr lang="en-US" smtClean="0"/>
-              <a:t>11/30/15</a:t>
+              <a:t>30/11/15</a:t>
             </a:fld>
             <a:endParaRPr lang="en-US"/>
           </a:p>
@@ -31071,7 +30765,7 @@
   <p:timing>
     <p:tnLst>
       <p:par>
-        <p:cTn id="1" dur="indefinite" restart="never" nodeType="tmRoot"/>
+        <p:cTn xmlns:p14="http://schemas.microsoft.com/office/powerpoint/2010/main" id="1" dur="indefinite" restart="never" nodeType="tmRoot"/>
       </p:par>
     </p:tnLst>
   </p:timing>
@@ -31102,7 +30796,7 @@
           <p:nvPr>
             <p:extLst>
               <p:ext uri="{D42A27DB-BD31-4B8C-83A1-F6EECF244321}">
-                <p14:modId xmlns:p14="http://schemas.microsoft.com/office/powerpoint/2010/main" val="857753112"/>
+                <p14:modId xmlns:p14="http://schemas.microsoft.com/office/powerpoint/2010/main" val="3977688763"/>
               </p:ext>
             </p:extLst>
           </p:nvPr>
@@ -31130,7 +30824,7 @@
   <p:timing>
     <p:tnLst>
       <p:par>
-        <p:cTn id="1" dur="indefinite" restart="never" nodeType="tmRoot"/>
+        <p:cTn xmlns:p14="http://schemas.microsoft.com/office/powerpoint/2010/main" id="1" dur="indefinite" restart="never" nodeType="tmRoot"/>
       </p:par>
     </p:tnLst>
   </p:timing>
@@ -31891,7 +31585,7 @@
   <p:timing>
     <p:tnLst>
       <p:par>
-        <p:cTn id="1" dur="indefinite" restart="never" nodeType="tmRoot"/>
+        <p:cTn xmlns:p14="http://schemas.microsoft.com/office/powerpoint/2010/main" id="1" dur="indefinite" restart="never" nodeType="tmRoot"/>
       </p:par>
     </p:tnLst>
   </p:timing>
@@ -31986,7 +31680,7 @@
   <p:timing>
     <p:tnLst>
       <p:par>
-        <p:cTn id="1" dur="indefinite" restart="never" nodeType="tmRoot"/>
+        <p:cTn xmlns:p14="http://schemas.microsoft.com/office/powerpoint/2010/main" id="1" dur="indefinite" restart="never" nodeType="tmRoot"/>
       </p:par>
     </p:tnLst>
   </p:timing>
@@ -32081,7 +31775,7 @@
   <p:timing>
     <p:tnLst>
       <p:par>
-        <p:cTn id="1" dur="indefinite" restart="never" nodeType="tmRoot"/>
+        <p:cTn xmlns:p14="http://schemas.microsoft.com/office/powerpoint/2010/main" id="1" dur="indefinite" restart="never" nodeType="tmRoot"/>
       </p:par>
     </p:tnLst>
   </p:timing>
@@ -32140,7 +31834,7 @@
   <p:timing>
     <p:tnLst>
       <p:par>
-        <p:cTn id="1" dur="indefinite" restart="never" nodeType="tmRoot"/>
+        <p:cTn xmlns:p14="http://schemas.microsoft.com/office/powerpoint/2010/main" id="1" dur="indefinite" restart="never" nodeType="tmRoot"/>
       </p:par>
     </p:tnLst>
   </p:timing>
@@ -32199,7 +31893,7 @@
   <p:timing>
     <p:tnLst>
       <p:par>
-        <p:cTn id="1" dur="indefinite" restart="never" nodeType="tmRoot"/>
+        <p:cTn xmlns:p14="http://schemas.microsoft.com/office/powerpoint/2010/main" id="1" dur="indefinite" restart="never" nodeType="tmRoot"/>
       </p:par>
     </p:tnLst>
   </p:timing>
@@ -32293,7 +31987,7 @@
   <p:timing>
     <p:tnLst>
       <p:par>
-        <p:cTn id="1" dur="indefinite" restart="never" nodeType="tmRoot"/>
+        <p:cTn xmlns:p14="http://schemas.microsoft.com/office/powerpoint/2010/main" id="1" dur="indefinite" restart="never" nodeType="tmRoot"/>
       </p:par>
     </p:tnLst>
   </p:timing>
@@ -32739,13 +32433,13 @@
       <p:transition spd="slow" p14:dur="2000"/>
     </mc:Choice>
     <mc:Fallback>
-      <p:transition spd="slow"/>
+      <p:transition xmlns:p14="http://schemas.microsoft.com/office/powerpoint/2010/main" spd="slow"/>
     </mc:Fallback>
   </mc:AlternateContent>
   <p:timing>
     <p:tnLst>
       <p:par>
-        <p:cTn id="1" dur="indefinite" restart="never" nodeType="tmRoot"/>
+        <p:cTn xmlns:p14="http://schemas.microsoft.com/office/powerpoint/2010/main" id="1" dur="indefinite" restart="never" nodeType="tmRoot"/>
       </p:par>
     </p:tnLst>
   </p:timing>
@@ -33210,13 +32904,13 @@
       <p:transition spd="slow" p14:dur="2000"/>
     </mc:Choice>
     <mc:Fallback>
-      <p:transition spd="slow"/>
+      <p:transition xmlns:p14="http://schemas.microsoft.com/office/powerpoint/2010/main" spd="slow"/>
     </mc:Fallback>
   </mc:AlternateContent>
   <p:timing>
     <p:tnLst>
       <p:par>
-        <p:cTn id="1" dur="indefinite" restart="never" nodeType="tmRoot"/>
+        <p:cTn xmlns:p14="http://schemas.microsoft.com/office/powerpoint/2010/main" id="1" dur="indefinite" restart="never" nodeType="tmRoot"/>
       </p:par>
     </p:tnLst>
   </p:timing>
@@ -33732,7 +33426,7 @@
   <p:timing>
     <p:tnLst>
       <p:par>
-        <p:cTn id="1" dur="indefinite" restart="never" nodeType="tmRoot"/>
+        <p:cTn xmlns:p14="http://schemas.microsoft.com/office/powerpoint/2010/main" id="1" dur="indefinite" restart="never" nodeType="tmRoot"/>
       </p:par>
     </p:tnLst>
   </p:timing>
@@ -33791,7 +33485,7 @@
   <p:timing>
     <p:tnLst>
       <p:par>
-        <p:cTn id="1" dur="indefinite" restart="never" nodeType="tmRoot"/>
+        <p:cTn xmlns:p14="http://schemas.microsoft.com/office/powerpoint/2010/main" id="1" dur="indefinite" restart="never" nodeType="tmRoot"/>
       </p:par>
     </p:tnLst>
   </p:timing>
@@ -33822,7 +33516,7 @@
           <p:nvPr>
             <p:extLst>
               <p:ext uri="{D42A27DB-BD31-4B8C-83A1-F6EECF244321}">
-                <p14:modId xmlns:p14="http://schemas.microsoft.com/office/powerpoint/2010/main" val="1661193516"/>
+                <p14:modId xmlns:p14="http://schemas.microsoft.com/office/powerpoint/2010/main" val="1540686068"/>
               </p:ext>
             </p:extLst>
           </p:nvPr>
@@ -33850,7 +33544,7 @@
   <p:timing>
     <p:tnLst>
       <p:par>
-        <p:cTn id="1" dur="indefinite" restart="never" nodeType="tmRoot"/>
+        <p:cTn xmlns:p14="http://schemas.microsoft.com/office/powerpoint/2010/main" id="1" dur="indefinite" restart="never" nodeType="tmRoot"/>
       </p:par>
     </p:tnLst>
   </p:timing>
@@ -34319,7 +34013,7 @@
   <p:timing>
     <p:tnLst>
       <p:par>
-        <p:cTn id="1" dur="indefinite" restart="never" nodeType="tmRoot"/>
+        <p:cTn xmlns:p14="http://schemas.microsoft.com/office/powerpoint/2010/main" id="1" dur="indefinite" restart="never" nodeType="tmRoot"/>
       </p:par>
     </p:tnLst>
   </p:timing>
@@ -34773,7 +34467,7 @@
   <p:timing>
     <p:tnLst>
       <p:par>
-        <p:cTn id="1" dur="indefinite" restart="never" nodeType="tmRoot"/>
+        <p:cTn xmlns:p14="http://schemas.microsoft.com/office/powerpoint/2010/main" id="1" dur="indefinite" restart="never" nodeType="tmRoot"/>
       </p:par>
     </p:tnLst>
   </p:timing>
@@ -34804,7 +34498,7 @@
           <p:nvPr>
             <p:extLst>
               <p:ext uri="{D42A27DB-BD31-4B8C-83A1-F6EECF244321}">
-                <p14:modId xmlns:p14="http://schemas.microsoft.com/office/powerpoint/2010/main" val="518729248"/>
+                <p14:modId xmlns:p14="http://schemas.microsoft.com/office/powerpoint/2010/main" val="3690905503"/>
               </p:ext>
             </p:extLst>
           </p:nvPr>
@@ -35323,7 +35017,7 @@
   <p:timing>
     <p:tnLst>
       <p:par>
-        <p:cTn id="1" dur="indefinite" restart="never" nodeType="tmRoot"/>
+        <p:cTn xmlns:p14="http://schemas.microsoft.com/office/powerpoint/2010/main" id="1" dur="indefinite" restart="never" nodeType="tmRoot"/>
       </p:par>
     </p:tnLst>
   </p:timing>
@@ -35412,7 +35106,7 @@
   <p:timing>
     <p:tnLst>
       <p:par>
-        <p:cTn id="1" dur="indefinite" restart="never" nodeType="tmRoot"/>
+        <p:cTn xmlns:p14="http://schemas.microsoft.com/office/powerpoint/2010/main" id="1" dur="indefinite" restart="never" nodeType="tmRoot"/>
       </p:par>
     </p:tnLst>
   </p:timing>
@@ -35471,7 +35165,7 @@
   <p:timing>
     <p:tnLst>
       <p:par>
-        <p:cTn id="1" dur="indefinite" restart="never" nodeType="tmRoot"/>
+        <p:cTn xmlns:p14="http://schemas.microsoft.com/office/powerpoint/2010/main" id="1" dur="indefinite" restart="never" nodeType="tmRoot"/>
       </p:par>
     </p:tnLst>
   </p:timing>
@@ -35530,7 +35224,7 @@
   <p:timing>
     <p:tnLst>
       <p:par>
-        <p:cTn id="1" dur="indefinite" restart="never" nodeType="tmRoot"/>
+        <p:cTn xmlns:p14="http://schemas.microsoft.com/office/powerpoint/2010/main" id="1" dur="indefinite" restart="never" nodeType="tmRoot"/>
       </p:par>
     </p:tnLst>
   </p:timing>
@@ -35589,7 +35283,7 @@
   <p:timing>
     <p:tnLst>
       <p:par>
-        <p:cTn id="1" dur="indefinite" restart="never" nodeType="tmRoot"/>
+        <p:cTn xmlns:p14="http://schemas.microsoft.com/office/powerpoint/2010/main" id="1" dur="indefinite" restart="never" nodeType="tmRoot"/>
       </p:par>
     </p:tnLst>
   </p:timing>
@@ -35648,7 +35342,7 @@
   <p:timing>
     <p:tnLst>
       <p:par>
-        <p:cTn id="1" dur="indefinite" restart="never" nodeType="tmRoot"/>
+        <p:cTn xmlns:p14="http://schemas.microsoft.com/office/powerpoint/2010/main" id="1" dur="indefinite" restart="never" nodeType="tmRoot"/>
       </p:par>
     </p:tnLst>
   </p:timing>
@@ -36010,7 +35704,7 @@
   <p:timing>
     <p:tnLst>
       <p:par>
-        <p:cTn id="1" dur="indefinite" restart="never" nodeType="tmRoot"/>
+        <p:cTn xmlns:p14="http://schemas.microsoft.com/office/powerpoint/2010/main" id="1" dur="indefinite" restart="never" nodeType="tmRoot"/>
       </p:par>
     </p:tnLst>
   </p:timing>
@@ -36103,7 +35797,7 @@
   <p:timing>
     <p:tnLst>
       <p:par>
-        <p:cTn id="1" dur="indefinite" restart="never" nodeType="tmRoot"/>
+        <p:cTn xmlns:p14="http://schemas.microsoft.com/office/powerpoint/2010/main" id="1" dur="indefinite" restart="never" nodeType="tmRoot"/>
       </p:par>
     </p:tnLst>
   </p:timing>
@@ -36228,7 +35922,7 @@
   <p:timing>
     <p:tnLst>
       <p:par>
-        <p:cTn id="1" dur="indefinite" restart="never" nodeType="tmRoot"/>
+        <p:cTn xmlns:p14="http://schemas.microsoft.com/office/powerpoint/2010/main" id="1" dur="indefinite" restart="never" nodeType="tmRoot"/>
       </p:par>
     </p:tnLst>
   </p:timing>
@@ -36490,7 +36184,7 @@
   <a:extraClrSchemeLst/>
   <a:extLst>
     <a:ext uri="{05A4C25C-085E-4340-85A3-A5531E510DB2}">
-      <thm15:themeFamily xmlns:thm15="http://schemas.microsoft.com/office/thememl/2012/main" name="Office Theme" id="{62F939B6-93AF-4DB8-9C6B-D6C7DFDC589F}" vid="{4A3C46E8-61CC-4603-A589-7422A47A8E4A}"/>
+      <thm15:themeFamily xmlns:thm15="http://schemas.microsoft.com/office/thememl/2012/main" xmlns="" name="Office Theme" id="{62F939B6-93AF-4DB8-9C6B-D6C7DFDC589F}" vid="{4A3C46E8-61CC-4603-A589-7422A47A8E4A}"/>
     </a:ext>
   </a:extLst>
 </a:theme>
@@ -36751,7 +36445,7 @@
   <a:extraClrSchemeLst/>
   <a:extLst>
     <a:ext uri="{05A4C25C-085E-4340-85A3-A5531E510DB2}">
-      <thm15:themeFamily xmlns:thm15="http://schemas.microsoft.com/office/thememl/2012/main" name="Office Theme" id="{62F939B6-93AF-4DB8-9C6B-D6C7DFDC589F}" vid="{4A3C46E8-61CC-4603-A589-7422A47A8E4A}"/>
+      <thm15:themeFamily xmlns:thm15="http://schemas.microsoft.com/office/thememl/2012/main" xmlns="" name="Office Theme" id="{62F939B6-93AF-4DB8-9C6B-D6C7DFDC589F}" vid="{4A3C46E8-61CC-4603-A589-7422A47A8E4A}"/>
     </a:ext>
   </a:extLst>
 </a:theme>

</xml_diff>

<commit_message>
minor changes to charts
</commit_message>
<xml_diff>
--- a/elsarticle/Images/Thesis charts.pptx
+++ b/elsarticle/Images/Thesis charts.pptx
@@ -132,7 +132,7 @@
   </p:defaultTextStyle>
   <p:extLst>
     <p:ext uri="{EFAFB233-063F-42B5-8137-9DF3F51BA10A}">
-      <p15:sldGuideLst xmlns:p15="http://schemas.microsoft.com/office/powerpoint/2012/main" xmlns="">
+      <p15:sldGuideLst xmlns="" xmlns:p15="http://schemas.microsoft.com/office/powerpoint/2012/main">
         <p15:guide id="1" orient="horz" pos="2160">
           <p15:clr>
             <a:srgbClr val="A4A3A4"/>
@@ -428,11 +428,11 @@
           <c:showPercent val="0"/>
           <c:showBubbleSize val="0"/>
         </c:dLbls>
-        <c:axId val="-2117822536"/>
-        <c:axId val="-2112843992"/>
+        <c:axId val="2127155688"/>
+        <c:axId val="2037439656"/>
       </c:scatterChart>
       <c:valAx>
-        <c:axId val="-2117822536"/>
+        <c:axId val="2127155688"/>
         <c:scaling>
           <c:orientation val="minMax"/>
         </c:scaling>
@@ -534,12 +534,12 @@
             <a:endParaRPr lang="en-US"/>
           </a:p>
         </c:txPr>
-        <c:crossAx val="-2112843992"/>
+        <c:crossAx val="2037439656"/>
         <c:crosses val="autoZero"/>
         <c:crossBetween val="midCat"/>
       </c:valAx>
       <c:valAx>
-        <c:axId val="-2112843992"/>
+        <c:axId val="2037439656"/>
         <c:scaling>
           <c:orientation val="minMax"/>
         </c:scaling>
@@ -645,7 +645,7 @@
             <a:endParaRPr lang="en-US"/>
           </a:p>
         </c:txPr>
-        <c:crossAx val="-2117822536"/>
+        <c:crossAx val="2127155688"/>
         <c:crosses val="autoZero"/>
         <c:crossBetween val="midCat"/>
       </c:valAx>
@@ -2287,11 +2287,11 @@
         </c:dLbls>
         <c:gapWidth val="150"/>
         <c:overlap val="100"/>
-        <c:axId val="-2119824520"/>
-        <c:axId val="-2119821336"/>
+        <c:axId val="-2113277704"/>
+        <c:axId val="2124279064"/>
       </c:barChart>
       <c:catAx>
-        <c:axId val="-2119824520"/>
+        <c:axId val="-2113277704"/>
         <c:scaling>
           <c:orientation val="minMax"/>
         </c:scaling>
@@ -2301,7 +2301,7 @@
         <c:majorTickMark val="none"/>
         <c:minorTickMark val="none"/>
         <c:tickLblPos val="nextTo"/>
-        <c:crossAx val="-2119821336"/>
+        <c:crossAx val="2124279064"/>
         <c:crosses val="autoZero"/>
         <c:auto val="1"/>
         <c:lblAlgn val="ctr"/>
@@ -2309,7 +2309,7 @@
         <c:noMultiLvlLbl val="0"/>
       </c:catAx>
       <c:valAx>
-        <c:axId val="-2119821336"/>
+        <c:axId val="2124279064"/>
         <c:scaling>
           <c:orientation val="minMax"/>
         </c:scaling>
@@ -2405,7 +2405,7 @@
             <a:endParaRPr lang="en-US"/>
           </a:p>
         </c:txPr>
-        <c:crossAx val="-2119824520"/>
+        <c:crossAx val="-2113277704"/>
         <c:crosses val="autoZero"/>
         <c:crossBetween val="between"/>
       </c:valAx>
@@ -2788,11 +2788,11 @@
         </c:dLbls>
         <c:gapWidth val="219"/>
         <c:overlap val="-27"/>
-        <c:axId val="-2120122120"/>
-        <c:axId val="-2120118472"/>
+        <c:axId val="-2117532488"/>
+        <c:axId val="2124389976"/>
       </c:barChart>
       <c:catAx>
-        <c:axId val="-2120122120"/>
+        <c:axId val="-2117532488"/>
         <c:scaling>
           <c:orientation val="minMax"/>
         </c:scaling>
@@ -2832,7 +2832,7 @@
             <a:endParaRPr lang="en-US"/>
           </a:p>
         </c:txPr>
-        <c:crossAx val="-2120118472"/>
+        <c:crossAx val="2124389976"/>
         <c:crosses val="autoZero"/>
         <c:auto val="1"/>
         <c:lblAlgn val="ctr"/>
@@ -2840,7 +2840,7 @@
         <c:noMultiLvlLbl val="0"/>
       </c:catAx>
       <c:valAx>
-        <c:axId val="-2120118472"/>
+        <c:axId val="2124389976"/>
         <c:scaling>
           <c:orientation val="minMax"/>
         </c:scaling>
@@ -2961,7 +2961,7 @@
             <a:endParaRPr lang="en-US"/>
           </a:p>
         </c:txPr>
-        <c:crossAx val="-2120122120"/>
+        <c:crossAx val="-2117532488"/>
         <c:crosses val="autoZero"/>
         <c:crossBetween val="between"/>
       </c:valAx>
@@ -3258,11 +3258,11 @@
         </c:dLbls>
         <c:gapWidth val="219"/>
         <c:overlap val="-27"/>
-        <c:axId val="-2119360168"/>
-        <c:axId val="-2119356536"/>
+        <c:axId val="-2112935288"/>
+        <c:axId val="-2112931656"/>
       </c:barChart>
       <c:catAx>
-        <c:axId val="-2119360168"/>
+        <c:axId val="-2112935288"/>
         <c:scaling>
           <c:orientation val="minMax"/>
         </c:scaling>
@@ -3302,7 +3302,7 @@
             <a:endParaRPr lang="en-US"/>
           </a:p>
         </c:txPr>
-        <c:crossAx val="-2119356536"/>
+        <c:crossAx val="-2112931656"/>
         <c:crosses val="autoZero"/>
         <c:auto val="1"/>
         <c:lblAlgn val="ctr"/>
@@ -3310,7 +3310,7 @@
         <c:noMultiLvlLbl val="0"/>
       </c:catAx>
       <c:valAx>
-        <c:axId val="-2119356536"/>
+        <c:axId val="-2112931656"/>
         <c:scaling>
           <c:orientation val="minMax"/>
         </c:scaling>
@@ -3431,7 +3431,7 @@
             <a:endParaRPr lang="en-US"/>
           </a:p>
         </c:txPr>
-        <c:crossAx val="-2119360168"/>
+        <c:crossAx val="-2112935288"/>
         <c:crosses val="autoZero"/>
         <c:crossBetween val="between"/>
       </c:valAx>
@@ -3961,7 +3961,7 @@
                   <c:v>-6.43</c:v>
                 </c:pt>
                 <c:pt idx="10">
-                  <c:v>-9.74</c:v>
+                  <c:v>-9.739999999999998</c:v>
                 </c:pt>
                 <c:pt idx="11">
                   <c:v>-13.05</c:v>
@@ -3996,11 +3996,11 @@
         </c:dLbls>
         <c:marker val="1"/>
         <c:smooth val="0"/>
-        <c:axId val="-2119289208"/>
-        <c:axId val="2125468488"/>
+        <c:axId val="-2113872104"/>
+        <c:axId val="-2113857048"/>
       </c:lineChart>
       <c:catAx>
-        <c:axId val="-2119289208"/>
+        <c:axId val="-2113872104"/>
         <c:scaling>
           <c:orientation val="minMax"/>
         </c:scaling>
@@ -4043,7 +4043,7 @@
             <a:endParaRPr lang="en-US"/>
           </a:p>
         </c:txPr>
-        <c:crossAx val="2125468488"/>
+        <c:crossAx val="-2113857048"/>
         <c:crosses val="autoZero"/>
         <c:auto val="1"/>
         <c:lblAlgn val="ctr"/>
@@ -4051,7 +4051,7 @@
         <c:noMultiLvlLbl val="0"/>
       </c:catAx>
       <c:valAx>
-        <c:axId val="2125468488"/>
+        <c:axId val="-2113857048"/>
         <c:scaling>
           <c:orientation val="minMax"/>
         </c:scaling>
@@ -4139,7 +4139,7 @@
             <a:endParaRPr lang="en-US"/>
           </a:p>
         </c:txPr>
-        <c:crossAx val="-2119289208"/>
+        <c:crossAx val="-2113872104"/>
         <c:crosses val="autoZero"/>
         <c:crossBetween val="between"/>
       </c:valAx>
@@ -4747,11 +4747,11 @@
         </c:dLbls>
         <c:gapWidth val="219"/>
         <c:overlap val="-27"/>
-        <c:axId val="-2119780712"/>
-        <c:axId val="-2119981864"/>
+        <c:axId val="-2135972792"/>
+        <c:axId val="-2135969016"/>
       </c:barChart>
       <c:catAx>
-        <c:axId val="-2119780712"/>
+        <c:axId val="-2135972792"/>
         <c:scaling>
           <c:orientation val="minMax"/>
         </c:scaling>
@@ -4794,7 +4794,7 @@
             <a:endParaRPr lang="en-US"/>
           </a:p>
         </c:txPr>
-        <c:crossAx val="-2119981864"/>
+        <c:crossAx val="-2135969016"/>
         <c:crosses val="autoZero"/>
         <c:auto val="1"/>
         <c:lblAlgn val="ctr"/>
@@ -4802,7 +4802,7 @@
         <c:noMultiLvlLbl val="0"/>
       </c:catAx>
       <c:valAx>
-        <c:axId val="-2119981864"/>
+        <c:axId val="-2135969016"/>
         <c:scaling>
           <c:orientation val="minMax"/>
         </c:scaling>
@@ -4906,7 +4906,7 @@
             <a:endParaRPr lang="en-US"/>
           </a:p>
         </c:txPr>
-        <c:crossAx val="-2119780712"/>
+        <c:crossAx val="-2135972792"/>
         <c:crosses val="autoZero"/>
         <c:crossBetween val="between"/>
       </c:valAx>
@@ -5602,11 +5602,11 @@
         </c:dLbls>
         <c:gapWidth val="219"/>
         <c:overlap val="100"/>
-        <c:axId val="2125157272"/>
-        <c:axId val="2125127064"/>
+        <c:axId val="-2136510136"/>
+        <c:axId val="-2136512904"/>
       </c:barChart>
       <c:catAx>
-        <c:axId val="2125157272"/>
+        <c:axId val="-2136510136"/>
         <c:scaling>
           <c:orientation val="minMax"/>
         </c:scaling>
@@ -5616,7 +5616,7 @@
         <c:majorTickMark val="none"/>
         <c:minorTickMark val="none"/>
         <c:tickLblPos val="nextTo"/>
-        <c:crossAx val="2125127064"/>
+        <c:crossAx val="-2136512904"/>
         <c:crosses val="autoZero"/>
         <c:auto val="1"/>
         <c:lblAlgn val="ctr"/>
@@ -5624,7 +5624,7 @@
         <c:noMultiLvlLbl val="0"/>
       </c:catAx>
       <c:valAx>
-        <c:axId val="2125127064"/>
+        <c:axId val="-2136512904"/>
         <c:scaling>
           <c:orientation val="minMax"/>
         </c:scaling>
@@ -5753,7 +5753,7 @@
             <a:endParaRPr lang="en-US"/>
           </a:p>
         </c:txPr>
-        <c:crossAx val="2125157272"/>
+        <c:crossAx val="-2136510136"/>
         <c:crosses val="autoZero"/>
         <c:crossBetween val="between"/>
       </c:valAx>
@@ -6225,11 +6225,11 @@
         </c:dLbls>
         <c:gapWidth val="219"/>
         <c:overlap val="-27"/>
-        <c:axId val="2096135784"/>
-        <c:axId val="2096139496"/>
+        <c:axId val="2124360312"/>
+        <c:axId val="2037096600"/>
       </c:barChart>
       <c:catAx>
-        <c:axId val="2096135784"/>
+        <c:axId val="2124360312"/>
         <c:scaling>
           <c:orientation val="minMax"/>
         </c:scaling>
@@ -6269,7 +6269,7 @@
             <a:endParaRPr lang="en-US"/>
           </a:p>
         </c:txPr>
-        <c:crossAx val="2096139496"/>
+        <c:crossAx val="2037096600"/>
         <c:crosses val="autoZero"/>
         <c:auto val="1"/>
         <c:lblAlgn val="ctr"/>
@@ -6277,7 +6277,7 @@
         <c:noMultiLvlLbl val="0"/>
       </c:catAx>
       <c:valAx>
-        <c:axId val="2096139496"/>
+        <c:axId val="2037096600"/>
         <c:scaling>
           <c:orientation val="minMax"/>
         </c:scaling>
@@ -6379,7 +6379,7 @@
             <a:endParaRPr lang="en-US"/>
           </a:p>
         </c:txPr>
-        <c:crossAx val="2096135784"/>
+        <c:crossAx val="2124360312"/>
         <c:crosses val="autoZero"/>
         <c:crossBetween val="between"/>
       </c:valAx>
@@ -7104,11 +7104,11 @@
         </c:dLbls>
         <c:gapWidth val="219"/>
         <c:overlap val="100"/>
-        <c:axId val="2125011832"/>
-        <c:axId val="2125014952"/>
+        <c:axId val="-2136756456"/>
+        <c:axId val="-2136759480"/>
       </c:barChart>
       <c:catAx>
-        <c:axId val="2125011832"/>
+        <c:axId val="-2136756456"/>
         <c:scaling>
           <c:orientation val="minMax"/>
         </c:scaling>
@@ -7118,7 +7118,7 @@
         <c:majorTickMark val="none"/>
         <c:minorTickMark val="none"/>
         <c:tickLblPos val="nextTo"/>
-        <c:crossAx val="2125014952"/>
+        <c:crossAx val="-2136759480"/>
         <c:crosses val="autoZero"/>
         <c:auto val="1"/>
         <c:lblAlgn val="ctr"/>
@@ -7126,7 +7126,7 @@
         <c:noMultiLvlLbl val="0"/>
       </c:catAx>
       <c:valAx>
-        <c:axId val="2125014952"/>
+        <c:axId val="-2136759480"/>
         <c:scaling>
           <c:orientation val="minMax"/>
         </c:scaling>
@@ -7255,7 +7255,7 @@
             <a:endParaRPr lang="en-US"/>
           </a:p>
         </c:txPr>
-        <c:crossAx val="2125011832"/>
+        <c:crossAx val="-2136756456"/>
         <c:crosses val="autoZero"/>
         <c:crossBetween val="between"/>
       </c:valAx>
@@ -8089,11 +8089,11 @@
         </c:dLbls>
         <c:gapWidth val="219"/>
         <c:overlap val="100"/>
-        <c:axId val="2124745208"/>
-        <c:axId val="2124738760"/>
+        <c:axId val="-2132859320"/>
+        <c:axId val="-2133365800"/>
       </c:barChart>
       <c:catAx>
-        <c:axId val="2124745208"/>
+        <c:axId val="-2132859320"/>
         <c:scaling>
           <c:orientation val="minMax"/>
         </c:scaling>
@@ -8103,7 +8103,7 @@
         <c:majorTickMark val="none"/>
         <c:minorTickMark val="none"/>
         <c:tickLblPos val="nextTo"/>
-        <c:crossAx val="2124738760"/>
+        <c:crossAx val="-2133365800"/>
         <c:crosses val="autoZero"/>
         <c:auto val="1"/>
         <c:lblAlgn val="ctr"/>
@@ -8111,7 +8111,7 @@
         <c:noMultiLvlLbl val="0"/>
       </c:catAx>
       <c:valAx>
-        <c:axId val="2124738760"/>
+        <c:axId val="-2133365800"/>
         <c:scaling>
           <c:orientation val="minMax"/>
         </c:scaling>
@@ -8240,7 +8240,7 @@
             <a:endParaRPr lang="en-US"/>
           </a:p>
         </c:txPr>
-        <c:crossAx val="2124745208"/>
+        <c:crossAx val="-2132859320"/>
         <c:crosses val="autoZero"/>
         <c:crossBetween val="between"/>
       </c:valAx>
@@ -8632,11 +8632,11 @@
         </c:dLbls>
         <c:gapWidth val="219"/>
         <c:overlap val="100"/>
-        <c:axId val="-2135983384"/>
-        <c:axId val="-2135979752"/>
+        <c:axId val="-2132917256"/>
+        <c:axId val="-2132920376"/>
       </c:barChart>
       <c:catAx>
-        <c:axId val="-2135983384"/>
+        <c:axId val="-2132917256"/>
         <c:scaling>
           <c:orientation val="minMax"/>
         </c:scaling>
@@ -8679,7 +8679,7 @@
             <a:endParaRPr lang="en-US"/>
           </a:p>
         </c:txPr>
-        <c:crossAx val="-2135979752"/>
+        <c:crossAx val="-2132920376"/>
         <c:crosses val="autoZero"/>
         <c:auto val="1"/>
         <c:lblAlgn val="ctr"/>
@@ -8687,7 +8687,7 @@
         <c:noMultiLvlLbl val="0"/>
       </c:catAx>
       <c:valAx>
-        <c:axId val="-2135979752"/>
+        <c:axId val="-2132920376"/>
         <c:scaling>
           <c:orientation val="minMax"/>
         </c:scaling>
@@ -8779,7 +8779,7 @@
             <a:endParaRPr lang="en-US"/>
           </a:p>
         </c:txPr>
-        <c:crossAx val="-2135983384"/>
+        <c:crossAx val="-2132917256"/>
         <c:crosses val="autoZero"/>
         <c:crossBetween val="between"/>
       </c:valAx>
@@ -9019,11 +9019,11 @@
         </c:dLbls>
         <c:gapWidth val="219"/>
         <c:overlap val="100"/>
-        <c:axId val="-2136117944"/>
-        <c:axId val="-2136123704"/>
+        <c:axId val="-2132982440"/>
+        <c:axId val="-2133001784"/>
       </c:barChart>
       <c:catAx>
-        <c:axId val="-2136117944"/>
+        <c:axId val="-2132982440"/>
         <c:scaling>
           <c:orientation val="minMax"/>
         </c:scaling>
@@ -9033,7 +9033,7 @@
         <c:majorTickMark val="none"/>
         <c:minorTickMark val="none"/>
         <c:tickLblPos val="nextTo"/>
-        <c:crossAx val="-2136123704"/>
+        <c:crossAx val="-2133001784"/>
         <c:crosses val="autoZero"/>
         <c:auto val="1"/>
         <c:lblAlgn val="ctr"/>
@@ -9041,7 +9041,7 @@
         <c:noMultiLvlLbl val="0"/>
       </c:catAx>
       <c:valAx>
-        <c:axId val="-2136123704"/>
+        <c:axId val="-2133001784"/>
         <c:scaling>
           <c:orientation val="minMax"/>
         </c:scaling>
@@ -9163,7 +9163,7 @@
             <a:endParaRPr lang="en-US"/>
           </a:p>
         </c:txPr>
-        <c:crossAx val="-2136117944"/>
+        <c:crossAx val="-2132982440"/>
         <c:crosses val="autoZero"/>
         <c:crossBetween val="between"/>
         <c:majorUnit val="100.0"/>
@@ -9354,11 +9354,11 @@
         </c:dLbls>
         <c:gapWidth val="219"/>
         <c:overlap val="100"/>
-        <c:axId val="-2136538328"/>
-        <c:axId val="-2136539592"/>
+        <c:axId val="-2133064952"/>
+        <c:axId val="-2133072216"/>
       </c:barChart>
       <c:catAx>
-        <c:axId val="-2136538328"/>
+        <c:axId val="-2133064952"/>
         <c:scaling>
           <c:orientation val="minMax"/>
         </c:scaling>
@@ -9368,7 +9368,7 @@
         <c:majorTickMark val="none"/>
         <c:minorTickMark val="none"/>
         <c:tickLblPos val="nextTo"/>
-        <c:crossAx val="-2136539592"/>
+        <c:crossAx val="-2133072216"/>
         <c:crosses val="autoZero"/>
         <c:auto val="1"/>
         <c:lblAlgn val="ctr"/>
@@ -9376,7 +9376,7 @@
         <c:noMultiLvlLbl val="0"/>
       </c:catAx>
       <c:valAx>
-        <c:axId val="-2136539592"/>
+        <c:axId val="-2133072216"/>
         <c:scaling>
           <c:orientation val="minMax"/>
           <c:max val="-540.0"/>
@@ -9429,7 +9429,7 @@
             <a:endParaRPr lang="en-US"/>
           </a:p>
         </c:txPr>
-        <c:crossAx val="-2136538328"/>
+        <c:crossAx val="-2133064952"/>
         <c:crosses val="autoZero"/>
         <c:crossBetween val="between"/>
         <c:majorUnit val="10.0"/>
@@ -9624,11 +9624,11 @@
         </c:dLbls>
         <c:gapWidth val="219"/>
         <c:overlap val="100"/>
-        <c:axId val="-2136597656"/>
-        <c:axId val="-2136594680"/>
+        <c:axId val="-2133111976"/>
+        <c:axId val="-2133109000"/>
       </c:barChart>
       <c:catAx>
-        <c:axId val="-2136597656"/>
+        <c:axId val="-2133111976"/>
         <c:scaling>
           <c:orientation val="minMax"/>
         </c:scaling>
@@ -9638,7 +9638,7 @@
         <c:majorTickMark val="none"/>
         <c:minorTickMark val="none"/>
         <c:tickLblPos val="nextTo"/>
-        <c:crossAx val="-2136594680"/>
+        <c:crossAx val="-2133109000"/>
         <c:crosses val="autoZero"/>
         <c:auto val="1"/>
         <c:lblAlgn val="ctr"/>
@@ -9646,7 +9646,7 @@
         <c:noMultiLvlLbl val="0"/>
       </c:catAx>
       <c:valAx>
-        <c:axId val="-2136594680"/>
+        <c:axId val="-2133109000"/>
         <c:scaling>
           <c:orientation val="minMax"/>
         </c:scaling>
@@ -9768,7 +9768,7 @@
             <a:endParaRPr lang="en-US"/>
           </a:p>
         </c:txPr>
-        <c:crossAx val="-2136597656"/>
+        <c:crossAx val="-2133111976"/>
         <c:crosses val="autoZero"/>
         <c:crossBetween val="between"/>
         <c:majorUnit val="100.0"/>
@@ -9971,11 +9971,11 @@
         </c:dLbls>
         <c:gapWidth val="219"/>
         <c:overlap val="100"/>
-        <c:axId val="-2136766968"/>
-        <c:axId val="-2136763992"/>
+        <c:axId val="-2133184120"/>
+        <c:axId val="-2133181144"/>
       </c:barChart>
       <c:catAx>
-        <c:axId val="-2136766968"/>
+        <c:axId val="-2133184120"/>
         <c:scaling>
           <c:orientation val="minMax"/>
         </c:scaling>
@@ -9985,7 +9985,7 @@
         <c:majorTickMark val="none"/>
         <c:minorTickMark val="none"/>
         <c:tickLblPos val="nextTo"/>
-        <c:crossAx val="-2136763992"/>
+        <c:crossAx val="-2133181144"/>
         <c:crosses val="autoZero"/>
         <c:auto val="1"/>
         <c:lblAlgn val="ctr"/>
@@ -9993,7 +9993,7 @@
         <c:noMultiLvlLbl val="0"/>
       </c:catAx>
       <c:valAx>
-        <c:axId val="-2136763992"/>
+        <c:axId val="-2133181144"/>
         <c:scaling>
           <c:orientation val="minMax"/>
           <c:max val="-500.0"/>
@@ -10046,7 +10046,7 @@
             <a:endParaRPr lang="en-US"/>
           </a:p>
         </c:txPr>
-        <c:crossAx val="-2136766968"/>
+        <c:crossAx val="-2133184120"/>
         <c:crosses val="autoZero"/>
         <c:crossBetween val="between"/>
         <c:majorUnit val="10.0"/>
@@ -10241,11 +10241,11 @@
         </c:dLbls>
         <c:gapWidth val="219"/>
         <c:overlap val="100"/>
-        <c:axId val="-2136882824"/>
-        <c:axId val="-2136879848"/>
+        <c:axId val="-2133220280"/>
+        <c:axId val="-2133225240"/>
       </c:barChart>
       <c:catAx>
-        <c:axId val="-2136882824"/>
+        <c:axId val="-2133220280"/>
         <c:scaling>
           <c:orientation val="minMax"/>
         </c:scaling>
@@ -10255,7 +10255,7 @@
         <c:majorTickMark val="none"/>
         <c:minorTickMark val="none"/>
         <c:tickLblPos val="nextTo"/>
-        <c:crossAx val="-2136879848"/>
+        <c:crossAx val="-2133225240"/>
         <c:crosses val="autoZero"/>
         <c:auto val="1"/>
         <c:lblAlgn val="ctr"/>
@@ -10263,7 +10263,7 @@
         <c:noMultiLvlLbl val="0"/>
       </c:catAx>
       <c:valAx>
-        <c:axId val="-2136879848"/>
+        <c:axId val="-2133225240"/>
         <c:scaling>
           <c:orientation val="minMax"/>
         </c:scaling>
@@ -10385,7 +10385,7 @@
             <a:endParaRPr lang="en-US"/>
           </a:p>
         </c:txPr>
-        <c:crossAx val="-2136882824"/>
+        <c:crossAx val="-2133220280"/>
         <c:crosses val="autoZero"/>
         <c:crossBetween val="between"/>
         <c:majorUnit val="100.0"/>
@@ -10711,11 +10711,11 @@
         </c:dLbls>
         <c:gapWidth val="219"/>
         <c:overlap val="-27"/>
-        <c:axId val="2125618968"/>
-        <c:axId val="-2119694728"/>
+        <c:axId val="2124092792"/>
+        <c:axId val="-2137210152"/>
       </c:barChart>
       <c:catAx>
-        <c:axId val="2125618968"/>
+        <c:axId val="2124092792"/>
         <c:scaling>
           <c:orientation val="minMax"/>
         </c:scaling>
@@ -10755,7 +10755,7 @@
             <a:endParaRPr lang="en-US"/>
           </a:p>
         </c:txPr>
-        <c:crossAx val="-2119694728"/>
+        <c:crossAx val="-2137210152"/>
         <c:crosses val="autoZero"/>
         <c:auto val="1"/>
         <c:lblAlgn val="ctr"/>
@@ -10763,7 +10763,7 @@
         <c:noMultiLvlLbl val="0"/>
       </c:catAx>
       <c:valAx>
-        <c:axId val="-2119694728"/>
+        <c:axId val="-2137210152"/>
         <c:scaling>
           <c:orientation val="minMax"/>
         </c:scaling>
@@ -10877,7 +10877,7 @@
             <a:endParaRPr lang="en-US"/>
           </a:p>
         </c:txPr>
-        <c:crossAx val="2125618968"/>
+        <c:crossAx val="2124092792"/>
         <c:crosses val="autoZero"/>
         <c:crossBetween val="between"/>
       </c:valAx>
@@ -11486,11 +11486,11 @@
         </c:dLbls>
         <c:gapWidth val="219"/>
         <c:overlap val="-27"/>
-        <c:axId val="2126086920"/>
-        <c:axId val="2126118552"/>
+        <c:axId val="-2117580952"/>
+        <c:axId val="-2118104344"/>
       </c:barChart>
       <c:catAx>
-        <c:axId val="2126086920"/>
+        <c:axId val="-2117580952"/>
         <c:scaling>
           <c:orientation val="minMax"/>
         </c:scaling>
@@ -11530,7 +11530,7 @@
             <a:endParaRPr lang="en-US"/>
           </a:p>
         </c:txPr>
-        <c:crossAx val="2126118552"/>
+        <c:crossAx val="-2118104344"/>
         <c:crosses val="autoZero"/>
         <c:auto val="1"/>
         <c:lblAlgn val="ctr"/>
@@ -11538,7 +11538,7 @@
         <c:noMultiLvlLbl val="0"/>
       </c:catAx>
       <c:valAx>
-        <c:axId val="2126118552"/>
+        <c:axId val="-2118104344"/>
         <c:scaling>
           <c:orientation val="minMax"/>
         </c:scaling>
@@ -11667,7 +11667,7 @@
             <a:endParaRPr lang="en-US"/>
           </a:p>
         </c:txPr>
-        <c:crossAx val="2126086920"/>
+        <c:crossAx val="-2117580952"/>
         <c:crosses val="autoZero"/>
         <c:crossBetween val="between"/>
       </c:valAx>
@@ -12059,11 +12059,11 @@
         </c:dLbls>
         <c:gapWidth val="219"/>
         <c:overlap val="-27"/>
-        <c:axId val="2126313016"/>
-        <c:axId val="2126416376"/>
+        <c:axId val="-2118065048"/>
+        <c:axId val="-2136878424"/>
       </c:barChart>
       <c:catAx>
-        <c:axId val="2126313016"/>
+        <c:axId val="-2118065048"/>
         <c:scaling>
           <c:orientation val="minMax"/>
         </c:scaling>
@@ -12103,7 +12103,7 @@
             <a:endParaRPr lang="en-US"/>
           </a:p>
         </c:txPr>
-        <c:crossAx val="2126416376"/>
+        <c:crossAx val="-2136878424"/>
         <c:crosses val="autoZero"/>
         <c:auto val="1"/>
         <c:lblAlgn val="ctr"/>
@@ -12111,7 +12111,7 @@
         <c:noMultiLvlLbl val="0"/>
       </c:catAx>
       <c:valAx>
-        <c:axId val="2126416376"/>
+        <c:axId val="-2136878424"/>
         <c:scaling>
           <c:orientation val="minMax"/>
         </c:scaling>
@@ -12232,7 +12232,7 @@
             <a:endParaRPr lang="en-US"/>
           </a:p>
         </c:txPr>
-        <c:crossAx val="2126313016"/>
+        <c:crossAx val="-2118065048"/>
         <c:crosses val="autoZero"/>
         <c:crossBetween val="between"/>
       </c:valAx>
@@ -12402,11 +12402,11 @@
         </c:dLbls>
         <c:gapWidth val="219"/>
         <c:overlap val="-27"/>
-        <c:axId val="-2119266248"/>
-        <c:axId val="-2119262568"/>
+        <c:axId val="-2137413304"/>
+        <c:axId val="-2137136728"/>
       </c:barChart>
       <c:catAx>
-        <c:axId val="-2119266248"/>
+        <c:axId val="-2137413304"/>
         <c:scaling>
           <c:orientation val="minMax"/>
         </c:scaling>
@@ -12446,7 +12446,7 @@
             <a:endParaRPr lang="en-US"/>
           </a:p>
         </c:txPr>
-        <c:crossAx val="-2119262568"/>
+        <c:crossAx val="-2137136728"/>
         <c:crosses val="autoZero"/>
         <c:auto val="1"/>
         <c:lblAlgn val="ctr"/>
@@ -12454,7 +12454,7 @@
         <c:noMultiLvlLbl val="0"/>
       </c:catAx>
       <c:valAx>
-        <c:axId val="-2119262568"/>
+        <c:axId val="-2137136728"/>
         <c:scaling>
           <c:orientation val="minMax"/>
         </c:scaling>
@@ -12575,7 +12575,7 @@
             <a:endParaRPr lang="en-US"/>
           </a:p>
         </c:txPr>
-        <c:crossAx val="-2119266248"/>
+        <c:crossAx val="-2137413304"/>
         <c:crosses val="autoZero"/>
         <c:crossBetween val="between"/>
       </c:valAx>
@@ -12885,11 +12885,11 @@
         </c:dLbls>
         <c:gapWidth val="219"/>
         <c:overlap val="100"/>
-        <c:axId val="-2119236376"/>
-        <c:axId val="-2119232888"/>
+        <c:axId val="2123990280"/>
+        <c:axId val="2124391416"/>
       </c:barChart>
       <c:catAx>
-        <c:axId val="-2119236376"/>
+        <c:axId val="2123990280"/>
         <c:scaling>
           <c:orientation val="minMax"/>
         </c:scaling>
@@ -12932,7 +12932,7 @@
             <a:endParaRPr lang="en-US"/>
           </a:p>
         </c:txPr>
-        <c:crossAx val="-2119232888"/>
+        <c:crossAx val="2124391416"/>
         <c:crosses val="autoZero"/>
         <c:auto val="1"/>
         <c:lblAlgn val="ctr"/>
@@ -12940,7 +12940,7 @@
         <c:noMultiLvlLbl val="0"/>
       </c:catAx>
       <c:valAx>
-        <c:axId val="-2119232888"/>
+        <c:axId val="2124391416"/>
         <c:scaling>
           <c:orientation val="minMax"/>
         </c:scaling>
@@ -13032,7 +13032,7 @@
             <a:endParaRPr lang="en-US"/>
           </a:p>
         </c:txPr>
-        <c:crossAx val="-2119236376"/>
+        <c:crossAx val="2123990280"/>
         <c:crosses val="autoZero"/>
         <c:crossBetween val="between"/>
       </c:valAx>
@@ -33516,7 +33516,7 @@
           <p:nvPr>
             <p:extLst>
               <p:ext uri="{D42A27DB-BD31-4B8C-83A1-F6EECF244321}">
-                <p14:modId xmlns:p14="http://schemas.microsoft.com/office/powerpoint/2010/main" val="1540686068"/>
+                <p14:modId xmlns:p14="http://schemas.microsoft.com/office/powerpoint/2010/main" val="1355132813"/>
               </p:ext>
             </p:extLst>
           </p:nvPr>
@@ -36184,7 +36184,7 @@
   <a:extraClrSchemeLst/>
   <a:extLst>
     <a:ext uri="{05A4C25C-085E-4340-85A3-A5531E510DB2}">
-      <thm15:themeFamily xmlns:thm15="http://schemas.microsoft.com/office/thememl/2012/main" xmlns="" name="Office Theme" id="{62F939B6-93AF-4DB8-9C6B-D6C7DFDC589F}" vid="{4A3C46E8-61CC-4603-A589-7422A47A8E4A}"/>
+      <thm15:themeFamily xmlns="" xmlns:thm15="http://schemas.microsoft.com/office/thememl/2012/main" name="Office Theme" id="{62F939B6-93AF-4DB8-9C6B-D6C7DFDC589F}" vid="{4A3C46E8-61CC-4603-A589-7422A47A8E4A}"/>
     </a:ext>
   </a:extLst>
 </a:theme>
@@ -36445,7 +36445,7 @@
   <a:extraClrSchemeLst/>
   <a:extLst>
     <a:ext uri="{05A4C25C-085E-4340-85A3-A5531E510DB2}">
-      <thm15:themeFamily xmlns:thm15="http://schemas.microsoft.com/office/thememl/2012/main" xmlns="" name="Office Theme" id="{62F939B6-93AF-4DB8-9C6B-D6C7DFDC589F}" vid="{4A3C46E8-61CC-4603-A589-7422A47A8E4A}"/>
+      <thm15:themeFamily xmlns="" xmlns:thm15="http://schemas.microsoft.com/office/thememl/2012/main" name="Office Theme" id="{62F939B6-93AF-4DB8-9C6B-D6C7DFDC589F}" vid="{4A3C46E8-61CC-4603-A589-7422A47A8E4A}"/>
     </a:ext>
   </a:extLst>
 </a:theme>

</xml_diff>